<commit_message>
Update Code Review slides
</commit_message>
<xml_diff>
--- a/Blood-Sweat-and-Code-Reviews/Code Reviews.pptx
+++ b/Blood-Sweat-and-Code-Reviews/Code Reviews.pptx
@@ -34,16 +34,16 @@
     <p:sldId id="319" r:id="rId25"/>
     <p:sldId id="309" r:id="rId26"/>
     <p:sldId id="285" r:id="rId27"/>
-    <p:sldId id="281" r:id="rId28"/>
-    <p:sldId id="282" r:id="rId29"/>
-    <p:sldId id="283" r:id="rId30"/>
-    <p:sldId id="287" r:id="rId31"/>
+    <p:sldId id="282" r:id="rId28"/>
+    <p:sldId id="283" r:id="rId29"/>
+    <p:sldId id="287" r:id="rId30"/>
+    <p:sldId id="281" r:id="rId31"/>
     <p:sldId id="310" r:id="rId32"/>
     <p:sldId id="308" r:id="rId33"/>
     <p:sldId id="324" r:id="rId34"/>
-    <p:sldId id="299" r:id="rId35"/>
-    <p:sldId id="298" r:id="rId36"/>
-    <p:sldId id="297" r:id="rId37"/>
+    <p:sldId id="297" r:id="rId35"/>
+    <p:sldId id="299" r:id="rId36"/>
+    <p:sldId id="298" r:id="rId37"/>
     <p:sldId id="296" r:id="rId38"/>
     <p:sldId id="303" r:id="rId39"/>
     <p:sldId id="292" r:id="rId40"/>
@@ -189,16 +189,16 @@
             <p14:sldId id="319"/>
             <p14:sldId id="309"/>
             <p14:sldId id="285"/>
-            <p14:sldId id="281"/>
             <p14:sldId id="282"/>
             <p14:sldId id="283"/>
             <p14:sldId id="287"/>
+            <p14:sldId id="281"/>
             <p14:sldId id="310"/>
             <p14:sldId id="308"/>
             <p14:sldId id="324"/>
+            <p14:sldId id="297"/>
             <p14:sldId id="299"/>
             <p14:sldId id="298"/>
-            <p14:sldId id="297"/>
             <p14:sldId id="296"/>
             <p14:sldId id="303"/>
             <p14:sldId id="292"/>
@@ -1560,34 +1560,10 @@
                 <a:ea typeface="+mj-ea"/>
                 <a:cs typeface="+mj-cs"/>
               </a:rPr>
-              <a:t>Not every Code</a:t>
-            </a:r>
-            <a:r>
-              <a:rPr lang="en-US" sz="1200" kern="1200" baseline="0" dirty="0">
-                <a:solidFill>
-                  <a:schemeClr val="tx1"/>
-                </a:solidFill>
-                <a:effectLst/>
-                <a:latin typeface="+mj-lt"/>
-                <a:ea typeface="+mj-ea"/>
-                <a:cs typeface="+mj-cs"/>
-              </a:rPr>
-              <a:t> Review needs to make the code perfect</a:t>
-            </a:r>
-          </a:p>
-          <a:p>
-            <a:r>
-              <a:rPr lang="en-US" sz="1200" kern="1200" baseline="0" dirty="0">
-                <a:solidFill>
-                  <a:schemeClr val="tx1"/>
-                </a:solidFill>
-                <a:effectLst/>
-                <a:latin typeface="+mj-lt"/>
-                <a:ea typeface="+mj-ea"/>
-                <a:cs typeface="+mj-cs"/>
-              </a:rPr>
-              <a:t>If there are many issues, a</a:t>
-            </a:r>
+              <a:t>Limit feedback on repeated patterns</a:t>
+            </a:r>
+          </a:p>
+          <a:p>
             <a:r>
               <a:rPr lang="en-US" sz="1200" kern="1200" dirty="0">
                 <a:solidFill>
@@ -1598,41 +1574,7 @@
                 <a:ea typeface="+mj-ea"/>
                 <a:cs typeface="+mj-cs"/>
               </a:rPr>
-              <a:t>im to bring the code up a letter grade or two</a:t>
-            </a:r>
-          </a:p>
-          <a:p>
-            <a:r>
-              <a:rPr lang="en-US" dirty="0"/>
-              <a:t>The next review can bring it up more</a:t>
-            </a:r>
-          </a:p>
-          <a:p>
-            <a:r>
-              <a:rPr lang="en-US" dirty="0"/>
-              <a:t>This</a:t>
-            </a:r>
-            <a:r>
-              <a:rPr lang="en-US" baseline="0" dirty="0"/>
-              <a:t> prevents the review from dragging on too long and becoming bogged down in trivial arguments</a:t>
-            </a:r>
-          </a:p>
-          <a:p>
-            <a:endParaRPr lang="en-US" dirty="0"/>
-          </a:p>
-          <a:p>
-            <a:r>
-              <a:rPr lang="en-US" dirty="0"/>
-              <a:t>Look for opportunities to split up large reviews</a:t>
-            </a:r>
-          </a:p>
-          <a:p>
-            <a:endParaRPr lang="en-US" dirty="0"/>
-          </a:p>
-          <a:p>
-            <a:r>
-              <a:rPr lang="en-US" dirty="0"/>
-              <a:t>Approve, if only Trivial Fixes Remain</a:t>
+              <a:t>Combine similar comments (e.g., “See naming convention comment above”)</a:t>
             </a:r>
           </a:p>
           <a:p>
@@ -1666,7 +1608,7 @@
     </p:spTree>
     <p:extLst>
       <p:ext uri="{BB962C8B-B14F-4D97-AF65-F5344CB8AC3E}">
-        <p14:creationId xmlns:p14="http://schemas.microsoft.com/office/powerpoint/2010/main" val="1696579158"/>
+        <p14:creationId xmlns:p14="http://schemas.microsoft.com/office/powerpoint/2010/main" val="329099366"/>
       </p:ext>
     </p:extLst>
   </p:cSld>
@@ -1730,24 +1672,8 @@
                 <a:ea typeface="+mj-ea"/>
                 <a:cs typeface="+mj-cs"/>
               </a:rPr>
-              <a:t>Limit feedback on repeated patterns</a:t>
-            </a:r>
-          </a:p>
-          <a:p>
-            <a:r>
-              <a:rPr lang="en-US" sz="1200" kern="1200" dirty="0">
-                <a:solidFill>
-                  <a:schemeClr val="tx1"/>
-                </a:solidFill>
-                <a:effectLst/>
-                <a:latin typeface="+mj-lt"/>
-                <a:ea typeface="+mj-ea"/>
-                <a:cs typeface="+mj-cs"/>
-              </a:rPr>
-              <a:t>Combine similar comments (e.g., “See naming convention comment above”)</a:t>
-            </a:r>
-          </a:p>
-          <a:p>
+              <a:t>Respect the scope of the review</a:t>
+            </a:r>
             <a:endParaRPr lang="en-US" dirty="0"/>
           </a:p>
         </p:txBody>
@@ -1778,7 +1704,7 @@
     </p:spTree>
     <p:extLst>
       <p:ext uri="{BB962C8B-B14F-4D97-AF65-F5344CB8AC3E}">
-        <p14:creationId xmlns:p14="http://schemas.microsoft.com/office/powerpoint/2010/main" val="329099366"/>
+        <p14:creationId xmlns:p14="http://schemas.microsoft.com/office/powerpoint/2010/main" val="3923662296"/>
       </p:ext>
     </p:extLst>
   </p:cSld>
@@ -1842,8 +1768,82 @@
                 <a:ea typeface="+mj-ea"/>
                 <a:cs typeface="+mj-cs"/>
               </a:rPr>
-              <a:t>Respect the scope of the review</a:t>
-            </a:r>
+              <a:t>Not every Code</a:t>
+            </a:r>
+            <a:r>
+              <a:rPr lang="en-US" sz="1200" kern="1200" baseline="0" dirty="0">
+                <a:solidFill>
+                  <a:schemeClr val="tx1"/>
+                </a:solidFill>
+                <a:effectLst/>
+                <a:latin typeface="+mj-lt"/>
+                <a:ea typeface="+mj-ea"/>
+                <a:cs typeface="+mj-cs"/>
+              </a:rPr>
+              <a:t> Review needs to make the code perfect</a:t>
+            </a:r>
+          </a:p>
+          <a:p>
+            <a:r>
+              <a:rPr lang="en-US" sz="1200" kern="1200" baseline="0" dirty="0">
+                <a:solidFill>
+                  <a:schemeClr val="tx1"/>
+                </a:solidFill>
+                <a:effectLst/>
+                <a:latin typeface="+mj-lt"/>
+                <a:ea typeface="+mj-ea"/>
+                <a:cs typeface="+mj-cs"/>
+              </a:rPr>
+              <a:t>If there are many issues, a</a:t>
+            </a:r>
+            <a:r>
+              <a:rPr lang="en-US" sz="1200" kern="1200" dirty="0">
+                <a:solidFill>
+                  <a:schemeClr val="tx1"/>
+                </a:solidFill>
+                <a:effectLst/>
+                <a:latin typeface="+mj-lt"/>
+                <a:ea typeface="+mj-ea"/>
+                <a:cs typeface="+mj-cs"/>
+              </a:rPr>
+              <a:t>im to bring the code up a letter grade or two</a:t>
+            </a:r>
+          </a:p>
+          <a:p>
+            <a:r>
+              <a:rPr lang="en-US" dirty="0"/>
+              <a:t>The next review can bring it up more</a:t>
+            </a:r>
+          </a:p>
+          <a:p>
+            <a:r>
+              <a:rPr lang="en-US" dirty="0"/>
+              <a:t>This</a:t>
+            </a:r>
+            <a:r>
+              <a:rPr lang="en-US" baseline="0" dirty="0"/>
+              <a:t> prevents the review from dragging on too long and becoming bogged down in trivial arguments</a:t>
+            </a:r>
+          </a:p>
+          <a:p>
+            <a:endParaRPr lang="en-US" dirty="0"/>
+          </a:p>
+          <a:p>
+            <a:r>
+              <a:rPr lang="en-US" dirty="0"/>
+              <a:t>Look for opportunities to split up large reviews</a:t>
+            </a:r>
+          </a:p>
+          <a:p>
+            <a:endParaRPr lang="en-US" dirty="0"/>
+          </a:p>
+          <a:p>
+            <a:r>
+              <a:rPr lang="en-US" dirty="0"/>
+              <a:t>Approve, if only Trivial Fixes Remain</a:t>
+            </a:r>
+          </a:p>
+          <a:p>
             <a:endParaRPr lang="en-US" dirty="0"/>
           </a:p>
         </p:txBody>
@@ -1865,7 +1865,7 @@
           <a:p>
             <a:fld id="{58B0D769-A7CC-4121-8D93-CE8B89E00FE0}" type="slidenum">
               <a:rPr lang="en-US" smtClean="0"/>
-              <a:t>29</a:t>
+              <a:t>30</a:t>
             </a:fld>
             <a:endParaRPr lang="en-US"/>
           </a:p>
@@ -1874,7 +1874,7 @@
     </p:spTree>
     <p:extLst>
       <p:ext uri="{BB962C8B-B14F-4D97-AF65-F5344CB8AC3E}">
-        <p14:creationId xmlns:p14="http://schemas.microsoft.com/office/powerpoint/2010/main" val="3923662296"/>
+        <p14:creationId xmlns:p14="http://schemas.microsoft.com/office/powerpoint/2010/main" val="1696579158"/>
       </p:ext>
     </p:extLst>
   </p:cSld>
@@ -1930,22 +1930,41 @@
           <a:p>
             <a:r>
               <a:rPr lang="en-US" dirty="0"/>
-              <a:t>Write a clear change list description</a:t>
-            </a:r>
-          </a:p>
-          <a:p>
-            <a:pPr lvl="0"/>
-            <a:r>
-              <a:rPr lang="en-US" dirty="0"/>
-              <a:t>Respond with what you changed</a:t>
-            </a:r>
-          </a:p>
-          <a:p>
-            <a:pPr lvl="0"/>
-            <a:r>
-              <a:rPr lang="en-US" dirty="0"/>
-              <a:t>Solicit missing information</a:t>
-            </a:r>
+              <a:t>Automate the easy stuff</a:t>
+            </a:r>
+          </a:p>
+          <a:p>
+            <a:pPr marL="171450" indent="-171450">
+              <a:buFont typeface="Arial" panose="020B0604020202020204" pitchFamily="34" charset="0"/>
+              <a:buChar char="•"/>
+            </a:pPr>
+            <a:r>
+              <a:rPr lang="en-US" dirty="0"/>
+              <a:t>compiler</a:t>
+            </a:r>
+          </a:p>
+          <a:p>
+            <a:pPr marL="171450" indent="-171450">
+              <a:buFont typeface="Arial" panose="020B0604020202020204" pitchFamily="34" charset="0"/>
+              <a:buChar char="•"/>
+            </a:pPr>
+            <a:r>
+              <a:rPr lang="en-US" dirty="0"/>
+              <a:t>linter</a:t>
+            </a:r>
+          </a:p>
+          <a:p>
+            <a:pPr marL="171450" indent="-171450">
+              <a:buFont typeface="Arial" panose="020B0604020202020204" pitchFamily="34" charset="0"/>
+              <a:buChar char="•"/>
+            </a:pPr>
+            <a:r>
+              <a:rPr lang="en-US" dirty="0"/>
+              <a:t>Automated tests</a:t>
+            </a:r>
+          </a:p>
+          <a:p>
+            <a:endParaRPr lang="en-US" dirty="0"/>
           </a:p>
           <a:p>
             <a:endParaRPr lang="en-US" dirty="0"/>
@@ -1969,7 +1988,7 @@
           <a:p>
             <a:fld id="{58B0D769-A7CC-4121-8D93-CE8B89E00FE0}" type="slidenum">
               <a:rPr lang="en-US" smtClean="0"/>
-              <a:t>35</a:t>
+              <a:t>34</a:t>
             </a:fld>
             <a:endParaRPr lang="en-US"/>
           </a:p>
@@ -1978,7 +1997,7 @@
     </p:spTree>
     <p:extLst>
       <p:ext uri="{BB962C8B-B14F-4D97-AF65-F5344CB8AC3E}">
-        <p14:creationId xmlns:p14="http://schemas.microsoft.com/office/powerpoint/2010/main" val="4129013769"/>
+        <p14:creationId xmlns:p14="http://schemas.microsoft.com/office/powerpoint/2010/main" val="2090670743"/>
       </p:ext>
     </p:extLst>
   </p:cSld>
@@ -2034,41 +2053,22 @@
           <a:p>
             <a:r>
               <a:rPr lang="en-US" dirty="0"/>
-              <a:t>Automate the easy stuff</a:t>
-            </a:r>
-          </a:p>
-          <a:p>
-            <a:pPr marL="171450" indent="-171450">
-              <a:buFont typeface="Arial" panose="020B0604020202020204" pitchFamily="34" charset="0"/>
-              <a:buChar char="•"/>
-            </a:pPr>
-            <a:r>
-              <a:rPr lang="en-US" dirty="0"/>
-              <a:t>compiler</a:t>
-            </a:r>
-          </a:p>
-          <a:p>
-            <a:pPr marL="171450" indent="-171450">
-              <a:buFont typeface="Arial" panose="020B0604020202020204" pitchFamily="34" charset="0"/>
-              <a:buChar char="•"/>
-            </a:pPr>
-            <a:r>
-              <a:rPr lang="en-US" dirty="0"/>
-              <a:t>linter</a:t>
-            </a:r>
-          </a:p>
-          <a:p>
-            <a:pPr marL="171450" indent="-171450">
-              <a:buFont typeface="Arial" panose="020B0604020202020204" pitchFamily="34" charset="0"/>
-              <a:buChar char="•"/>
-            </a:pPr>
-            <a:r>
-              <a:rPr lang="en-US" dirty="0"/>
-              <a:t>Automated tests</a:t>
-            </a:r>
-          </a:p>
-          <a:p>
-            <a:endParaRPr lang="en-US" dirty="0"/>
+              <a:t>Write a clear change list description</a:t>
+            </a:r>
+          </a:p>
+          <a:p>
+            <a:pPr lvl="0"/>
+            <a:r>
+              <a:rPr lang="en-US" dirty="0"/>
+              <a:t>Respond with what you changed</a:t>
+            </a:r>
+          </a:p>
+          <a:p>
+            <a:pPr lvl="0"/>
+            <a:r>
+              <a:rPr lang="en-US" dirty="0"/>
+              <a:t>Solicit missing information</a:t>
+            </a:r>
           </a:p>
           <a:p>
             <a:endParaRPr lang="en-US" dirty="0"/>
@@ -2101,7 +2101,7 @@
     </p:spTree>
     <p:extLst>
       <p:ext uri="{BB962C8B-B14F-4D97-AF65-F5344CB8AC3E}">
-        <p14:creationId xmlns:p14="http://schemas.microsoft.com/office/powerpoint/2010/main" val="2090670743"/>
+        <p14:creationId xmlns:p14="http://schemas.microsoft.com/office/powerpoint/2010/main" val="4129013769"/>
       </p:ext>
     </p:extLst>
   </p:cSld>
@@ -2247,11 +2247,7 @@
           <a:p>
             <a:r>
               <a:rPr lang="en-US" dirty="0"/>
-              <a:t>If the reviewer is confused by your code, go back to the code and make </a:t>
-            </a:r>
-            <a:r>
-              <a:rPr lang="en-US"/>
-              <a:t>it self-documenting</a:t>
+              <a:t>If the reviewer is confused by your code, go back to the code and make it self-documenting</a:t>
             </a:r>
           </a:p>
           <a:p>
@@ -6937,7 +6933,16 @@
           <a:bodyPr/>
           <a:lstStyle/>
           <a:p>
-            <a:endParaRPr lang="en-US" dirty="0"/>
+            <a:r>
+              <a:rPr lang="en-US" dirty="0"/>
+              <a:t>Why are code reviews important?</a:t>
+            </a:r>
+          </a:p>
+          <a:p>
+            <a:r>
+              <a:rPr lang="en-US" dirty="0"/>
+              <a:t>How can we make them better?</a:t>
+            </a:r>
           </a:p>
         </p:txBody>
       </p:sp>
@@ -7409,31 +7414,31 @@
           <a:p>
             <a:r>
               <a:rPr lang="en-US" dirty="0"/>
+              <a:t>Limited Time and Stamina</a:t>
+            </a:r>
+          </a:p>
+          <a:p>
+            <a:r>
+              <a:rPr lang="en-US" dirty="0"/>
+              <a:t>Reviews often block other changes</a:t>
+            </a:r>
+          </a:p>
+          <a:p>
+            <a:r>
+              <a:rPr lang="en-US" dirty="0"/>
               <a:t>Miscommunication</a:t>
             </a:r>
           </a:p>
           <a:p>
             <a:r>
               <a:rPr lang="en-US" dirty="0"/>
-              <a:t>Limited Time and Stamina</a:t>
-            </a:r>
-          </a:p>
-          <a:p>
-            <a:r>
-              <a:rPr lang="en-US" dirty="0"/>
-              <a:t>Reviews often block other changes</a:t>
+              <a:t>Different opinions</a:t>
             </a:r>
           </a:p>
           <a:p>
             <a:r>
               <a:rPr lang="en-US" dirty="0"/>
               <a:t>There is often more than one correct solution to a problem</a:t>
-            </a:r>
-          </a:p>
-          <a:p>
-            <a:r>
-              <a:rPr lang="en-US" dirty="0"/>
-              <a:t>Different opinions</a:t>
             </a:r>
           </a:p>
           <a:p>
@@ -7536,7 +7541,7 @@
           <a:p>
             <a:r>
               <a:rPr lang="en-US" dirty="0"/>
-              <a:t>Belief that I know less than the reviewer</a:t>
+              <a:t>Belief that I know less than the author</a:t>
             </a:r>
           </a:p>
           <a:p>
@@ -8393,13 +8398,13 @@
         </p:nvSpPr>
         <p:spPr>
           <a:xfrm>
-            <a:off x="838200" y="1358537"/>
-            <a:ext cx="10515600" cy="4818426"/>
+            <a:off x="69133" y="1176862"/>
+            <a:ext cx="5471768" cy="5672048"/>
           </a:xfrm>
         </p:spPr>
         <p:txBody>
           <a:bodyPr>
-            <a:normAutofit fontScale="55000" lnSpcReduction="20000"/>
+            <a:noAutofit/>
           </a:bodyPr>
           <a:lstStyle/>
           <a:p>
@@ -8410,189 +8415,234 @@
               <a:buNone/>
             </a:pPr>
             <a:r>
-              <a:rPr lang="en-US" dirty="0"/>
+              <a:rPr lang="en-US" sz="1400" dirty="0"/>
               <a:t>{</a:t>
             </a:r>
             <a:br>
-              <a:rPr lang="en-US" dirty="0"/>
+              <a:rPr lang="en-US" sz="1400" dirty="0"/>
             </a:br>
             <a:r>
-              <a:rPr lang="en-US" dirty="0"/>
+              <a:rPr lang="en-US" sz="1400" dirty="0"/>
               <a:t>    "name": "David Giard",</a:t>
             </a:r>
             <a:br>
-              <a:rPr lang="en-US" dirty="0"/>
+              <a:rPr lang="en-US" sz="1400" dirty="0"/>
             </a:br>
             <a:r>
-              <a:rPr lang="en-US" dirty="0"/>
-              <a:t>    "title": “Cloud </a:t>
-            </a:r>
-            <a:r>
-              <a:rPr lang="en-US"/>
-              <a:t>Solution Architect",</a:t>
+              <a:rPr lang="en-US" sz="1400" dirty="0"/>
+              <a:t>    "title": “Cloud Solution Architect",</a:t>
             </a:r>
             <a:br>
-              <a:rPr lang="en-US" dirty="0"/>
+              <a:rPr lang="en-US" sz="1400" dirty="0"/>
             </a:br>
             <a:r>
-              <a:rPr lang="en-US" dirty="0"/>
+              <a:rPr lang="en-US" sz="1400" dirty="0"/>
               <a:t>    "employer": "Microsoft",</a:t>
             </a:r>
             <a:br>
-              <a:rPr lang="en-US" dirty="0"/>
+              <a:rPr lang="en-US" sz="1400" dirty="0"/>
             </a:br>
             <a:r>
-              <a:rPr lang="en-US" dirty="0"/>
+              <a:rPr lang="en-US" sz="1400" dirty="0"/>
               <a:t>    "email": "dgiard@microsoft.com",</a:t>
             </a:r>
             <a:br>
-              <a:rPr lang="en-US" dirty="0"/>
+              <a:rPr lang="en-US" sz="1400" dirty="0"/>
             </a:br>
             <a:r>
-              <a:rPr lang="en-US" dirty="0"/>
+              <a:rPr lang="en-US" sz="1400" dirty="0"/>
               <a:t>    "twitter": "@</a:t>
             </a:r>
             <a:r>
-              <a:rPr lang="en-US" dirty="0" err="1"/>
+              <a:rPr lang="en-US" sz="1400" dirty="0" err="1"/>
               <a:t>DavidGiard</a:t>
             </a:r>
             <a:r>
-              <a:rPr lang="en-US" dirty="0"/>
+              <a:rPr lang="en-US" sz="1400" dirty="0"/>
               <a:t>",</a:t>
             </a:r>
             <a:br>
-              <a:rPr lang="en-US" dirty="0"/>
+              <a:rPr lang="en-US" sz="1400" dirty="0"/>
             </a:br>
             <a:r>
-              <a:rPr lang="en-US" dirty="0"/>
+              <a:rPr lang="en-US" sz="1400" dirty="0"/>
               <a:t>    "blog": "davidgiard.com",</a:t>
             </a:r>
             <a:br>
-              <a:rPr lang="en-US" dirty="0"/>
+              <a:rPr lang="en-US" sz="1400" dirty="0"/>
             </a:br>
             <a:r>
-              <a:rPr lang="en-US" dirty="0"/>
+              <a:rPr lang="en-US" sz="1400" dirty="0"/>
               <a:t>    "TV": [</a:t>
             </a:r>
             <a:br>
-              <a:rPr lang="en-US" dirty="0"/>
+              <a:rPr lang="en-US" sz="1400" dirty="0"/>
             </a:br>
             <a:r>
-              <a:rPr lang="en-US" dirty="0"/>
+              <a:rPr lang="en-US" sz="1400" dirty="0"/>
               <a:t>        {</a:t>
             </a:r>
             <a:br>
-              <a:rPr lang="en-US" dirty="0"/>
+              <a:rPr lang="en-US" sz="1400" dirty="0"/>
             </a:br>
             <a:r>
-              <a:rPr lang="en-US" dirty="0"/>
+              <a:rPr lang="en-US" sz="1400" dirty="0"/>
               <a:t>            "title": "Technology and Friends",</a:t>
             </a:r>
             <a:br>
-              <a:rPr lang="en-US" dirty="0"/>
+              <a:rPr lang="en-US" sz="1400" dirty="0"/>
             </a:br>
             <a:r>
-              <a:rPr lang="en-US" dirty="0"/>
-              <a:t>            "description": "Talking with smart people about technology",</a:t>
+              <a:rPr lang="en-US" sz="1400" dirty="0"/>
+              <a:t>            "description": </a:t>
             </a:r>
             <a:br>
-              <a:rPr lang="en-US" dirty="0"/>
+              <a:rPr lang="en-US" sz="1400" dirty="0"/>
             </a:br>
             <a:r>
-              <a:rPr lang="en-US" dirty="0"/>
+              <a:rPr lang="en-US" sz="1400" dirty="0"/>
+              <a:t>	"Talking with smart people about technology",</a:t>
+            </a:r>
+            <a:br>
+              <a:rPr lang="en-US" sz="1400" dirty="0"/>
+            </a:br>
+            <a:r>
+              <a:rPr lang="en-US" sz="1400" dirty="0"/>
               <a:t>            "</a:t>
             </a:r>
             <a:r>
-              <a:rPr lang="en-US" dirty="0" err="1"/>
+              <a:rPr lang="en-US" sz="1400" dirty="0" err="1"/>
               <a:t>url</a:t>
             </a:r>
             <a:r>
-              <a:rPr lang="en-US" dirty="0"/>
+              <a:rPr lang="en-US" sz="1400" dirty="0"/>
               <a:t>": "http://technologyandfriends.com"</a:t>
             </a:r>
             <a:br>
-              <a:rPr lang="en-US" dirty="0"/>
+              <a:rPr lang="en-US" sz="1400" dirty="0"/>
             </a:br>
             <a:r>
-              <a:rPr lang="en-US" dirty="0"/>
+              <a:rPr lang="en-US" sz="1400" dirty="0"/>
               <a:t>        },</a:t>
             </a:r>
             <a:br>
-              <a:rPr lang="en-US" dirty="0"/>
+              <a:rPr lang="en-US" sz="1400" dirty="0"/>
             </a:br>
             <a:r>
-              <a:rPr lang="en-US" dirty="0"/>
+              <a:rPr lang="en-US" sz="1400" dirty="0"/>
               <a:t>        {</a:t>
             </a:r>
             <a:br>
-              <a:rPr lang="en-US" dirty="0"/>
+              <a:rPr lang="en-US" sz="1400" dirty="0"/>
             </a:br>
             <a:r>
-              <a:rPr lang="en-US" dirty="0"/>
+              <a:rPr lang="en-US" sz="1400" dirty="0"/>
               <a:t>            "title": "</a:t>
             </a:r>
             <a:r>
-              <a:rPr lang="en-US" dirty="0" err="1"/>
+              <a:rPr lang="en-US" sz="1400" dirty="0" err="1"/>
               <a:t>GCast</a:t>
             </a:r>
             <a:r>
-              <a:rPr lang="en-US" dirty="0"/>
+              <a:rPr lang="en-US" sz="1400" dirty="0"/>
               <a:t>",</a:t>
             </a:r>
             <a:br>
-              <a:rPr lang="en-US" dirty="0"/>
+              <a:rPr lang="en-US" sz="1400" dirty="0"/>
             </a:br>
             <a:r>
-              <a:rPr lang="en-US" dirty="0"/>
-              <a:t>            "description": "Screencast demos showing how to do tech stuff",</a:t>
+              <a:rPr lang="en-US" sz="1400" dirty="0"/>
+              <a:t>            "description": </a:t>
             </a:r>
             <a:br>
-              <a:rPr lang="en-US" dirty="0"/>
+              <a:rPr lang="en-US" sz="1400" dirty="0"/>
             </a:br>
             <a:r>
-              <a:rPr lang="en-US" dirty="0"/>
+              <a:rPr lang="en-US" sz="1400" dirty="0"/>
+              <a:t>	"Screencast demos showing how to do tech stuff",</a:t>
+            </a:r>
+            <a:br>
+              <a:rPr lang="en-US" sz="1400" dirty="0"/>
+            </a:br>
+            <a:r>
+              <a:rPr lang="en-US" sz="1400" dirty="0"/>
               <a:t>            "</a:t>
             </a:r>
             <a:r>
-              <a:rPr lang="en-US" dirty="0" err="1"/>
+              <a:rPr lang="en-US" sz="1400" dirty="0" err="1"/>
               <a:t>url</a:t>
             </a:r>
             <a:r>
-              <a:rPr lang="en-US" dirty="0"/>
+              <a:rPr lang="en-US" sz="1400" dirty="0"/>
               <a:t>": "https://aka.ms/</a:t>
             </a:r>
             <a:r>
-              <a:rPr lang="en-US" dirty="0" err="1"/>
+              <a:rPr lang="en-US" sz="1400" dirty="0" err="1"/>
               <a:t>gcast</a:t>
             </a:r>
             <a:r>
-              <a:rPr lang="en-US" dirty="0"/>
+              <a:rPr lang="en-US" sz="1400" dirty="0"/>
               <a:t>"</a:t>
             </a:r>
             <a:br>
-              <a:rPr lang="en-US" dirty="0"/>
+              <a:rPr lang="en-US" sz="1400" dirty="0"/>
             </a:br>
             <a:r>
-              <a:rPr lang="en-US" dirty="0"/>
+              <a:rPr lang="en-US" sz="1400" dirty="0"/>
               <a:t>        }</a:t>
             </a:r>
             <a:br>
-              <a:rPr lang="en-US" dirty="0"/>
+              <a:rPr lang="en-US" sz="1400" dirty="0"/>
             </a:br>
             <a:r>
-              <a:rPr lang="en-US" dirty="0"/>
+              <a:rPr lang="en-US" sz="1400" dirty="0"/>
               <a:t>    ]</a:t>
             </a:r>
             <a:br>
-              <a:rPr lang="en-US" dirty="0"/>
+              <a:rPr lang="en-US" sz="1400" dirty="0"/>
             </a:br>
             <a:r>
-              <a:rPr lang="en-US" dirty="0"/>
+              <a:rPr lang="en-US" sz="1400" dirty="0"/>
               <a:t>}</a:t>
             </a:r>
           </a:p>
         </p:txBody>
       </p:sp>
+      <p:pic>
+        <p:nvPicPr>
+          <p:cNvPr id="5" name="Picture 4" descr="David Giard at home">
+            <a:extLst>
+              <a:ext uri="{FF2B5EF4-FFF2-40B4-BE49-F238E27FC236}">
+                <a16:creationId xmlns:a16="http://schemas.microsoft.com/office/drawing/2014/main" id="{4852B208-B8A9-9C88-ED47-F4F675C4E0DA}"/>
+              </a:ext>
+            </a:extLst>
+          </p:cNvPr>
+          <p:cNvPicPr>
+            <a:picLocks noChangeAspect="1"/>
+          </p:cNvPicPr>
+          <p:nvPr/>
+        </p:nvPicPr>
+        <p:blipFill rotWithShape="1">
+          <a:blip r:embed="rId2">
+            <a:extLst>
+              <a:ext uri="{28A0092B-C50C-407E-A947-70E740481C1C}">
+                <a14:useLocalDpi xmlns:a14="http://schemas.microsoft.com/office/drawing/2010/main" val="0"/>
+              </a:ext>
+            </a:extLst>
+          </a:blip>
+          <a:srcRect r="27263"/>
+          <a:stretch/>
+        </p:blipFill>
+        <p:spPr>
+          <a:xfrm>
+            <a:off x="5540901" y="0"/>
+            <a:ext cx="6651099" cy="6858000"/>
+          </a:xfrm>
+          <a:prstGeom prst="rect">
+            <a:avLst/>
+          </a:prstGeom>
+        </p:spPr>
+      </p:pic>
     </p:spTree>
     <p:extLst>
       <p:ext uri="{BB962C8B-B14F-4D97-AF65-F5344CB8AC3E}">
@@ -9411,7 +9461,7 @@
           <p:cNvPr id="2" name="Title 1">
             <a:extLst>
               <a:ext uri="{FF2B5EF4-FFF2-40B4-BE49-F238E27FC236}">
-                <a16:creationId xmlns:a16="http://schemas.microsoft.com/office/drawing/2014/main" id="{1A7D252D-6B4C-4749-BF4B-C4B91C7A2B9B}"/>
+                <a16:creationId xmlns:a16="http://schemas.microsoft.com/office/drawing/2014/main" id="{2CC1ED39-E06C-4481-A123-CC7C697D1E5B}"/>
               </a:ext>
             </a:extLst>
           </p:cNvPr>
@@ -9440,7 +9490,7 @@
                 <a:ea typeface="+mj-ea"/>
                 <a:cs typeface="+mj-cs"/>
               </a:rPr>
-              <a:t>Goal: Improve Code</a:t>
+              <a:t>Avoid Repeating Feedback</a:t>
             </a:r>
             <a:endParaRPr lang="en-US" dirty="0"/>
           </a:p>
@@ -9451,7 +9501,7 @@
           <p:cNvPr id="3" name="Content Placeholder 2">
             <a:extLst>
               <a:ext uri="{FF2B5EF4-FFF2-40B4-BE49-F238E27FC236}">
-                <a16:creationId xmlns:a16="http://schemas.microsoft.com/office/drawing/2014/main" id="{C5B44566-2B5B-46DB-BC5A-C1E2DA1E7236}"/>
+                <a16:creationId xmlns:a16="http://schemas.microsoft.com/office/drawing/2014/main" id="{BF1A8C6F-72A0-4A11-AB2B-0F965154AD0D}"/>
               </a:ext>
             </a:extLst>
           </p:cNvPr>
@@ -9467,9 +9517,6 @@
           <a:bodyPr/>
           <a:lstStyle/>
           <a:p>
-            <a:pPr marL="0" indent="0">
-              <a:buNone/>
-            </a:pPr>
             <a:endParaRPr lang="en-US" dirty="0"/>
           </a:p>
         </p:txBody>
@@ -9477,7 +9524,7 @@
     </p:spTree>
     <p:extLst>
       <p:ext uri="{BB962C8B-B14F-4D97-AF65-F5344CB8AC3E}">
-        <p14:creationId xmlns:p14="http://schemas.microsoft.com/office/powerpoint/2010/main" val="3537904068"/>
+        <p14:creationId xmlns:p14="http://schemas.microsoft.com/office/powerpoint/2010/main" val="1070692530"/>
       </p:ext>
     </p:extLst>
   </p:cSld>
@@ -9509,7 +9556,7 @@
           <p:cNvPr id="2" name="Title 1">
             <a:extLst>
               <a:ext uri="{FF2B5EF4-FFF2-40B4-BE49-F238E27FC236}">
-                <a16:creationId xmlns:a16="http://schemas.microsoft.com/office/drawing/2014/main" id="{2CC1ED39-E06C-4481-A123-CC7C697D1E5B}"/>
+                <a16:creationId xmlns:a16="http://schemas.microsoft.com/office/drawing/2014/main" id="{040CCC4B-DF36-45D2-9F4A-CF91339C1B14}"/>
               </a:ext>
             </a:extLst>
           </p:cNvPr>
@@ -9538,7 +9585,7 @@
                 <a:ea typeface="+mj-ea"/>
                 <a:cs typeface="+mj-cs"/>
               </a:rPr>
-              <a:t>Avoid Repeating Feedback</a:t>
+              <a:t>Consider the Scope of the Review</a:t>
             </a:r>
             <a:endParaRPr lang="en-US" dirty="0"/>
           </a:p>
@@ -9549,7 +9596,7 @@
           <p:cNvPr id="3" name="Content Placeholder 2">
             <a:extLst>
               <a:ext uri="{FF2B5EF4-FFF2-40B4-BE49-F238E27FC236}">
-                <a16:creationId xmlns:a16="http://schemas.microsoft.com/office/drawing/2014/main" id="{BF1A8C6F-72A0-4A11-AB2B-0F965154AD0D}"/>
+                <a16:creationId xmlns:a16="http://schemas.microsoft.com/office/drawing/2014/main" id="{4B44D634-86F7-4806-AD7E-EC760E369389}"/>
               </a:ext>
             </a:extLst>
           </p:cNvPr>
@@ -9565,14 +9612,45 @@
           <a:bodyPr/>
           <a:lstStyle/>
           <a:p>
-            <a:endParaRPr lang="en-US" dirty="0"/>
+            <a:r>
+              <a:rPr lang="en-US" dirty="0"/>
+              <a:t>Avoid feedback on lines that did not change</a:t>
+            </a:r>
+          </a:p>
+          <a:p>
+            <a:r>
+              <a:rPr lang="en-US" dirty="0"/>
+              <a:t>Exceptions</a:t>
+            </a:r>
+          </a:p>
+          <a:p>
+            <a:pPr lvl="1"/>
+            <a:r>
+              <a:rPr lang="en-US" dirty="0"/>
+              <a:t>Change affected a line (</a:t>
+            </a:r>
+            <a:r>
+              <a:rPr lang="en-US" dirty="0" err="1"/>
+              <a:t>e.g</a:t>
+            </a:r>
+            <a:r>
+              <a:rPr lang="en-US" dirty="0"/>
+              <a:t>, the name of a function whose body changed)</a:t>
+            </a:r>
+          </a:p>
+          <a:p>
+            <a:pPr lvl="1"/>
+            <a:r>
+              <a:rPr lang="en-US" dirty="0"/>
+              <a:t>Trivial change and few other feedback items</a:t>
+            </a:r>
           </a:p>
         </p:txBody>
       </p:sp>
     </p:spTree>
     <p:extLst>
       <p:ext uri="{BB962C8B-B14F-4D97-AF65-F5344CB8AC3E}">
-        <p14:creationId xmlns:p14="http://schemas.microsoft.com/office/powerpoint/2010/main" val="1070692530"/>
+        <p14:creationId xmlns:p14="http://schemas.microsoft.com/office/powerpoint/2010/main" val="3374163760"/>
       </p:ext>
     </p:extLst>
   </p:cSld>
@@ -9604,7 +9682,7 @@
           <p:cNvPr id="2" name="Title 1">
             <a:extLst>
               <a:ext uri="{FF2B5EF4-FFF2-40B4-BE49-F238E27FC236}">
-                <a16:creationId xmlns:a16="http://schemas.microsoft.com/office/drawing/2014/main" id="{040CCC4B-DF36-45D2-9F4A-CF91339C1B14}"/>
+                <a16:creationId xmlns:a16="http://schemas.microsoft.com/office/drawing/2014/main" id="{756AE765-1AAB-4A76-986C-DD680717C9A0}"/>
               </a:ext>
             </a:extLst>
           </p:cNvPr>
@@ -9617,9 +9695,7 @@
         </p:nvSpPr>
         <p:spPr/>
         <p:txBody>
-          <a:bodyPr>
-            <a:normAutofit/>
-          </a:bodyPr>
+          <a:bodyPr/>
           <a:lstStyle/>
           <a:p>
             <a:pPr rtl="0" eaLnBrk="1" latinLnBrk="0" hangingPunct="1"/>
@@ -9633,7 +9709,7 @@
                 <a:ea typeface="+mj-ea"/>
                 <a:cs typeface="+mj-cs"/>
               </a:rPr>
-              <a:t>Consider the Scope of the Review</a:t>
+              <a:t>Stalemates</a:t>
             </a:r>
             <a:endParaRPr lang="en-US" dirty="0"/>
           </a:p>
@@ -9644,7 +9720,7 @@
           <p:cNvPr id="3" name="Content Placeholder 2">
             <a:extLst>
               <a:ext uri="{FF2B5EF4-FFF2-40B4-BE49-F238E27FC236}">
-                <a16:creationId xmlns:a16="http://schemas.microsoft.com/office/drawing/2014/main" id="{4B44D634-86F7-4806-AD7E-EC760E369389}"/>
+                <a16:creationId xmlns:a16="http://schemas.microsoft.com/office/drawing/2014/main" id="{1EA7DAC6-CEC9-4255-872E-3E1D95674F03}"/>
               </a:ext>
             </a:extLst>
           </p:cNvPr>
@@ -9662,35 +9738,55 @@
           <a:p>
             <a:r>
               <a:rPr lang="en-US" dirty="0"/>
-              <a:t>Avoid feedback on lines that did not change</a:t>
-            </a:r>
-          </a:p>
-          <a:p>
-            <a:r>
-              <a:rPr lang="en-US" dirty="0"/>
-              <a:t>Exceptions</a:t>
+              <a:t>Symptoms</a:t>
             </a:r>
           </a:p>
           <a:p>
             <a:pPr lvl="1"/>
             <a:r>
               <a:rPr lang="en-US" dirty="0"/>
-              <a:t>Change affected a line (</a:t>
-            </a:r>
-            <a:r>
-              <a:rPr lang="en-US" dirty="0" err="1"/>
-              <a:t>e.g</a:t>
-            </a:r>
-            <a:r>
-              <a:rPr lang="en-US" dirty="0"/>
-              <a:t>, the name of a function whose body changed)</a:t>
+              <a:t>No progress</a:t>
             </a:r>
           </a:p>
           <a:p>
             <a:pPr lvl="1"/>
             <a:r>
               <a:rPr lang="en-US" dirty="0"/>
-              <a:t>Trivial change and few other feedback items</a:t>
+              <a:t>Tension</a:t>
+            </a:r>
+          </a:p>
+          <a:p>
+            <a:r>
+              <a:rPr lang="en-US" dirty="0"/>
+              <a:t>Cures</a:t>
+            </a:r>
+          </a:p>
+          <a:p>
+            <a:pPr lvl="1"/>
+            <a:r>
+              <a:rPr lang="en-US" dirty="0"/>
+              <a:t>Discuss</a:t>
+            </a:r>
+          </a:p>
+          <a:p>
+            <a:pPr lvl="1"/>
+            <a:r>
+              <a:rPr lang="en-US" dirty="0"/>
+              <a:t>Design Review</a:t>
+            </a:r>
+          </a:p>
+          <a:p>
+            <a:pPr lvl="1"/>
+            <a:r>
+              <a:rPr lang="en-US" dirty="0"/>
+              <a:t>Concede</a:t>
+            </a:r>
+          </a:p>
+          <a:p>
+            <a:pPr lvl="1"/>
+            <a:r>
+              <a:rPr lang="en-US" dirty="0"/>
+              <a:t>Escalate</a:t>
             </a:r>
           </a:p>
         </p:txBody>
@@ -9698,7 +9794,7 @@
     </p:spTree>
     <p:extLst>
       <p:ext uri="{BB962C8B-B14F-4D97-AF65-F5344CB8AC3E}">
-        <p14:creationId xmlns:p14="http://schemas.microsoft.com/office/powerpoint/2010/main" val="3374163760"/>
+        <p14:creationId xmlns:p14="http://schemas.microsoft.com/office/powerpoint/2010/main" val="3682861194"/>
       </p:ext>
     </p:extLst>
   </p:cSld>
@@ -9855,7 +9951,7 @@
           <p:cNvPr id="2" name="Title 1">
             <a:extLst>
               <a:ext uri="{FF2B5EF4-FFF2-40B4-BE49-F238E27FC236}">
-                <a16:creationId xmlns:a16="http://schemas.microsoft.com/office/drawing/2014/main" id="{756AE765-1AAB-4A76-986C-DD680717C9A0}"/>
+                <a16:creationId xmlns:a16="http://schemas.microsoft.com/office/drawing/2014/main" id="{1A7D252D-6B4C-4749-BF4B-C4B91C7A2B9B}"/>
               </a:ext>
             </a:extLst>
           </p:cNvPr>
@@ -9868,7 +9964,9 @@
         </p:nvSpPr>
         <p:spPr/>
         <p:txBody>
-          <a:bodyPr/>
+          <a:bodyPr>
+            <a:normAutofit/>
+          </a:bodyPr>
           <a:lstStyle/>
           <a:p>
             <a:pPr rtl="0" eaLnBrk="1" latinLnBrk="0" hangingPunct="1"/>
@@ -9882,7 +9980,7 @@
                 <a:ea typeface="+mj-ea"/>
                 <a:cs typeface="+mj-cs"/>
               </a:rPr>
-              <a:t>Stalemates</a:t>
+              <a:t>Goal: Improve Code</a:t>
             </a:r>
             <a:endParaRPr lang="en-US" dirty="0"/>
           </a:p>
@@ -9893,7 +9991,7 @@
           <p:cNvPr id="3" name="Content Placeholder 2">
             <a:extLst>
               <a:ext uri="{FF2B5EF4-FFF2-40B4-BE49-F238E27FC236}">
-                <a16:creationId xmlns:a16="http://schemas.microsoft.com/office/drawing/2014/main" id="{1EA7DAC6-CEC9-4255-872E-3E1D95674F03}"/>
+                <a16:creationId xmlns:a16="http://schemas.microsoft.com/office/drawing/2014/main" id="{C5B44566-2B5B-46DB-BC5A-C1E2DA1E7236}"/>
               </a:ext>
             </a:extLst>
           </p:cNvPr>
@@ -9909,65 +10007,17 @@
           <a:bodyPr/>
           <a:lstStyle/>
           <a:p>
-            <a:r>
-              <a:rPr lang="en-US" dirty="0"/>
-              <a:t>Symptoms</a:t>
-            </a:r>
-          </a:p>
-          <a:p>
-            <a:pPr lvl="1"/>
-            <a:r>
-              <a:rPr lang="en-US" dirty="0"/>
-              <a:t>No progress</a:t>
-            </a:r>
-          </a:p>
-          <a:p>
-            <a:pPr lvl="1"/>
-            <a:r>
-              <a:rPr lang="en-US" dirty="0"/>
-              <a:t>Tension</a:t>
-            </a:r>
-          </a:p>
-          <a:p>
-            <a:r>
-              <a:rPr lang="en-US" dirty="0"/>
-              <a:t>Cures</a:t>
-            </a:r>
-          </a:p>
-          <a:p>
-            <a:pPr lvl="1"/>
-            <a:r>
-              <a:rPr lang="en-US" dirty="0"/>
-              <a:t>Discuss</a:t>
-            </a:r>
-          </a:p>
-          <a:p>
-            <a:pPr lvl="1"/>
-            <a:r>
-              <a:rPr lang="en-US" dirty="0"/>
-              <a:t>Design Review</a:t>
-            </a:r>
-          </a:p>
-          <a:p>
-            <a:pPr lvl="1"/>
-            <a:r>
-              <a:rPr lang="en-US" dirty="0"/>
-              <a:t>Concede</a:t>
-            </a:r>
-          </a:p>
-          <a:p>
-            <a:pPr lvl="1"/>
-            <a:r>
-              <a:rPr lang="en-US" dirty="0"/>
-              <a:t>Escalate</a:t>
-            </a:r>
+            <a:pPr marL="0" indent="0">
+              <a:buNone/>
+            </a:pPr>
+            <a:endParaRPr lang="en-US" dirty="0"/>
           </a:p>
         </p:txBody>
       </p:sp>
     </p:spTree>
     <p:extLst>
       <p:ext uri="{BB962C8B-B14F-4D97-AF65-F5344CB8AC3E}">
-        <p14:creationId xmlns:p14="http://schemas.microsoft.com/office/powerpoint/2010/main" val="3682861194"/>
+        <p14:creationId xmlns:p14="http://schemas.microsoft.com/office/powerpoint/2010/main" val="3537904068"/>
       </p:ext>
     </p:extLst>
   </p:cSld>
@@ -10407,7 +10457,7 @@
           <p:cNvPr id="2" name="Title 1">
             <a:extLst>
               <a:ext uri="{FF2B5EF4-FFF2-40B4-BE49-F238E27FC236}">
-                <a16:creationId xmlns:a16="http://schemas.microsoft.com/office/drawing/2014/main" id="{55FBC620-476D-4296-935F-9E71A1ECB00F}"/>
+                <a16:creationId xmlns:a16="http://schemas.microsoft.com/office/drawing/2014/main" id="{1400C7A5-EDF0-4A76-967E-C7B402FCAED5}"/>
               </a:ext>
             </a:extLst>
           </p:cNvPr>
@@ -10426,7 +10476,7 @@
             <a:pPr lvl="0"/>
             <a:r>
               <a:rPr lang="en-US" dirty="0"/>
-              <a:t>Review your own code first</a:t>
+              <a:t>Use the computer</a:t>
             </a:r>
           </a:p>
         </p:txBody>
@@ -10436,7 +10486,7 @@
           <p:cNvPr id="3" name="Content Placeholder 2">
             <a:extLst>
               <a:ext uri="{FF2B5EF4-FFF2-40B4-BE49-F238E27FC236}">
-                <a16:creationId xmlns:a16="http://schemas.microsoft.com/office/drawing/2014/main" id="{7D5A9C92-94F5-4740-84CA-D1FD2F46FD27}"/>
+                <a16:creationId xmlns:a16="http://schemas.microsoft.com/office/drawing/2014/main" id="{410129CB-3B53-4D35-B842-E13D26067596}"/>
               </a:ext>
             </a:extLst>
           </p:cNvPr>
@@ -10452,14 +10502,14 @@
           <a:bodyPr/>
           <a:lstStyle/>
           <a:p>
-            <a:endParaRPr lang="en-US" dirty="0"/>
+            <a:endParaRPr lang="en-US"/>
           </a:p>
         </p:txBody>
       </p:sp>
     </p:spTree>
     <p:extLst>
       <p:ext uri="{BB962C8B-B14F-4D97-AF65-F5344CB8AC3E}">
-        <p14:creationId xmlns:p14="http://schemas.microsoft.com/office/powerpoint/2010/main" val="3324773624"/>
+        <p14:creationId xmlns:p14="http://schemas.microsoft.com/office/powerpoint/2010/main" val="849285240"/>
       </p:ext>
     </p:extLst>
   </p:cSld>
@@ -10491,7 +10541,7 @@
           <p:cNvPr id="2" name="Title 1">
             <a:extLst>
               <a:ext uri="{FF2B5EF4-FFF2-40B4-BE49-F238E27FC236}">
-                <a16:creationId xmlns:a16="http://schemas.microsoft.com/office/drawing/2014/main" id="{74F67C75-18B2-4C47-B562-A820CA04993D}"/>
+                <a16:creationId xmlns:a16="http://schemas.microsoft.com/office/drawing/2014/main" id="{55FBC620-476D-4296-935F-9E71A1ECB00F}"/>
               </a:ext>
             </a:extLst>
           </p:cNvPr>
@@ -10510,7 +10560,7 @@
             <a:pPr lvl="0"/>
             <a:r>
               <a:rPr lang="en-US" dirty="0"/>
-              <a:t>Communicate Clearly</a:t>
+              <a:t>Review your own code first</a:t>
             </a:r>
           </a:p>
         </p:txBody>
@@ -10520,7 +10570,7 @@
           <p:cNvPr id="3" name="Content Placeholder 2">
             <a:extLst>
               <a:ext uri="{FF2B5EF4-FFF2-40B4-BE49-F238E27FC236}">
-                <a16:creationId xmlns:a16="http://schemas.microsoft.com/office/drawing/2014/main" id="{D66E4CEB-A5F2-49D1-A171-E4F2F2F92B6D}"/>
+                <a16:creationId xmlns:a16="http://schemas.microsoft.com/office/drawing/2014/main" id="{7D5A9C92-94F5-4740-84CA-D1FD2F46FD27}"/>
               </a:ext>
             </a:extLst>
           </p:cNvPr>
@@ -10536,14 +10586,14 @@
           <a:bodyPr/>
           <a:lstStyle/>
           <a:p>
-            <a:endParaRPr lang="en-US"/>
+            <a:endParaRPr lang="en-US" dirty="0"/>
           </a:p>
         </p:txBody>
       </p:sp>
     </p:spTree>
     <p:extLst>
       <p:ext uri="{BB962C8B-B14F-4D97-AF65-F5344CB8AC3E}">
-        <p14:creationId xmlns:p14="http://schemas.microsoft.com/office/powerpoint/2010/main" val="97765795"/>
+        <p14:creationId xmlns:p14="http://schemas.microsoft.com/office/powerpoint/2010/main" val="3324773624"/>
       </p:ext>
     </p:extLst>
   </p:cSld>
@@ -10575,7 +10625,7 @@
           <p:cNvPr id="2" name="Title 1">
             <a:extLst>
               <a:ext uri="{FF2B5EF4-FFF2-40B4-BE49-F238E27FC236}">
-                <a16:creationId xmlns:a16="http://schemas.microsoft.com/office/drawing/2014/main" id="{1400C7A5-EDF0-4A76-967E-C7B402FCAED5}"/>
+                <a16:creationId xmlns:a16="http://schemas.microsoft.com/office/drawing/2014/main" id="{74F67C75-18B2-4C47-B562-A820CA04993D}"/>
               </a:ext>
             </a:extLst>
           </p:cNvPr>
@@ -10594,7 +10644,7 @@
             <a:pPr lvl="0"/>
             <a:r>
               <a:rPr lang="en-US" dirty="0"/>
-              <a:t>Use the computer</a:t>
+              <a:t>Communicate Clearly</a:t>
             </a:r>
           </a:p>
         </p:txBody>
@@ -10604,7 +10654,7 @@
           <p:cNvPr id="3" name="Content Placeholder 2">
             <a:extLst>
               <a:ext uri="{FF2B5EF4-FFF2-40B4-BE49-F238E27FC236}">
-                <a16:creationId xmlns:a16="http://schemas.microsoft.com/office/drawing/2014/main" id="{410129CB-3B53-4D35-B842-E13D26067596}"/>
+                <a16:creationId xmlns:a16="http://schemas.microsoft.com/office/drawing/2014/main" id="{D66E4CEB-A5F2-49D1-A171-E4F2F2F92B6D}"/>
               </a:ext>
             </a:extLst>
           </p:cNvPr>
@@ -10627,7 +10677,7 @@
     </p:spTree>
     <p:extLst>
       <p:ext uri="{BB962C8B-B14F-4D97-AF65-F5344CB8AC3E}">
-        <p14:creationId xmlns:p14="http://schemas.microsoft.com/office/powerpoint/2010/main" val="849285240"/>
+        <p14:creationId xmlns:p14="http://schemas.microsoft.com/office/powerpoint/2010/main" val="97765795"/>
       </p:ext>
     </p:extLst>
   </p:cSld>
@@ -10813,7 +10863,7 @@
             <a:pPr lvl="0"/>
             <a:r>
               <a:rPr lang="en-US" dirty="0"/>
-              <a:t>Break up large change lists</a:t>
+              <a:t>Break up large change sets</a:t>
             </a:r>
           </a:p>
         </p:txBody>
@@ -11272,7 +11322,7 @@
           <a:p>
             <a:r>
               <a:rPr lang="en-US" dirty="0"/>
-              <a:t>Clear Code</a:t>
+              <a:t>Readable Code</a:t>
             </a:r>
           </a:p>
           <a:p>
@@ -11442,10 +11492,9 @@
           <a:lstStyle/>
           <a:p>
             <a:r>
-              <a:rPr lang="en-US"/>
+              <a:rPr lang="en-US" dirty="0"/>
               <a:t>For Managers</a:t>
             </a:r>
-            <a:endParaRPr lang="en-US" dirty="0"/>
           </a:p>
         </p:txBody>
       </p:sp>
@@ -11472,7 +11521,7 @@
           <a:p>
             <a:r>
               <a:rPr lang="en-US" dirty="0"/>
-              <a:t>Rotate who receives whose code</a:t>
+              <a:t>Rotate who reviews whose code</a:t>
             </a:r>
           </a:p>
           <a:p>
@@ -11772,8 +11821,11 @@
                 <a:effectLst/>
                 <a:latin typeface="Calibri" panose="020F0502020204030204" pitchFamily="34" charset="0"/>
               </a:rPr>
-              <a:t>These Slides</a:t>
-            </a:r>
+              <a:t>Code Review Articles – davidgiard.com</a:t>
+            </a:r>
+            <a:endParaRPr lang="en-US" sz="2400" dirty="0">
+              <a:latin typeface="Calibri" panose="020F0502020204030204" pitchFamily="34" charset="0"/>
+            </a:endParaRPr>
           </a:p>
           <a:p>
             <a:pPr marL="800100" lvl="1">
@@ -11786,6 +11838,42 @@
                 <a:effectLst/>
                 <a:latin typeface="Calibri" panose="020F0502020204030204" pitchFamily="34" charset="0"/>
                 <a:hlinkClick r:id="rId7"/>
+              </a:rPr>
+              <a:t>davidgiard.com/code-review-articles</a:t>
+            </a:r>
+            <a:r>
+              <a:rPr lang="en-US" sz="2000" dirty="0">
+                <a:effectLst/>
+                <a:latin typeface="Calibri" panose="020F0502020204030204" pitchFamily="34" charset="0"/>
+              </a:rPr>
+              <a:t> </a:t>
+            </a:r>
+          </a:p>
+          <a:p>
+            <a:pPr marL="342900">
+              <a:spcBef>
+                <a:spcPts val="0"/>
+              </a:spcBef>
+            </a:pPr>
+            <a:r>
+              <a:rPr lang="en-US" sz="2400" dirty="0">
+                <a:effectLst/>
+                <a:latin typeface="Calibri" panose="020F0502020204030204" pitchFamily="34" charset="0"/>
+              </a:rPr>
+              <a:t>These Slides</a:t>
+            </a:r>
+          </a:p>
+          <a:p>
+            <a:pPr marL="800100" lvl="1">
+              <a:spcBef>
+                <a:spcPts val="0"/>
+              </a:spcBef>
+            </a:pPr>
+            <a:r>
+              <a:rPr lang="en-US" sz="2000" dirty="0">
+                <a:effectLst/>
+                <a:latin typeface="Calibri" panose="020F0502020204030204" pitchFamily="34" charset="0"/>
+                <a:hlinkClick r:id="rId8"/>
               </a:rPr>
               <a:t>tinyurl.com/bloodsweatcodereview</a:t>
             </a:r>

</xml_diff>

<commit_message>
Reorder Code Review links
</commit_message>
<xml_diff>
--- a/Blood-Sweat-and-Code-Reviews/Code Reviews.pptx
+++ b/Blood-Sweat-and-Code-Reviews/Code Reviews.pptx
@@ -307,7 +307,7 @@
           <a:p>
             <a:fld id="{C9AD57E7-247F-4128-A8B5-A3DA6234991F}" type="datetimeFigureOut">
               <a:rPr lang="en-US" smtClean="0"/>
-              <a:t>6/13/2022</a:t>
+              <a:t>6/14/2022</a:t>
             </a:fld>
             <a:endParaRPr lang="en-US"/>
           </a:p>
@@ -3810,7 +3810,7 @@
           <a:p>
             <a:fld id="{EA362AFC-14BE-4CC3-881D-E49F13F68D08}" type="datetimeFigureOut">
               <a:rPr lang="en-US" smtClean="0"/>
-              <a:t>6/13/2022</a:t>
+              <a:t>6/14/2022</a:t>
             </a:fld>
             <a:endParaRPr lang="en-US"/>
           </a:p>
@@ -4008,7 +4008,7 @@
           <a:p>
             <a:fld id="{EA362AFC-14BE-4CC3-881D-E49F13F68D08}" type="datetimeFigureOut">
               <a:rPr lang="en-US" smtClean="0"/>
-              <a:t>6/13/2022</a:t>
+              <a:t>6/14/2022</a:t>
             </a:fld>
             <a:endParaRPr lang="en-US"/>
           </a:p>
@@ -4216,7 +4216,7 @@
           <a:p>
             <a:fld id="{EA362AFC-14BE-4CC3-881D-E49F13F68D08}" type="datetimeFigureOut">
               <a:rPr lang="en-US" smtClean="0"/>
-              <a:t>6/13/2022</a:t>
+              <a:t>6/14/2022</a:t>
             </a:fld>
             <a:endParaRPr lang="en-US"/>
           </a:p>
@@ -4414,7 +4414,7 @@
           <a:p>
             <a:fld id="{EA362AFC-14BE-4CC3-881D-E49F13F68D08}" type="datetimeFigureOut">
               <a:rPr lang="en-US" smtClean="0"/>
-              <a:t>6/13/2022</a:t>
+              <a:t>6/14/2022</a:t>
             </a:fld>
             <a:endParaRPr lang="en-US"/>
           </a:p>
@@ -4689,7 +4689,7 @@
           <a:p>
             <a:fld id="{EA362AFC-14BE-4CC3-881D-E49F13F68D08}" type="datetimeFigureOut">
               <a:rPr lang="en-US" smtClean="0"/>
-              <a:t>6/13/2022</a:t>
+              <a:t>6/14/2022</a:t>
             </a:fld>
             <a:endParaRPr lang="en-US"/>
           </a:p>
@@ -4954,7 +4954,7 @@
           <a:p>
             <a:fld id="{EA362AFC-14BE-4CC3-881D-E49F13F68D08}" type="datetimeFigureOut">
               <a:rPr lang="en-US" smtClean="0"/>
-              <a:t>6/13/2022</a:t>
+              <a:t>6/14/2022</a:t>
             </a:fld>
             <a:endParaRPr lang="en-US"/>
           </a:p>
@@ -5366,7 +5366,7 @@
           <a:p>
             <a:fld id="{EA362AFC-14BE-4CC3-881D-E49F13F68D08}" type="datetimeFigureOut">
               <a:rPr lang="en-US" smtClean="0"/>
-              <a:t>6/13/2022</a:t>
+              <a:t>6/14/2022</a:t>
             </a:fld>
             <a:endParaRPr lang="en-US"/>
           </a:p>
@@ -5507,7 +5507,7 @@
           <a:p>
             <a:fld id="{EA362AFC-14BE-4CC3-881D-E49F13F68D08}" type="datetimeFigureOut">
               <a:rPr lang="en-US" smtClean="0"/>
-              <a:t>6/13/2022</a:t>
+              <a:t>6/14/2022</a:t>
             </a:fld>
             <a:endParaRPr lang="en-US"/>
           </a:p>
@@ -5620,7 +5620,7 @@
           <a:p>
             <a:fld id="{EA362AFC-14BE-4CC3-881D-E49F13F68D08}" type="datetimeFigureOut">
               <a:rPr lang="en-US" smtClean="0"/>
-              <a:t>6/13/2022</a:t>
+              <a:t>6/14/2022</a:t>
             </a:fld>
             <a:endParaRPr lang="en-US"/>
           </a:p>
@@ -5931,7 +5931,7 @@
           <a:p>
             <a:fld id="{EA362AFC-14BE-4CC3-881D-E49F13F68D08}" type="datetimeFigureOut">
               <a:rPr lang="en-US" smtClean="0"/>
-              <a:t>6/13/2022</a:t>
+              <a:t>6/14/2022</a:t>
             </a:fld>
             <a:endParaRPr lang="en-US"/>
           </a:p>
@@ -6219,7 +6219,7 @@
           <a:p>
             <a:fld id="{EA362AFC-14BE-4CC3-881D-E49F13F68D08}" type="datetimeFigureOut">
               <a:rPr lang="en-US" smtClean="0"/>
-              <a:t>6/13/2022</a:t>
+              <a:t>6/14/2022</a:t>
             </a:fld>
             <a:endParaRPr lang="en-US"/>
           </a:p>
@@ -6460,7 +6460,7 @@
           <a:p>
             <a:fld id="{EA362AFC-14BE-4CC3-881D-E49F13F68D08}" type="datetimeFigureOut">
               <a:rPr lang="en-US" smtClean="0"/>
-              <a:t>6/13/2022</a:t>
+              <a:t>6/14/2022</a:t>
             </a:fld>
             <a:endParaRPr lang="en-US"/>
           </a:p>
@@ -11630,9 +11630,10 @@
             </a:pPr>
             <a:r>
               <a:rPr lang="en-US" sz="2400" dirty="0">
+                <a:effectLst/>
                 <a:latin typeface="Calibri" panose="020F0502020204030204" pitchFamily="34" charset="0"/>
               </a:rPr>
-              <a:t>How to Do Code Reviews Like a Human</a:t>
+              <a:t>These Slides</a:t>
             </a:r>
           </a:p>
           <a:p>
@@ -11645,16 +11646,23 @@
               <a:rPr lang="en-US" sz="2000" dirty="0">
                 <a:effectLst/>
                 <a:latin typeface="Calibri" panose="020F0502020204030204" pitchFamily="34" charset="0"/>
+                <a:hlinkClick r:id="rId2"/>
               </a:rPr>
-              <a:t>Part 1: </a:t>
-            </a:r>
-            <a:r>
-              <a:rPr lang="en-US" sz="2000" dirty="0">
+              <a:t>tinyurl.com/</a:t>
+            </a:r>
+            <a:r>
+              <a:rPr lang="en-US" sz="2000" dirty="0" err="1">
                 <a:effectLst/>
                 <a:latin typeface="Calibri" panose="020F0502020204030204" pitchFamily="34" charset="0"/>
                 <a:hlinkClick r:id="rId2"/>
               </a:rPr>
-              <a:t>mtlynch.io/human-code-reviews-1/</a:t>
+              <a:t>bloodsweatcodereview</a:t>
+            </a:r>
+            <a:r>
+              <a:rPr lang="en-US" sz="2000" dirty="0">
+                <a:latin typeface="Calibri" panose="020F0502020204030204" pitchFamily="34" charset="0"/>
+              </a:rPr>
+              <a:t> </a:t>
             </a:r>
             <a:r>
               <a:rPr lang="en-US" sz="2000" dirty="0">
@@ -11665,12 +11673,99 @@
             </a:r>
           </a:p>
           <a:p>
+            <a:pPr marL="342900">
+              <a:spcBef>
+                <a:spcPts val="0"/>
+              </a:spcBef>
+            </a:pPr>
+            <a:r>
+              <a:rPr lang="en-US" sz="2400" dirty="0">
+                <a:effectLst/>
+                <a:latin typeface="Calibri" panose="020F0502020204030204" pitchFamily="34" charset="0"/>
+              </a:rPr>
+              <a:t>Code Review Articles – davidgiard.com</a:t>
+            </a:r>
+            <a:endParaRPr lang="en-US" sz="2400" dirty="0">
+              <a:latin typeface="Calibri" panose="020F0502020204030204" pitchFamily="34" charset="0"/>
+            </a:endParaRPr>
+          </a:p>
+          <a:p>
             <a:pPr marL="800100" lvl="1">
               <a:spcBef>
                 <a:spcPts val="0"/>
               </a:spcBef>
             </a:pPr>
             <a:r>
+              <a:rPr lang="en-US" sz="2000">
+                <a:effectLst/>
+                <a:latin typeface="Calibri" panose="020F0502020204030204" pitchFamily="34" charset="0"/>
+                <a:hlinkClick r:id="rId3"/>
+              </a:rPr>
+              <a:t>davidgiard.com/code-review-articles</a:t>
+            </a:r>
+            <a:r>
+              <a:rPr lang="en-US" sz="2000">
+                <a:effectLst/>
+                <a:latin typeface="Calibri" panose="020F0502020204030204" pitchFamily="34" charset="0"/>
+              </a:rPr>
+              <a:t> </a:t>
+            </a:r>
+          </a:p>
+          <a:p>
+            <a:pPr marL="342900">
+              <a:spcBef>
+                <a:spcPts val="0"/>
+              </a:spcBef>
+            </a:pPr>
+            <a:r>
+              <a:rPr lang="en-US" sz="2400">
+                <a:latin typeface="Calibri" panose="020F0502020204030204" pitchFamily="34" charset="0"/>
+              </a:rPr>
+              <a:t>How </a:t>
+            </a:r>
+            <a:r>
+              <a:rPr lang="en-US" sz="2400" dirty="0">
+                <a:latin typeface="Calibri" panose="020F0502020204030204" pitchFamily="34" charset="0"/>
+              </a:rPr>
+              <a:t>to Do Code Reviews Like a Human</a:t>
+            </a:r>
+          </a:p>
+          <a:p>
+            <a:pPr marL="800100" lvl="1">
+              <a:spcBef>
+                <a:spcPts val="0"/>
+              </a:spcBef>
+            </a:pPr>
+            <a:r>
+              <a:rPr lang="en-US" sz="2000" dirty="0">
+                <a:effectLst/>
+                <a:latin typeface="Calibri" panose="020F0502020204030204" pitchFamily="34" charset="0"/>
+              </a:rPr>
+              <a:t>Part 1: </a:t>
+            </a:r>
+            <a:r>
+              <a:rPr lang="en-US" sz="2000" dirty="0">
+                <a:effectLst/>
+                <a:latin typeface="Calibri" panose="020F0502020204030204" pitchFamily="34" charset="0"/>
+                <a:hlinkClick r:id="rId4"/>
+              </a:rPr>
+              <a:t>mtlynch.io/human-code-reviews-1/</a:t>
+            </a:r>
+            <a:r>
+              <a:rPr lang="en-US" sz="2000" dirty="0">
+                <a:effectLst/>
+                <a:latin typeface="Calibri" panose="020F0502020204030204" pitchFamily="34" charset="0"/>
+              </a:rPr>
+              <a:t> </a:t>
+            </a:r>
+          </a:p>
+          <a:p>
+            <a:pPr marL="800100" lvl="1">
+              <a:spcBef>
+                <a:spcPts val="0"/>
+              </a:spcBef>
+            </a:pPr>
+            <a:r>
               <a:rPr lang="en-US" sz="2000" dirty="0">
                 <a:latin typeface="Calibri" panose="020F0502020204030204" pitchFamily="34" charset="0"/>
               </a:rPr>
@@ -11680,7 +11775,7 @@
               <a:rPr lang="en-US" sz="2000" dirty="0">
                 <a:effectLst/>
                 <a:latin typeface="Calibri" panose="020F0502020204030204" pitchFamily="34" charset="0"/>
-                <a:hlinkClick r:id="rId3"/>
+                <a:hlinkClick r:id="rId5"/>
               </a:rPr>
               <a:t>mtlynch.io/human-code-reviews-2/</a:t>
             </a:r>
@@ -11718,7 +11813,7 @@
               <a:rPr lang="en-US" sz="2000" dirty="0">
                 <a:effectLst/>
                 <a:latin typeface="Calibri" panose="020F0502020204030204" pitchFamily="34" charset="0"/>
-                <a:hlinkClick r:id="rId4"/>
+                <a:hlinkClick r:id="rId6"/>
               </a:rPr>
               <a:t>mtlynch.io/code-review-love/</a:t>
             </a:r>
@@ -11744,7 +11839,7 @@
             </a:r>
             <a:endParaRPr lang="en-US" sz="2400" dirty="0">
               <a:latin typeface="Calibri" panose="020F0502020204030204" pitchFamily="34" charset="0"/>
-              <a:hlinkClick r:id="rId5">
+              <a:hlinkClick r:id="rId7">
                 <a:extLst>
                   <a:ext uri="{A12FA001-AC4F-418D-AE19-62706E023703}">
                     <ahyp:hlinkClr xmlns:ahyp="http://schemas.microsoft.com/office/drawing/2018/hyperlinkcolor" val="tx"/>
@@ -11763,7 +11858,7 @@
               <a:rPr lang="en-US" sz="2000" dirty="0">
                 <a:effectLst/>
                 <a:latin typeface="Calibri" panose="020F0502020204030204" pitchFamily="34" charset="0"/>
-                <a:hlinkClick r:id="rId5"/>
+                <a:hlinkClick r:id="rId7"/>
               </a:rPr>
               <a:t>www.pluralsight.com/blog/tutorials/code-review</a:t>
             </a:r>
@@ -11801,7 +11896,7 @@
               <a:rPr lang="en-US" sz="2000" dirty="0">
                 <a:effectLst/>
                 <a:latin typeface="Calibri" panose="020F0502020204030204" pitchFamily="34" charset="0"/>
-                <a:hlinkClick r:id="rId6"/>
+                <a:hlinkClick r:id="rId8"/>
               </a:rPr>
               <a:t>a-hemdan.medium.com/conventional-comments-1f83f56a7a48</a:t>
             </a:r>
@@ -11809,87 +11904,6 @@
               <a:effectLst/>
               <a:latin typeface="Calibri" panose="020F0502020204030204" pitchFamily="34" charset="0"/>
             </a:endParaRPr>
-          </a:p>
-          <a:p>
-            <a:pPr marL="342900">
-              <a:spcBef>
-                <a:spcPts val="0"/>
-              </a:spcBef>
-            </a:pPr>
-            <a:r>
-              <a:rPr lang="en-US" sz="2400" dirty="0">
-                <a:effectLst/>
-                <a:latin typeface="Calibri" panose="020F0502020204030204" pitchFamily="34" charset="0"/>
-              </a:rPr>
-              <a:t>Code Review Articles – davidgiard.com</a:t>
-            </a:r>
-            <a:endParaRPr lang="en-US" sz="2400" dirty="0">
-              <a:latin typeface="Calibri" panose="020F0502020204030204" pitchFamily="34" charset="0"/>
-            </a:endParaRPr>
-          </a:p>
-          <a:p>
-            <a:pPr marL="800100" lvl="1">
-              <a:spcBef>
-                <a:spcPts val="0"/>
-              </a:spcBef>
-            </a:pPr>
-            <a:r>
-              <a:rPr lang="en-US" sz="2000" dirty="0">
-                <a:effectLst/>
-                <a:latin typeface="Calibri" panose="020F0502020204030204" pitchFamily="34" charset="0"/>
-                <a:hlinkClick r:id="rId7"/>
-              </a:rPr>
-              <a:t>davidgiard.com/code-review-articles</a:t>
-            </a:r>
-            <a:r>
-              <a:rPr lang="en-US" sz="2000" dirty="0">
-                <a:effectLst/>
-                <a:latin typeface="Calibri" panose="020F0502020204030204" pitchFamily="34" charset="0"/>
-              </a:rPr>
-              <a:t> </a:t>
-            </a:r>
-          </a:p>
-          <a:p>
-            <a:pPr marL="342900">
-              <a:spcBef>
-                <a:spcPts val="0"/>
-              </a:spcBef>
-            </a:pPr>
-            <a:r>
-              <a:rPr lang="en-US" sz="2400" dirty="0">
-                <a:effectLst/>
-                <a:latin typeface="Calibri" panose="020F0502020204030204" pitchFamily="34" charset="0"/>
-              </a:rPr>
-              <a:t>These Slides</a:t>
-            </a:r>
-          </a:p>
-          <a:p>
-            <a:pPr marL="800100" lvl="1">
-              <a:spcBef>
-                <a:spcPts val="0"/>
-              </a:spcBef>
-            </a:pPr>
-            <a:r>
-              <a:rPr lang="en-US" sz="2000" dirty="0">
-                <a:effectLst/>
-                <a:latin typeface="Calibri" panose="020F0502020204030204" pitchFamily="34" charset="0"/>
-                <a:hlinkClick r:id="rId8"/>
-              </a:rPr>
-              <a:t>tinyurl.com/bloodsweatcodereview</a:t>
-            </a:r>
-            <a:r>
-              <a:rPr lang="en-US" sz="2000" dirty="0">
-                <a:latin typeface="Calibri" panose="020F0502020204030204" pitchFamily="34" charset="0"/>
-              </a:rPr>
-              <a:t> </a:t>
-            </a:r>
-            <a:r>
-              <a:rPr lang="en-US" sz="2000" dirty="0">
-                <a:effectLst/>
-                <a:latin typeface="Calibri" panose="020F0502020204030204" pitchFamily="34" charset="0"/>
-              </a:rPr>
-              <a:t> </a:t>
-            </a:r>
           </a:p>
           <a:p>
             <a:pPr marL="342900">

</xml_diff>

<commit_message>
Code Review prefix examples
</commit_message>
<xml_diff>
--- a/Blood-Sweat-and-Code-Reviews/Code Reviews.pptx
+++ b/Blood-Sweat-and-Code-Reviews/Code Reviews.pptx
@@ -5,7 +5,7 @@
     <p:sldMasterId id="2147483648" r:id="rId1"/>
   </p:sldMasterIdLst>
   <p:notesMasterIdLst>
-    <p:notesMasterId r:id="rId50"/>
+    <p:notesMasterId r:id="rId51"/>
   </p:notesMasterIdLst>
   <p:sldIdLst>
     <p:sldId id="256" r:id="rId2"/>
@@ -33,29 +33,30 @@
     <p:sldId id="277" r:id="rId24"/>
     <p:sldId id="319" r:id="rId25"/>
     <p:sldId id="309" r:id="rId26"/>
-    <p:sldId id="285" r:id="rId27"/>
-    <p:sldId id="282" r:id="rId28"/>
-    <p:sldId id="283" r:id="rId29"/>
-    <p:sldId id="287" r:id="rId30"/>
-    <p:sldId id="281" r:id="rId31"/>
-    <p:sldId id="310" r:id="rId32"/>
-    <p:sldId id="308" r:id="rId33"/>
-    <p:sldId id="324" r:id="rId34"/>
-    <p:sldId id="297" r:id="rId35"/>
-    <p:sldId id="299" r:id="rId36"/>
-    <p:sldId id="298" r:id="rId37"/>
-    <p:sldId id="296" r:id="rId38"/>
-    <p:sldId id="303" r:id="rId39"/>
-    <p:sldId id="292" r:id="rId40"/>
-    <p:sldId id="320" r:id="rId41"/>
-    <p:sldId id="289" r:id="rId42"/>
-    <p:sldId id="311" r:id="rId43"/>
-    <p:sldId id="321" r:id="rId44"/>
-    <p:sldId id="322" r:id="rId45"/>
-    <p:sldId id="257" r:id="rId46"/>
-    <p:sldId id="267" r:id="rId47"/>
-    <p:sldId id="266" r:id="rId48"/>
-    <p:sldId id="302" r:id="rId49"/>
+    <p:sldId id="325" r:id="rId27"/>
+    <p:sldId id="285" r:id="rId28"/>
+    <p:sldId id="282" r:id="rId29"/>
+    <p:sldId id="283" r:id="rId30"/>
+    <p:sldId id="287" r:id="rId31"/>
+    <p:sldId id="281" r:id="rId32"/>
+    <p:sldId id="310" r:id="rId33"/>
+    <p:sldId id="308" r:id="rId34"/>
+    <p:sldId id="324" r:id="rId35"/>
+    <p:sldId id="297" r:id="rId36"/>
+    <p:sldId id="299" r:id="rId37"/>
+    <p:sldId id="298" r:id="rId38"/>
+    <p:sldId id="296" r:id="rId39"/>
+    <p:sldId id="303" r:id="rId40"/>
+    <p:sldId id="292" r:id="rId41"/>
+    <p:sldId id="320" r:id="rId42"/>
+    <p:sldId id="289" r:id="rId43"/>
+    <p:sldId id="311" r:id="rId44"/>
+    <p:sldId id="321" r:id="rId45"/>
+    <p:sldId id="322" r:id="rId46"/>
+    <p:sldId id="257" r:id="rId47"/>
+    <p:sldId id="267" r:id="rId48"/>
+    <p:sldId id="266" r:id="rId49"/>
+    <p:sldId id="302" r:id="rId50"/>
   </p:sldIdLst>
   <p:sldSz cx="12192000" cy="6858000"/>
   <p:notesSz cx="6858000" cy="9144000"/>
@@ -188,6 +189,7 @@
             <p14:sldId id="277"/>
             <p14:sldId id="319"/>
             <p14:sldId id="309"/>
+            <p14:sldId id="325"/>
             <p14:sldId id="285"/>
             <p14:sldId id="282"/>
             <p14:sldId id="283"/>
@@ -1455,17 +1457,62 @@
           <a:lstStyle/>
           <a:p>
             <a:r>
-              <a:rPr lang="en-US" sz="1200" kern="1200" dirty="0">
-                <a:solidFill>
-                  <a:schemeClr val="tx1"/>
-                </a:solidFill>
-                <a:effectLst/>
-                <a:latin typeface="+mj-lt"/>
-                <a:ea typeface="+mj-ea"/>
-                <a:cs typeface="+mj-cs"/>
+              <a:rPr lang="en-US" dirty="0">
+                <a:hlinkClick r:id="rId3"/>
               </a:rPr>
-              <a:t>Offer sincere praise</a:t>
-            </a:r>
+              <a:t>Conventional: Comments | Medium</a:t>
+            </a:r>
+            <a:endParaRPr lang="en-US" dirty="0"/>
+          </a:p>
+          <a:p>
+            <a:endParaRPr lang="en-US" dirty="0"/>
+          </a:p>
+          <a:p>
+            <a:r>
+              <a:rPr lang="en-US" dirty="0"/>
+              <a:t>Issue: Specific problem. Pair with suggestion</a:t>
+            </a:r>
+          </a:p>
+          <a:p>
+            <a:r>
+              <a:rPr lang="en-US" dirty="0"/>
+              <a:t>Suggestion: Suggested improvement</a:t>
+            </a:r>
+          </a:p>
+          <a:p>
+            <a:r>
+              <a:rPr lang="en-US" dirty="0"/>
+              <a:t>Question: Potential concerns, but not sure if relevant</a:t>
+            </a:r>
+          </a:p>
+          <a:p>
+            <a:r>
+              <a:rPr lang="en-US" dirty="0"/>
+              <a:t>Nit: Trivial, but necessary changes</a:t>
+            </a:r>
+          </a:p>
+          <a:p>
+            <a:r>
+              <a:rPr lang="en-US" dirty="0"/>
+              <a:t>Thought: Non-blocking ideas</a:t>
+            </a:r>
+          </a:p>
+          <a:p>
+            <a:r>
+              <a:rPr lang="en-US" dirty="0"/>
+              <a:t>Chore: Simple tasks that must be done</a:t>
+            </a:r>
+          </a:p>
+          <a:p>
+            <a:r>
+              <a:rPr lang="en-US" dirty="0"/>
+              <a:t>Praise: Highlight something positive</a:t>
+            </a:r>
+          </a:p>
+          <a:p>
+            <a:endParaRPr lang="en-US" dirty="0"/>
+          </a:p>
+          <a:p>
             <a:endParaRPr lang="en-US" dirty="0"/>
           </a:p>
         </p:txBody>
@@ -1496,7 +1543,7 @@
     </p:spTree>
     <p:extLst>
       <p:ext uri="{BB962C8B-B14F-4D97-AF65-F5344CB8AC3E}">
-        <p14:creationId xmlns:p14="http://schemas.microsoft.com/office/powerpoint/2010/main" val="2432822528"/>
+        <p14:creationId xmlns:p14="http://schemas.microsoft.com/office/powerpoint/2010/main" val="49253412"/>
       </p:ext>
     </p:extLst>
   </p:cSld>
@@ -1560,24 +1607,8 @@
                 <a:ea typeface="+mj-ea"/>
                 <a:cs typeface="+mj-cs"/>
               </a:rPr>
-              <a:t>Limit feedback on repeated patterns</a:t>
-            </a:r>
-          </a:p>
-          <a:p>
-            <a:r>
-              <a:rPr lang="en-US" sz="1200" kern="1200" dirty="0">
-                <a:solidFill>
-                  <a:schemeClr val="tx1"/>
-                </a:solidFill>
-                <a:effectLst/>
-                <a:latin typeface="+mj-lt"/>
-                <a:ea typeface="+mj-ea"/>
-                <a:cs typeface="+mj-cs"/>
-              </a:rPr>
-              <a:t>Combine similar comments (e.g., “See naming convention comment above”)</a:t>
-            </a:r>
-          </a:p>
-          <a:p>
+              <a:t>Offer sincere praise</a:t>
+            </a:r>
             <a:endParaRPr lang="en-US" dirty="0"/>
           </a:p>
         </p:txBody>
@@ -1608,7 +1639,7 @@
     </p:spTree>
     <p:extLst>
       <p:ext uri="{BB962C8B-B14F-4D97-AF65-F5344CB8AC3E}">
-        <p14:creationId xmlns:p14="http://schemas.microsoft.com/office/powerpoint/2010/main" val="329099366"/>
+        <p14:creationId xmlns:p14="http://schemas.microsoft.com/office/powerpoint/2010/main" val="2432822528"/>
       </p:ext>
     </p:extLst>
   </p:cSld>
@@ -1672,8 +1703,24 @@
                 <a:ea typeface="+mj-ea"/>
                 <a:cs typeface="+mj-cs"/>
               </a:rPr>
-              <a:t>Respect the scope of the review</a:t>
-            </a:r>
+              <a:t>Limit feedback on repeated patterns</a:t>
+            </a:r>
+          </a:p>
+          <a:p>
+            <a:r>
+              <a:rPr lang="en-US" sz="1200" kern="1200" dirty="0">
+                <a:solidFill>
+                  <a:schemeClr val="tx1"/>
+                </a:solidFill>
+                <a:effectLst/>
+                <a:latin typeface="+mj-lt"/>
+                <a:ea typeface="+mj-ea"/>
+                <a:cs typeface="+mj-cs"/>
+              </a:rPr>
+              <a:t>Combine similar comments (e.g., “See naming convention comment above”)</a:t>
+            </a:r>
+          </a:p>
+          <a:p>
             <a:endParaRPr lang="en-US" dirty="0"/>
           </a:p>
         </p:txBody>
@@ -1704,7 +1751,7 @@
     </p:spTree>
     <p:extLst>
       <p:ext uri="{BB962C8B-B14F-4D97-AF65-F5344CB8AC3E}">
-        <p14:creationId xmlns:p14="http://schemas.microsoft.com/office/powerpoint/2010/main" val="3923662296"/>
+        <p14:creationId xmlns:p14="http://schemas.microsoft.com/office/powerpoint/2010/main" val="329099366"/>
       </p:ext>
     </p:extLst>
   </p:cSld>
@@ -1768,82 +1815,8 @@
                 <a:ea typeface="+mj-ea"/>
                 <a:cs typeface="+mj-cs"/>
               </a:rPr>
-              <a:t>Not every Code</a:t>
-            </a:r>
-            <a:r>
-              <a:rPr lang="en-US" sz="1200" kern="1200" baseline="0" dirty="0">
-                <a:solidFill>
-                  <a:schemeClr val="tx1"/>
-                </a:solidFill>
-                <a:effectLst/>
-                <a:latin typeface="+mj-lt"/>
-                <a:ea typeface="+mj-ea"/>
-                <a:cs typeface="+mj-cs"/>
-              </a:rPr>
-              <a:t> Review needs to make the code perfect</a:t>
-            </a:r>
-          </a:p>
-          <a:p>
-            <a:r>
-              <a:rPr lang="en-US" sz="1200" kern="1200" baseline="0" dirty="0">
-                <a:solidFill>
-                  <a:schemeClr val="tx1"/>
-                </a:solidFill>
-                <a:effectLst/>
-                <a:latin typeface="+mj-lt"/>
-                <a:ea typeface="+mj-ea"/>
-                <a:cs typeface="+mj-cs"/>
-              </a:rPr>
-              <a:t>If there are many issues, a</a:t>
-            </a:r>
-            <a:r>
-              <a:rPr lang="en-US" sz="1200" kern="1200" dirty="0">
-                <a:solidFill>
-                  <a:schemeClr val="tx1"/>
-                </a:solidFill>
-                <a:effectLst/>
-                <a:latin typeface="+mj-lt"/>
-                <a:ea typeface="+mj-ea"/>
-                <a:cs typeface="+mj-cs"/>
-              </a:rPr>
-              <a:t>im to bring the code up a letter grade or two</a:t>
-            </a:r>
-          </a:p>
-          <a:p>
-            <a:r>
-              <a:rPr lang="en-US" dirty="0"/>
-              <a:t>The next review can bring it up more</a:t>
-            </a:r>
-          </a:p>
-          <a:p>
-            <a:r>
-              <a:rPr lang="en-US" dirty="0"/>
-              <a:t>This</a:t>
-            </a:r>
-            <a:r>
-              <a:rPr lang="en-US" baseline="0" dirty="0"/>
-              <a:t> prevents the review from dragging on too long and becoming bogged down in trivial arguments</a:t>
-            </a:r>
-          </a:p>
-          <a:p>
-            <a:endParaRPr lang="en-US" dirty="0"/>
-          </a:p>
-          <a:p>
-            <a:r>
-              <a:rPr lang="en-US" dirty="0"/>
-              <a:t>Look for opportunities to split up large reviews</a:t>
-            </a:r>
-          </a:p>
-          <a:p>
-            <a:endParaRPr lang="en-US" dirty="0"/>
-          </a:p>
-          <a:p>
-            <a:r>
-              <a:rPr lang="en-US" dirty="0"/>
-              <a:t>Approve, if only Trivial Fixes Remain</a:t>
-            </a:r>
-          </a:p>
-          <a:p>
+              <a:t>Respect the scope of the review</a:t>
+            </a:r>
             <a:endParaRPr lang="en-US" dirty="0"/>
           </a:p>
         </p:txBody>
@@ -1865,7 +1838,7 @@
           <a:p>
             <a:fld id="{58B0D769-A7CC-4121-8D93-CE8B89E00FE0}" type="slidenum">
               <a:rPr lang="en-US" smtClean="0"/>
-              <a:t>30</a:t>
+              <a:t>29</a:t>
             </a:fld>
             <a:endParaRPr lang="en-US"/>
           </a:p>
@@ -1874,7 +1847,7 @@
     </p:spTree>
     <p:extLst>
       <p:ext uri="{BB962C8B-B14F-4D97-AF65-F5344CB8AC3E}">
-        <p14:creationId xmlns:p14="http://schemas.microsoft.com/office/powerpoint/2010/main" val="1696579158"/>
+        <p14:creationId xmlns:p14="http://schemas.microsoft.com/office/powerpoint/2010/main" val="3923662296"/>
       </p:ext>
     </p:extLst>
   </p:cSld>
@@ -1929,42 +1902,89 @@
           <a:lstStyle/>
           <a:p>
             <a:r>
-              <a:rPr lang="en-US" dirty="0"/>
-              <a:t>Automate the easy stuff</a:t>
-            </a:r>
-          </a:p>
-          <a:p>
-            <a:pPr marL="171450" indent="-171450">
-              <a:buFont typeface="Arial" panose="020B0604020202020204" pitchFamily="34" charset="0"/>
-              <a:buChar char="•"/>
-            </a:pPr>
-            <a:r>
-              <a:rPr lang="en-US" dirty="0"/>
-              <a:t>compiler</a:t>
-            </a:r>
-          </a:p>
-          <a:p>
-            <a:pPr marL="171450" indent="-171450">
-              <a:buFont typeface="Arial" panose="020B0604020202020204" pitchFamily="34" charset="0"/>
-              <a:buChar char="•"/>
-            </a:pPr>
-            <a:r>
-              <a:rPr lang="en-US" dirty="0"/>
-              <a:t>linter</a:t>
-            </a:r>
-          </a:p>
-          <a:p>
-            <a:pPr marL="171450" indent="-171450">
-              <a:buFont typeface="Arial" panose="020B0604020202020204" pitchFamily="34" charset="0"/>
-              <a:buChar char="•"/>
-            </a:pPr>
-            <a:r>
-              <a:rPr lang="en-US" dirty="0"/>
-              <a:t>Automated tests</a:t>
+              <a:rPr lang="en-US" sz="1200" kern="1200" dirty="0">
+                <a:solidFill>
+                  <a:schemeClr val="tx1"/>
+                </a:solidFill>
+                <a:effectLst/>
+                <a:latin typeface="+mj-lt"/>
+                <a:ea typeface="+mj-ea"/>
+                <a:cs typeface="+mj-cs"/>
+              </a:rPr>
+              <a:t>Not every Code</a:t>
+            </a:r>
+            <a:r>
+              <a:rPr lang="en-US" sz="1200" kern="1200" baseline="0" dirty="0">
+                <a:solidFill>
+                  <a:schemeClr val="tx1"/>
+                </a:solidFill>
+                <a:effectLst/>
+                <a:latin typeface="+mj-lt"/>
+                <a:ea typeface="+mj-ea"/>
+                <a:cs typeface="+mj-cs"/>
+              </a:rPr>
+              <a:t> Review needs to make the code perfect</a:t>
+            </a:r>
+          </a:p>
+          <a:p>
+            <a:r>
+              <a:rPr lang="en-US" sz="1200" kern="1200" baseline="0" dirty="0">
+                <a:solidFill>
+                  <a:schemeClr val="tx1"/>
+                </a:solidFill>
+                <a:effectLst/>
+                <a:latin typeface="+mj-lt"/>
+                <a:ea typeface="+mj-ea"/>
+                <a:cs typeface="+mj-cs"/>
+              </a:rPr>
+              <a:t>If there are many issues, a</a:t>
+            </a:r>
+            <a:r>
+              <a:rPr lang="en-US" sz="1200" kern="1200" dirty="0">
+                <a:solidFill>
+                  <a:schemeClr val="tx1"/>
+                </a:solidFill>
+                <a:effectLst/>
+                <a:latin typeface="+mj-lt"/>
+                <a:ea typeface="+mj-ea"/>
+                <a:cs typeface="+mj-cs"/>
+              </a:rPr>
+              <a:t>im to bring the code up a letter grade or two</a:t>
+            </a:r>
+          </a:p>
+          <a:p>
+            <a:r>
+              <a:rPr lang="en-US" dirty="0"/>
+              <a:t>The next review can bring it up more</a:t>
+            </a:r>
+          </a:p>
+          <a:p>
+            <a:r>
+              <a:rPr lang="en-US" dirty="0"/>
+              <a:t>This</a:t>
+            </a:r>
+            <a:r>
+              <a:rPr lang="en-US" baseline="0" dirty="0"/>
+              <a:t> prevents the review from dragging on too long and becoming bogged down in trivial arguments</a:t>
             </a:r>
           </a:p>
           <a:p>
             <a:endParaRPr lang="en-US" dirty="0"/>
+          </a:p>
+          <a:p>
+            <a:r>
+              <a:rPr lang="en-US" dirty="0"/>
+              <a:t>Look for opportunities to split up large reviews</a:t>
+            </a:r>
+          </a:p>
+          <a:p>
+            <a:endParaRPr lang="en-US" dirty="0"/>
+          </a:p>
+          <a:p>
+            <a:r>
+              <a:rPr lang="en-US" dirty="0"/>
+              <a:t>Approve, if only Trivial Fixes Remain</a:t>
+            </a:r>
           </a:p>
           <a:p>
             <a:endParaRPr lang="en-US" dirty="0"/>
@@ -1988,7 +2008,7 @@
           <a:p>
             <a:fld id="{58B0D769-A7CC-4121-8D93-CE8B89E00FE0}" type="slidenum">
               <a:rPr lang="en-US" smtClean="0"/>
-              <a:t>34</a:t>
+              <a:t>31</a:t>
             </a:fld>
             <a:endParaRPr lang="en-US"/>
           </a:p>
@@ -1997,7 +2017,7 @@
     </p:spTree>
     <p:extLst>
       <p:ext uri="{BB962C8B-B14F-4D97-AF65-F5344CB8AC3E}">
-        <p14:creationId xmlns:p14="http://schemas.microsoft.com/office/powerpoint/2010/main" val="2090670743"/>
+        <p14:creationId xmlns:p14="http://schemas.microsoft.com/office/powerpoint/2010/main" val="1696579158"/>
       </p:ext>
     </p:extLst>
   </p:cSld>
@@ -2053,22 +2073,41 @@
           <a:p>
             <a:r>
               <a:rPr lang="en-US" dirty="0"/>
-              <a:t>Write a clear change list description</a:t>
-            </a:r>
-          </a:p>
-          <a:p>
-            <a:pPr lvl="0"/>
-            <a:r>
-              <a:rPr lang="en-US" dirty="0"/>
-              <a:t>Respond with what you changed</a:t>
-            </a:r>
-          </a:p>
-          <a:p>
-            <a:pPr lvl="0"/>
-            <a:r>
-              <a:rPr lang="en-US" dirty="0"/>
-              <a:t>Solicit missing information</a:t>
-            </a:r>
+              <a:t>Automate the easy stuff</a:t>
+            </a:r>
+          </a:p>
+          <a:p>
+            <a:pPr marL="171450" indent="-171450">
+              <a:buFont typeface="Arial" panose="020B0604020202020204" pitchFamily="34" charset="0"/>
+              <a:buChar char="•"/>
+            </a:pPr>
+            <a:r>
+              <a:rPr lang="en-US" dirty="0"/>
+              <a:t>compiler</a:t>
+            </a:r>
+          </a:p>
+          <a:p>
+            <a:pPr marL="171450" indent="-171450">
+              <a:buFont typeface="Arial" panose="020B0604020202020204" pitchFamily="34" charset="0"/>
+              <a:buChar char="•"/>
+            </a:pPr>
+            <a:r>
+              <a:rPr lang="en-US" dirty="0"/>
+              <a:t>linter</a:t>
+            </a:r>
+          </a:p>
+          <a:p>
+            <a:pPr marL="171450" indent="-171450">
+              <a:buFont typeface="Arial" panose="020B0604020202020204" pitchFamily="34" charset="0"/>
+              <a:buChar char="•"/>
+            </a:pPr>
+            <a:r>
+              <a:rPr lang="en-US" dirty="0"/>
+              <a:t>Automated tests</a:t>
+            </a:r>
+          </a:p>
+          <a:p>
+            <a:endParaRPr lang="en-US" dirty="0"/>
           </a:p>
           <a:p>
             <a:endParaRPr lang="en-US" dirty="0"/>
@@ -2092,7 +2131,7 @@
           <a:p>
             <a:fld id="{58B0D769-A7CC-4121-8D93-CE8B89E00FE0}" type="slidenum">
               <a:rPr lang="en-US" smtClean="0"/>
-              <a:t>36</a:t>
+              <a:t>35</a:t>
             </a:fld>
             <a:endParaRPr lang="en-US"/>
           </a:p>
@@ -2101,7 +2140,7 @@
     </p:spTree>
     <p:extLst>
       <p:ext uri="{BB962C8B-B14F-4D97-AF65-F5344CB8AC3E}">
-        <p14:creationId xmlns:p14="http://schemas.microsoft.com/office/powerpoint/2010/main" val="4129013769"/>
+        <p14:creationId xmlns:p14="http://schemas.microsoft.com/office/powerpoint/2010/main" val="2090670743"/>
       </p:ext>
     </p:extLst>
   </p:cSld>
@@ -2247,7 +2286,21 @@
           <a:p>
             <a:r>
               <a:rPr lang="en-US" dirty="0"/>
-              <a:t>If the reviewer is confused by your code, go back to the code and make it self-documenting</a:t>
+              <a:t>Write a clear change list description</a:t>
+            </a:r>
+          </a:p>
+          <a:p>
+            <a:pPr lvl="0"/>
+            <a:r>
+              <a:rPr lang="en-US" dirty="0"/>
+              <a:t>Respond with what you changed</a:t>
+            </a:r>
+          </a:p>
+          <a:p>
+            <a:pPr lvl="0"/>
+            <a:r>
+              <a:rPr lang="en-US" dirty="0"/>
+              <a:t>Solicit missing information</a:t>
             </a:r>
           </a:p>
           <a:p>
@@ -2281,7 +2334,7 @@
     </p:spTree>
     <p:extLst>
       <p:ext uri="{BB962C8B-B14F-4D97-AF65-F5344CB8AC3E}">
-        <p14:creationId xmlns:p14="http://schemas.microsoft.com/office/powerpoint/2010/main" val="3510792138"/>
+        <p14:creationId xmlns:p14="http://schemas.microsoft.com/office/powerpoint/2010/main" val="4129013769"/>
       </p:ext>
     </p:extLst>
   </p:cSld>
@@ -2337,25 +2390,7 @@
           <a:p>
             <a:r>
               <a:rPr lang="en-US" dirty="0"/>
-              <a:t>Non-functional changes</a:t>
-            </a:r>
-          </a:p>
-          <a:p>
-            <a:r>
-              <a:rPr lang="en-US" dirty="0"/>
-              <a:t>	refactoring code</a:t>
-            </a:r>
-          </a:p>
-          <a:p>
-            <a:r>
-              <a:rPr lang="en-US" dirty="0"/>
-              <a:t>	changing formatting (e.g., indentation)</a:t>
-            </a:r>
-          </a:p>
-          <a:p>
-            <a:r>
-              <a:rPr lang="en-US" dirty="0"/>
-              <a:t>	These can often show every line as “changed” in diff view</a:t>
+              <a:t>If the reviewer is confused by your code, go back to the code and make it self-documenting</a:t>
             </a:r>
           </a:p>
           <a:p>
@@ -2389,7 +2424,7 @@
     </p:spTree>
     <p:extLst>
       <p:ext uri="{BB962C8B-B14F-4D97-AF65-F5344CB8AC3E}">
-        <p14:creationId xmlns:p14="http://schemas.microsoft.com/office/powerpoint/2010/main" val="3030666083"/>
+        <p14:creationId xmlns:p14="http://schemas.microsoft.com/office/powerpoint/2010/main" val="3510792138"/>
       </p:ext>
     </p:extLst>
   </p:cSld>
@@ -2445,19 +2480,25 @@
           <a:p>
             <a:r>
               <a:rPr lang="en-US" dirty="0"/>
-              <a:t>Be grateful for feedback</a:t>
-            </a:r>
-          </a:p>
-          <a:p>
-            <a:r>
-              <a:rPr lang="en-US" dirty="0"/>
-              <a:t>Catching errors is a sign your code is structured in a way that makes it easier to find errors</a:t>
-            </a:r>
-          </a:p>
-          <a:p>
-            <a:r>
-              <a:rPr lang="en-US" dirty="0"/>
-              <a:t>If the reviewer is wrong, it may be a sign that your code can be refactored to make it more readable</a:t>
+              <a:t>Non-functional changes</a:t>
+            </a:r>
+          </a:p>
+          <a:p>
+            <a:r>
+              <a:rPr lang="en-US" dirty="0"/>
+              <a:t>	refactoring code</a:t>
+            </a:r>
+          </a:p>
+          <a:p>
+            <a:r>
+              <a:rPr lang="en-US" dirty="0"/>
+              <a:t>	changing formatting (e.g., indentation)</a:t>
+            </a:r>
+          </a:p>
+          <a:p>
+            <a:r>
+              <a:rPr lang="en-US" dirty="0"/>
+              <a:t>	These can often show every line as “changed” in diff view</a:t>
             </a:r>
           </a:p>
           <a:p>
@@ -2491,7 +2532,7 @@
     </p:spTree>
     <p:extLst>
       <p:ext uri="{BB962C8B-B14F-4D97-AF65-F5344CB8AC3E}">
-        <p14:creationId xmlns:p14="http://schemas.microsoft.com/office/powerpoint/2010/main" val="3240909068"/>
+        <p14:creationId xmlns:p14="http://schemas.microsoft.com/office/powerpoint/2010/main" val="3030666083"/>
       </p:ext>
     </p:extLst>
   </p:cSld>
@@ -2547,8 +2588,23 @@
           <a:p>
             <a:r>
               <a:rPr lang="en-US" dirty="0"/>
-              <a:t>Minimize lag between rounds of review</a:t>
-            </a:r>
+              <a:t>Be grateful for feedback</a:t>
+            </a:r>
+          </a:p>
+          <a:p>
+            <a:r>
+              <a:rPr lang="en-US" dirty="0"/>
+              <a:t>Catching errors is a sign your code is structured in a way that makes it easier to find errors</a:t>
+            </a:r>
+          </a:p>
+          <a:p>
+            <a:r>
+              <a:rPr lang="en-US" dirty="0"/>
+              <a:t>If the reviewer is wrong, it may be a sign that your code can be refactored to make it more readable</a:t>
+            </a:r>
+          </a:p>
+          <a:p>
+            <a:endParaRPr lang="en-US" dirty="0"/>
           </a:p>
         </p:txBody>
       </p:sp>
@@ -2570,6 +2626,93 @@
             <a:fld id="{58B0D769-A7CC-4121-8D93-CE8B89E00FE0}" type="slidenum">
               <a:rPr lang="en-US" smtClean="0"/>
               <a:t>40</a:t>
+            </a:fld>
+            <a:endParaRPr lang="en-US"/>
+          </a:p>
+        </p:txBody>
+      </p:sp>
+    </p:spTree>
+    <p:extLst>
+      <p:ext uri="{BB962C8B-B14F-4D97-AF65-F5344CB8AC3E}">
+        <p14:creationId xmlns:p14="http://schemas.microsoft.com/office/powerpoint/2010/main" val="3240909068"/>
+      </p:ext>
+    </p:extLst>
+  </p:cSld>
+  <p:clrMapOvr>
+    <a:masterClrMapping/>
+  </p:clrMapOvr>
+</p:notes>
+</file>
+
+<file path=ppt/notesSlides/notesSlide24.xml><?xml version="1.0" encoding="utf-8"?>
+<p:notes xmlns:a="http://schemas.openxmlformats.org/drawingml/2006/main" xmlns:r="http://schemas.openxmlformats.org/officeDocument/2006/relationships" xmlns:p="http://schemas.openxmlformats.org/presentationml/2006/main">
+  <p:cSld>
+    <p:spTree>
+      <p:nvGrpSpPr>
+        <p:cNvPr id="1" name=""/>
+        <p:cNvGrpSpPr/>
+        <p:nvPr/>
+      </p:nvGrpSpPr>
+      <p:grpSpPr>
+        <a:xfrm>
+          <a:off x="0" y="0"/>
+          <a:ext cx="0" cy="0"/>
+          <a:chOff x="0" y="0"/>
+          <a:chExt cx="0" cy="0"/>
+        </a:xfrm>
+      </p:grpSpPr>
+      <p:sp>
+        <p:nvSpPr>
+          <p:cNvPr id="2" name="Slide Image Placeholder 1"/>
+          <p:cNvSpPr>
+            <a:spLocks noGrp="1" noRot="1" noChangeAspect="1"/>
+          </p:cNvSpPr>
+          <p:nvPr>
+            <p:ph type="sldImg"/>
+          </p:nvPr>
+        </p:nvSpPr>
+        <p:spPr/>
+      </p:sp>
+      <p:sp>
+        <p:nvSpPr>
+          <p:cNvPr id="3" name="Notes Placeholder 2"/>
+          <p:cNvSpPr>
+            <a:spLocks noGrp="1"/>
+          </p:cNvSpPr>
+          <p:nvPr>
+            <p:ph type="body" idx="1"/>
+          </p:nvPr>
+        </p:nvSpPr>
+        <p:spPr/>
+        <p:txBody>
+          <a:bodyPr/>
+          <a:lstStyle/>
+          <a:p>
+            <a:r>
+              <a:rPr lang="en-US" dirty="0"/>
+              <a:t>Minimize lag between rounds of review</a:t>
+            </a:r>
+          </a:p>
+        </p:txBody>
+      </p:sp>
+      <p:sp>
+        <p:nvSpPr>
+          <p:cNvPr id="4" name="Slide Number Placeholder 3"/>
+          <p:cNvSpPr>
+            <a:spLocks noGrp="1"/>
+          </p:cNvSpPr>
+          <p:nvPr>
+            <p:ph type="sldNum" sz="quarter" idx="5"/>
+          </p:nvPr>
+        </p:nvSpPr>
+        <p:spPr/>
+        <p:txBody>
+          <a:bodyPr/>
+          <a:lstStyle/>
+          <a:p>
+            <a:fld id="{58B0D769-A7CC-4121-8D93-CE8B89E00FE0}" type="slidenum">
+              <a:rPr lang="en-US" smtClean="0"/>
+              <a:t>41</a:t>
             </a:fld>
             <a:endParaRPr lang="en-US"/>
           </a:p>
@@ -9366,7 +9509,7 @@
           <p:cNvPr id="2" name="Title 1">
             <a:extLst>
               <a:ext uri="{FF2B5EF4-FFF2-40B4-BE49-F238E27FC236}">
-                <a16:creationId xmlns:a16="http://schemas.microsoft.com/office/drawing/2014/main" id="{E7292F2C-862D-48C0-8ABB-A2C971E526D7}"/>
+                <a16:creationId xmlns:a16="http://schemas.microsoft.com/office/drawing/2014/main" id="{291BEF2D-0A52-BFE1-8F98-FDB0B873DF62}"/>
               </a:ext>
             </a:extLst>
           </p:cNvPr>
@@ -9379,57 +9522,108 @@
         </p:nvSpPr>
         <p:spPr/>
         <p:txBody>
-          <a:bodyPr>
-            <a:normAutofit/>
-          </a:bodyPr>
-          <a:lstStyle/>
-          <a:p>
-            <a:pPr rtl="0" eaLnBrk="1" latinLnBrk="0" hangingPunct="1"/>
-            <a:r>
-              <a:rPr lang="en-US" sz="4400" kern="1200" dirty="0">
-                <a:solidFill>
-                  <a:schemeClr val="tx1"/>
-                </a:solidFill>
-                <a:effectLst/>
-                <a:latin typeface="+mj-lt"/>
-                <a:ea typeface="+mj-ea"/>
-                <a:cs typeface="+mj-cs"/>
-              </a:rPr>
-              <a:t>Praise Sincerely</a:t>
-            </a:r>
+          <a:bodyPr/>
+          <a:lstStyle/>
+          <a:p>
+            <a:r>
+              <a:rPr lang="en-US" dirty="0"/>
+              <a:t>Prefix review comments with labels:</a:t>
+            </a:r>
+          </a:p>
+        </p:txBody>
+      </p:sp>
+      <p:sp>
+        <p:nvSpPr>
+          <p:cNvPr id="3" name="Content Placeholder 2">
+            <a:extLst>
+              <a:ext uri="{FF2B5EF4-FFF2-40B4-BE49-F238E27FC236}">
+                <a16:creationId xmlns:a16="http://schemas.microsoft.com/office/drawing/2014/main" id="{031337D1-73EC-A1AA-46AB-09ADBC36299D}"/>
+              </a:ext>
+            </a:extLst>
+          </p:cNvPr>
+          <p:cNvSpPr>
+            <a:spLocks noGrp="1"/>
+          </p:cNvSpPr>
+          <p:nvPr>
+            <p:ph idx="1"/>
+          </p:nvPr>
+        </p:nvSpPr>
+        <p:spPr>
+          <a:xfrm>
+            <a:off x="838199" y="1825625"/>
+            <a:ext cx="11072149" cy="4351338"/>
+          </a:xfrm>
+        </p:spPr>
+        <p:txBody>
+          <a:bodyPr/>
+          <a:lstStyle/>
+          <a:p>
+            <a:r>
+              <a:rPr lang="en-US" dirty="0"/>
+              <a:t>Issue: This method does 2 things; violates the SRP</a:t>
+            </a:r>
+          </a:p>
+          <a:p>
+            <a:r>
+              <a:rPr lang="en-US" dirty="0"/>
+              <a:t>Suggestion: Consider splitting this into 2 methods</a:t>
+            </a:r>
+          </a:p>
+          <a:p>
+            <a:r>
+              <a:rPr lang="en-US" dirty="0"/>
+              <a:t>Question: Why did you choose the </a:t>
+            </a:r>
+            <a:r>
+              <a:rPr lang="en-US" dirty="0" err="1"/>
+              <a:t>ArrayList</a:t>
+            </a:r>
+            <a:r>
+              <a:rPr lang="en-US" dirty="0"/>
+              <a:t> instead of the List class?</a:t>
+            </a:r>
+          </a:p>
+          <a:p>
+            <a:r>
+              <a:rPr lang="en-US" dirty="0"/>
+              <a:t>Nit: A better name for this method might be “</a:t>
+            </a:r>
+            <a:r>
+              <a:rPr lang="en-US" dirty="0" err="1"/>
+              <a:t>GetAllProducts</a:t>
+            </a:r>
+            <a:r>
+              <a:rPr lang="en-US" dirty="0"/>
+              <a:t>”</a:t>
+            </a:r>
+          </a:p>
+          <a:p>
+            <a:r>
+              <a:rPr lang="en-US" dirty="0"/>
+              <a:t>Thought: Here is a library that does this for you</a:t>
+            </a:r>
+          </a:p>
+          <a:p>
+            <a:r>
+              <a:rPr lang="en-US" dirty="0"/>
+              <a:t>Chore: “Customer” is misspelled</a:t>
+            </a:r>
+          </a:p>
+          <a:p>
+            <a:r>
+              <a:rPr lang="en-US" dirty="0"/>
+              <a:t>Praise: Clever refactoring! Much more readable!</a:t>
+            </a:r>
+          </a:p>
+          <a:p>
             <a:endParaRPr lang="en-US" dirty="0"/>
-          </a:p>
-        </p:txBody>
-      </p:sp>
-      <p:sp>
-        <p:nvSpPr>
-          <p:cNvPr id="3" name="Content Placeholder 2">
-            <a:extLst>
-              <a:ext uri="{FF2B5EF4-FFF2-40B4-BE49-F238E27FC236}">
-                <a16:creationId xmlns:a16="http://schemas.microsoft.com/office/drawing/2014/main" id="{AE3130E8-14D6-462E-ADD0-E1FA331D78FF}"/>
-              </a:ext>
-            </a:extLst>
-          </p:cNvPr>
-          <p:cNvSpPr>
-            <a:spLocks noGrp="1"/>
-          </p:cNvSpPr>
-          <p:nvPr>
-            <p:ph idx="1"/>
-          </p:nvPr>
-        </p:nvSpPr>
-        <p:spPr/>
-        <p:txBody>
-          <a:bodyPr/>
-          <a:lstStyle/>
-          <a:p>
-            <a:endParaRPr lang="en-US"/>
           </a:p>
         </p:txBody>
       </p:sp>
     </p:spTree>
     <p:extLst>
       <p:ext uri="{BB962C8B-B14F-4D97-AF65-F5344CB8AC3E}">
-        <p14:creationId xmlns:p14="http://schemas.microsoft.com/office/powerpoint/2010/main" val="3965849638"/>
+        <p14:creationId xmlns:p14="http://schemas.microsoft.com/office/powerpoint/2010/main" val="2945040223"/>
       </p:ext>
     </p:extLst>
   </p:cSld>
@@ -9461,7 +9655,7 @@
           <p:cNvPr id="2" name="Title 1">
             <a:extLst>
               <a:ext uri="{FF2B5EF4-FFF2-40B4-BE49-F238E27FC236}">
-                <a16:creationId xmlns:a16="http://schemas.microsoft.com/office/drawing/2014/main" id="{2CC1ED39-E06C-4481-A123-CC7C697D1E5B}"/>
+                <a16:creationId xmlns:a16="http://schemas.microsoft.com/office/drawing/2014/main" id="{E7292F2C-862D-48C0-8ABB-A2C971E526D7}"/>
               </a:ext>
             </a:extLst>
           </p:cNvPr>
@@ -9490,7 +9684,7 @@
                 <a:ea typeface="+mj-ea"/>
                 <a:cs typeface="+mj-cs"/>
               </a:rPr>
-              <a:t>Avoid Repeating Feedback</a:t>
+              <a:t>Praise Sincerely</a:t>
             </a:r>
             <a:endParaRPr lang="en-US" dirty="0"/>
           </a:p>
@@ -9501,7 +9695,7 @@
           <p:cNvPr id="3" name="Content Placeholder 2">
             <a:extLst>
               <a:ext uri="{FF2B5EF4-FFF2-40B4-BE49-F238E27FC236}">
-                <a16:creationId xmlns:a16="http://schemas.microsoft.com/office/drawing/2014/main" id="{BF1A8C6F-72A0-4A11-AB2B-0F965154AD0D}"/>
+                <a16:creationId xmlns:a16="http://schemas.microsoft.com/office/drawing/2014/main" id="{AE3130E8-14D6-462E-ADD0-E1FA331D78FF}"/>
               </a:ext>
             </a:extLst>
           </p:cNvPr>
@@ -9517,14 +9711,14 @@
           <a:bodyPr/>
           <a:lstStyle/>
           <a:p>
-            <a:endParaRPr lang="en-US" dirty="0"/>
+            <a:endParaRPr lang="en-US"/>
           </a:p>
         </p:txBody>
       </p:sp>
     </p:spTree>
     <p:extLst>
       <p:ext uri="{BB962C8B-B14F-4D97-AF65-F5344CB8AC3E}">
-        <p14:creationId xmlns:p14="http://schemas.microsoft.com/office/powerpoint/2010/main" val="1070692530"/>
+        <p14:creationId xmlns:p14="http://schemas.microsoft.com/office/powerpoint/2010/main" val="3965849638"/>
       </p:ext>
     </p:extLst>
   </p:cSld>
@@ -9556,7 +9750,7 @@
           <p:cNvPr id="2" name="Title 1">
             <a:extLst>
               <a:ext uri="{FF2B5EF4-FFF2-40B4-BE49-F238E27FC236}">
-                <a16:creationId xmlns:a16="http://schemas.microsoft.com/office/drawing/2014/main" id="{040CCC4B-DF36-45D2-9F4A-CF91339C1B14}"/>
+                <a16:creationId xmlns:a16="http://schemas.microsoft.com/office/drawing/2014/main" id="{2CC1ED39-E06C-4481-A123-CC7C697D1E5B}"/>
               </a:ext>
             </a:extLst>
           </p:cNvPr>
@@ -9585,7 +9779,7 @@
                 <a:ea typeface="+mj-ea"/>
                 <a:cs typeface="+mj-cs"/>
               </a:rPr>
-              <a:t>Consider the Scope of the Review</a:t>
+              <a:t>Avoid Repeating Feedback</a:t>
             </a:r>
             <a:endParaRPr lang="en-US" dirty="0"/>
           </a:p>
@@ -9596,7 +9790,7 @@
           <p:cNvPr id="3" name="Content Placeholder 2">
             <a:extLst>
               <a:ext uri="{FF2B5EF4-FFF2-40B4-BE49-F238E27FC236}">
-                <a16:creationId xmlns:a16="http://schemas.microsoft.com/office/drawing/2014/main" id="{4B44D634-86F7-4806-AD7E-EC760E369389}"/>
+                <a16:creationId xmlns:a16="http://schemas.microsoft.com/office/drawing/2014/main" id="{BF1A8C6F-72A0-4A11-AB2B-0F965154AD0D}"/>
               </a:ext>
             </a:extLst>
           </p:cNvPr>
@@ -9613,44 +9807,25 @@
           <a:lstStyle/>
           <a:p>
             <a:r>
-              <a:rPr lang="en-US" dirty="0"/>
-              <a:t>Avoid feedback on lines that did not change</a:t>
-            </a:r>
-          </a:p>
-          <a:p>
-            <a:r>
-              <a:rPr lang="en-US" dirty="0"/>
-              <a:t>Exceptions</a:t>
-            </a:r>
-          </a:p>
-          <a:p>
-            <a:pPr lvl="1"/>
-            <a:r>
-              <a:rPr lang="en-US" dirty="0"/>
-              <a:t>Change affected a line (</a:t>
-            </a:r>
-            <a:r>
-              <a:rPr lang="en-US" dirty="0" err="1"/>
-              <a:t>e.g</a:t>
-            </a:r>
-            <a:r>
-              <a:rPr lang="en-US" dirty="0"/>
-              <a:t>, the name of a function whose body changed)</a:t>
-            </a:r>
-          </a:p>
-          <a:p>
-            <a:pPr lvl="1"/>
-            <a:r>
-              <a:rPr lang="en-US" dirty="0"/>
-              <a:t>Trivial change and few other feedback items</a:t>
-            </a:r>
+              <a:rPr lang="en-US" sz="2800" kern="1200" dirty="0">
+                <a:solidFill>
+                  <a:schemeClr val="tx1"/>
+                </a:solidFill>
+                <a:effectLst/>
+                <a:latin typeface="+mj-lt"/>
+                <a:ea typeface="+mj-ea"/>
+                <a:cs typeface="+mj-cs"/>
+              </a:rPr>
+              <a:t>e.g., “See naming convention comment above”</a:t>
+            </a:r>
+            <a:endParaRPr lang="en-US" dirty="0"/>
           </a:p>
         </p:txBody>
       </p:sp>
     </p:spTree>
     <p:extLst>
       <p:ext uri="{BB962C8B-B14F-4D97-AF65-F5344CB8AC3E}">
-        <p14:creationId xmlns:p14="http://schemas.microsoft.com/office/powerpoint/2010/main" val="3374163760"/>
+        <p14:creationId xmlns:p14="http://schemas.microsoft.com/office/powerpoint/2010/main" val="1070692530"/>
       </p:ext>
     </p:extLst>
   </p:cSld>
@@ -9682,7 +9857,7 @@
           <p:cNvPr id="2" name="Title 1">
             <a:extLst>
               <a:ext uri="{FF2B5EF4-FFF2-40B4-BE49-F238E27FC236}">
-                <a16:creationId xmlns:a16="http://schemas.microsoft.com/office/drawing/2014/main" id="{756AE765-1AAB-4A76-986C-DD680717C9A0}"/>
+                <a16:creationId xmlns:a16="http://schemas.microsoft.com/office/drawing/2014/main" id="{040CCC4B-DF36-45D2-9F4A-CF91339C1B14}"/>
               </a:ext>
             </a:extLst>
           </p:cNvPr>
@@ -9695,7 +9870,9 @@
         </p:nvSpPr>
         <p:spPr/>
         <p:txBody>
-          <a:bodyPr/>
+          <a:bodyPr>
+            <a:normAutofit/>
+          </a:bodyPr>
           <a:lstStyle/>
           <a:p>
             <a:pPr rtl="0" eaLnBrk="1" latinLnBrk="0" hangingPunct="1"/>
@@ -9709,7 +9886,7 @@
                 <a:ea typeface="+mj-ea"/>
                 <a:cs typeface="+mj-cs"/>
               </a:rPr>
-              <a:t>Stalemates</a:t>
+              <a:t>Consider the Scope of the Review</a:t>
             </a:r>
             <a:endParaRPr lang="en-US" dirty="0"/>
           </a:p>
@@ -9720,7 +9897,7 @@
           <p:cNvPr id="3" name="Content Placeholder 2">
             <a:extLst>
               <a:ext uri="{FF2B5EF4-FFF2-40B4-BE49-F238E27FC236}">
-                <a16:creationId xmlns:a16="http://schemas.microsoft.com/office/drawing/2014/main" id="{1EA7DAC6-CEC9-4255-872E-3E1D95674F03}"/>
+                <a16:creationId xmlns:a16="http://schemas.microsoft.com/office/drawing/2014/main" id="{4B44D634-86F7-4806-AD7E-EC760E369389}"/>
               </a:ext>
             </a:extLst>
           </p:cNvPr>
@@ -9738,55 +9915,31 @@
           <a:p>
             <a:r>
               <a:rPr lang="en-US" dirty="0"/>
-              <a:t>Symptoms</a:t>
+              <a:t>Avoid feedback on lines that did not change</a:t>
+            </a:r>
+          </a:p>
+          <a:p>
+            <a:r>
+              <a:rPr lang="en-US" dirty="0"/>
+              <a:t>Exceptions</a:t>
             </a:r>
           </a:p>
           <a:p>
             <a:pPr lvl="1"/>
             <a:r>
-              <a:rPr lang="en-US" dirty="0"/>
-              <a:t>No progress</a:t>
+              <a:rPr lang="en-US"/>
+              <a:t>Trivial change and few other feedback items</a:t>
             </a:r>
           </a:p>
           <a:p>
             <a:pPr lvl="1"/>
             <a:r>
-              <a:rPr lang="en-US" dirty="0"/>
-              <a:t>Tension</a:t>
-            </a:r>
-          </a:p>
-          <a:p>
-            <a:r>
-              <a:rPr lang="en-US" dirty="0"/>
-              <a:t>Cures</a:t>
-            </a:r>
-          </a:p>
-          <a:p>
-            <a:pPr lvl="1"/>
-            <a:r>
-              <a:rPr lang="en-US" dirty="0"/>
-              <a:t>Discuss</a:t>
-            </a:r>
-          </a:p>
-          <a:p>
-            <a:pPr lvl="1"/>
-            <a:r>
-              <a:rPr lang="en-US" dirty="0"/>
-              <a:t>Design Review</a:t>
-            </a:r>
-          </a:p>
-          <a:p>
-            <a:pPr lvl="1"/>
-            <a:r>
-              <a:rPr lang="en-US" dirty="0"/>
-              <a:t>Concede</a:t>
-            </a:r>
-          </a:p>
-          <a:p>
-            <a:pPr lvl="1"/>
-            <a:r>
-              <a:rPr lang="en-US" dirty="0"/>
-              <a:t>Escalate</a:t>
+              <a:rPr lang="en-US"/>
+              <a:t>Change </a:t>
+            </a:r>
+            <a:r>
+              <a:rPr lang="en-US" dirty="0"/>
+              <a:t>affected a line (e.g., the name of a function whose body changed)</a:t>
             </a:r>
           </a:p>
         </p:txBody>
@@ -9794,7 +9947,7 @@
     </p:spTree>
     <p:extLst>
       <p:ext uri="{BB962C8B-B14F-4D97-AF65-F5344CB8AC3E}">
-        <p14:creationId xmlns:p14="http://schemas.microsoft.com/office/powerpoint/2010/main" val="3682861194"/>
+        <p14:creationId xmlns:p14="http://schemas.microsoft.com/office/powerpoint/2010/main" val="3374163760"/>
       </p:ext>
     </p:extLst>
   </p:cSld>
@@ -9897,12 +10050,6 @@
             <a:r>
               <a:rPr lang="en-US" dirty="0"/>
               <a:t>Techniques for Code Author</a:t>
-            </a:r>
-          </a:p>
-          <a:p>
-            <a:r>
-              <a:rPr lang="en-US" dirty="0"/>
-              <a:t>Definitions and Goals</a:t>
             </a:r>
           </a:p>
           <a:p>
@@ -9951,7 +10098,7 @@
           <p:cNvPr id="2" name="Title 1">
             <a:extLst>
               <a:ext uri="{FF2B5EF4-FFF2-40B4-BE49-F238E27FC236}">
-                <a16:creationId xmlns:a16="http://schemas.microsoft.com/office/drawing/2014/main" id="{1A7D252D-6B4C-4749-BF4B-C4B91C7A2B9B}"/>
+                <a16:creationId xmlns:a16="http://schemas.microsoft.com/office/drawing/2014/main" id="{756AE765-1AAB-4A76-986C-DD680717C9A0}"/>
               </a:ext>
             </a:extLst>
           </p:cNvPr>
@@ -9964,9 +10111,7 @@
         </p:nvSpPr>
         <p:spPr/>
         <p:txBody>
-          <a:bodyPr>
-            <a:normAutofit/>
-          </a:bodyPr>
+          <a:bodyPr/>
           <a:lstStyle/>
           <a:p>
             <a:pPr rtl="0" eaLnBrk="1" latinLnBrk="0" hangingPunct="1"/>
@@ -9980,7 +10125,7 @@
                 <a:ea typeface="+mj-ea"/>
                 <a:cs typeface="+mj-cs"/>
               </a:rPr>
-              <a:t>Goal: Improve Code</a:t>
+              <a:t>Stalemates</a:t>
             </a:r>
             <a:endParaRPr lang="en-US" dirty="0"/>
           </a:p>
@@ -9991,7 +10136,7 @@
           <p:cNvPr id="3" name="Content Placeholder 2">
             <a:extLst>
               <a:ext uri="{FF2B5EF4-FFF2-40B4-BE49-F238E27FC236}">
-                <a16:creationId xmlns:a16="http://schemas.microsoft.com/office/drawing/2014/main" id="{C5B44566-2B5B-46DB-BC5A-C1E2DA1E7236}"/>
+                <a16:creationId xmlns:a16="http://schemas.microsoft.com/office/drawing/2014/main" id="{1EA7DAC6-CEC9-4255-872E-3E1D95674F03}"/>
               </a:ext>
             </a:extLst>
           </p:cNvPr>
@@ -10007,17 +10152,65 @@
           <a:bodyPr/>
           <a:lstStyle/>
           <a:p>
-            <a:pPr marL="0" indent="0">
-              <a:buNone/>
-            </a:pPr>
-            <a:endParaRPr lang="en-US" dirty="0"/>
+            <a:r>
+              <a:rPr lang="en-US" dirty="0"/>
+              <a:t>Symptoms</a:t>
+            </a:r>
+          </a:p>
+          <a:p>
+            <a:pPr lvl="1"/>
+            <a:r>
+              <a:rPr lang="en-US" dirty="0"/>
+              <a:t>No progress</a:t>
+            </a:r>
+          </a:p>
+          <a:p>
+            <a:pPr lvl="1"/>
+            <a:r>
+              <a:rPr lang="en-US" dirty="0"/>
+              <a:t>Tension</a:t>
+            </a:r>
+          </a:p>
+          <a:p>
+            <a:r>
+              <a:rPr lang="en-US" dirty="0"/>
+              <a:t>Cures</a:t>
+            </a:r>
+          </a:p>
+          <a:p>
+            <a:pPr lvl="1"/>
+            <a:r>
+              <a:rPr lang="en-US" dirty="0"/>
+              <a:t>Discuss</a:t>
+            </a:r>
+          </a:p>
+          <a:p>
+            <a:pPr lvl="1"/>
+            <a:r>
+              <a:rPr lang="en-US" dirty="0"/>
+              <a:t>Design Review</a:t>
+            </a:r>
+          </a:p>
+          <a:p>
+            <a:pPr lvl="1"/>
+            <a:r>
+              <a:rPr lang="en-US" dirty="0"/>
+              <a:t>Concede</a:t>
+            </a:r>
+          </a:p>
+          <a:p>
+            <a:pPr lvl="1"/>
+            <a:r>
+              <a:rPr lang="en-US" dirty="0"/>
+              <a:t>Escalate</a:t>
+            </a:r>
           </a:p>
         </p:txBody>
       </p:sp>
     </p:spTree>
     <p:extLst>
       <p:ext uri="{BB962C8B-B14F-4D97-AF65-F5344CB8AC3E}">
-        <p14:creationId xmlns:p14="http://schemas.microsoft.com/office/powerpoint/2010/main" val="3537904068"/>
+        <p14:creationId xmlns:p14="http://schemas.microsoft.com/office/powerpoint/2010/main" val="3682861194"/>
       </p:ext>
     </p:extLst>
   </p:cSld>
@@ -10049,6 +10242,104 @@
           <p:cNvPr id="2" name="Title 1">
             <a:extLst>
               <a:ext uri="{FF2B5EF4-FFF2-40B4-BE49-F238E27FC236}">
+                <a16:creationId xmlns:a16="http://schemas.microsoft.com/office/drawing/2014/main" id="{1A7D252D-6B4C-4749-BF4B-C4B91C7A2B9B}"/>
+              </a:ext>
+            </a:extLst>
+          </p:cNvPr>
+          <p:cNvSpPr>
+            <a:spLocks noGrp="1"/>
+          </p:cNvSpPr>
+          <p:nvPr>
+            <p:ph type="title"/>
+          </p:nvPr>
+        </p:nvSpPr>
+        <p:spPr/>
+        <p:txBody>
+          <a:bodyPr>
+            <a:normAutofit/>
+          </a:bodyPr>
+          <a:lstStyle/>
+          <a:p>
+            <a:pPr rtl="0" eaLnBrk="1" latinLnBrk="0" hangingPunct="1"/>
+            <a:r>
+              <a:rPr lang="en-US" sz="4400" kern="1200" dirty="0">
+                <a:solidFill>
+                  <a:schemeClr val="tx1"/>
+                </a:solidFill>
+                <a:effectLst/>
+                <a:latin typeface="+mj-lt"/>
+                <a:ea typeface="+mj-ea"/>
+                <a:cs typeface="+mj-cs"/>
+              </a:rPr>
+              <a:t>Goal: Improve Code</a:t>
+            </a:r>
+            <a:endParaRPr lang="en-US" dirty="0"/>
+          </a:p>
+        </p:txBody>
+      </p:sp>
+      <p:sp>
+        <p:nvSpPr>
+          <p:cNvPr id="3" name="Content Placeholder 2">
+            <a:extLst>
+              <a:ext uri="{FF2B5EF4-FFF2-40B4-BE49-F238E27FC236}">
+                <a16:creationId xmlns:a16="http://schemas.microsoft.com/office/drawing/2014/main" id="{C5B44566-2B5B-46DB-BC5A-C1E2DA1E7236}"/>
+              </a:ext>
+            </a:extLst>
+          </p:cNvPr>
+          <p:cNvSpPr>
+            <a:spLocks noGrp="1"/>
+          </p:cNvSpPr>
+          <p:nvPr>
+            <p:ph idx="1"/>
+          </p:nvPr>
+        </p:nvSpPr>
+        <p:spPr/>
+        <p:txBody>
+          <a:bodyPr/>
+          <a:lstStyle/>
+          <a:p>
+            <a:pPr marL="0" indent="0">
+              <a:buNone/>
+            </a:pPr>
+            <a:endParaRPr lang="en-US" dirty="0"/>
+          </a:p>
+        </p:txBody>
+      </p:sp>
+    </p:spTree>
+    <p:extLst>
+      <p:ext uri="{BB962C8B-B14F-4D97-AF65-F5344CB8AC3E}">
+        <p14:creationId xmlns:p14="http://schemas.microsoft.com/office/powerpoint/2010/main" val="3537904068"/>
+      </p:ext>
+    </p:extLst>
+  </p:cSld>
+  <p:clrMapOvr>
+    <a:masterClrMapping/>
+  </p:clrMapOvr>
+</p:sld>
+</file>
+
+<file path=ppt/slides/slide32.xml><?xml version="1.0" encoding="utf-8"?>
+<p:sld xmlns:a="http://schemas.openxmlformats.org/drawingml/2006/main" xmlns:r="http://schemas.openxmlformats.org/officeDocument/2006/relationships" xmlns:p="http://schemas.openxmlformats.org/presentationml/2006/main">
+  <p:cSld>
+    <p:spTree>
+      <p:nvGrpSpPr>
+        <p:cNvPr id="1" name=""/>
+        <p:cNvGrpSpPr/>
+        <p:nvPr/>
+      </p:nvGrpSpPr>
+      <p:grpSpPr>
+        <a:xfrm>
+          <a:off x="0" y="0"/>
+          <a:ext cx="0" cy="0"/>
+          <a:chOff x="0" y="0"/>
+          <a:chExt cx="0" cy="0"/>
+        </a:xfrm>
+      </p:grpSpPr>
+      <p:sp>
+        <p:nvSpPr>
+          <p:cNvPr id="2" name="Title 1">
+            <a:extLst>
+              <a:ext uri="{FF2B5EF4-FFF2-40B4-BE49-F238E27FC236}">
                 <a16:creationId xmlns:a16="http://schemas.microsoft.com/office/drawing/2014/main" id="{BD8F8452-BA7A-96C4-9680-0CC582F0CE80}"/>
               </a:ext>
             </a:extLst>
@@ -10128,7 +10419,7 @@
 </p:sld>
 </file>
 
-<file path=ppt/slides/slide32.xml><?xml version="1.0" encoding="utf-8"?>
+<file path=ppt/slides/slide33.xml><?xml version="1.0" encoding="utf-8"?>
 <p:sld xmlns:a="http://schemas.openxmlformats.org/drawingml/2006/main" xmlns:r="http://schemas.openxmlformats.org/officeDocument/2006/relationships" xmlns:p="http://schemas.openxmlformats.org/presentationml/2006/main">
   <p:cSld>
     <p:spTree>
@@ -10352,89 +10643,6 @@
 </p:sld>
 </file>
 
-<file path=ppt/slides/slide33.xml><?xml version="1.0" encoding="utf-8"?>
-<p:sld xmlns:a="http://schemas.openxmlformats.org/drawingml/2006/main" xmlns:r="http://schemas.openxmlformats.org/officeDocument/2006/relationships" xmlns:p="http://schemas.openxmlformats.org/presentationml/2006/main">
-  <p:cSld>
-    <p:spTree>
-      <p:nvGrpSpPr>
-        <p:cNvPr id="1" name=""/>
-        <p:cNvGrpSpPr/>
-        <p:nvPr/>
-      </p:nvGrpSpPr>
-      <p:grpSpPr>
-        <a:xfrm>
-          <a:off x="0" y="0"/>
-          <a:ext cx="0" cy="0"/>
-          <a:chOff x="0" y="0"/>
-          <a:chExt cx="0" cy="0"/>
-        </a:xfrm>
-      </p:grpSpPr>
-      <p:sp>
-        <p:nvSpPr>
-          <p:cNvPr id="2" name="Title 1">
-            <a:extLst>
-              <a:ext uri="{FF2B5EF4-FFF2-40B4-BE49-F238E27FC236}">
-                <a16:creationId xmlns:a16="http://schemas.microsoft.com/office/drawing/2014/main" id="{3DC4F2E8-6C07-939C-3F38-CADCF7C47825}"/>
-              </a:ext>
-            </a:extLst>
-          </p:cNvPr>
-          <p:cNvSpPr>
-            <a:spLocks noGrp="1"/>
-          </p:cNvSpPr>
-          <p:nvPr>
-            <p:ph type="title"/>
-          </p:nvPr>
-        </p:nvSpPr>
-        <p:spPr/>
-        <p:txBody>
-          <a:bodyPr/>
-          <a:lstStyle/>
-          <a:p>
-            <a:r>
-              <a:rPr lang="en-US" dirty="0"/>
-              <a:t>Test, Test, Test!</a:t>
-            </a:r>
-          </a:p>
-        </p:txBody>
-      </p:sp>
-      <p:sp>
-        <p:nvSpPr>
-          <p:cNvPr id="3" name="Content Placeholder 2">
-            <a:extLst>
-              <a:ext uri="{FF2B5EF4-FFF2-40B4-BE49-F238E27FC236}">
-                <a16:creationId xmlns:a16="http://schemas.microsoft.com/office/drawing/2014/main" id="{38717A33-7130-FF93-A34C-4ABB6BFEE63C}"/>
-              </a:ext>
-            </a:extLst>
-          </p:cNvPr>
-          <p:cNvSpPr>
-            <a:spLocks noGrp="1"/>
-          </p:cNvSpPr>
-          <p:nvPr>
-            <p:ph idx="1"/>
-          </p:nvPr>
-        </p:nvSpPr>
-        <p:spPr/>
-        <p:txBody>
-          <a:bodyPr/>
-          <a:lstStyle/>
-          <a:p>
-            <a:endParaRPr lang="en-US"/>
-          </a:p>
-        </p:txBody>
-      </p:sp>
-    </p:spTree>
-    <p:extLst>
-      <p:ext uri="{BB962C8B-B14F-4D97-AF65-F5344CB8AC3E}">
-        <p14:creationId xmlns:p14="http://schemas.microsoft.com/office/powerpoint/2010/main" val="266870724"/>
-      </p:ext>
-    </p:extLst>
-  </p:cSld>
-  <p:clrMapOvr>
-    <a:masterClrMapping/>
-  </p:clrMapOvr>
-</p:sld>
-</file>
-
 <file path=ppt/slides/slide34.xml><?xml version="1.0" encoding="utf-8"?>
 <p:sld xmlns:a="http://schemas.openxmlformats.org/drawingml/2006/main" xmlns:r="http://schemas.openxmlformats.org/officeDocument/2006/relationships" xmlns:p="http://schemas.openxmlformats.org/presentationml/2006/main">
   <p:cSld>
@@ -10457,7 +10665,7 @@
           <p:cNvPr id="2" name="Title 1">
             <a:extLst>
               <a:ext uri="{FF2B5EF4-FFF2-40B4-BE49-F238E27FC236}">
-                <a16:creationId xmlns:a16="http://schemas.microsoft.com/office/drawing/2014/main" id="{1400C7A5-EDF0-4A76-967E-C7B402FCAED5}"/>
+                <a16:creationId xmlns:a16="http://schemas.microsoft.com/office/drawing/2014/main" id="{3DC4F2E8-6C07-939C-3F38-CADCF7C47825}"/>
               </a:ext>
             </a:extLst>
           </p:cNvPr>
@@ -10473,10 +10681,9 @@
           <a:bodyPr/>
           <a:lstStyle/>
           <a:p>
-            <a:pPr lvl="0"/>
-            <a:r>
-              <a:rPr lang="en-US" dirty="0"/>
-              <a:t>Use the computer</a:t>
+            <a:r>
+              <a:rPr lang="en-US" dirty="0"/>
+              <a:t>Test, Test, Test!</a:t>
             </a:r>
           </a:p>
         </p:txBody>
@@ -10486,7 +10693,7 @@
           <p:cNvPr id="3" name="Content Placeholder 2">
             <a:extLst>
               <a:ext uri="{FF2B5EF4-FFF2-40B4-BE49-F238E27FC236}">
-                <a16:creationId xmlns:a16="http://schemas.microsoft.com/office/drawing/2014/main" id="{410129CB-3B53-4D35-B842-E13D26067596}"/>
+                <a16:creationId xmlns:a16="http://schemas.microsoft.com/office/drawing/2014/main" id="{38717A33-7130-FF93-A34C-4ABB6BFEE63C}"/>
               </a:ext>
             </a:extLst>
           </p:cNvPr>
@@ -10509,7 +10716,7 @@
     </p:spTree>
     <p:extLst>
       <p:ext uri="{BB962C8B-B14F-4D97-AF65-F5344CB8AC3E}">
-        <p14:creationId xmlns:p14="http://schemas.microsoft.com/office/powerpoint/2010/main" val="849285240"/>
+        <p14:creationId xmlns:p14="http://schemas.microsoft.com/office/powerpoint/2010/main" val="266870724"/>
       </p:ext>
     </p:extLst>
   </p:cSld>
@@ -10541,7 +10748,7 @@
           <p:cNvPr id="2" name="Title 1">
             <a:extLst>
               <a:ext uri="{FF2B5EF4-FFF2-40B4-BE49-F238E27FC236}">
-                <a16:creationId xmlns:a16="http://schemas.microsoft.com/office/drawing/2014/main" id="{55FBC620-476D-4296-935F-9E71A1ECB00F}"/>
+                <a16:creationId xmlns:a16="http://schemas.microsoft.com/office/drawing/2014/main" id="{1400C7A5-EDF0-4A76-967E-C7B402FCAED5}"/>
               </a:ext>
             </a:extLst>
           </p:cNvPr>
@@ -10560,7 +10767,7 @@
             <a:pPr lvl="0"/>
             <a:r>
               <a:rPr lang="en-US" dirty="0"/>
-              <a:t>Review your own code first</a:t>
+              <a:t>Use the computer</a:t>
             </a:r>
           </a:p>
         </p:txBody>
@@ -10570,7 +10777,7 @@
           <p:cNvPr id="3" name="Content Placeholder 2">
             <a:extLst>
               <a:ext uri="{FF2B5EF4-FFF2-40B4-BE49-F238E27FC236}">
-                <a16:creationId xmlns:a16="http://schemas.microsoft.com/office/drawing/2014/main" id="{7D5A9C92-94F5-4740-84CA-D1FD2F46FD27}"/>
+                <a16:creationId xmlns:a16="http://schemas.microsoft.com/office/drawing/2014/main" id="{410129CB-3B53-4D35-B842-E13D26067596}"/>
               </a:ext>
             </a:extLst>
           </p:cNvPr>
@@ -10586,14 +10793,14 @@
           <a:bodyPr/>
           <a:lstStyle/>
           <a:p>
-            <a:endParaRPr lang="en-US" dirty="0"/>
+            <a:endParaRPr lang="en-US"/>
           </a:p>
         </p:txBody>
       </p:sp>
     </p:spTree>
     <p:extLst>
       <p:ext uri="{BB962C8B-B14F-4D97-AF65-F5344CB8AC3E}">
-        <p14:creationId xmlns:p14="http://schemas.microsoft.com/office/powerpoint/2010/main" val="3324773624"/>
+        <p14:creationId xmlns:p14="http://schemas.microsoft.com/office/powerpoint/2010/main" val="849285240"/>
       </p:ext>
     </p:extLst>
   </p:cSld>
@@ -10625,7 +10832,7 @@
           <p:cNvPr id="2" name="Title 1">
             <a:extLst>
               <a:ext uri="{FF2B5EF4-FFF2-40B4-BE49-F238E27FC236}">
-                <a16:creationId xmlns:a16="http://schemas.microsoft.com/office/drawing/2014/main" id="{74F67C75-18B2-4C47-B562-A820CA04993D}"/>
+                <a16:creationId xmlns:a16="http://schemas.microsoft.com/office/drawing/2014/main" id="{55FBC620-476D-4296-935F-9E71A1ECB00F}"/>
               </a:ext>
             </a:extLst>
           </p:cNvPr>
@@ -10644,7 +10851,7 @@
             <a:pPr lvl="0"/>
             <a:r>
               <a:rPr lang="en-US" dirty="0"/>
-              <a:t>Communicate Clearly</a:t>
+              <a:t>Review your own code first</a:t>
             </a:r>
           </a:p>
         </p:txBody>
@@ -10654,7 +10861,7 @@
           <p:cNvPr id="3" name="Content Placeholder 2">
             <a:extLst>
               <a:ext uri="{FF2B5EF4-FFF2-40B4-BE49-F238E27FC236}">
-                <a16:creationId xmlns:a16="http://schemas.microsoft.com/office/drawing/2014/main" id="{D66E4CEB-A5F2-49D1-A171-E4F2F2F92B6D}"/>
+                <a16:creationId xmlns:a16="http://schemas.microsoft.com/office/drawing/2014/main" id="{7D5A9C92-94F5-4740-84CA-D1FD2F46FD27}"/>
               </a:ext>
             </a:extLst>
           </p:cNvPr>
@@ -10670,14 +10877,14 @@
           <a:bodyPr/>
           <a:lstStyle/>
           <a:p>
-            <a:endParaRPr lang="en-US"/>
+            <a:endParaRPr lang="en-US" dirty="0"/>
           </a:p>
         </p:txBody>
       </p:sp>
     </p:spTree>
     <p:extLst>
       <p:ext uri="{BB962C8B-B14F-4D97-AF65-F5344CB8AC3E}">
-        <p14:creationId xmlns:p14="http://schemas.microsoft.com/office/powerpoint/2010/main" val="97765795"/>
+        <p14:creationId xmlns:p14="http://schemas.microsoft.com/office/powerpoint/2010/main" val="3324773624"/>
       </p:ext>
     </p:extLst>
   </p:cSld>
@@ -10709,7 +10916,7 @@
           <p:cNvPr id="2" name="Title 1">
             <a:extLst>
               <a:ext uri="{FF2B5EF4-FFF2-40B4-BE49-F238E27FC236}">
-                <a16:creationId xmlns:a16="http://schemas.microsoft.com/office/drawing/2014/main" id="{C4F9A022-7BBA-446B-B9AB-1AAD4B3C623C}"/>
+                <a16:creationId xmlns:a16="http://schemas.microsoft.com/office/drawing/2014/main" id="{74F67C75-18B2-4C47-B562-A820CA04993D}"/>
               </a:ext>
             </a:extLst>
           </p:cNvPr>
@@ -10728,7 +10935,7 @@
             <a:pPr lvl="0"/>
             <a:r>
               <a:rPr lang="en-US" dirty="0"/>
-              <a:t>Answer questions with the code</a:t>
+              <a:t>Communicate Clearly</a:t>
             </a:r>
           </a:p>
         </p:txBody>
@@ -10738,7 +10945,7 @@
           <p:cNvPr id="3" name="Content Placeholder 2">
             <a:extLst>
               <a:ext uri="{FF2B5EF4-FFF2-40B4-BE49-F238E27FC236}">
-                <a16:creationId xmlns:a16="http://schemas.microsoft.com/office/drawing/2014/main" id="{AF189AA5-1C25-430C-8DB5-6C9D8A504F9B}"/>
+                <a16:creationId xmlns:a16="http://schemas.microsoft.com/office/drawing/2014/main" id="{D66E4CEB-A5F2-49D1-A171-E4F2F2F92B6D}"/>
               </a:ext>
             </a:extLst>
           </p:cNvPr>
@@ -10754,23 +10961,14 @@
           <a:bodyPr/>
           <a:lstStyle/>
           <a:p>
-            <a:r>
-              <a:rPr lang="en-US" dirty="0"/>
-              <a:t>Refactor to make it more readable</a:t>
-            </a:r>
-          </a:p>
-          <a:p>
-            <a:r>
-              <a:rPr lang="en-US" dirty="0"/>
-              <a:t>Eliminate confusion</a:t>
-            </a:r>
+            <a:endParaRPr lang="en-US"/>
           </a:p>
         </p:txBody>
       </p:sp>
     </p:spTree>
     <p:extLst>
       <p:ext uri="{BB962C8B-B14F-4D97-AF65-F5344CB8AC3E}">
-        <p14:creationId xmlns:p14="http://schemas.microsoft.com/office/powerpoint/2010/main" val="2685276257"/>
+        <p14:creationId xmlns:p14="http://schemas.microsoft.com/office/powerpoint/2010/main" val="97765795"/>
       </p:ext>
     </p:extLst>
   </p:cSld>
@@ -10802,7 +11000,7 @@
           <p:cNvPr id="2" name="Title 1">
             <a:extLst>
               <a:ext uri="{FF2B5EF4-FFF2-40B4-BE49-F238E27FC236}">
-                <a16:creationId xmlns:a16="http://schemas.microsoft.com/office/drawing/2014/main" id="{27B045FA-639B-48FA-166A-1273198F3F4D}"/>
+                <a16:creationId xmlns:a16="http://schemas.microsoft.com/office/drawing/2014/main" id="{C4F9A022-7BBA-446B-B9AB-1AAD4B3C623C}"/>
               </a:ext>
             </a:extLst>
           </p:cNvPr>
@@ -10818,9 +11016,10 @@
           <a:bodyPr/>
           <a:lstStyle/>
           <a:p>
-            <a:r>
-              <a:rPr lang="en-US" dirty="0"/>
-              <a:t>Keep it Simple</a:t>
+            <a:pPr lvl="0"/>
+            <a:r>
+              <a:rPr lang="en-US" dirty="0"/>
+              <a:t>Answer questions with the code</a:t>
             </a:r>
           </a:p>
         </p:txBody>
@@ -10830,7 +11029,7 @@
           <p:cNvPr id="3" name="Content Placeholder 2">
             <a:extLst>
               <a:ext uri="{FF2B5EF4-FFF2-40B4-BE49-F238E27FC236}">
-                <a16:creationId xmlns:a16="http://schemas.microsoft.com/office/drawing/2014/main" id="{3182D7FA-4DEE-93DD-A7B3-F431B32DF42F}"/>
+                <a16:creationId xmlns:a16="http://schemas.microsoft.com/office/drawing/2014/main" id="{AF189AA5-1C25-430C-8DB5-6C9D8A504F9B}"/>
               </a:ext>
             </a:extLst>
           </p:cNvPr>
@@ -10846,24 +11045,15 @@
           <a:bodyPr/>
           <a:lstStyle/>
           <a:p>
-            <a:pPr lvl="0"/>
-            <a:r>
-              <a:rPr lang="en-US" dirty="0"/>
-              <a:t>Narrow scope changes</a:t>
-            </a:r>
-          </a:p>
-          <a:p>
-            <a:pPr lvl="0"/>
-            <a:r>
-              <a:rPr lang="en-US" dirty="0"/>
-              <a:t>Separate functional and non-functional changes</a:t>
-            </a:r>
-          </a:p>
-          <a:p>
-            <a:pPr lvl="0"/>
-            <a:r>
-              <a:rPr lang="en-US" dirty="0"/>
-              <a:t>Break up large change sets</a:t>
+            <a:r>
+              <a:rPr lang="en-US" dirty="0"/>
+              <a:t>Refactor to make it more readable</a:t>
+            </a:r>
+          </a:p>
+          <a:p>
+            <a:r>
+              <a:rPr lang="en-US" dirty="0"/>
+              <a:t>Eliminate confusion</a:t>
             </a:r>
           </a:p>
         </p:txBody>
@@ -10871,7 +11061,7 @@
     </p:spTree>
     <p:extLst>
       <p:ext uri="{BB962C8B-B14F-4D97-AF65-F5344CB8AC3E}">
-        <p14:creationId xmlns:p14="http://schemas.microsoft.com/office/powerpoint/2010/main" val="1020306639"/>
+        <p14:creationId xmlns:p14="http://schemas.microsoft.com/office/powerpoint/2010/main" val="2685276257"/>
       </p:ext>
     </p:extLst>
   </p:cSld>
@@ -10903,7 +11093,7 @@
           <p:cNvPr id="2" name="Title 1">
             <a:extLst>
               <a:ext uri="{FF2B5EF4-FFF2-40B4-BE49-F238E27FC236}">
-                <a16:creationId xmlns:a16="http://schemas.microsoft.com/office/drawing/2014/main" id="{77133BF5-62E6-4381-AAD5-4D276411C0FE}"/>
+                <a16:creationId xmlns:a16="http://schemas.microsoft.com/office/drawing/2014/main" id="{27B045FA-639B-48FA-166A-1273198F3F4D}"/>
               </a:ext>
             </a:extLst>
           </p:cNvPr>
@@ -10919,46 +11109,52 @@
           <a:bodyPr/>
           <a:lstStyle/>
           <a:p>
+            <a:r>
+              <a:rPr lang="en-US" dirty="0"/>
+              <a:t>Keep it Simple</a:t>
+            </a:r>
+          </a:p>
+        </p:txBody>
+      </p:sp>
+      <p:sp>
+        <p:nvSpPr>
+          <p:cNvPr id="3" name="Content Placeholder 2">
+            <a:extLst>
+              <a:ext uri="{FF2B5EF4-FFF2-40B4-BE49-F238E27FC236}">
+                <a16:creationId xmlns:a16="http://schemas.microsoft.com/office/drawing/2014/main" id="{3182D7FA-4DEE-93DD-A7B3-F431B32DF42F}"/>
+              </a:ext>
+            </a:extLst>
+          </p:cNvPr>
+          <p:cNvSpPr>
+            <a:spLocks noGrp="1"/>
+          </p:cNvSpPr>
+          <p:nvPr>
+            <p:ph idx="1"/>
+          </p:nvPr>
+        </p:nvSpPr>
+        <p:spPr/>
+        <p:txBody>
+          <a:bodyPr/>
+          <a:lstStyle/>
+          <a:p>
             <a:pPr lvl="0"/>
             <a:r>
               <a:rPr lang="en-US" dirty="0"/>
-              <a:t>Stay Cool</a:t>
-            </a:r>
-          </a:p>
-        </p:txBody>
-      </p:sp>
-      <p:sp>
-        <p:nvSpPr>
-          <p:cNvPr id="3" name="Content Placeholder 2">
-            <a:extLst>
-              <a:ext uri="{FF2B5EF4-FFF2-40B4-BE49-F238E27FC236}">
-                <a16:creationId xmlns:a16="http://schemas.microsoft.com/office/drawing/2014/main" id="{FFD8BA3E-42B8-47D9-92FF-5437AEE51C9E}"/>
-              </a:ext>
-            </a:extLst>
-          </p:cNvPr>
-          <p:cNvSpPr>
-            <a:spLocks noGrp="1"/>
-          </p:cNvSpPr>
-          <p:nvPr>
-            <p:ph idx="1"/>
-          </p:nvPr>
-        </p:nvSpPr>
-        <p:spPr/>
-        <p:txBody>
-          <a:bodyPr/>
-          <a:lstStyle/>
+              <a:t>Narrow scope changes</a:t>
+            </a:r>
+          </a:p>
           <a:p>
             <a:pPr lvl="0"/>
             <a:r>
               <a:rPr lang="en-US" dirty="0"/>
-              <a:t>Respond graciously</a:t>
+              <a:t>Separate functional and non-functional changes</a:t>
             </a:r>
           </a:p>
           <a:p>
             <a:pPr lvl="0"/>
             <a:r>
               <a:rPr lang="en-US" dirty="0"/>
-              <a:t>Be patient when reviewer is mistaken</a:t>
+              <a:t>Break up large change sets</a:t>
             </a:r>
           </a:p>
         </p:txBody>
@@ -10966,7 +11162,7 @@
     </p:spTree>
     <p:extLst>
       <p:ext uri="{BB962C8B-B14F-4D97-AF65-F5344CB8AC3E}">
-        <p14:creationId xmlns:p14="http://schemas.microsoft.com/office/powerpoint/2010/main" val="502853573"/>
+        <p14:creationId xmlns:p14="http://schemas.microsoft.com/office/powerpoint/2010/main" val="1020306639"/>
       </p:ext>
     </p:extLst>
   </p:cSld>
@@ -11096,7 +11292,7 @@
           <p:cNvPr id="2" name="Title 1">
             <a:extLst>
               <a:ext uri="{FF2B5EF4-FFF2-40B4-BE49-F238E27FC236}">
-                <a16:creationId xmlns:a16="http://schemas.microsoft.com/office/drawing/2014/main" id="{2DB38190-4088-2EAF-AB63-6A6308369618}"/>
+                <a16:creationId xmlns:a16="http://schemas.microsoft.com/office/drawing/2014/main" id="{77133BF5-62E6-4381-AAD5-4D276411C0FE}"/>
               </a:ext>
             </a:extLst>
           </p:cNvPr>
@@ -11112,9 +11308,10 @@
           <a:bodyPr/>
           <a:lstStyle/>
           <a:p>
-            <a:r>
-              <a:rPr lang="en-US" dirty="0"/>
-              <a:t>Respond Quickly</a:t>
+            <a:pPr lvl="0"/>
+            <a:r>
+              <a:rPr lang="en-US" dirty="0"/>
+              <a:t>Stay Cool</a:t>
             </a:r>
           </a:p>
         </p:txBody>
@@ -11124,7 +11321,7 @@
           <p:cNvPr id="3" name="Content Placeholder 2">
             <a:extLst>
               <a:ext uri="{FF2B5EF4-FFF2-40B4-BE49-F238E27FC236}">
-                <a16:creationId xmlns:a16="http://schemas.microsoft.com/office/drawing/2014/main" id="{1E6A3824-4E76-1B2D-AC84-9F005F5B1A66}"/>
+                <a16:creationId xmlns:a16="http://schemas.microsoft.com/office/drawing/2014/main" id="{FFD8BA3E-42B8-47D9-92FF-5437AEE51C9E}"/>
               </a:ext>
             </a:extLst>
           </p:cNvPr>
@@ -11141,14 +11338,24 @@
           <a:lstStyle/>
           <a:p>
             <a:pPr lvl="0"/>
-            <a:endParaRPr lang="en-US" dirty="0"/>
+            <a:r>
+              <a:rPr lang="en-US" dirty="0"/>
+              <a:t>Respond graciously</a:t>
+            </a:r>
+          </a:p>
+          <a:p>
+            <a:pPr lvl="0"/>
+            <a:r>
+              <a:rPr lang="en-US" dirty="0"/>
+              <a:t>Be patient when reviewer is mistaken</a:t>
+            </a:r>
           </a:p>
         </p:txBody>
       </p:sp>
     </p:spTree>
     <p:extLst>
       <p:ext uri="{BB962C8B-B14F-4D97-AF65-F5344CB8AC3E}">
-        <p14:creationId xmlns:p14="http://schemas.microsoft.com/office/powerpoint/2010/main" val="4063495638"/>
+        <p14:creationId xmlns:p14="http://schemas.microsoft.com/office/powerpoint/2010/main" val="502853573"/>
       </p:ext>
     </p:extLst>
   </p:cSld>
@@ -11180,7 +11387,7 @@
           <p:cNvPr id="2" name="Title 1">
             <a:extLst>
               <a:ext uri="{FF2B5EF4-FFF2-40B4-BE49-F238E27FC236}">
-                <a16:creationId xmlns:a16="http://schemas.microsoft.com/office/drawing/2014/main" id="{AFECA953-EA38-47CF-B589-C24DB3218239}"/>
+                <a16:creationId xmlns:a16="http://schemas.microsoft.com/office/drawing/2014/main" id="{2DB38190-4088-2EAF-AB63-6A6308369618}"/>
               </a:ext>
             </a:extLst>
           </p:cNvPr>
@@ -11196,43 +11403,43 @@
           <a:bodyPr/>
           <a:lstStyle/>
           <a:p>
+            <a:r>
+              <a:rPr lang="en-US" dirty="0"/>
+              <a:t>Respond Quickly</a:t>
+            </a:r>
+          </a:p>
+        </p:txBody>
+      </p:sp>
+      <p:sp>
+        <p:nvSpPr>
+          <p:cNvPr id="3" name="Content Placeholder 2">
+            <a:extLst>
+              <a:ext uri="{FF2B5EF4-FFF2-40B4-BE49-F238E27FC236}">
+                <a16:creationId xmlns:a16="http://schemas.microsoft.com/office/drawing/2014/main" id="{1E6A3824-4E76-1B2D-AC84-9F005F5B1A66}"/>
+              </a:ext>
+            </a:extLst>
+          </p:cNvPr>
+          <p:cNvSpPr>
+            <a:spLocks noGrp="1"/>
+          </p:cNvSpPr>
+          <p:nvPr>
+            <p:ph idx="1"/>
+          </p:nvPr>
+        </p:nvSpPr>
+        <p:spPr/>
+        <p:txBody>
+          <a:bodyPr/>
+          <a:lstStyle/>
+          <a:p>
             <a:pPr lvl="0"/>
-            <a:r>
-              <a:rPr lang="en-US" dirty="0"/>
-              <a:t>Award ties to your reviewer</a:t>
-            </a:r>
-          </a:p>
-        </p:txBody>
-      </p:sp>
-      <p:sp>
-        <p:nvSpPr>
-          <p:cNvPr id="3" name="Content Placeholder 2">
-            <a:extLst>
-              <a:ext uri="{FF2B5EF4-FFF2-40B4-BE49-F238E27FC236}">
-                <a16:creationId xmlns:a16="http://schemas.microsoft.com/office/drawing/2014/main" id="{9804FA7E-20D6-4595-9AFC-39ACA010A08F}"/>
-              </a:ext>
-            </a:extLst>
-          </p:cNvPr>
-          <p:cNvSpPr>
-            <a:spLocks noGrp="1"/>
-          </p:cNvSpPr>
-          <p:nvPr>
-            <p:ph idx="1"/>
-          </p:nvPr>
-        </p:nvSpPr>
-        <p:spPr/>
-        <p:txBody>
-          <a:bodyPr/>
-          <a:lstStyle/>
-          <a:p>
-            <a:endParaRPr lang="en-US"/>
+            <a:endParaRPr lang="en-US" dirty="0"/>
           </a:p>
         </p:txBody>
       </p:sp>
     </p:spTree>
     <p:extLst>
       <p:ext uri="{BB962C8B-B14F-4D97-AF65-F5344CB8AC3E}">
-        <p14:creationId xmlns:p14="http://schemas.microsoft.com/office/powerpoint/2010/main" val="660866794"/>
+        <p14:creationId xmlns:p14="http://schemas.microsoft.com/office/powerpoint/2010/main" val="4063495638"/>
       </p:ext>
     </p:extLst>
   </p:cSld>
@@ -11264,7 +11471,7 @@
           <p:cNvPr id="2" name="Title 1">
             <a:extLst>
               <a:ext uri="{FF2B5EF4-FFF2-40B4-BE49-F238E27FC236}">
-                <a16:creationId xmlns:a16="http://schemas.microsoft.com/office/drawing/2014/main" id="{77E78699-ECC4-FB9B-2E4D-DCB0F2DC3353}"/>
+                <a16:creationId xmlns:a16="http://schemas.microsoft.com/office/drawing/2014/main" id="{AFECA953-EA38-47CF-B589-C24DB3218239}"/>
               </a:ext>
             </a:extLst>
           </p:cNvPr>
@@ -11280,9 +11487,10 @@
           <a:bodyPr/>
           <a:lstStyle/>
           <a:p>
-            <a:r>
-              <a:rPr lang="en-US" dirty="0"/>
-              <a:t>Best Practices for Code Author</a:t>
+            <a:pPr lvl="0"/>
+            <a:r>
+              <a:rPr lang="en-US" dirty="0"/>
+              <a:t>Award ties to your reviewer</a:t>
             </a:r>
           </a:p>
         </p:txBody>
@@ -11292,7 +11500,7 @@
           <p:cNvPr id="3" name="Content Placeholder 2">
             <a:extLst>
               <a:ext uri="{FF2B5EF4-FFF2-40B4-BE49-F238E27FC236}">
-                <a16:creationId xmlns:a16="http://schemas.microsoft.com/office/drawing/2014/main" id="{DD7EC6D3-8CBF-E3A3-EAEA-FAD9515DF7E6}"/>
+                <a16:creationId xmlns:a16="http://schemas.microsoft.com/office/drawing/2014/main" id="{9804FA7E-20D6-4595-9AFC-39ACA010A08F}"/>
               </a:ext>
             </a:extLst>
           </p:cNvPr>
@@ -11308,41 +11516,14 @@
           <a:bodyPr/>
           <a:lstStyle/>
           <a:p>
-            <a:r>
-              <a:rPr lang="en-US" dirty="0"/>
-              <a:t>Review First</a:t>
-            </a:r>
-          </a:p>
-          <a:p>
-            <a:r>
-              <a:rPr lang="en-US" dirty="0"/>
-              <a:t>Small change sets</a:t>
-            </a:r>
-          </a:p>
-          <a:p>
-            <a:r>
-              <a:rPr lang="en-US" dirty="0"/>
-              <a:t>Readable Code</a:t>
-            </a:r>
-          </a:p>
-          <a:p>
-            <a:r>
-              <a:rPr lang="en-US" dirty="0"/>
-              <a:t>Clear Communication</a:t>
-            </a:r>
-          </a:p>
-          <a:p>
-            <a:r>
-              <a:rPr lang="en-US" dirty="0"/>
-              <a:t>Do Not Take It Personally</a:t>
-            </a:r>
+            <a:endParaRPr lang="en-US"/>
           </a:p>
         </p:txBody>
       </p:sp>
     </p:spTree>
     <p:extLst>
       <p:ext uri="{BB962C8B-B14F-4D97-AF65-F5344CB8AC3E}">
-        <p14:creationId xmlns:p14="http://schemas.microsoft.com/office/powerpoint/2010/main" val="1835386389"/>
+        <p14:creationId xmlns:p14="http://schemas.microsoft.com/office/powerpoint/2010/main" val="660866794"/>
       </p:ext>
     </p:extLst>
   </p:cSld>
@@ -11374,7 +11555,7 @@
           <p:cNvPr id="2" name="Title 1">
             <a:extLst>
               <a:ext uri="{FF2B5EF4-FFF2-40B4-BE49-F238E27FC236}">
-                <a16:creationId xmlns:a16="http://schemas.microsoft.com/office/drawing/2014/main" id="{64C74969-14BF-E23B-0378-D3C115411FDD}"/>
+                <a16:creationId xmlns:a16="http://schemas.microsoft.com/office/drawing/2014/main" id="{77E78699-ECC4-FB9B-2E4D-DCB0F2DC3353}"/>
               </a:ext>
             </a:extLst>
           </p:cNvPr>
@@ -11392,7 +11573,7 @@
           <a:p>
             <a:r>
               <a:rPr lang="en-US" dirty="0"/>
-              <a:t>Best Practices Common to Author and Reviewer</a:t>
+              <a:t>Best Practices for Code Author</a:t>
             </a:r>
           </a:p>
         </p:txBody>
@@ -11402,7 +11583,7 @@
           <p:cNvPr id="3" name="Content Placeholder 2">
             <a:extLst>
               <a:ext uri="{FF2B5EF4-FFF2-40B4-BE49-F238E27FC236}">
-                <a16:creationId xmlns:a16="http://schemas.microsoft.com/office/drawing/2014/main" id="{53CCF844-EC74-58A6-F908-14572160C533}"/>
+                <a16:creationId xmlns:a16="http://schemas.microsoft.com/office/drawing/2014/main" id="{DD7EC6D3-8CBF-E3A3-EAEA-FAD9515DF7E6}"/>
               </a:ext>
             </a:extLst>
           </p:cNvPr>
@@ -11420,30 +11601,39 @@
           <a:p>
             <a:r>
               <a:rPr lang="en-US" dirty="0"/>
-              <a:t>Keep review time short</a:t>
-            </a:r>
-          </a:p>
-          <a:p>
-            <a:r>
-              <a:rPr lang="en-US" dirty="0"/>
-              <a:t>Maintain respectful communication</a:t>
-            </a:r>
-          </a:p>
-          <a:p>
-            <a:r>
-              <a:rPr lang="en-US" dirty="0"/>
-              <a:t>Never make it personal</a:t>
-            </a:r>
-          </a:p>
-          <a:p>
-            <a:endParaRPr lang="en-US" dirty="0"/>
+              <a:t>Review First</a:t>
+            </a:r>
+          </a:p>
+          <a:p>
+            <a:r>
+              <a:rPr lang="en-US" dirty="0"/>
+              <a:t>Small change sets</a:t>
+            </a:r>
+          </a:p>
+          <a:p>
+            <a:r>
+              <a:rPr lang="en-US" dirty="0"/>
+              <a:t>Readable Code</a:t>
+            </a:r>
+          </a:p>
+          <a:p>
+            <a:r>
+              <a:rPr lang="en-US" dirty="0"/>
+              <a:t>Clear Communication</a:t>
+            </a:r>
+          </a:p>
+          <a:p>
+            <a:r>
+              <a:rPr lang="en-US" dirty="0"/>
+              <a:t>Do Not Take It Personally</a:t>
+            </a:r>
           </a:p>
         </p:txBody>
       </p:sp>
     </p:spTree>
     <p:extLst>
       <p:ext uri="{BB962C8B-B14F-4D97-AF65-F5344CB8AC3E}">
-        <p14:creationId xmlns:p14="http://schemas.microsoft.com/office/powerpoint/2010/main" val="2141707603"/>
+        <p14:creationId xmlns:p14="http://schemas.microsoft.com/office/powerpoint/2010/main" val="1835386389"/>
       </p:ext>
     </p:extLst>
   </p:cSld>
@@ -11475,7 +11665,7 @@
           <p:cNvPr id="2" name="Title 1">
             <a:extLst>
               <a:ext uri="{FF2B5EF4-FFF2-40B4-BE49-F238E27FC236}">
-                <a16:creationId xmlns:a16="http://schemas.microsoft.com/office/drawing/2014/main" id="{73125B13-522D-C8C0-4132-26103B18FC5A}"/>
+                <a16:creationId xmlns:a16="http://schemas.microsoft.com/office/drawing/2014/main" id="{64C74969-14BF-E23B-0378-D3C115411FDD}"/>
               </a:ext>
             </a:extLst>
           </p:cNvPr>
@@ -11493,7 +11683,7 @@
           <a:p>
             <a:r>
               <a:rPr lang="en-US" dirty="0"/>
-              <a:t>For Managers</a:t>
+              <a:t>Best Practices Common to Author and Reviewer</a:t>
             </a:r>
           </a:p>
         </p:txBody>
@@ -11503,7 +11693,7 @@
           <p:cNvPr id="3" name="Content Placeholder 2">
             <a:extLst>
               <a:ext uri="{FF2B5EF4-FFF2-40B4-BE49-F238E27FC236}">
-                <a16:creationId xmlns:a16="http://schemas.microsoft.com/office/drawing/2014/main" id="{CBD7B767-AF2A-E842-237F-A1D946AF88B8}"/>
+                <a16:creationId xmlns:a16="http://schemas.microsoft.com/office/drawing/2014/main" id="{53CCF844-EC74-58A6-F908-14572160C533}"/>
               </a:ext>
             </a:extLst>
           </p:cNvPr>
@@ -11521,33 +11711,30 @@
           <a:p>
             <a:r>
               <a:rPr lang="en-US" dirty="0"/>
-              <a:t>Rotate who reviews whose code</a:t>
-            </a:r>
-          </a:p>
-          <a:p>
-            <a:r>
-              <a:rPr lang="en-US" dirty="0"/>
-              <a:t>Make sure each engineer is authoring and reviewing</a:t>
-            </a:r>
-          </a:p>
-          <a:p>
-            <a:r>
-              <a:rPr lang="en-US" dirty="0"/>
-              <a:t>Set policies to require code approval before a PR merge</a:t>
-            </a:r>
-          </a:p>
-          <a:p>
-            <a:r>
-              <a:rPr lang="en-US" dirty="0"/>
-              <a:t>Foster a culture of teamwork</a:t>
-            </a:r>
+              <a:t>Keep review time short</a:t>
+            </a:r>
+          </a:p>
+          <a:p>
+            <a:r>
+              <a:rPr lang="en-US" dirty="0"/>
+              <a:t>Maintain respectful communication</a:t>
+            </a:r>
+          </a:p>
+          <a:p>
+            <a:r>
+              <a:rPr lang="en-US" dirty="0"/>
+              <a:t>Never make it personal</a:t>
+            </a:r>
+          </a:p>
+          <a:p>
+            <a:endParaRPr lang="en-US" dirty="0"/>
           </a:p>
         </p:txBody>
       </p:sp>
     </p:spTree>
     <p:extLst>
       <p:ext uri="{BB962C8B-B14F-4D97-AF65-F5344CB8AC3E}">
-        <p14:creationId xmlns:p14="http://schemas.microsoft.com/office/powerpoint/2010/main" val="1686258816"/>
+        <p14:creationId xmlns:p14="http://schemas.microsoft.com/office/powerpoint/2010/main" val="2141707603"/>
       </p:ext>
     </p:extLst>
   </p:cSld>
@@ -11579,6 +11766,110 @@
           <p:cNvPr id="2" name="Title 1">
             <a:extLst>
               <a:ext uri="{FF2B5EF4-FFF2-40B4-BE49-F238E27FC236}">
+                <a16:creationId xmlns:a16="http://schemas.microsoft.com/office/drawing/2014/main" id="{73125B13-522D-C8C0-4132-26103B18FC5A}"/>
+              </a:ext>
+            </a:extLst>
+          </p:cNvPr>
+          <p:cNvSpPr>
+            <a:spLocks noGrp="1"/>
+          </p:cNvSpPr>
+          <p:nvPr>
+            <p:ph type="title"/>
+          </p:nvPr>
+        </p:nvSpPr>
+        <p:spPr/>
+        <p:txBody>
+          <a:bodyPr/>
+          <a:lstStyle/>
+          <a:p>
+            <a:r>
+              <a:rPr lang="en-US" dirty="0"/>
+              <a:t>For Managers</a:t>
+            </a:r>
+          </a:p>
+        </p:txBody>
+      </p:sp>
+      <p:sp>
+        <p:nvSpPr>
+          <p:cNvPr id="3" name="Content Placeholder 2">
+            <a:extLst>
+              <a:ext uri="{FF2B5EF4-FFF2-40B4-BE49-F238E27FC236}">
+                <a16:creationId xmlns:a16="http://schemas.microsoft.com/office/drawing/2014/main" id="{CBD7B767-AF2A-E842-237F-A1D946AF88B8}"/>
+              </a:ext>
+            </a:extLst>
+          </p:cNvPr>
+          <p:cNvSpPr>
+            <a:spLocks noGrp="1"/>
+          </p:cNvSpPr>
+          <p:nvPr>
+            <p:ph idx="1"/>
+          </p:nvPr>
+        </p:nvSpPr>
+        <p:spPr/>
+        <p:txBody>
+          <a:bodyPr/>
+          <a:lstStyle/>
+          <a:p>
+            <a:r>
+              <a:rPr lang="en-US" dirty="0"/>
+              <a:t>Rotate who reviews whose code</a:t>
+            </a:r>
+          </a:p>
+          <a:p>
+            <a:r>
+              <a:rPr lang="en-US" dirty="0"/>
+              <a:t>Make sure each engineer is authoring and reviewing</a:t>
+            </a:r>
+          </a:p>
+          <a:p>
+            <a:r>
+              <a:rPr lang="en-US" dirty="0"/>
+              <a:t>Set policies to require code approval before a PR merge</a:t>
+            </a:r>
+          </a:p>
+          <a:p>
+            <a:r>
+              <a:rPr lang="en-US" dirty="0"/>
+              <a:t>Foster a culture of teamwork</a:t>
+            </a:r>
+          </a:p>
+        </p:txBody>
+      </p:sp>
+    </p:spTree>
+    <p:extLst>
+      <p:ext uri="{BB962C8B-B14F-4D97-AF65-F5344CB8AC3E}">
+        <p14:creationId xmlns:p14="http://schemas.microsoft.com/office/powerpoint/2010/main" val="1686258816"/>
+      </p:ext>
+    </p:extLst>
+  </p:cSld>
+  <p:clrMapOvr>
+    <a:masterClrMapping/>
+  </p:clrMapOvr>
+</p:sld>
+</file>
+
+<file path=ppt/slides/slide46.xml><?xml version="1.0" encoding="utf-8"?>
+<p:sld xmlns:a="http://schemas.openxmlformats.org/drawingml/2006/main" xmlns:r="http://schemas.openxmlformats.org/officeDocument/2006/relationships" xmlns:p="http://schemas.openxmlformats.org/presentationml/2006/main">
+  <p:cSld>
+    <p:spTree>
+      <p:nvGrpSpPr>
+        <p:cNvPr id="1" name=""/>
+        <p:cNvGrpSpPr/>
+        <p:nvPr/>
+      </p:nvGrpSpPr>
+      <p:grpSpPr>
+        <a:xfrm>
+          <a:off x="0" y="0"/>
+          <a:ext cx="0" cy="0"/>
+          <a:chOff x="0" y="0"/>
+          <a:chExt cx="0" cy="0"/>
+        </a:xfrm>
+      </p:grpSpPr>
+      <p:sp>
+        <p:nvSpPr>
+          <p:cNvPr id="2" name="Title 1">
+            <a:extLst>
+              <a:ext uri="{FF2B5EF4-FFF2-40B4-BE49-F238E27FC236}">
                 <a16:creationId xmlns:a16="http://schemas.microsoft.com/office/drawing/2014/main" id="{7A9BBECF-D27F-4A95-82D2-35584A0A31A4}"/>
               </a:ext>
             </a:extLst>
@@ -11948,7 +12239,7 @@
 </p:sld>
 </file>
 
-<file path=ppt/slides/slide46.xml><?xml version="1.0" encoding="utf-8"?>
+<file path=ppt/slides/slide47.xml><?xml version="1.0" encoding="utf-8"?>
 <p:sld xmlns:a="http://schemas.openxmlformats.org/drawingml/2006/main" xmlns:r="http://schemas.openxmlformats.org/officeDocument/2006/relationships" xmlns:p="http://schemas.openxmlformats.org/presentationml/2006/main">
   <p:cSld>
     <p:spTree>
@@ -12044,7 +12335,7 @@
 </p:sld>
 </file>
 
-<file path=ppt/slides/slide47.xml><?xml version="1.0" encoding="utf-8"?>
+<file path=ppt/slides/slide48.xml><?xml version="1.0" encoding="utf-8"?>
 <p:sld xmlns:a="http://schemas.openxmlformats.org/drawingml/2006/main" xmlns:r="http://schemas.openxmlformats.org/officeDocument/2006/relationships" xmlns:p="http://schemas.openxmlformats.org/presentationml/2006/main" show="0">
   <p:cSld>
     <p:spTree>
@@ -12196,7 +12487,7 @@
 </p:sld>
 </file>
 
-<file path=ppt/slides/slide48.xml><?xml version="1.0" encoding="utf-8"?>
+<file path=ppt/slides/slide49.xml><?xml version="1.0" encoding="utf-8"?>
 <p:sld xmlns:a="http://schemas.openxmlformats.org/drawingml/2006/main" xmlns:r="http://schemas.openxmlformats.org/officeDocument/2006/relationships" xmlns:p="http://schemas.openxmlformats.org/presentationml/2006/main">
   <p:cSld>
     <p:spTree>

</xml_diff>

<commit_message>
Rearrange Code Review slides
</commit_message>
<xml_diff>
--- a/Blood-Sweat-and-Code-Reviews/Code Reviews.pptx
+++ b/Blood-Sweat-and-Code-Reviews/Code Reviews.pptx
@@ -5,7 +5,7 @@
     <p:sldMasterId id="2147483648" r:id="rId1"/>
   </p:sldMasterIdLst>
   <p:notesMasterIdLst>
-    <p:notesMasterId r:id="rId51"/>
+    <p:notesMasterId r:id="rId52"/>
   </p:notesMasterIdLst>
   <p:sldIdLst>
     <p:sldId id="256" r:id="rId2"/>
@@ -54,9 +54,10 @@
     <p:sldId id="321" r:id="rId45"/>
     <p:sldId id="322" r:id="rId46"/>
     <p:sldId id="257" r:id="rId47"/>
-    <p:sldId id="267" r:id="rId48"/>
-    <p:sldId id="266" r:id="rId49"/>
-    <p:sldId id="302" r:id="rId50"/>
+    <p:sldId id="326" r:id="rId48"/>
+    <p:sldId id="267" r:id="rId49"/>
+    <p:sldId id="266" r:id="rId50"/>
+    <p:sldId id="302" r:id="rId51"/>
   </p:sldIdLst>
   <p:sldSz cx="12192000" cy="6858000"/>
   <p:notesSz cx="6858000" cy="9144000"/>
@@ -210,6 +211,7 @@
             <p14:sldId id="321"/>
             <p14:sldId id="322"/>
             <p14:sldId id="257"/>
+            <p14:sldId id="326"/>
             <p14:sldId id="267"/>
             <p14:sldId id="266"/>
             <p14:sldId id="302"/>
@@ -8511,242 +8513,20 @@
             <p:ph type="title"/>
           </p:nvPr>
         </p:nvSpPr>
-        <p:spPr/>
-        <p:txBody>
-          <a:bodyPr/>
-          <a:lstStyle/>
-          <a:p>
-            <a:r>
-              <a:rPr lang="en-US" dirty="0"/>
-              <a:t>David Giard</a:t>
-            </a:r>
-          </a:p>
-        </p:txBody>
-      </p:sp>
-      <p:sp>
-        <p:nvSpPr>
-          <p:cNvPr id="3" name="Content Placeholder 2">
-            <a:extLst>
-              <a:ext uri="{FF2B5EF4-FFF2-40B4-BE49-F238E27FC236}">
-                <a16:creationId xmlns:a16="http://schemas.microsoft.com/office/drawing/2014/main" id="{6F6CE5B4-E9EC-4BE1-A733-F8761F407C69}"/>
-              </a:ext>
-            </a:extLst>
-          </p:cNvPr>
-          <p:cNvSpPr>
-            <a:spLocks noGrp="1"/>
-          </p:cNvSpPr>
-          <p:nvPr>
-            <p:ph idx="1"/>
-          </p:nvPr>
-        </p:nvSpPr>
         <p:spPr>
           <a:xfrm>
-            <a:off x="69133" y="1176862"/>
-            <a:ext cx="5471768" cy="5672048"/>
+            <a:off x="838200" y="365125"/>
+            <a:ext cx="9751541" cy="1325563"/>
           </a:xfrm>
         </p:spPr>
         <p:txBody>
-          <a:bodyPr>
-            <a:noAutofit/>
-          </a:bodyPr>
-          <a:lstStyle/>
-          <a:p>
-            <a:pPr marL="0" indent="0">
-              <a:lnSpc>
-                <a:spcPct val="120000"/>
-              </a:lnSpc>
-              <a:buNone/>
-            </a:pPr>
-            <a:r>
-              <a:rPr lang="en-US" sz="1400" dirty="0"/>
-              <a:t>{</a:t>
-            </a:r>
-            <a:br>
-              <a:rPr lang="en-US" sz="1400" dirty="0"/>
-            </a:br>
-            <a:r>
-              <a:rPr lang="en-US" sz="1400" dirty="0"/>
-              <a:t>    "name": "David Giard",</a:t>
-            </a:r>
-            <a:br>
-              <a:rPr lang="en-US" sz="1400" dirty="0"/>
-            </a:br>
-            <a:r>
-              <a:rPr lang="en-US" sz="1400" dirty="0"/>
-              <a:t>    "title": “Cloud Solution Architect",</a:t>
-            </a:r>
-            <a:br>
-              <a:rPr lang="en-US" sz="1400" dirty="0"/>
-            </a:br>
-            <a:r>
-              <a:rPr lang="en-US" sz="1400" dirty="0"/>
-              <a:t>    "employer": "Microsoft",</a:t>
-            </a:r>
-            <a:br>
-              <a:rPr lang="en-US" sz="1400" dirty="0"/>
-            </a:br>
-            <a:r>
-              <a:rPr lang="en-US" sz="1400" dirty="0"/>
-              <a:t>    "email": "dgiard@microsoft.com",</a:t>
-            </a:r>
-            <a:br>
-              <a:rPr lang="en-US" sz="1400" dirty="0"/>
-            </a:br>
-            <a:r>
-              <a:rPr lang="en-US" sz="1400" dirty="0"/>
-              <a:t>    "twitter": "@</a:t>
-            </a:r>
-            <a:r>
-              <a:rPr lang="en-US" sz="1400" dirty="0" err="1"/>
-              <a:t>DavidGiard</a:t>
-            </a:r>
-            <a:r>
-              <a:rPr lang="en-US" sz="1400" dirty="0"/>
-              <a:t>",</a:t>
-            </a:r>
-            <a:br>
-              <a:rPr lang="en-US" sz="1400" dirty="0"/>
-            </a:br>
-            <a:r>
-              <a:rPr lang="en-US" sz="1400" dirty="0"/>
-              <a:t>    "blog": "davidgiard.com",</a:t>
-            </a:r>
-            <a:br>
-              <a:rPr lang="en-US" sz="1400" dirty="0"/>
-            </a:br>
-            <a:r>
-              <a:rPr lang="en-US" sz="1400" dirty="0"/>
-              <a:t>    "TV": [</a:t>
-            </a:r>
-            <a:br>
-              <a:rPr lang="en-US" sz="1400" dirty="0"/>
-            </a:br>
-            <a:r>
-              <a:rPr lang="en-US" sz="1400" dirty="0"/>
-              <a:t>        {</a:t>
-            </a:r>
-            <a:br>
-              <a:rPr lang="en-US" sz="1400" dirty="0"/>
-            </a:br>
-            <a:r>
-              <a:rPr lang="en-US" sz="1400" dirty="0"/>
-              <a:t>            "title": "Technology and Friends",</a:t>
-            </a:r>
-            <a:br>
-              <a:rPr lang="en-US" sz="1400" dirty="0"/>
-            </a:br>
-            <a:r>
-              <a:rPr lang="en-US" sz="1400" dirty="0"/>
-              <a:t>            "description": </a:t>
-            </a:r>
-            <a:br>
-              <a:rPr lang="en-US" sz="1400" dirty="0"/>
-            </a:br>
-            <a:r>
-              <a:rPr lang="en-US" sz="1400" dirty="0"/>
-              <a:t>	"Talking with smart people about technology",</a:t>
-            </a:r>
-            <a:br>
-              <a:rPr lang="en-US" sz="1400" dirty="0"/>
-            </a:br>
-            <a:r>
-              <a:rPr lang="en-US" sz="1400" dirty="0"/>
-              <a:t>            "</a:t>
-            </a:r>
-            <a:r>
-              <a:rPr lang="en-US" sz="1400" dirty="0" err="1"/>
-              <a:t>url</a:t>
-            </a:r>
-            <a:r>
-              <a:rPr lang="en-US" sz="1400" dirty="0"/>
-              <a:t>": "http://technologyandfriends.com"</a:t>
-            </a:r>
-            <a:br>
-              <a:rPr lang="en-US" sz="1400" dirty="0"/>
-            </a:br>
-            <a:r>
-              <a:rPr lang="en-US" sz="1400" dirty="0"/>
-              <a:t>        },</a:t>
-            </a:r>
-            <a:br>
-              <a:rPr lang="en-US" sz="1400" dirty="0"/>
-            </a:br>
-            <a:r>
-              <a:rPr lang="en-US" sz="1400" dirty="0"/>
-              <a:t>        {</a:t>
-            </a:r>
-            <a:br>
-              <a:rPr lang="en-US" sz="1400" dirty="0"/>
-            </a:br>
-            <a:r>
-              <a:rPr lang="en-US" sz="1400" dirty="0"/>
-              <a:t>            "title": "</a:t>
-            </a:r>
-            <a:r>
-              <a:rPr lang="en-US" sz="1400" dirty="0" err="1"/>
-              <a:t>GCast</a:t>
-            </a:r>
-            <a:r>
-              <a:rPr lang="en-US" sz="1400" dirty="0"/>
-              <a:t>",</a:t>
-            </a:r>
-            <a:br>
-              <a:rPr lang="en-US" sz="1400" dirty="0"/>
-            </a:br>
-            <a:r>
-              <a:rPr lang="en-US" sz="1400" dirty="0"/>
-              <a:t>            "description": </a:t>
-            </a:r>
-            <a:br>
-              <a:rPr lang="en-US" sz="1400" dirty="0"/>
-            </a:br>
-            <a:r>
-              <a:rPr lang="en-US" sz="1400" dirty="0"/>
-              <a:t>	"Screencast demos showing how to do tech stuff",</a:t>
-            </a:r>
-            <a:br>
-              <a:rPr lang="en-US" sz="1400" dirty="0"/>
-            </a:br>
-            <a:r>
-              <a:rPr lang="en-US" sz="1400" dirty="0"/>
-              <a:t>            "</a:t>
-            </a:r>
-            <a:r>
-              <a:rPr lang="en-US" sz="1400" dirty="0" err="1"/>
-              <a:t>url</a:t>
-            </a:r>
-            <a:r>
-              <a:rPr lang="en-US" sz="1400" dirty="0"/>
-              <a:t>": "https://aka.ms/</a:t>
-            </a:r>
-            <a:r>
-              <a:rPr lang="en-US" sz="1400" dirty="0" err="1"/>
-              <a:t>gcast</a:t>
-            </a:r>
-            <a:r>
-              <a:rPr lang="en-US" sz="1400" dirty="0"/>
-              <a:t>"</a:t>
-            </a:r>
-            <a:br>
-              <a:rPr lang="en-US" sz="1400" dirty="0"/>
-            </a:br>
-            <a:r>
-              <a:rPr lang="en-US" sz="1400" dirty="0"/>
-              <a:t>        }</a:t>
-            </a:r>
-            <a:br>
-              <a:rPr lang="en-US" sz="1400" dirty="0"/>
-            </a:br>
-            <a:r>
-              <a:rPr lang="en-US" sz="1400" dirty="0"/>
-              <a:t>    ]</a:t>
-            </a:r>
-            <a:br>
-              <a:rPr lang="en-US" sz="1400" dirty="0"/>
-            </a:br>
-            <a:r>
-              <a:rPr lang="en-US" sz="1400" dirty="0"/>
-              <a:t>}</a:t>
+          <a:bodyPr/>
+          <a:lstStyle/>
+          <a:p>
+            <a:pPr algn="r"/>
+            <a:r>
+              <a:rPr lang="en-US" dirty="0"/>
+              <a:t>David Giard</a:t>
             </a:r>
           </a:p>
         </p:txBody>
@@ -8778,7 +8558,7 @@
         </p:blipFill>
         <p:spPr>
           <a:xfrm>
-            <a:off x="5540901" y="0"/>
+            <a:off x="0" y="0"/>
             <a:ext cx="6651099" cy="6858000"/>
           </a:xfrm>
           <a:prstGeom prst="rect">
@@ -11987,7 +11767,7 @@
               </a:spcBef>
             </a:pPr>
             <a:r>
-              <a:rPr lang="en-US" sz="2000">
+              <a:rPr lang="en-US" sz="2000" dirty="0">
                 <a:effectLst/>
                 <a:latin typeface="Calibri" panose="020F0502020204030204" pitchFamily="34" charset="0"/>
                 <a:hlinkClick r:id="rId3"/>
@@ -11995,7 +11775,7 @@
               <a:t>davidgiard.com/code-review-articles</a:t>
             </a:r>
             <a:r>
-              <a:rPr lang="en-US" sz="2000">
+              <a:rPr lang="en-US" sz="2000" dirty="0">
                 <a:effectLst/>
                 <a:latin typeface="Calibri" panose="020F0502020204030204" pitchFamily="34" charset="0"/>
               </a:rPr>
@@ -12009,16 +11789,10 @@
               </a:spcBef>
             </a:pPr>
             <a:r>
-              <a:rPr lang="en-US" sz="2400">
-                <a:latin typeface="Calibri" panose="020F0502020204030204" pitchFamily="34" charset="0"/>
-              </a:rPr>
-              <a:t>How </a:t>
-            </a:r>
-            <a:r>
               <a:rPr lang="en-US" sz="2400" dirty="0">
                 <a:latin typeface="Calibri" panose="020F0502020204030204" pitchFamily="34" charset="0"/>
               </a:rPr>
-              <a:t>to Do Code Reviews Like a Human</a:t>
+              <a:t>How to Do Code Reviews Like a Human</a:t>
             </a:r>
           </a:p>
           <a:p>
@@ -12261,6 +12035,603 @@
           <p:cNvPr id="2" name="Title 1">
             <a:extLst>
               <a:ext uri="{FF2B5EF4-FFF2-40B4-BE49-F238E27FC236}">
+                <a16:creationId xmlns:a16="http://schemas.microsoft.com/office/drawing/2014/main" id="{50B2387B-16CF-4CE9-80AB-284A8E9456D5}"/>
+              </a:ext>
+            </a:extLst>
+          </p:cNvPr>
+          <p:cNvSpPr>
+            <a:spLocks noGrp="1"/>
+          </p:cNvSpPr>
+          <p:nvPr>
+            <p:ph type="title"/>
+          </p:nvPr>
+        </p:nvSpPr>
+        <p:spPr/>
+        <p:txBody>
+          <a:bodyPr/>
+          <a:lstStyle/>
+          <a:p>
+            <a:r>
+              <a:rPr lang="en-US" dirty="0"/>
+              <a:t>David Giard</a:t>
+            </a:r>
+          </a:p>
+        </p:txBody>
+      </p:sp>
+      <p:sp>
+        <p:nvSpPr>
+          <p:cNvPr id="3" name="Content Placeholder 2">
+            <a:extLst>
+              <a:ext uri="{FF2B5EF4-FFF2-40B4-BE49-F238E27FC236}">
+                <a16:creationId xmlns:a16="http://schemas.microsoft.com/office/drawing/2014/main" id="{6F6CE5B4-E9EC-4BE1-A733-F8761F407C69}"/>
+              </a:ext>
+            </a:extLst>
+          </p:cNvPr>
+          <p:cNvSpPr>
+            <a:spLocks noGrp="1"/>
+          </p:cNvSpPr>
+          <p:nvPr>
+            <p:ph idx="1"/>
+          </p:nvPr>
+        </p:nvSpPr>
+        <p:spPr>
+          <a:xfrm>
+            <a:off x="69133" y="1176862"/>
+            <a:ext cx="5471768" cy="5672048"/>
+          </a:xfrm>
+        </p:spPr>
+        <p:txBody>
+          <a:bodyPr>
+            <a:noAutofit/>
+          </a:bodyPr>
+          <a:lstStyle/>
+          <a:p>
+            <a:pPr marL="0" indent="0">
+              <a:lnSpc>
+                <a:spcPct val="120000"/>
+              </a:lnSpc>
+              <a:buNone/>
+            </a:pPr>
+            <a:r>
+              <a:rPr lang="en-US" sz="1400" dirty="0"/>
+              <a:t>{</a:t>
+            </a:r>
+            <a:br>
+              <a:rPr lang="en-US" sz="1400" dirty="0"/>
+            </a:br>
+            <a:r>
+              <a:rPr lang="en-US" sz="1400" dirty="0"/>
+              <a:t>    "name": "David Giard",</a:t>
+            </a:r>
+            <a:br>
+              <a:rPr lang="en-US" sz="1400" dirty="0"/>
+            </a:br>
+            <a:r>
+              <a:rPr lang="en-US" sz="1400" dirty="0"/>
+              <a:t>    "title": “Cloud Solution Architect",</a:t>
+            </a:r>
+            <a:br>
+              <a:rPr lang="en-US" sz="1400" dirty="0"/>
+            </a:br>
+            <a:r>
+              <a:rPr lang="en-US" sz="1400" dirty="0"/>
+              <a:t>    "employer": "Microsoft",</a:t>
+            </a:r>
+            <a:br>
+              <a:rPr lang="en-US" sz="1400" dirty="0"/>
+            </a:br>
+            <a:r>
+              <a:rPr lang="en-US" sz="1400" dirty="0"/>
+              <a:t>    "email": "dgiard@microsoft.com",</a:t>
+            </a:r>
+            <a:br>
+              <a:rPr lang="en-US" sz="1400" dirty="0"/>
+            </a:br>
+            <a:r>
+              <a:rPr lang="en-US" sz="1400" dirty="0"/>
+              <a:t>    "twitter": "@</a:t>
+            </a:r>
+            <a:r>
+              <a:rPr lang="en-US" sz="1400" dirty="0" err="1"/>
+              <a:t>DavidGiard</a:t>
+            </a:r>
+            <a:r>
+              <a:rPr lang="en-US" sz="1400" dirty="0"/>
+              <a:t>",</a:t>
+            </a:r>
+            <a:br>
+              <a:rPr lang="en-US" sz="1400" dirty="0"/>
+            </a:br>
+            <a:r>
+              <a:rPr lang="en-US" sz="1400" dirty="0"/>
+              <a:t>    "blog": "davidgiard.com",</a:t>
+            </a:r>
+            <a:br>
+              <a:rPr lang="en-US" sz="1400" dirty="0"/>
+            </a:br>
+            <a:r>
+              <a:rPr lang="en-US" sz="1400" dirty="0"/>
+              <a:t>    "TV": [</a:t>
+            </a:r>
+            <a:br>
+              <a:rPr lang="en-US" sz="1400" dirty="0"/>
+            </a:br>
+            <a:r>
+              <a:rPr lang="en-US" sz="1400" dirty="0"/>
+              <a:t>        {</a:t>
+            </a:r>
+            <a:br>
+              <a:rPr lang="en-US" sz="1400" dirty="0"/>
+            </a:br>
+            <a:r>
+              <a:rPr lang="en-US" sz="1400" dirty="0"/>
+              <a:t>            "title": "Technology and Friends",</a:t>
+            </a:r>
+            <a:br>
+              <a:rPr lang="en-US" sz="1400" dirty="0"/>
+            </a:br>
+            <a:r>
+              <a:rPr lang="en-US" sz="1400" dirty="0"/>
+              <a:t>            "description": </a:t>
+            </a:r>
+            <a:br>
+              <a:rPr lang="en-US" sz="1400" dirty="0"/>
+            </a:br>
+            <a:r>
+              <a:rPr lang="en-US" sz="1400" dirty="0"/>
+              <a:t>	"Talking with smart people about technology",</a:t>
+            </a:r>
+            <a:br>
+              <a:rPr lang="en-US" sz="1400" dirty="0"/>
+            </a:br>
+            <a:r>
+              <a:rPr lang="en-US" sz="1400" dirty="0"/>
+              <a:t>            "</a:t>
+            </a:r>
+            <a:r>
+              <a:rPr lang="en-US" sz="1400" dirty="0" err="1"/>
+              <a:t>url</a:t>
+            </a:r>
+            <a:r>
+              <a:rPr lang="en-US" sz="1400" dirty="0"/>
+              <a:t>": "http://technologyandfriends.com"</a:t>
+            </a:r>
+            <a:br>
+              <a:rPr lang="en-US" sz="1400" dirty="0"/>
+            </a:br>
+            <a:r>
+              <a:rPr lang="en-US" sz="1400" dirty="0"/>
+              <a:t>        },</a:t>
+            </a:r>
+            <a:br>
+              <a:rPr lang="en-US" sz="1400" dirty="0"/>
+            </a:br>
+            <a:r>
+              <a:rPr lang="en-US" sz="1400" dirty="0"/>
+              <a:t>        {</a:t>
+            </a:r>
+            <a:br>
+              <a:rPr lang="en-US" sz="1400" dirty="0"/>
+            </a:br>
+            <a:r>
+              <a:rPr lang="en-US" sz="1400" dirty="0"/>
+              <a:t>            "title": "</a:t>
+            </a:r>
+            <a:r>
+              <a:rPr lang="en-US" sz="1400" dirty="0" err="1"/>
+              <a:t>GCast</a:t>
+            </a:r>
+            <a:r>
+              <a:rPr lang="en-US" sz="1400" dirty="0"/>
+              <a:t>",</a:t>
+            </a:r>
+            <a:br>
+              <a:rPr lang="en-US" sz="1400" dirty="0"/>
+            </a:br>
+            <a:r>
+              <a:rPr lang="en-US" sz="1400" dirty="0"/>
+              <a:t>            "description": </a:t>
+            </a:r>
+            <a:br>
+              <a:rPr lang="en-US" sz="1400" dirty="0"/>
+            </a:br>
+            <a:r>
+              <a:rPr lang="en-US" sz="1400" dirty="0"/>
+              <a:t>	"Screencast demos showing how to do tech stuff",</a:t>
+            </a:r>
+            <a:br>
+              <a:rPr lang="en-US" sz="1400" dirty="0"/>
+            </a:br>
+            <a:r>
+              <a:rPr lang="en-US" sz="1400" dirty="0"/>
+              <a:t>            "</a:t>
+            </a:r>
+            <a:r>
+              <a:rPr lang="en-US" sz="1400" dirty="0" err="1"/>
+              <a:t>url</a:t>
+            </a:r>
+            <a:r>
+              <a:rPr lang="en-US" sz="1400" dirty="0"/>
+              <a:t>": "https://aka.ms/</a:t>
+            </a:r>
+            <a:r>
+              <a:rPr lang="en-US" sz="1400" dirty="0" err="1"/>
+              <a:t>gcast</a:t>
+            </a:r>
+            <a:r>
+              <a:rPr lang="en-US" sz="1400" dirty="0"/>
+              <a:t>"</a:t>
+            </a:r>
+            <a:br>
+              <a:rPr lang="en-US" sz="1400" dirty="0"/>
+            </a:br>
+            <a:r>
+              <a:rPr lang="en-US" sz="1400" dirty="0"/>
+              <a:t>        }</a:t>
+            </a:r>
+            <a:br>
+              <a:rPr lang="en-US" sz="1400" dirty="0"/>
+            </a:br>
+            <a:r>
+              <a:rPr lang="en-US" sz="1400" dirty="0"/>
+              <a:t>    ]</a:t>
+            </a:r>
+            <a:br>
+              <a:rPr lang="en-US" sz="1400" dirty="0"/>
+            </a:br>
+            <a:r>
+              <a:rPr lang="en-US" sz="1400" dirty="0"/>
+              <a:t>}</a:t>
+            </a:r>
+          </a:p>
+        </p:txBody>
+      </p:sp>
+      <p:pic>
+        <p:nvPicPr>
+          <p:cNvPr id="5" name="Picture 4" descr="David Giard at home">
+            <a:extLst>
+              <a:ext uri="{FF2B5EF4-FFF2-40B4-BE49-F238E27FC236}">
+                <a16:creationId xmlns:a16="http://schemas.microsoft.com/office/drawing/2014/main" id="{4852B208-B8A9-9C88-ED47-F4F675C4E0DA}"/>
+              </a:ext>
+            </a:extLst>
+          </p:cNvPr>
+          <p:cNvPicPr>
+            <a:picLocks noChangeAspect="1"/>
+          </p:cNvPicPr>
+          <p:nvPr/>
+        </p:nvPicPr>
+        <p:blipFill rotWithShape="1">
+          <a:blip r:embed="rId2">
+            <a:extLst>
+              <a:ext uri="{28A0092B-C50C-407E-A947-70E740481C1C}">
+                <a14:useLocalDpi xmlns:a14="http://schemas.microsoft.com/office/drawing/2010/main" val="0"/>
+              </a:ext>
+            </a:extLst>
+          </a:blip>
+          <a:srcRect r="27263"/>
+          <a:stretch/>
+        </p:blipFill>
+        <p:spPr>
+          <a:xfrm>
+            <a:off x="5540901" y="0"/>
+            <a:ext cx="6651099" cy="6858000"/>
+          </a:xfrm>
+          <a:prstGeom prst="rect">
+            <a:avLst/>
+          </a:prstGeom>
+        </p:spPr>
+      </p:pic>
+      <p:sp>
+        <p:nvSpPr>
+          <p:cNvPr id="4" name="Rectangle: Rounded Corners 3">
+            <a:extLst>
+              <a:ext uri="{FF2B5EF4-FFF2-40B4-BE49-F238E27FC236}">
+                <a16:creationId xmlns:a16="http://schemas.microsoft.com/office/drawing/2014/main" id="{6F3A71FA-A12F-4825-5D8C-2C1A9DC102FE}"/>
+              </a:ext>
+            </a:extLst>
+          </p:cNvPr>
+          <p:cNvSpPr/>
+          <p:nvPr/>
+        </p:nvSpPr>
+        <p:spPr>
+          <a:xfrm>
+            <a:off x="5634613" y="3014505"/>
+            <a:ext cx="914400" cy="914400"/>
+          </a:xfrm>
+          <a:prstGeom prst="roundRect">
+            <a:avLst/>
+          </a:prstGeom>
+        </p:spPr>
+        <p:style>
+          <a:lnRef idx="2">
+            <a:schemeClr val="accent1">
+              <a:shade val="50000"/>
+            </a:schemeClr>
+          </a:lnRef>
+          <a:fillRef idx="1">
+            <a:schemeClr val="accent1"/>
+          </a:fillRef>
+          <a:effectRef idx="0">
+            <a:schemeClr val="accent1"/>
+          </a:effectRef>
+          <a:fontRef idx="minor">
+            <a:schemeClr val="lt1"/>
+          </a:fontRef>
+        </p:style>
+        <p:txBody>
+          <a:bodyPr rtlCol="0" anchor="ctr"/>
+          <a:lstStyle/>
+          <a:p>
+            <a:pPr algn="ctr"/>
+            <a:endParaRPr lang="en-US"/>
+          </a:p>
+        </p:txBody>
+      </p:sp>
+      <p:sp>
+        <p:nvSpPr>
+          <p:cNvPr id="6" name="Rectangle: Rounded Corners 5">
+            <a:extLst>
+              <a:ext uri="{FF2B5EF4-FFF2-40B4-BE49-F238E27FC236}">
+                <a16:creationId xmlns:a16="http://schemas.microsoft.com/office/drawing/2014/main" id="{1EBEC86F-5A09-39FF-A251-4E03B739B93B}"/>
+              </a:ext>
+            </a:extLst>
+          </p:cNvPr>
+          <p:cNvSpPr/>
+          <p:nvPr/>
+        </p:nvSpPr>
+        <p:spPr>
+          <a:xfrm>
+            <a:off x="562231" y="3520588"/>
+            <a:ext cx="4428806" cy="1144088"/>
+          </a:xfrm>
+          <a:prstGeom prst="roundRect">
+            <a:avLst/>
+          </a:prstGeom>
+          <a:solidFill>
+            <a:schemeClr val="accent4">
+              <a:alpha val="47000"/>
+            </a:schemeClr>
+          </a:solidFill>
+          <a:ln>
+            <a:noFill/>
+          </a:ln>
+        </p:spPr>
+        <p:style>
+          <a:lnRef idx="2">
+            <a:schemeClr val="accent4">
+              <a:shade val="50000"/>
+            </a:schemeClr>
+          </a:lnRef>
+          <a:fillRef idx="1">
+            <a:schemeClr val="accent4"/>
+          </a:fillRef>
+          <a:effectRef idx="0">
+            <a:schemeClr val="accent4"/>
+          </a:effectRef>
+          <a:fontRef idx="minor">
+            <a:schemeClr val="lt1"/>
+          </a:fontRef>
+        </p:style>
+        <p:txBody>
+          <a:bodyPr rtlCol="0" anchor="ctr"/>
+          <a:lstStyle/>
+          <a:p>
+            <a:pPr algn="ctr"/>
+            <a:endParaRPr lang="en-US"/>
+          </a:p>
+        </p:txBody>
+      </p:sp>
+      <p:sp>
+        <p:nvSpPr>
+          <p:cNvPr id="8" name="Rectangle: Rounded Corners 7">
+            <a:extLst>
+              <a:ext uri="{FF2B5EF4-FFF2-40B4-BE49-F238E27FC236}">
+                <a16:creationId xmlns:a16="http://schemas.microsoft.com/office/drawing/2014/main" id="{F420900B-DE1C-BE80-A3DE-801B9E6D25FD}"/>
+              </a:ext>
+            </a:extLst>
+          </p:cNvPr>
+          <p:cNvSpPr/>
+          <p:nvPr/>
+        </p:nvSpPr>
+        <p:spPr>
+          <a:xfrm>
+            <a:off x="562232" y="4973595"/>
+            <a:ext cx="4428806" cy="1272746"/>
+          </a:xfrm>
+          <a:prstGeom prst="roundRect">
+            <a:avLst/>
+          </a:prstGeom>
+          <a:solidFill>
+            <a:schemeClr val="accent4">
+              <a:alpha val="47000"/>
+            </a:schemeClr>
+          </a:solidFill>
+          <a:ln>
+            <a:noFill/>
+          </a:ln>
+        </p:spPr>
+        <p:style>
+          <a:lnRef idx="2">
+            <a:schemeClr val="accent4">
+              <a:shade val="50000"/>
+            </a:schemeClr>
+          </a:lnRef>
+          <a:fillRef idx="1">
+            <a:schemeClr val="accent4"/>
+          </a:fillRef>
+          <a:effectRef idx="0">
+            <a:schemeClr val="accent4"/>
+          </a:effectRef>
+          <a:fontRef idx="minor">
+            <a:schemeClr val="lt1"/>
+          </a:fontRef>
+        </p:style>
+        <p:txBody>
+          <a:bodyPr rtlCol="0" anchor="ctr"/>
+          <a:lstStyle/>
+          <a:p>
+            <a:pPr algn="ctr"/>
+            <a:endParaRPr lang="en-US"/>
+          </a:p>
+        </p:txBody>
+      </p:sp>
+    </p:spTree>
+    <p:extLst>
+      <p:ext uri="{BB962C8B-B14F-4D97-AF65-F5344CB8AC3E}">
+        <p14:creationId xmlns:p14="http://schemas.microsoft.com/office/powerpoint/2010/main" val="2968310530"/>
+      </p:ext>
+    </p:extLst>
+  </p:cSld>
+  <p:clrMapOvr>
+    <a:masterClrMapping/>
+  </p:clrMapOvr>
+  <p:timing>
+    <p:tnLst>
+      <p:par>
+        <p:cTn id="1" dur="indefinite" restart="never" nodeType="tmRoot">
+          <p:childTnLst>
+            <p:seq concurrent="1" nextAc="seek">
+              <p:cTn id="2" dur="indefinite" nodeType="mainSeq">
+                <p:childTnLst>
+                  <p:par>
+                    <p:cTn id="3" fill="hold">
+                      <p:stCondLst>
+                        <p:cond delay="indefinite"/>
+                      </p:stCondLst>
+                      <p:childTnLst>
+                        <p:par>
+                          <p:cTn id="4" fill="hold">
+                            <p:stCondLst>
+                              <p:cond delay="0"/>
+                            </p:stCondLst>
+                            <p:childTnLst>
+                              <p:par>
+                                <p:cTn id="5" presetID="10" presetClass="entr" presetSubtype="0" fill="hold" grpId="0" nodeType="clickEffect">
+                                  <p:stCondLst>
+                                    <p:cond delay="0"/>
+                                  </p:stCondLst>
+                                  <p:childTnLst>
+                                    <p:set>
+                                      <p:cBhvr>
+                                        <p:cTn id="6" dur="1" fill="hold">
+                                          <p:stCondLst>
+                                            <p:cond delay="0"/>
+                                          </p:stCondLst>
+                                        </p:cTn>
+                                        <p:tgtEl>
+                                          <p:spTgt spid="6"/>
+                                        </p:tgtEl>
+                                        <p:attrNameLst>
+                                          <p:attrName>style.visibility</p:attrName>
+                                        </p:attrNameLst>
+                                      </p:cBhvr>
+                                      <p:to>
+                                        <p:strVal val="visible"/>
+                                      </p:to>
+                                    </p:set>
+                                    <p:animEffect transition="in" filter="fade">
+                                      <p:cBhvr>
+                                        <p:cTn id="7" dur="500"/>
+                                        <p:tgtEl>
+                                          <p:spTgt spid="6"/>
+                                        </p:tgtEl>
+                                      </p:cBhvr>
+                                    </p:animEffect>
+                                  </p:childTnLst>
+                                </p:cTn>
+                              </p:par>
+                              <p:par>
+                                <p:cTn id="8" presetID="10" presetClass="entr" presetSubtype="0" fill="hold" grpId="0" nodeType="withEffect">
+                                  <p:stCondLst>
+                                    <p:cond delay="0"/>
+                                  </p:stCondLst>
+                                  <p:childTnLst>
+                                    <p:set>
+                                      <p:cBhvr>
+                                        <p:cTn id="9" dur="1" fill="hold">
+                                          <p:stCondLst>
+                                            <p:cond delay="0"/>
+                                          </p:stCondLst>
+                                        </p:cTn>
+                                        <p:tgtEl>
+                                          <p:spTgt spid="8"/>
+                                        </p:tgtEl>
+                                        <p:attrNameLst>
+                                          <p:attrName>style.visibility</p:attrName>
+                                        </p:attrNameLst>
+                                      </p:cBhvr>
+                                      <p:to>
+                                        <p:strVal val="visible"/>
+                                      </p:to>
+                                    </p:set>
+                                    <p:animEffect transition="in" filter="fade">
+                                      <p:cBhvr>
+                                        <p:cTn id="10" dur="500"/>
+                                        <p:tgtEl>
+                                          <p:spTgt spid="8"/>
+                                        </p:tgtEl>
+                                      </p:cBhvr>
+                                    </p:animEffect>
+                                  </p:childTnLst>
+                                </p:cTn>
+                              </p:par>
+                            </p:childTnLst>
+                          </p:cTn>
+                        </p:par>
+                      </p:childTnLst>
+                    </p:cTn>
+                  </p:par>
+                </p:childTnLst>
+              </p:cTn>
+              <p:prevCondLst>
+                <p:cond evt="onPrev" delay="0">
+                  <p:tgtEl>
+                    <p:sldTgt/>
+                  </p:tgtEl>
+                </p:cond>
+              </p:prevCondLst>
+              <p:nextCondLst>
+                <p:cond evt="onNext" delay="0">
+                  <p:tgtEl>
+                    <p:sldTgt/>
+                  </p:tgtEl>
+                </p:cond>
+              </p:nextCondLst>
+            </p:seq>
+          </p:childTnLst>
+        </p:cTn>
+      </p:par>
+    </p:tnLst>
+    <p:bldLst>
+      <p:bldP spid="6" grpId="0" animBg="1"/>
+      <p:bldP spid="8" grpId="0" animBg="1"/>
+    </p:bldLst>
+  </p:timing>
+</p:sld>
+</file>
+
+<file path=ppt/slides/slide48.xml><?xml version="1.0" encoding="utf-8"?>
+<p:sld xmlns:a="http://schemas.openxmlformats.org/drawingml/2006/main" xmlns:r="http://schemas.openxmlformats.org/officeDocument/2006/relationships" xmlns:p="http://schemas.openxmlformats.org/presentationml/2006/main">
+  <p:cSld>
+    <p:spTree>
+      <p:nvGrpSpPr>
+        <p:cNvPr id="1" name=""/>
+        <p:cNvGrpSpPr/>
+        <p:nvPr/>
+      </p:nvGrpSpPr>
+      <p:grpSpPr>
+        <a:xfrm>
+          <a:off x="0" y="0"/>
+          <a:ext cx="0" cy="0"/>
+          <a:chOff x="0" y="0"/>
+          <a:chExt cx="0" cy="0"/>
+        </a:xfrm>
+      </p:grpSpPr>
+      <p:sp>
+        <p:nvSpPr>
+          <p:cNvPr id="2" name="Title 1">
+            <a:extLst>
+              <a:ext uri="{FF2B5EF4-FFF2-40B4-BE49-F238E27FC236}">
                 <a16:creationId xmlns:a16="http://schemas.microsoft.com/office/drawing/2014/main" id="{7047F3E8-F132-427F-9697-3EC81542BC5F}"/>
               </a:ext>
             </a:extLst>
@@ -12335,7 +12706,7 @@
 </p:sld>
 </file>
 
-<file path=ppt/slides/slide48.xml><?xml version="1.0" encoding="utf-8"?>
+<file path=ppt/slides/slide49.xml><?xml version="1.0" encoding="utf-8"?>
 <p:sld xmlns:a="http://schemas.openxmlformats.org/drawingml/2006/main" xmlns:r="http://schemas.openxmlformats.org/officeDocument/2006/relationships" xmlns:p="http://schemas.openxmlformats.org/presentationml/2006/main" show="0">
   <p:cSld>
     <p:spTree>
@@ -12487,7 +12858,215 @@
 </p:sld>
 </file>
 
-<file path=ppt/slides/slide49.xml><?xml version="1.0" encoding="utf-8"?>
+<file path=ppt/slides/slide5.xml><?xml version="1.0" encoding="utf-8"?>
+<p:sld xmlns:a="http://schemas.openxmlformats.org/drawingml/2006/main" xmlns:r="http://schemas.openxmlformats.org/officeDocument/2006/relationships" xmlns:p="http://schemas.openxmlformats.org/presentationml/2006/main">
+  <p:cSld>
+    <p:spTree>
+      <p:nvGrpSpPr>
+        <p:cNvPr id="1" name=""/>
+        <p:cNvGrpSpPr/>
+        <p:nvPr/>
+      </p:nvGrpSpPr>
+      <p:grpSpPr>
+        <a:xfrm>
+          <a:off x="0" y="0"/>
+          <a:ext cx="0" cy="0"/>
+          <a:chOff x="0" y="0"/>
+          <a:chExt cx="0" cy="0"/>
+        </a:xfrm>
+      </p:grpSpPr>
+      <p:sp>
+        <p:nvSpPr>
+          <p:cNvPr id="2" name="Title 1">
+            <a:extLst>
+              <a:ext uri="{FF2B5EF4-FFF2-40B4-BE49-F238E27FC236}">
+                <a16:creationId xmlns:a16="http://schemas.microsoft.com/office/drawing/2014/main" id="{F765BD84-354B-4793-BFF5-8078A8779293}"/>
+              </a:ext>
+            </a:extLst>
+          </p:cNvPr>
+          <p:cNvSpPr>
+            <a:spLocks noGrp="1"/>
+          </p:cNvSpPr>
+          <p:nvPr>
+            <p:ph type="title"/>
+          </p:nvPr>
+        </p:nvSpPr>
+        <p:spPr/>
+        <p:txBody>
+          <a:bodyPr/>
+          <a:lstStyle/>
+          <a:p>
+            <a:r>
+              <a:rPr lang="en-US" dirty="0"/>
+              <a:t>Two Parties in Code Review Process</a:t>
+            </a:r>
+          </a:p>
+        </p:txBody>
+      </p:sp>
+      <p:pic>
+        <p:nvPicPr>
+          <p:cNvPr id="5" name="Graphic 4" descr="Office worker male with solid fill">
+            <a:extLst>
+              <a:ext uri="{FF2B5EF4-FFF2-40B4-BE49-F238E27FC236}">
+                <a16:creationId xmlns:a16="http://schemas.microsoft.com/office/drawing/2014/main" id="{87EC1592-0DC1-4781-A6B8-0667CBDB9736}"/>
+              </a:ext>
+            </a:extLst>
+          </p:cNvPr>
+          <p:cNvPicPr>
+            <a:picLocks noChangeAspect="1"/>
+          </p:cNvPicPr>
+          <p:nvPr/>
+        </p:nvPicPr>
+        <p:blipFill>
+          <a:blip r:embed="rId2">
+            <a:extLst>
+              <a:ext uri="{28A0092B-C50C-407E-A947-70E740481C1C}">
+                <a14:useLocalDpi xmlns:a14="http://schemas.microsoft.com/office/drawing/2010/main" val="0"/>
+              </a:ext>
+              <a:ext uri="{96DAC541-7B7A-43D3-8B79-37D633B846F1}">
+                <asvg:svgBlip xmlns:asvg="http://schemas.microsoft.com/office/drawing/2016/SVG/main" r:embed="rId3"/>
+              </a:ext>
+            </a:extLst>
+          </a:blip>
+          <a:stretch>
+            <a:fillRect/>
+          </a:stretch>
+        </p:blipFill>
+        <p:spPr>
+          <a:xfrm>
+            <a:off x="2907804" y="2477233"/>
+            <a:ext cx="2289347" cy="2289347"/>
+          </a:xfrm>
+          <a:prstGeom prst="rect">
+            <a:avLst/>
+          </a:prstGeom>
+        </p:spPr>
+      </p:pic>
+      <p:pic>
+        <p:nvPicPr>
+          <p:cNvPr id="7" name="Graphic 6" descr="Office worker female with solid fill">
+            <a:extLst>
+              <a:ext uri="{FF2B5EF4-FFF2-40B4-BE49-F238E27FC236}">
+                <a16:creationId xmlns:a16="http://schemas.microsoft.com/office/drawing/2014/main" id="{8B2FD38C-5B3A-496E-B64B-013D64395E1D}"/>
+              </a:ext>
+            </a:extLst>
+          </p:cNvPr>
+          <p:cNvPicPr>
+            <a:picLocks noChangeAspect="1"/>
+          </p:cNvPicPr>
+          <p:nvPr/>
+        </p:nvPicPr>
+        <p:blipFill>
+          <a:blip r:embed="rId4">
+            <a:extLst>
+              <a:ext uri="{28A0092B-C50C-407E-A947-70E740481C1C}">
+                <a14:useLocalDpi xmlns:a14="http://schemas.microsoft.com/office/drawing/2010/main" val="0"/>
+              </a:ext>
+              <a:ext uri="{96DAC541-7B7A-43D3-8B79-37D633B846F1}">
+                <asvg:svgBlip xmlns:asvg="http://schemas.microsoft.com/office/drawing/2016/SVG/main" r:embed="rId5"/>
+              </a:ext>
+            </a:extLst>
+          </a:blip>
+          <a:stretch>
+            <a:fillRect/>
+          </a:stretch>
+        </p:blipFill>
+        <p:spPr>
+          <a:xfrm>
+            <a:off x="5866349" y="2477233"/>
+            <a:ext cx="2289347" cy="2289347"/>
+          </a:xfrm>
+          <a:prstGeom prst="rect">
+            <a:avLst/>
+          </a:prstGeom>
+        </p:spPr>
+      </p:pic>
+      <p:sp>
+        <p:nvSpPr>
+          <p:cNvPr id="8" name="TextBox 7">
+            <a:extLst>
+              <a:ext uri="{FF2B5EF4-FFF2-40B4-BE49-F238E27FC236}">
+                <a16:creationId xmlns:a16="http://schemas.microsoft.com/office/drawing/2014/main" id="{0DF51B84-25DC-4F70-9AFD-CE890507F154}"/>
+              </a:ext>
+            </a:extLst>
+          </p:cNvPr>
+          <p:cNvSpPr txBox="1"/>
+          <p:nvPr/>
+        </p:nvSpPr>
+        <p:spPr>
+          <a:xfrm>
+            <a:off x="3110288" y="4698567"/>
+            <a:ext cx="1884379" cy="369332"/>
+          </a:xfrm>
+          <a:prstGeom prst="rect">
+            <a:avLst/>
+          </a:prstGeom>
+          <a:noFill/>
+        </p:spPr>
+        <p:txBody>
+          <a:bodyPr wrap="square" rtlCol="0">
+            <a:spAutoFit/>
+          </a:bodyPr>
+          <a:lstStyle/>
+          <a:p>
+            <a:pPr algn="ctr"/>
+            <a:r>
+              <a:rPr lang="en-US" dirty="0"/>
+              <a:t>Code Author</a:t>
+            </a:r>
+          </a:p>
+        </p:txBody>
+      </p:sp>
+      <p:sp>
+        <p:nvSpPr>
+          <p:cNvPr id="10" name="TextBox 9">
+            <a:extLst>
+              <a:ext uri="{FF2B5EF4-FFF2-40B4-BE49-F238E27FC236}">
+                <a16:creationId xmlns:a16="http://schemas.microsoft.com/office/drawing/2014/main" id="{114F55A1-0792-4FCE-BEB1-C33760CB7455}"/>
+              </a:ext>
+            </a:extLst>
+          </p:cNvPr>
+          <p:cNvSpPr txBox="1"/>
+          <p:nvPr/>
+        </p:nvSpPr>
+        <p:spPr>
+          <a:xfrm>
+            <a:off x="6068832" y="4698567"/>
+            <a:ext cx="1884379" cy="369332"/>
+          </a:xfrm>
+          <a:prstGeom prst="rect">
+            <a:avLst/>
+          </a:prstGeom>
+          <a:noFill/>
+        </p:spPr>
+        <p:txBody>
+          <a:bodyPr wrap="square" rtlCol="0">
+            <a:spAutoFit/>
+          </a:bodyPr>
+          <a:lstStyle/>
+          <a:p>
+            <a:pPr algn="ctr"/>
+            <a:r>
+              <a:rPr lang="en-US" dirty="0"/>
+              <a:t>Code Reviewer</a:t>
+            </a:r>
+          </a:p>
+        </p:txBody>
+      </p:sp>
+    </p:spTree>
+    <p:extLst>
+      <p:ext uri="{BB962C8B-B14F-4D97-AF65-F5344CB8AC3E}">
+        <p14:creationId xmlns:p14="http://schemas.microsoft.com/office/powerpoint/2010/main" val="1580145185"/>
+      </p:ext>
+    </p:extLst>
+  </p:cSld>
+  <p:clrMapOvr>
+    <a:masterClrMapping/>
+  </p:clrMapOvr>
+</p:sld>
+</file>
+
+<file path=ppt/slides/slide50.xml><?xml version="1.0" encoding="utf-8"?>
 <p:sld xmlns:a="http://schemas.openxmlformats.org/drawingml/2006/main" xmlns:r="http://schemas.openxmlformats.org/officeDocument/2006/relationships" xmlns:p="http://schemas.openxmlformats.org/presentationml/2006/main">
   <p:cSld>
     <p:spTree>
@@ -12580,214 +13159,6 @@
     <p:extLst>
       <p:ext uri="{BB962C8B-B14F-4D97-AF65-F5344CB8AC3E}">
         <p14:creationId xmlns:p14="http://schemas.microsoft.com/office/powerpoint/2010/main" val="509761945"/>
-      </p:ext>
-    </p:extLst>
-  </p:cSld>
-  <p:clrMapOvr>
-    <a:masterClrMapping/>
-  </p:clrMapOvr>
-</p:sld>
-</file>
-
-<file path=ppt/slides/slide5.xml><?xml version="1.0" encoding="utf-8"?>
-<p:sld xmlns:a="http://schemas.openxmlformats.org/drawingml/2006/main" xmlns:r="http://schemas.openxmlformats.org/officeDocument/2006/relationships" xmlns:p="http://schemas.openxmlformats.org/presentationml/2006/main">
-  <p:cSld>
-    <p:spTree>
-      <p:nvGrpSpPr>
-        <p:cNvPr id="1" name=""/>
-        <p:cNvGrpSpPr/>
-        <p:nvPr/>
-      </p:nvGrpSpPr>
-      <p:grpSpPr>
-        <a:xfrm>
-          <a:off x="0" y="0"/>
-          <a:ext cx="0" cy="0"/>
-          <a:chOff x="0" y="0"/>
-          <a:chExt cx="0" cy="0"/>
-        </a:xfrm>
-      </p:grpSpPr>
-      <p:sp>
-        <p:nvSpPr>
-          <p:cNvPr id="2" name="Title 1">
-            <a:extLst>
-              <a:ext uri="{FF2B5EF4-FFF2-40B4-BE49-F238E27FC236}">
-                <a16:creationId xmlns:a16="http://schemas.microsoft.com/office/drawing/2014/main" id="{F765BD84-354B-4793-BFF5-8078A8779293}"/>
-              </a:ext>
-            </a:extLst>
-          </p:cNvPr>
-          <p:cNvSpPr>
-            <a:spLocks noGrp="1"/>
-          </p:cNvSpPr>
-          <p:nvPr>
-            <p:ph type="title"/>
-          </p:nvPr>
-        </p:nvSpPr>
-        <p:spPr/>
-        <p:txBody>
-          <a:bodyPr/>
-          <a:lstStyle/>
-          <a:p>
-            <a:r>
-              <a:rPr lang="en-US" dirty="0"/>
-              <a:t>Two Parties in Code Review Process</a:t>
-            </a:r>
-          </a:p>
-        </p:txBody>
-      </p:sp>
-      <p:pic>
-        <p:nvPicPr>
-          <p:cNvPr id="5" name="Graphic 4" descr="Office worker male with solid fill">
-            <a:extLst>
-              <a:ext uri="{FF2B5EF4-FFF2-40B4-BE49-F238E27FC236}">
-                <a16:creationId xmlns:a16="http://schemas.microsoft.com/office/drawing/2014/main" id="{87EC1592-0DC1-4781-A6B8-0667CBDB9736}"/>
-              </a:ext>
-            </a:extLst>
-          </p:cNvPr>
-          <p:cNvPicPr>
-            <a:picLocks noChangeAspect="1"/>
-          </p:cNvPicPr>
-          <p:nvPr/>
-        </p:nvPicPr>
-        <p:blipFill>
-          <a:blip r:embed="rId2">
-            <a:extLst>
-              <a:ext uri="{28A0092B-C50C-407E-A947-70E740481C1C}">
-                <a14:useLocalDpi xmlns:a14="http://schemas.microsoft.com/office/drawing/2010/main" val="0"/>
-              </a:ext>
-              <a:ext uri="{96DAC541-7B7A-43D3-8B79-37D633B846F1}">
-                <asvg:svgBlip xmlns:asvg="http://schemas.microsoft.com/office/drawing/2016/SVG/main" r:embed="rId3"/>
-              </a:ext>
-            </a:extLst>
-          </a:blip>
-          <a:stretch>
-            <a:fillRect/>
-          </a:stretch>
-        </p:blipFill>
-        <p:spPr>
-          <a:xfrm>
-            <a:off x="2907804" y="2477233"/>
-            <a:ext cx="2289347" cy="2289347"/>
-          </a:xfrm>
-          <a:prstGeom prst="rect">
-            <a:avLst/>
-          </a:prstGeom>
-        </p:spPr>
-      </p:pic>
-      <p:pic>
-        <p:nvPicPr>
-          <p:cNvPr id="7" name="Graphic 6" descr="Office worker female with solid fill">
-            <a:extLst>
-              <a:ext uri="{FF2B5EF4-FFF2-40B4-BE49-F238E27FC236}">
-                <a16:creationId xmlns:a16="http://schemas.microsoft.com/office/drawing/2014/main" id="{8B2FD38C-5B3A-496E-B64B-013D64395E1D}"/>
-              </a:ext>
-            </a:extLst>
-          </p:cNvPr>
-          <p:cNvPicPr>
-            <a:picLocks noChangeAspect="1"/>
-          </p:cNvPicPr>
-          <p:nvPr/>
-        </p:nvPicPr>
-        <p:blipFill>
-          <a:blip r:embed="rId4">
-            <a:extLst>
-              <a:ext uri="{28A0092B-C50C-407E-A947-70E740481C1C}">
-                <a14:useLocalDpi xmlns:a14="http://schemas.microsoft.com/office/drawing/2010/main" val="0"/>
-              </a:ext>
-              <a:ext uri="{96DAC541-7B7A-43D3-8B79-37D633B846F1}">
-                <asvg:svgBlip xmlns:asvg="http://schemas.microsoft.com/office/drawing/2016/SVG/main" r:embed="rId5"/>
-              </a:ext>
-            </a:extLst>
-          </a:blip>
-          <a:stretch>
-            <a:fillRect/>
-          </a:stretch>
-        </p:blipFill>
-        <p:spPr>
-          <a:xfrm>
-            <a:off x="5866349" y="2477233"/>
-            <a:ext cx="2289347" cy="2289347"/>
-          </a:xfrm>
-          <a:prstGeom prst="rect">
-            <a:avLst/>
-          </a:prstGeom>
-        </p:spPr>
-      </p:pic>
-      <p:sp>
-        <p:nvSpPr>
-          <p:cNvPr id="8" name="TextBox 7">
-            <a:extLst>
-              <a:ext uri="{FF2B5EF4-FFF2-40B4-BE49-F238E27FC236}">
-                <a16:creationId xmlns:a16="http://schemas.microsoft.com/office/drawing/2014/main" id="{0DF51B84-25DC-4F70-9AFD-CE890507F154}"/>
-              </a:ext>
-            </a:extLst>
-          </p:cNvPr>
-          <p:cNvSpPr txBox="1"/>
-          <p:nvPr/>
-        </p:nvSpPr>
-        <p:spPr>
-          <a:xfrm>
-            <a:off x="3110288" y="4698567"/>
-            <a:ext cx="1884379" cy="369332"/>
-          </a:xfrm>
-          <a:prstGeom prst="rect">
-            <a:avLst/>
-          </a:prstGeom>
-          <a:noFill/>
-        </p:spPr>
-        <p:txBody>
-          <a:bodyPr wrap="square" rtlCol="0">
-            <a:spAutoFit/>
-          </a:bodyPr>
-          <a:lstStyle/>
-          <a:p>
-            <a:pPr algn="ctr"/>
-            <a:r>
-              <a:rPr lang="en-US" dirty="0"/>
-              <a:t>Code Author</a:t>
-            </a:r>
-          </a:p>
-        </p:txBody>
-      </p:sp>
-      <p:sp>
-        <p:nvSpPr>
-          <p:cNvPr id="10" name="TextBox 9">
-            <a:extLst>
-              <a:ext uri="{FF2B5EF4-FFF2-40B4-BE49-F238E27FC236}">
-                <a16:creationId xmlns:a16="http://schemas.microsoft.com/office/drawing/2014/main" id="{114F55A1-0792-4FCE-BEB1-C33760CB7455}"/>
-              </a:ext>
-            </a:extLst>
-          </p:cNvPr>
-          <p:cNvSpPr txBox="1"/>
-          <p:nvPr/>
-        </p:nvSpPr>
-        <p:spPr>
-          <a:xfrm>
-            <a:off x="6068832" y="4698567"/>
-            <a:ext cx="1884379" cy="369332"/>
-          </a:xfrm>
-          <a:prstGeom prst="rect">
-            <a:avLst/>
-          </a:prstGeom>
-          <a:noFill/>
-        </p:spPr>
-        <p:txBody>
-          <a:bodyPr wrap="square" rtlCol="0">
-            <a:spAutoFit/>
-          </a:bodyPr>
-          <a:lstStyle/>
-          <a:p>
-            <a:pPr algn="ctr"/>
-            <a:r>
-              <a:rPr lang="en-US" dirty="0"/>
-              <a:t>Code Reviewer</a:t>
-            </a:r>
-          </a:p>
-        </p:txBody>
-      </p:sp>
-    </p:spTree>
-    <p:extLst>
-      <p:ext uri="{BB962C8B-B14F-4D97-AF65-F5344CB8AC3E}">
-        <p14:creationId xmlns:p14="http://schemas.microsoft.com/office/powerpoint/2010/main" val="1580145185"/>
       </p:ext>
     </p:extLst>
   </p:cSld>

</xml_diff>

<commit_message>
Code Review: Cost vs Time
</commit_message>
<xml_diff>
--- a/Blood-Sweat-and-Code-Reviews/Code Reviews.pptx
+++ b/Blood-Sweat-and-Code-Reviews/Code Reviews.pptx
@@ -5,7 +5,7 @@
     <p:sldMasterId id="2147483648" r:id="rId1"/>
   </p:sldMasterIdLst>
   <p:notesMasterIdLst>
-    <p:notesMasterId r:id="rId54"/>
+    <p:notesMasterId r:id="rId56"/>
   </p:notesMasterIdLst>
   <p:sldIdLst>
     <p:sldId id="256" r:id="rId2"/>
@@ -22,44 +22,46 @@
     <p:sldId id="270" r:id="rId13"/>
     <p:sldId id="271" r:id="rId14"/>
     <p:sldId id="318" r:id="rId15"/>
-    <p:sldId id="265" r:id="rId16"/>
-    <p:sldId id="305" r:id="rId17"/>
-    <p:sldId id="306" r:id="rId18"/>
-    <p:sldId id="304" r:id="rId19"/>
-    <p:sldId id="307" r:id="rId20"/>
-    <p:sldId id="262" r:id="rId21"/>
-    <p:sldId id="275" r:id="rId22"/>
-    <p:sldId id="276" r:id="rId23"/>
-    <p:sldId id="273" r:id="rId24"/>
-    <p:sldId id="274" r:id="rId25"/>
-    <p:sldId id="277" r:id="rId26"/>
-    <p:sldId id="319" r:id="rId27"/>
-    <p:sldId id="309" r:id="rId28"/>
-    <p:sldId id="325" r:id="rId29"/>
-    <p:sldId id="285" r:id="rId30"/>
-    <p:sldId id="282" r:id="rId31"/>
-    <p:sldId id="283" r:id="rId32"/>
-    <p:sldId id="287" r:id="rId33"/>
-    <p:sldId id="281" r:id="rId34"/>
-    <p:sldId id="310" r:id="rId35"/>
-    <p:sldId id="308" r:id="rId36"/>
-    <p:sldId id="324" r:id="rId37"/>
-    <p:sldId id="297" r:id="rId38"/>
-    <p:sldId id="299" r:id="rId39"/>
-    <p:sldId id="298" r:id="rId40"/>
-    <p:sldId id="296" r:id="rId41"/>
-    <p:sldId id="303" r:id="rId42"/>
-    <p:sldId id="292" r:id="rId43"/>
-    <p:sldId id="320" r:id="rId44"/>
-    <p:sldId id="289" r:id="rId45"/>
-    <p:sldId id="311" r:id="rId46"/>
-    <p:sldId id="321" r:id="rId47"/>
-    <p:sldId id="322" r:id="rId48"/>
-    <p:sldId id="257" r:id="rId49"/>
-    <p:sldId id="326" r:id="rId50"/>
-    <p:sldId id="267" r:id="rId51"/>
-    <p:sldId id="266" r:id="rId52"/>
-    <p:sldId id="302" r:id="rId53"/>
+    <p:sldId id="333" r:id="rId16"/>
+    <p:sldId id="334" r:id="rId17"/>
+    <p:sldId id="265" r:id="rId18"/>
+    <p:sldId id="305" r:id="rId19"/>
+    <p:sldId id="306" r:id="rId20"/>
+    <p:sldId id="304" r:id="rId21"/>
+    <p:sldId id="307" r:id="rId22"/>
+    <p:sldId id="262" r:id="rId23"/>
+    <p:sldId id="275" r:id="rId24"/>
+    <p:sldId id="276" r:id="rId25"/>
+    <p:sldId id="273" r:id="rId26"/>
+    <p:sldId id="274" r:id="rId27"/>
+    <p:sldId id="277" r:id="rId28"/>
+    <p:sldId id="319" r:id="rId29"/>
+    <p:sldId id="309" r:id="rId30"/>
+    <p:sldId id="325" r:id="rId31"/>
+    <p:sldId id="285" r:id="rId32"/>
+    <p:sldId id="282" r:id="rId33"/>
+    <p:sldId id="283" r:id="rId34"/>
+    <p:sldId id="287" r:id="rId35"/>
+    <p:sldId id="281" r:id="rId36"/>
+    <p:sldId id="310" r:id="rId37"/>
+    <p:sldId id="308" r:id="rId38"/>
+    <p:sldId id="324" r:id="rId39"/>
+    <p:sldId id="297" r:id="rId40"/>
+    <p:sldId id="299" r:id="rId41"/>
+    <p:sldId id="298" r:id="rId42"/>
+    <p:sldId id="296" r:id="rId43"/>
+    <p:sldId id="303" r:id="rId44"/>
+    <p:sldId id="292" r:id="rId45"/>
+    <p:sldId id="320" r:id="rId46"/>
+    <p:sldId id="289" r:id="rId47"/>
+    <p:sldId id="311" r:id="rId48"/>
+    <p:sldId id="321" r:id="rId49"/>
+    <p:sldId id="322" r:id="rId50"/>
+    <p:sldId id="257" r:id="rId51"/>
+    <p:sldId id="326" r:id="rId52"/>
+    <p:sldId id="267" r:id="rId53"/>
+    <p:sldId id="266" r:id="rId54"/>
+    <p:sldId id="302" r:id="rId55"/>
   </p:sldIdLst>
   <p:sldSz cx="12192000" cy="6858000"/>
   <p:notesSz cx="6858000" cy="9144000"/>
@@ -181,6 +183,8 @@
             <p14:sldId id="270"/>
             <p14:sldId id="271"/>
             <p14:sldId id="318"/>
+            <p14:sldId id="333"/>
+            <p14:sldId id="334"/>
             <p14:sldId id="265"/>
             <p14:sldId id="305"/>
             <p14:sldId id="306"/>
@@ -315,7 +319,7 @@
           <a:p>
             <a:fld id="{C9AD57E7-247F-4128-A8B5-A3DA6234991F}" type="datetimeFigureOut">
               <a:rPr lang="en-US" smtClean="0"/>
-              <a:t>6/14/2022</a:t>
+              <a:t>7/5/2022</a:t>
             </a:fld>
             <a:endParaRPr lang="en-US"/>
           </a:p>
@@ -774,7 +778,7 @@
           <a:p>
             <a:fld id="{58B0D769-A7CC-4121-8D93-CE8B89E00FE0}" type="slidenum">
               <a:rPr lang="en-US" smtClean="0"/>
-              <a:t>16</a:t>
+              <a:t>18</a:t>
             </a:fld>
             <a:endParaRPr lang="en-US"/>
           </a:p>
@@ -858,7 +862,7 @@
           <a:p>
             <a:fld id="{58B0D769-A7CC-4121-8D93-CE8B89E00FE0}" type="slidenum">
               <a:rPr lang="en-US" smtClean="0"/>
-              <a:t>17</a:t>
+              <a:t>19</a:t>
             </a:fld>
             <a:endParaRPr lang="en-US"/>
           </a:p>
@@ -951,7 +955,7 @@
           <a:p>
             <a:fld id="{58B0D769-A7CC-4121-8D93-CE8B89E00FE0}" type="slidenum">
               <a:rPr lang="en-US" smtClean="0"/>
-              <a:t>18</a:t>
+              <a:t>20</a:t>
             </a:fld>
             <a:endParaRPr lang="en-US"/>
           </a:p>
@@ -1058,7 +1062,7 @@
           <a:p>
             <a:fld id="{58B0D769-A7CC-4121-8D93-CE8B89E00FE0}" type="slidenum">
               <a:rPr lang="en-US" smtClean="0"/>
-              <a:t>21</a:t>
+              <a:t>23</a:t>
             </a:fld>
             <a:endParaRPr lang="en-US"/>
           </a:p>
@@ -1245,7 +1249,7 @@
           <a:p>
             <a:fld id="{58B0D769-A7CC-4121-8D93-CE8B89E00FE0}" type="slidenum">
               <a:rPr lang="en-US" smtClean="0"/>
-              <a:t>22</a:t>
+              <a:t>24</a:t>
             </a:fld>
             <a:endParaRPr lang="en-US"/>
           </a:p>
@@ -1591,7 +1595,7 @@
           <a:p>
             <a:fld id="{58B0D769-A7CC-4121-8D93-CE8B89E00FE0}" type="slidenum">
               <a:rPr lang="en-US" smtClean="0"/>
-              <a:t>23</a:t>
+              <a:t>25</a:t>
             </a:fld>
             <a:endParaRPr lang="en-US"/>
           </a:p>
@@ -1700,7 +1704,7 @@
           <a:p>
             <a:fld id="{58B0D769-A7CC-4121-8D93-CE8B89E00FE0}" type="slidenum">
               <a:rPr lang="en-US" smtClean="0"/>
-              <a:t>24</a:t>
+              <a:t>26</a:t>
             </a:fld>
             <a:endParaRPr lang="en-US"/>
           </a:p>
@@ -1890,7 +1894,7 @@
           <a:p>
             <a:fld id="{58B0D769-A7CC-4121-8D93-CE8B89E00FE0}" type="slidenum">
               <a:rPr lang="en-US" smtClean="0"/>
-              <a:t>25</a:t>
+              <a:t>27</a:t>
             </a:fld>
             <a:endParaRPr lang="en-US"/>
           </a:p>
@@ -2146,7 +2150,7 @@
           <a:p>
             <a:fld id="{58B0D769-A7CC-4121-8D93-CE8B89E00FE0}" type="slidenum">
               <a:rPr lang="en-US" smtClean="0"/>
-              <a:t>26</a:t>
+              <a:t>28</a:t>
             </a:fld>
             <a:endParaRPr lang="en-US"/>
           </a:p>
@@ -2209,60 +2213,6 @@
           <a:bodyPr/>
           <a:lstStyle/>
           <a:p>
-            <a:r>
-              <a:rPr lang="en-US" dirty="0">
-                <a:hlinkClick r:id="rId3"/>
-              </a:rPr>
-              <a:t>Conventional: Comments | Medium</a:t>
-            </a:r>
-            <a:endParaRPr lang="en-US" dirty="0"/>
-          </a:p>
-          <a:p>
-            <a:endParaRPr lang="en-US" dirty="0"/>
-          </a:p>
-          <a:p>
-            <a:r>
-              <a:rPr lang="en-US" dirty="0"/>
-              <a:t>Issue: Specific problem. Pair with suggestion</a:t>
-            </a:r>
-          </a:p>
-          <a:p>
-            <a:r>
-              <a:rPr lang="en-US" dirty="0"/>
-              <a:t>Suggestion: Suggested improvement</a:t>
-            </a:r>
-          </a:p>
-          <a:p>
-            <a:r>
-              <a:rPr lang="en-US" dirty="0"/>
-              <a:t>Question: Potential concerns, but not sure if relevant</a:t>
-            </a:r>
-          </a:p>
-          <a:p>
-            <a:r>
-              <a:rPr lang="en-US" dirty="0"/>
-              <a:t>Nit: Trivial, but necessary changes</a:t>
-            </a:r>
-          </a:p>
-          <a:p>
-            <a:r>
-              <a:rPr lang="en-US" dirty="0"/>
-              <a:t>Thought: Non-blocking ideas</a:t>
-            </a:r>
-          </a:p>
-          <a:p>
-            <a:r>
-              <a:rPr lang="en-US" dirty="0"/>
-              <a:t>Chore: Simple tasks that must be done</a:t>
-            </a:r>
-          </a:p>
-          <a:p>
-            <a:r>
-              <a:rPr lang="en-US" dirty="0"/>
-              <a:t>Praise: Highlight something positive</a:t>
-            </a:r>
-          </a:p>
-          <a:p>
             <a:endParaRPr lang="en-US" dirty="0"/>
           </a:p>
           <a:p>
@@ -2287,7 +2237,7 @@
           <a:p>
             <a:fld id="{58B0D769-A7CC-4121-8D93-CE8B89E00FE0}" type="slidenum">
               <a:rPr lang="en-US" smtClean="0"/>
-              <a:t>27</a:t>
+              <a:t>29</a:t>
             </a:fld>
             <a:endParaRPr lang="en-US"/>
           </a:p>
@@ -2515,7 +2465,7 @@
           <a:p>
             <a:fld id="{58B0D769-A7CC-4121-8D93-CE8B89E00FE0}" type="slidenum">
               <a:rPr lang="en-US" smtClean="0"/>
-              <a:t>28</a:t>
+              <a:t>30</a:t>
             </a:fld>
             <a:endParaRPr lang="en-US"/>
           </a:p>
@@ -2611,7 +2561,7 @@
           <a:p>
             <a:fld id="{58B0D769-A7CC-4121-8D93-CE8B89E00FE0}" type="slidenum">
               <a:rPr lang="en-US" smtClean="0"/>
-              <a:t>29</a:t>
+              <a:t>31</a:t>
             </a:fld>
             <a:endParaRPr lang="en-US"/>
           </a:p>
@@ -2723,7 +2673,7 @@
           <a:p>
             <a:fld id="{58B0D769-A7CC-4121-8D93-CE8B89E00FE0}" type="slidenum">
               <a:rPr lang="en-US" smtClean="0"/>
-              <a:t>30</a:t>
+              <a:t>32</a:t>
             </a:fld>
             <a:endParaRPr lang="en-US"/>
           </a:p>
@@ -2819,7 +2769,7 @@
           <a:p>
             <a:fld id="{58B0D769-A7CC-4121-8D93-CE8B89E00FE0}" type="slidenum">
               <a:rPr lang="en-US" smtClean="0"/>
-              <a:t>31</a:t>
+              <a:t>33</a:t>
             </a:fld>
             <a:endParaRPr lang="en-US"/>
           </a:p>
@@ -2989,7 +2939,7 @@
           <a:p>
             <a:fld id="{58B0D769-A7CC-4121-8D93-CE8B89E00FE0}" type="slidenum">
               <a:rPr lang="en-US" smtClean="0"/>
-              <a:t>33</a:t>
+              <a:t>35</a:t>
             </a:fld>
             <a:endParaRPr lang="en-US"/>
           </a:p>
@@ -3112,7 +3062,7 @@
           <a:p>
             <a:fld id="{58B0D769-A7CC-4121-8D93-CE8B89E00FE0}" type="slidenum">
               <a:rPr lang="en-US" smtClean="0"/>
-              <a:t>37</a:t>
+              <a:t>39</a:t>
             </a:fld>
             <a:endParaRPr lang="en-US"/>
           </a:p>
@@ -3216,7 +3166,7 @@
           <a:p>
             <a:fld id="{58B0D769-A7CC-4121-8D93-CE8B89E00FE0}" type="slidenum">
               <a:rPr lang="en-US" smtClean="0"/>
-              <a:t>39</a:t>
+              <a:t>41</a:t>
             </a:fld>
             <a:endParaRPr lang="en-US"/>
           </a:p>
@@ -3306,7 +3256,7 @@
           <a:p>
             <a:fld id="{58B0D769-A7CC-4121-8D93-CE8B89E00FE0}" type="slidenum">
               <a:rPr lang="en-US" smtClean="0"/>
-              <a:t>40</a:t>
+              <a:t>42</a:t>
             </a:fld>
             <a:endParaRPr lang="en-US"/>
           </a:p>
@@ -3414,7 +3364,7 @@
           <a:p>
             <a:fld id="{58B0D769-A7CC-4121-8D93-CE8B89E00FE0}" type="slidenum">
               <a:rPr lang="en-US" smtClean="0"/>
-              <a:t>41</a:t>
+              <a:t>43</a:t>
             </a:fld>
             <a:endParaRPr lang="en-US"/>
           </a:p>
@@ -3516,7 +3466,7 @@
           <a:p>
             <a:fld id="{58B0D769-A7CC-4121-8D93-CE8B89E00FE0}" type="slidenum">
               <a:rPr lang="en-US" smtClean="0"/>
-              <a:t>42</a:t>
+              <a:t>44</a:t>
             </a:fld>
             <a:endParaRPr lang="en-US"/>
           </a:p>
@@ -3697,7 +3647,7 @@
           <a:p>
             <a:fld id="{58B0D769-A7CC-4121-8D93-CE8B89E00FE0}" type="slidenum">
               <a:rPr lang="en-US" smtClean="0"/>
-              <a:t>43</a:t>
+              <a:t>45</a:t>
             </a:fld>
             <a:endParaRPr lang="en-US"/>
           </a:p>
@@ -4604,7 +4554,7 @@
           <a:p>
             <a:fld id="{58B0D769-A7CC-4121-8D93-CE8B89E00FE0}" type="slidenum">
               <a:rPr lang="en-US" smtClean="0"/>
-              <a:t>15</a:t>
+              <a:t>17</a:t>
             </a:fld>
             <a:endParaRPr lang="en-US"/>
           </a:p>
@@ -4770,7 +4720,7 @@
           <a:p>
             <a:fld id="{EA362AFC-14BE-4CC3-881D-E49F13F68D08}" type="datetimeFigureOut">
               <a:rPr lang="en-US" smtClean="0"/>
-              <a:t>6/14/2022</a:t>
+              <a:t>7/5/2022</a:t>
             </a:fld>
             <a:endParaRPr lang="en-US"/>
           </a:p>
@@ -4968,7 +4918,7 @@
           <a:p>
             <a:fld id="{EA362AFC-14BE-4CC3-881D-E49F13F68D08}" type="datetimeFigureOut">
               <a:rPr lang="en-US" smtClean="0"/>
-              <a:t>6/14/2022</a:t>
+              <a:t>7/5/2022</a:t>
             </a:fld>
             <a:endParaRPr lang="en-US"/>
           </a:p>
@@ -5176,7 +5126,7 @@
           <a:p>
             <a:fld id="{EA362AFC-14BE-4CC3-881D-E49F13F68D08}" type="datetimeFigureOut">
               <a:rPr lang="en-US" smtClean="0"/>
-              <a:t>6/14/2022</a:t>
+              <a:t>7/5/2022</a:t>
             </a:fld>
             <a:endParaRPr lang="en-US"/>
           </a:p>
@@ -5374,7 +5324,7 @@
           <a:p>
             <a:fld id="{EA362AFC-14BE-4CC3-881D-E49F13F68D08}" type="datetimeFigureOut">
               <a:rPr lang="en-US" smtClean="0"/>
-              <a:t>6/14/2022</a:t>
+              <a:t>7/5/2022</a:t>
             </a:fld>
             <a:endParaRPr lang="en-US"/>
           </a:p>
@@ -5649,7 +5599,7 @@
           <a:p>
             <a:fld id="{EA362AFC-14BE-4CC3-881D-E49F13F68D08}" type="datetimeFigureOut">
               <a:rPr lang="en-US" smtClean="0"/>
-              <a:t>6/14/2022</a:t>
+              <a:t>7/5/2022</a:t>
             </a:fld>
             <a:endParaRPr lang="en-US"/>
           </a:p>
@@ -5914,7 +5864,7 @@
           <a:p>
             <a:fld id="{EA362AFC-14BE-4CC3-881D-E49F13F68D08}" type="datetimeFigureOut">
               <a:rPr lang="en-US" smtClean="0"/>
-              <a:t>6/14/2022</a:t>
+              <a:t>7/5/2022</a:t>
             </a:fld>
             <a:endParaRPr lang="en-US"/>
           </a:p>
@@ -6326,7 +6276,7 @@
           <a:p>
             <a:fld id="{EA362AFC-14BE-4CC3-881D-E49F13F68D08}" type="datetimeFigureOut">
               <a:rPr lang="en-US" smtClean="0"/>
-              <a:t>6/14/2022</a:t>
+              <a:t>7/5/2022</a:t>
             </a:fld>
             <a:endParaRPr lang="en-US"/>
           </a:p>
@@ -6467,7 +6417,7 @@
           <a:p>
             <a:fld id="{EA362AFC-14BE-4CC3-881D-E49F13F68D08}" type="datetimeFigureOut">
               <a:rPr lang="en-US" smtClean="0"/>
-              <a:t>6/14/2022</a:t>
+              <a:t>7/5/2022</a:t>
             </a:fld>
             <a:endParaRPr lang="en-US"/>
           </a:p>
@@ -6580,7 +6530,7 @@
           <a:p>
             <a:fld id="{EA362AFC-14BE-4CC3-881D-E49F13F68D08}" type="datetimeFigureOut">
               <a:rPr lang="en-US" smtClean="0"/>
-              <a:t>6/14/2022</a:t>
+              <a:t>7/5/2022</a:t>
             </a:fld>
             <a:endParaRPr lang="en-US"/>
           </a:p>
@@ -6891,7 +6841,7 @@
           <a:p>
             <a:fld id="{EA362AFC-14BE-4CC3-881D-E49F13F68D08}" type="datetimeFigureOut">
               <a:rPr lang="en-US" smtClean="0"/>
-              <a:t>6/14/2022</a:t>
+              <a:t>7/5/2022</a:t>
             </a:fld>
             <a:endParaRPr lang="en-US"/>
           </a:p>
@@ -7179,7 +7129,7 @@
           <a:p>
             <a:fld id="{EA362AFC-14BE-4CC3-881D-E49F13F68D08}" type="datetimeFigureOut">
               <a:rPr lang="en-US" smtClean="0"/>
-              <a:t>6/14/2022</a:t>
+              <a:t>7/5/2022</a:t>
             </a:fld>
             <a:endParaRPr lang="en-US"/>
           </a:p>
@@ -7420,7 +7370,7 @@
           <a:p>
             <a:fld id="{EA362AFC-14BE-4CC3-881D-E49F13F68D08}" type="datetimeFigureOut">
               <a:rPr lang="en-US" smtClean="0"/>
-              <a:t>6/14/2022</a:t>
+              <a:t>7/5/2022</a:t>
             </a:fld>
             <a:endParaRPr lang="en-US"/>
           </a:p>
@@ -8459,7 +8409,7 @@
           <p:cNvPr id="2" name="Title 1">
             <a:extLst>
               <a:ext uri="{FF2B5EF4-FFF2-40B4-BE49-F238E27FC236}">
-                <a16:creationId xmlns:a16="http://schemas.microsoft.com/office/drawing/2014/main" id="{BC490216-219C-41F6-B8B2-68B76B841A90}"/>
+                <a16:creationId xmlns:a16="http://schemas.microsoft.com/office/drawing/2014/main" id="{0B9220B8-C623-CF39-9CDF-22697655DC7D}"/>
               </a:ext>
             </a:extLst>
           </p:cNvPr>
@@ -8477,32 +8427,160 @@
           <a:p>
             <a:r>
               <a:rPr lang="en-US" dirty="0"/>
-              <a:t>Challenges</a:t>
-            </a:r>
-          </a:p>
-        </p:txBody>
-      </p:sp>
-      <p:sp>
-        <p:nvSpPr>
-          <p:cNvPr id="3" name="Content Placeholder 2">
-            <a:extLst>
-              <a:ext uri="{FF2B5EF4-FFF2-40B4-BE49-F238E27FC236}">
-                <a16:creationId xmlns:a16="http://schemas.microsoft.com/office/drawing/2014/main" id="{4AD8AD5E-3851-4376-8B54-A74B22517183}"/>
-              </a:ext>
-            </a:extLst>
-          </p:cNvPr>
-          <p:cNvSpPr>
-            <a:spLocks noGrp="1"/>
-          </p:cNvSpPr>
-          <p:nvPr>
-            <p:ph idx="1"/>
-          </p:nvPr>
-        </p:nvSpPr>
-        <p:spPr/>
-        <p:txBody>
-          <a:bodyPr/>
-          <a:lstStyle/>
-          <a:p>
+              <a:t>Cost of Software Change</a:t>
+            </a:r>
+          </a:p>
+        </p:txBody>
+      </p:sp>
+      <p:pic>
+        <p:nvPicPr>
+          <p:cNvPr id="1026" name="Picture 2">
+            <a:extLst>
+              <a:ext uri="{FF2B5EF4-FFF2-40B4-BE49-F238E27FC236}">
+                <a16:creationId xmlns:a16="http://schemas.microsoft.com/office/drawing/2014/main" id="{A41067D5-4A82-F016-4B43-44BA0E5442F8}"/>
+              </a:ext>
+            </a:extLst>
+          </p:cNvPr>
+          <p:cNvPicPr>
+            <a:picLocks noChangeAspect="1" noChangeArrowheads="1"/>
+          </p:cNvPicPr>
+          <p:nvPr/>
+        </p:nvPicPr>
+        <p:blipFill>
+          <a:blip r:embed="rId2">
+            <a:extLst>
+              <a:ext uri="{28A0092B-C50C-407E-A947-70E740481C1C}">
+                <a14:useLocalDpi xmlns:a14="http://schemas.microsoft.com/office/drawing/2010/main" val="0"/>
+              </a:ext>
+            </a:extLst>
+          </a:blip>
+          <a:srcRect/>
+          <a:stretch>
+            <a:fillRect/>
+          </a:stretch>
+        </p:blipFill>
+        <p:spPr bwMode="auto">
+          <a:xfrm>
+            <a:off x="1993392" y="1319887"/>
+            <a:ext cx="6419088" cy="4996358"/>
+          </a:xfrm>
+          <a:prstGeom prst="rect">
+            <a:avLst/>
+          </a:prstGeom>
+          <a:noFill/>
+          <a:extLst>
+            <a:ext uri="{909E8E84-426E-40DD-AFC4-6F175D3DCCD1}">
+              <a14:hiddenFill xmlns:a14="http://schemas.microsoft.com/office/drawing/2010/main">
+                <a:solidFill>
+                  <a:srgbClr val="FFFFFF"/>
+                </a:solidFill>
+              </a14:hiddenFill>
+            </a:ext>
+          </a:extLst>
+        </p:spPr>
+      </p:pic>
+      <p:sp>
+        <p:nvSpPr>
+          <p:cNvPr id="5" name="TextBox 4">
+            <a:extLst>
+              <a:ext uri="{FF2B5EF4-FFF2-40B4-BE49-F238E27FC236}">
+                <a16:creationId xmlns:a16="http://schemas.microsoft.com/office/drawing/2014/main" id="{0D0E5727-138D-CAAE-E7C9-AA9357B7500D}"/>
+              </a:ext>
+            </a:extLst>
+          </p:cNvPr>
+          <p:cNvSpPr txBox="1"/>
+          <p:nvPr/>
+        </p:nvSpPr>
+        <p:spPr>
+          <a:xfrm>
+            <a:off x="5639637" y="2971800"/>
+            <a:ext cx="914400" cy="914400"/>
+          </a:xfrm>
+          <a:prstGeom prst="rect">
+            <a:avLst/>
+          </a:prstGeom>
+          <a:noFill/>
+        </p:spPr>
+        <p:txBody>
+          <a:bodyPr wrap="square" rtlCol="0">
+            <a:spAutoFit/>
+          </a:bodyPr>
+          <a:lstStyle/>
+          <a:p>
+            <a:endParaRPr lang="en-US" dirty="0"/>
+          </a:p>
+        </p:txBody>
+      </p:sp>
+      <p:sp>
+        <p:nvSpPr>
+          <p:cNvPr id="7" name="TextBox 6">
+            <a:extLst>
+              <a:ext uri="{FF2B5EF4-FFF2-40B4-BE49-F238E27FC236}">
+                <a16:creationId xmlns:a16="http://schemas.microsoft.com/office/drawing/2014/main" id="{D3C8F53F-C6C4-496B-E590-2DB550B4D603}"/>
+              </a:ext>
+            </a:extLst>
+          </p:cNvPr>
+          <p:cNvSpPr txBox="1"/>
+          <p:nvPr/>
+        </p:nvSpPr>
+        <p:spPr>
+          <a:xfrm>
+            <a:off x="5639637" y="2971800"/>
+            <a:ext cx="914400" cy="914400"/>
+          </a:xfrm>
+          <a:prstGeom prst="rect">
+            <a:avLst/>
+          </a:prstGeom>
+          <a:noFill/>
+        </p:spPr>
+        <p:txBody>
+          <a:bodyPr wrap="square" rtlCol="0">
+            <a:spAutoFit/>
+          </a:bodyPr>
+          <a:lstStyle/>
+          <a:p>
+            <a:endParaRPr lang="en-US" dirty="0"/>
+          </a:p>
+        </p:txBody>
+      </p:sp>
+      <p:sp>
+        <p:nvSpPr>
+          <p:cNvPr id="8" name="TextBox 7">
+            <a:extLst>
+              <a:ext uri="{FF2B5EF4-FFF2-40B4-BE49-F238E27FC236}">
+                <a16:creationId xmlns:a16="http://schemas.microsoft.com/office/drawing/2014/main" id="{977B7C80-DD71-EBB1-D567-56EDF6143C7E}"/>
+              </a:ext>
+            </a:extLst>
+          </p:cNvPr>
+          <p:cNvSpPr txBox="1"/>
+          <p:nvPr/>
+        </p:nvSpPr>
+        <p:spPr>
+          <a:xfrm>
+            <a:off x="2476919" y="6407915"/>
+            <a:ext cx="9242787" cy="369332"/>
+          </a:xfrm>
+          <a:prstGeom prst="rect">
+            <a:avLst/>
+          </a:prstGeom>
+          <a:noFill/>
+        </p:spPr>
+        <p:txBody>
+          <a:bodyPr wrap="none" rtlCol="0">
+            <a:spAutoFit/>
+          </a:bodyPr>
+          <a:lstStyle/>
+          <a:p>
+            <a:r>
+              <a:rPr lang="en-US" dirty="0"/>
+              <a:t>Source: </a:t>
+            </a:r>
+            <a:r>
+              <a:rPr lang="en-US" dirty="0">
+                <a:hlinkClick r:id="rId3"/>
+              </a:rPr>
+              <a:t>Why Agile Software Development Techniques Work: Improved Feedback (ambysoft.com)</a:t>
+            </a:r>
             <a:endParaRPr lang="en-US" dirty="0"/>
           </a:p>
         </p:txBody>
@@ -8510,7 +8588,7 @@
     </p:spTree>
     <p:extLst>
       <p:ext uri="{BB962C8B-B14F-4D97-AF65-F5344CB8AC3E}">
-        <p14:creationId xmlns:p14="http://schemas.microsoft.com/office/powerpoint/2010/main" val="3574865734"/>
+        <p14:creationId xmlns:p14="http://schemas.microsoft.com/office/powerpoint/2010/main" val="4266351686"/>
       </p:ext>
     </p:extLst>
   </p:cSld>
@@ -8537,6 +8615,236 @@
           <a:chExt cx="0" cy="0"/>
         </a:xfrm>
       </p:grpSpPr>
+      <p:pic>
+        <p:nvPicPr>
+          <p:cNvPr id="2050" name="Picture 2">
+            <a:extLst>
+              <a:ext uri="{FF2B5EF4-FFF2-40B4-BE49-F238E27FC236}">
+                <a16:creationId xmlns:a16="http://schemas.microsoft.com/office/drawing/2014/main" id="{474E3B34-0B93-D036-8D42-ABFE91E89834}"/>
+              </a:ext>
+            </a:extLst>
+          </p:cNvPr>
+          <p:cNvPicPr>
+            <a:picLocks noChangeAspect="1" noChangeArrowheads="1"/>
+          </p:cNvPicPr>
+          <p:nvPr/>
+        </p:nvPicPr>
+        <p:blipFill>
+          <a:blip r:embed="rId2">
+            <a:extLst>
+              <a:ext uri="{28A0092B-C50C-407E-A947-70E740481C1C}">
+                <a14:useLocalDpi xmlns:a14="http://schemas.microsoft.com/office/drawing/2010/main" val="0"/>
+              </a:ext>
+            </a:extLst>
+          </a:blip>
+          <a:srcRect/>
+          <a:stretch>
+            <a:fillRect/>
+          </a:stretch>
+        </p:blipFill>
+        <p:spPr bwMode="auto">
+          <a:xfrm>
+            <a:off x="1992293" y="1361551"/>
+            <a:ext cx="6425184" cy="4974336"/>
+          </a:xfrm>
+          <a:prstGeom prst="rect">
+            <a:avLst/>
+          </a:prstGeom>
+          <a:noFill/>
+          <a:extLst>
+            <a:ext uri="{909E8E84-426E-40DD-AFC4-6F175D3DCCD1}">
+              <a14:hiddenFill xmlns:a14="http://schemas.microsoft.com/office/drawing/2010/main">
+                <a:solidFill>
+                  <a:srgbClr val="FFFFFF"/>
+                </a:solidFill>
+              </a14:hiddenFill>
+            </a:ext>
+          </a:extLst>
+        </p:spPr>
+      </p:pic>
+      <p:sp>
+        <p:nvSpPr>
+          <p:cNvPr id="2" name="Title 1">
+            <a:extLst>
+              <a:ext uri="{FF2B5EF4-FFF2-40B4-BE49-F238E27FC236}">
+                <a16:creationId xmlns:a16="http://schemas.microsoft.com/office/drawing/2014/main" id="{05D2B06A-5B13-EE4A-CA14-C06C22010616}"/>
+              </a:ext>
+            </a:extLst>
+          </p:cNvPr>
+          <p:cNvSpPr>
+            <a:spLocks noGrp="1"/>
+          </p:cNvSpPr>
+          <p:nvPr>
+            <p:ph type="title"/>
+          </p:nvPr>
+        </p:nvSpPr>
+        <p:spPr/>
+        <p:txBody>
+          <a:bodyPr/>
+          <a:lstStyle/>
+          <a:p>
+            <a:r>
+              <a:rPr lang="en-US" dirty="0"/>
+              <a:t>Cost of Software Change</a:t>
+            </a:r>
+          </a:p>
+        </p:txBody>
+      </p:sp>
+      <p:sp>
+        <p:nvSpPr>
+          <p:cNvPr id="4" name="TextBox 3">
+            <a:extLst>
+              <a:ext uri="{FF2B5EF4-FFF2-40B4-BE49-F238E27FC236}">
+                <a16:creationId xmlns:a16="http://schemas.microsoft.com/office/drawing/2014/main" id="{C90C2D68-6EB9-D4FE-FD4D-400DF3C49A30}"/>
+              </a:ext>
+            </a:extLst>
+          </p:cNvPr>
+          <p:cNvSpPr txBox="1"/>
+          <p:nvPr/>
+        </p:nvSpPr>
+        <p:spPr>
+          <a:xfrm>
+            <a:off x="2476919" y="6407915"/>
+            <a:ext cx="9242787" cy="369332"/>
+          </a:xfrm>
+          <a:prstGeom prst="rect">
+            <a:avLst/>
+          </a:prstGeom>
+          <a:noFill/>
+        </p:spPr>
+        <p:txBody>
+          <a:bodyPr wrap="none" rtlCol="0">
+            <a:spAutoFit/>
+          </a:bodyPr>
+          <a:lstStyle/>
+          <a:p>
+            <a:r>
+              <a:rPr lang="en-US" dirty="0"/>
+              <a:t>Source: </a:t>
+            </a:r>
+            <a:r>
+              <a:rPr lang="en-US" dirty="0">
+                <a:hlinkClick r:id="rId3"/>
+              </a:rPr>
+              <a:t>Why Agile Software Development Techniques Work: Improved Feedback (ambysoft.com)</a:t>
+            </a:r>
+            <a:endParaRPr lang="en-US" dirty="0"/>
+          </a:p>
+        </p:txBody>
+      </p:sp>
+    </p:spTree>
+    <p:extLst>
+      <p:ext uri="{BB962C8B-B14F-4D97-AF65-F5344CB8AC3E}">
+        <p14:creationId xmlns:p14="http://schemas.microsoft.com/office/powerpoint/2010/main" val="1899376176"/>
+      </p:ext>
+    </p:extLst>
+  </p:cSld>
+  <p:clrMapOvr>
+    <a:masterClrMapping/>
+  </p:clrMapOvr>
+</p:sld>
+</file>
+
+<file path=ppt/slides/slide17.xml><?xml version="1.0" encoding="utf-8"?>
+<p:sld xmlns:a="http://schemas.openxmlformats.org/drawingml/2006/main" xmlns:r="http://schemas.openxmlformats.org/officeDocument/2006/relationships" xmlns:p="http://schemas.openxmlformats.org/presentationml/2006/main">
+  <p:cSld>
+    <p:spTree>
+      <p:nvGrpSpPr>
+        <p:cNvPr id="1" name=""/>
+        <p:cNvGrpSpPr/>
+        <p:nvPr/>
+      </p:nvGrpSpPr>
+      <p:grpSpPr>
+        <a:xfrm>
+          <a:off x="0" y="0"/>
+          <a:ext cx="0" cy="0"/>
+          <a:chOff x="0" y="0"/>
+          <a:chExt cx="0" cy="0"/>
+        </a:xfrm>
+      </p:grpSpPr>
+      <p:sp>
+        <p:nvSpPr>
+          <p:cNvPr id="2" name="Title 1">
+            <a:extLst>
+              <a:ext uri="{FF2B5EF4-FFF2-40B4-BE49-F238E27FC236}">
+                <a16:creationId xmlns:a16="http://schemas.microsoft.com/office/drawing/2014/main" id="{BC490216-219C-41F6-B8B2-68B76B841A90}"/>
+              </a:ext>
+            </a:extLst>
+          </p:cNvPr>
+          <p:cNvSpPr>
+            <a:spLocks noGrp="1"/>
+          </p:cNvSpPr>
+          <p:nvPr>
+            <p:ph type="title"/>
+          </p:nvPr>
+        </p:nvSpPr>
+        <p:spPr/>
+        <p:txBody>
+          <a:bodyPr/>
+          <a:lstStyle/>
+          <a:p>
+            <a:r>
+              <a:rPr lang="en-US" dirty="0"/>
+              <a:t>Challenges</a:t>
+            </a:r>
+          </a:p>
+        </p:txBody>
+      </p:sp>
+      <p:sp>
+        <p:nvSpPr>
+          <p:cNvPr id="3" name="Content Placeholder 2">
+            <a:extLst>
+              <a:ext uri="{FF2B5EF4-FFF2-40B4-BE49-F238E27FC236}">
+                <a16:creationId xmlns:a16="http://schemas.microsoft.com/office/drawing/2014/main" id="{4AD8AD5E-3851-4376-8B54-A74B22517183}"/>
+              </a:ext>
+            </a:extLst>
+          </p:cNvPr>
+          <p:cNvSpPr>
+            <a:spLocks noGrp="1"/>
+          </p:cNvSpPr>
+          <p:nvPr>
+            <p:ph idx="1"/>
+          </p:nvPr>
+        </p:nvSpPr>
+        <p:spPr/>
+        <p:txBody>
+          <a:bodyPr/>
+          <a:lstStyle/>
+          <a:p>
+            <a:endParaRPr lang="en-US" dirty="0"/>
+          </a:p>
+        </p:txBody>
+      </p:sp>
+    </p:spTree>
+    <p:extLst>
+      <p:ext uri="{BB962C8B-B14F-4D97-AF65-F5344CB8AC3E}">
+        <p14:creationId xmlns:p14="http://schemas.microsoft.com/office/powerpoint/2010/main" val="3574865734"/>
+      </p:ext>
+    </p:extLst>
+  </p:cSld>
+  <p:clrMapOvr>
+    <a:masterClrMapping/>
+  </p:clrMapOvr>
+</p:sld>
+</file>
+
+<file path=ppt/slides/slide18.xml><?xml version="1.0" encoding="utf-8"?>
+<p:sld xmlns:a="http://schemas.openxmlformats.org/drawingml/2006/main" xmlns:r="http://schemas.openxmlformats.org/officeDocument/2006/relationships" xmlns:p="http://schemas.openxmlformats.org/presentationml/2006/main">
+  <p:cSld>
+    <p:spTree>
+      <p:nvGrpSpPr>
+        <p:cNvPr id="1" name=""/>
+        <p:cNvGrpSpPr/>
+        <p:nvPr/>
+      </p:nvGrpSpPr>
+      <p:grpSpPr>
+        <a:xfrm>
+          <a:off x="0" y="0"/>
+          <a:ext cx="0" cy="0"/>
+          <a:chOff x="0" y="0"/>
+          <a:chExt cx="0" cy="0"/>
+        </a:xfrm>
+      </p:grpSpPr>
       <p:sp>
         <p:nvSpPr>
           <p:cNvPr id="2" name="Title 1">
@@ -8647,7 +8955,7 @@
 </p:sld>
 </file>
 
-<file path=ppt/slides/slide17.xml><?xml version="1.0" encoding="utf-8"?>
+<file path=ppt/slides/slide19.xml><?xml version="1.0" encoding="utf-8"?>
 <p:sld xmlns:a="http://schemas.openxmlformats.org/drawingml/2006/main" xmlns:r="http://schemas.openxmlformats.org/officeDocument/2006/relationships" xmlns:p="http://schemas.openxmlformats.org/presentationml/2006/main">
   <p:cSld>
     <p:spTree>
@@ -8882,7 +9190,168 @@
 </p:sld>
 </file>
 
-<file path=ppt/slides/slide18.xml><?xml version="1.0" encoding="utf-8"?>
+<file path=ppt/slides/slide2.xml><?xml version="1.0" encoding="utf-8"?>
+<p:sld xmlns:a="http://schemas.openxmlformats.org/drawingml/2006/main" xmlns:r="http://schemas.openxmlformats.org/officeDocument/2006/relationships" xmlns:p="http://schemas.openxmlformats.org/presentationml/2006/main">
+  <p:cSld>
+    <p:spTree>
+      <p:nvGrpSpPr>
+        <p:cNvPr id="1" name=""/>
+        <p:cNvGrpSpPr/>
+        <p:nvPr/>
+      </p:nvGrpSpPr>
+      <p:grpSpPr>
+        <a:xfrm>
+          <a:off x="0" y="0"/>
+          <a:ext cx="0" cy="0"/>
+          <a:chOff x="0" y="0"/>
+          <a:chExt cx="0" cy="0"/>
+        </a:xfrm>
+      </p:grpSpPr>
+      <p:sp>
+        <p:nvSpPr>
+          <p:cNvPr id="2" name="Title 1">
+            <a:extLst>
+              <a:ext uri="{FF2B5EF4-FFF2-40B4-BE49-F238E27FC236}">
+                <a16:creationId xmlns:a16="http://schemas.microsoft.com/office/drawing/2014/main" id="{50B2387B-16CF-4CE9-80AB-284A8E9456D5}"/>
+              </a:ext>
+            </a:extLst>
+          </p:cNvPr>
+          <p:cNvSpPr>
+            <a:spLocks noGrp="1"/>
+          </p:cNvSpPr>
+          <p:nvPr>
+            <p:ph type="title"/>
+          </p:nvPr>
+        </p:nvSpPr>
+        <p:spPr>
+          <a:xfrm>
+            <a:off x="838200" y="365125"/>
+            <a:ext cx="9751541" cy="1325563"/>
+          </a:xfrm>
+        </p:spPr>
+        <p:txBody>
+          <a:bodyPr/>
+          <a:lstStyle/>
+          <a:p>
+            <a:pPr algn="r"/>
+            <a:r>
+              <a:rPr lang="en-US" dirty="0"/>
+              <a:t>David Giard</a:t>
+            </a:r>
+          </a:p>
+        </p:txBody>
+      </p:sp>
+      <p:pic>
+        <p:nvPicPr>
+          <p:cNvPr id="5" name="Picture 4" descr="David Giard at home">
+            <a:extLst>
+              <a:ext uri="{FF2B5EF4-FFF2-40B4-BE49-F238E27FC236}">
+                <a16:creationId xmlns:a16="http://schemas.microsoft.com/office/drawing/2014/main" id="{4852B208-B8A9-9C88-ED47-F4F675C4E0DA}"/>
+              </a:ext>
+            </a:extLst>
+          </p:cNvPr>
+          <p:cNvPicPr>
+            <a:picLocks noChangeAspect="1"/>
+          </p:cNvPicPr>
+          <p:nvPr/>
+        </p:nvPicPr>
+        <p:blipFill rotWithShape="1">
+          <a:blip r:embed="rId2">
+            <a:extLst>
+              <a:ext uri="{28A0092B-C50C-407E-A947-70E740481C1C}">
+                <a14:useLocalDpi xmlns:a14="http://schemas.microsoft.com/office/drawing/2010/main" val="0"/>
+              </a:ext>
+            </a:extLst>
+          </a:blip>
+          <a:srcRect r="27263"/>
+          <a:stretch/>
+        </p:blipFill>
+        <p:spPr>
+          <a:xfrm>
+            <a:off x="0" y="0"/>
+            <a:ext cx="6651099" cy="6858000"/>
+          </a:xfrm>
+          <a:prstGeom prst="rect">
+            <a:avLst/>
+          </a:prstGeom>
+        </p:spPr>
+      </p:pic>
+      <p:sp>
+        <p:nvSpPr>
+          <p:cNvPr id="4" name="Title 1">
+            <a:extLst>
+              <a:ext uri="{FF2B5EF4-FFF2-40B4-BE49-F238E27FC236}">
+                <a16:creationId xmlns:a16="http://schemas.microsoft.com/office/drawing/2014/main" id="{254E783C-7579-0B95-0526-F5F676084283}"/>
+              </a:ext>
+            </a:extLst>
+          </p:cNvPr>
+          <p:cNvSpPr txBox="1">
+            <a:spLocks/>
+          </p:cNvSpPr>
+          <p:nvPr/>
+        </p:nvSpPr>
+        <p:spPr>
+          <a:xfrm>
+            <a:off x="838200" y="1472118"/>
+            <a:ext cx="9751541" cy="1325563"/>
+          </a:xfrm>
+          <a:prstGeom prst="rect">
+            <a:avLst/>
+          </a:prstGeom>
+        </p:spPr>
+        <p:txBody>
+          <a:bodyPr vert="horz" lIns="91440" tIns="45720" rIns="91440" bIns="45720" rtlCol="0" anchor="ctr">
+            <a:normAutofit/>
+          </a:bodyPr>
+          <a:lstStyle>
+            <a:lvl1pPr algn="l" defTabSz="914400" rtl="0" eaLnBrk="1" latinLnBrk="0" hangingPunct="1">
+              <a:lnSpc>
+                <a:spcPct val="90000"/>
+              </a:lnSpc>
+              <a:spcBef>
+                <a:spcPct val="0"/>
+              </a:spcBef>
+              <a:buNone/>
+              <a:defRPr sz="4400" kern="1200">
+                <a:solidFill>
+                  <a:schemeClr val="tx1"/>
+                </a:solidFill>
+                <a:latin typeface="+mj-lt"/>
+                <a:ea typeface="+mj-ea"/>
+                <a:cs typeface="+mj-cs"/>
+              </a:defRPr>
+            </a:lvl1pPr>
+          </a:lstStyle>
+          <a:p>
+            <a:pPr algn="r"/>
+            <a:r>
+              <a:rPr lang="en-US" sz="2800" dirty="0"/>
+              <a:t>Microsoft</a:t>
+            </a:r>
+          </a:p>
+          <a:p>
+            <a:pPr algn="r"/>
+            <a:r>
+              <a:rPr lang="en-US" sz="2800" dirty="0"/>
+              <a:t>Cloud Solution Architect</a:t>
+            </a:r>
+          </a:p>
+        </p:txBody>
+      </p:sp>
+    </p:spTree>
+    <p:extLst>
+      <p:ext uri="{BB962C8B-B14F-4D97-AF65-F5344CB8AC3E}">
+        <p14:creationId xmlns:p14="http://schemas.microsoft.com/office/powerpoint/2010/main" val="1292035122"/>
+      </p:ext>
+    </p:extLst>
+  </p:cSld>
+  <p:clrMapOvr>
+    <a:masterClrMapping/>
+  </p:clrMapOvr>
+</p:sld>
+</file>
+
+<file path=ppt/slides/slide20.xml><?xml version="1.0" encoding="utf-8"?>
 <p:sld xmlns:a="http://schemas.openxmlformats.org/drawingml/2006/main" xmlns:r="http://schemas.openxmlformats.org/officeDocument/2006/relationships" xmlns:p="http://schemas.openxmlformats.org/presentationml/2006/main">
   <p:cSld>
     <p:spTree>
@@ -9115,7 +9584,7 @@
 </p:sld>
 </file>
 
-<file path=ppt/slides/slide19.xml><?xml version="1.0" encoding="utf-8"?>
+<file path=ppt/slides/slide21.xml><?xml version="1.0" encoding="utf-8"?>
 <p:sld xmlns:a="http://schemas.openxmlformats.org/drawingml/2006/main" xmlns:r="http://schemas.openxmlformats.org/officeDocument/2006/relationships" xmlns:p="http://schemas.openxmlformats.org/presentationml/2006/main">
   <p:cSld>
     <p:spTree>
@@ -9198,106 +9667,7 @@
 </p:sld>
 </file>
 
-<file path=ppt/slides/slide2.xml><?xml version="1.0" encoding="utf-8"?>
-<p:sld xmlns:a="http://schemas.openxmlformats.org/drawingml/2006/main" xmlns:r="http://schemas.openxmlformats.org/officeDocument/2006/relationships" xmlns:p="http://schemas.openxmlformats.org/presentationml/2006/main">
-  <p:cSld>
-    <p:spTree>
-      <p:nvGrpSpPr>
-        <p:cNvPr id="1" name=""/>
-        <p:cNvGrpSpPr/>
-        <p:nvPr/>
-      </p:nvGrpSpPr>
-      <p:grpSpPr>
-        <a:xfrm>
-          <a:off x="0" y="0"/>
-          <a:ext cx="0" cy="0"/>
-          <a:chOff x="0" y="0"/>
-          <a:chExt cx="0" cy="0"/>
-        </a:xfrm>
-      </p:grpSpPr>
-      <p:sp>
-        <p:nvSpPr>
-          <p:cNvPr id="2" name="Title 1">
-            <a:extLst>
-              <a:ext uri="{FF2B5EF4-FFF2-40B4-BE49-F238E27FC236}">
-                <a16:creationId xmlns:a16="http://schemas.microsoft.com/office/drawing/2014/main" id="{50B2387B-16CF-4CE9-80AB-284A8E9456D5}"/>
-              </a:ext>
-            </a:extLst>
-          </p:cNvPr>
-          <p:cNvSpPr>
-            <a:spLocks noGrp="1"/>
-          </p:cNvSpPr>
-          <p:nvPr>
-            <p:ph type="title"/>
-          </p:nvPr>
-        </p:nvSpPr>
-        <p:spPr>
-          <a:xfrm>
-            <a:off x="838200" y="365125"/>
-            <a:ext cx="9751541" cy="1325563"/>
-          </a:xfrm>
-        </p:spPr>
-        <p:txBody>
-          <a:bodyPr/>
-          <a:lstStyle/>
-          <a:p>
-            <a:pPr algn="r"/>
-            <a:r>
-              <a:rPr lang="en-US" dirty="0"/>
-              <a:t>David Giard</a:t>
-            </a:r>
-          </a:p>
-        </p:txBody>
-      </p:sp>
-      <p:pic>
-        <p:nvPicPr>
-          <p:cNvPr id="5" name="Picture 4" descr="David Giard at home">
-            <a:extLst>
-              <a:ext uri="{FF2B5EF4-FFF2-40B4-BE49-F238E27FC236}">
-                <a16:creationId xmlns:a16="http://schemas.microsoft.com/office/drawing/2014/main" id="{4852B208-B8A9-9C88-ED47-F4F675C4E0DA}"/>
-              </a:ext>
-            </a:extLst>
-          </p:cNvPr>
-          <p:cNvPicPr>
-            <a:picLocks noChangeAspect="1"/>
-          </p:cNvPicPr>
-          <p:nvPr/>
-        </p:nvPicPr>
-        <p:blipFill rotWithShape="1">
-          <a:blip r:embed="rId2">
-            <a:extLst>
-              <a:ext uri="{28A0092B-C50C-407E-A947-70E740481C1C}">
-                <a14:useLocalDpi xmlns:a14="http://schemas.microsoft.com/office/drawing/2010/main" val="0"/>
-              </a:ext>
-            </a:extLst>
-          </a:blip>
-          <a:srcRect r="27263"/>
-          <a:stretch/>
-        </p:blipFill>
-        <p:spPr>
-          <a:xfrm>
-            <a:off x="0" y="0"/>
-            <a:ext cx="6651099" cy="6858000"/>
-          </a:xfrm>
-          <a:prstGeom prst="rect">
-            <a:avLst/>
-          </a:prstGeom>
-        </p:spPr>
-      </p:pic>
-    </p:spTree>
-    <p:extLst>
-      <p:ext uri="{BB962C8B-B14F-4D97-AF65-F5344CB8AC3E}">
-        <p14:creationId xmlns:p14="http://schemas.microsoft.com/office/powerpoint/2010/main" val="1292035122"/>
-      </p:ext>
-    </p:extLst>
-  </p:cSld>
-  <p:clrMapOvr>
-    <a:masterClrMapping/>
-  </p:clrMapOvr>
-</p:sld>
-</file>
-
-<file path=ppt/slides/slide20.xml><?xml version="1.0" encoding="utf-8"?>
+<file path=ppt/slides/slide22.xml><?xml version="1.0" encoding="utf-8"?>
 <p:sld xmlns:a="http://schemas.openxmlformats.org/drawingml/2006/main" xmlns:r="http://schemas.openxmlformats.org/officeDocument/2006/relationships" xmlns:p="http://schemas.openxmlformats.org/presentationml/2006/main">
   <p:cSld>
     <p:spTree>
@@ -9521,196 +9891,6 @@
 </p:sld>
 </file>
 
-<file path=ppt/slides/slide21.xml><?xml version="1.0" encoding="utf-8"?>
-<p:sld xmlns:a="http://schemas.openxmlformats.org/drawingml/2006/main" xmlns:r="http://schemas.openxmlformats.org/officeDocument/2006/relationships" xmlns:p="http://schemas.openxmlformats.org/presentationml/2006/main">
-  <p:cSld>
-    <p:spTree>
-      <p:nvGrpSpPr>
-        <p:cNvPr id="1" name=""/>
-        <p:cNvGrpSpPr/>
-        <p:nvPr/>
-      </p:nvGrpSpPr>
-      <p:grpSpPr>
-        <a:xfrm>
-          <a:off x="0" y="0"/>
-          <a:ext cx="0" cy="0"/>
-          <a:chOff x="0" y="0"/>
-          <a:chExt cx="0" cy="0"/>
-        </a:xfrm>
-      </p:grpSpPr>
-      <p:sp>
-        <p:nvSpPr>
-          <p:cNvPr id="2" name="Title 1">
-            <a:extLst>
-              <a:ext uri="{FF2B5EF4-FFF2-40B4-BE49-F238E27FC236}">
-                <a16:creationId xmlns:a16="http://schemas.microsoft.com/office/drawing/2014/main" id="{70D4803A-C4FF-4EAE-A0A1-E900598B8B68}"/>
-              </a:ext>
-            </a:extLst>
-          </p:cNvPr>
-          <p:cNvSpPr>
-            <a:spLocks noGrp="1"/>
-          </p:cNvSpPr>
-          <p:nvPr>
-            <p:ph type="title"/>
-          </p:nvPr>
-        </p:nvSpPr>
-        <p:spPr/>
-        <p:txBody>
-          <a:bodyPr>
-            <a:normAutofit/>
-          </a:bodyPr>
-          <a:lstStyle/>
-          <a:p>
-            <a:pPr rtl="0" eaLnBrk="1" latinLnBrk="0" hangingPunct="1"/>
-            <a:r>
-              <a:rPr lang="en-US" sz="4400" kern="1200" dirty="0">
-                <a:solidFill>
-                  <a:schemeClr val="tx1"/>
-                </a:solidFill>
-                <a:effectLst/>
-                <a:latin typeface="+mj-lt"/>
-                <a:ea typeface="+mj-ea"/>
-                <a:cs typeface="+mj-cs"/>
-              </a:rPr>
-              <a:t>Don’t Delay</a:t>
-            </a:r>
-            <a:endParaRPr lang="en-US" dirty="0"/>
-          </a:p>
-        </p:txBody>
-      </p:sp>
-      <p:sp>
-        <p:nvSpPr>
-          <p:cNvPr id="3" name="Content Placeholder 2">
-            <a:extLst>
-              <a:ext uri="{FF2B5EF4-FFF2-40B4-BE49-F238E27FC236}">
-                <a16:creationId xmlns:a16="http://schemas.microsoft.com/office/drawing/2014/main" id="{F59A0FCF-4EB3-4519-A55C-F66098357CFD}"/>
-              </a:ext>
-            </a:extLst>
-          </p:cNvPr>
-          <p:cNvSpPr>
-            <a:spLocks noGrp="1"/>
-          </p:cNvSpPr>
-          <p:nvPr>
-            <p:ph idx="1"/>
-          </p:nvPr>
-        </p:nvSpPr>
-        <p:spPr/>
-        <p:txBody>
-          <a:bodyPr/>
-          <a:lstStyle/>
-          <a:p>
-            <a:endParaRPr lang="en-US"/>
-          </a:p>
-        </p:txBody>
-      </p:sp>
-    </p:spTree>
-    <p:extLst>
-      <p:ext uri="{BB962C8B-B14F-4D97-AF65-F5344CB8AC3E}">
-        <p14:creationId xmlns:p14="http://schemas.microsoft.com/office/powerpoint/2010/main" val="3388759464"/>
-      </p:ext>
-    </p:extLst>
-  </p:cSld>
-  <p:clrMapOvr>
-    <a:masterClrMapping/>
-  </p:clrMapOvr>
-</p:sld>
-</file>
-
-<file path=ppt/slides/slide22.xml><?xml version="1.0" encoding="utf-8"?>
-<p:sld xmlns:a="http://schemas.openxmlformats.org/drawingml/2006/main" xmlns:r="http://schemas.openxmlformats.org/officeDocument/2006/relationships" xmlns:p="http://schemas.openxmlformats.org/presentationml/2006/main">
-  <p:cSld>
-    <p:spTree>
-      <p:nvGrpSpPr>
-        <p:cNvPr id="1" name=""/>
-        <p:cNvGrpSpPr/>
-        <p:nvPr/>
-      </p:nvGrpSpPr>
-      <p:grpSpPr>
-        <a:xfrm>
-          <a:off x="0" y="0"/>
-          <a:ext cx="0" cy="0"/>
-          <a:chOff x="0" y="0"/>
-          <a:chExt cx="0" cy="0"/>
-        </a:xfrm>
-      </p:grpSpPr>
-      <p:sp>
-        <p:nvSpPr>
-          <p:cNvPr id="2" name="Title 1">
-            <a:extLst>
-              <a:ext uri="{FF2B5EF4-FFF2-40B4-BE49-F238E27FC236}">
-                <a16:creationId xmlns:a16="http://schemas.microsoft.com/office/drawing/2014/main" id="{DC639A60-E5A9-4810-8D1E-45F56C3F96EF}"/>
-              </a:ext>
-            </a:extLst>
-          </p:cNvPr>
-          <p:cNvSpPr>
-            <a:spLocks noGrp="1"/>
-          </p:cNvSpPr>
-          <p:nvPr>
-            <p:ph type="title"/>
-          </p:nvPr>
-        </p:nvSpPr>
-        <p:spPr/>
-        <p:txBody>
-          <a:bodyPr>
-            <a:normAutofit/>
-          </a:bodyPr>
-          <a:lstStyle/>
-          <a:p>
-            <a:pPr rtl="0" eaLnBrk="1" latinLnBrk="0" hangingPunct="1"/>
-            <a:r>
-              <a:rPr lang="en-US" sz="4400" kern="1200" dirty="0">
-                <a:solidFill>
-                  <a:schemeClr val="tx1"/>
-                </a:solidFill>
-                <a:effectLst/>
-                <a:latin typeface="+mj-lt"/>
-                <a:ea typeface="+mj-ea"/>
-                <a:cs typeface="+mj-cs"/>
-              </a:rPr>
-              <a:t>Work High Level to Low Level</a:t>
-            </a:r>
-            <a:endParaRPr lang="en-US" dirty="0"/>
-          </a:p>
-        </p:txBody>
-      </p:sp>
-      <p:sp>
-        <p:nvSpPr>
-          <p:cNvPr id="3" name="Content Placeholder 2">
-            <a:extLst>
-              <a:ext uri="{FF2B5EF4-FFF2-40B4-BE49-F238E27FC236}">
-                <a16:creationId xmlns:a16="http://schemas.microsoft.com/office/drawing/2014/main" id="{1B0268D1-74E0-42EC-86E4-76637B1B2E23}"/>
-              </a:ext>
-            </a:extLst>
-          </p:cNvPr>
-          <p:cNvSpPr>
-            <a:spLocks noGrp="1"/>
-          </p:cNvSpPr>
-          <p:nvPr>
-            <p:ph idx="1"/>
-          </p:nvPr>
-        </p:nvSpPr>
-        <p:spPr/>
-        <p:txBody>
-          <a:bodyPr/>
-          <a:lstStyle/>
-          <a:p>
-            <a:endParaRPr lang="en-US"/>
-          </a:p>
-        </p:txBody>
-      </p:sp>
-    </p:spTree>
-    <p:extLst>
-      <p:ext uri="{BB962C8B-B14F-4D97-AF65-F5344CB8AC3E}">
-        <p14:creationId xmlns:p14="http://schemas.microsoft.com/office/powerpoint/2010/main" val="1401221868"/>
-      </p:ext>
-    </p:extLst>
-  </p:cSld>
-  <p:clrMapOvr>
-    <a:masterClrMapping/>
-  </p:clrMapOvr>
-</p:sld>
-</file>
-
 <file path=ppt/slides/slide23.xml><?xml version="1.0" encoding="utf-8"?>
 <p:sld xmlns:a="http://schemas.openxmlformats.org/drawingml/2006/main" xmlns:r="http://schemas.openxmlformats.org/officeDocument/2006/relationships" xmlns:p="http://schemas.openxmlformats.org/presentationml/2006/main">
   <p:cSld>
@@ -9733,7 +9913,7 @@
           <p:cNvPr id="2" name="Title 1">
             <a:extLst>
               <a:ext uri="{FF2B5EF4-FFF2-40B4-BE49-F238E27FC236}">
-                <a16:creationId xmlns:a16="http://schemas.microsoft.com/office/drawing/2014/main" id="{42581139-FDE8-47B2-AF45-D6DF888E2BBD}"/>
+                <a16:creationId xmlns:a16="http://schemas.microsoft.com/office/drawing/2014/main" id="{70D4803A-C4FF-4EAE-A0A1-E900598B8B68}"/>
               </a:ext>
             </a:extLst>
           </p:cNvPr>
@@ -9762,7 +9942,7 @@
                 <a:ea typeface="+mj-ea"/>
                 <a:cs typeface="+mj-cs"/>
               </a:rPr>
-              <a:t>Use the Computer</a:t>
+              <a:t>Don’t Delay</a:t>
             </a:r>
             <a:endParaRPr lang="en-US" dirty="0"/>
           </a:p>
@@ -9773,7 +9953,7 @@
           <p:cNvPr id="3" name="Content Placeholder 2">
             <a:extLst>
               <a:ext uri="{FF2B5EF4-FFF2-40B4-BE49-F238E27FC236}">
-                <a16:creationId xmlns:a16="http://schemas.microsoft.com/office/drawing/2014/main" id="{E21C6901-8D49-4DA7-B41E-54BD2C3371FE}"/>
+                <a16:creationId xmlns:a16="http://schemas.microsoft.com/office/drawing/2014/main" id="{F59A0FCF-4EB3-4519-A55C-F66098357CFD}"/>
               </a:ext>
             </a:extLst>
           </p:cNvPr>
@@ -9796,7 +9976,7 @@
     </p:spTree>
     <p:extLst>
       <p:ext uri="{BB962C8B-B14F-4D97-AF65-F5344CB8AC3E}">
-        <p14:creationId xmlns:p14="http://schemas.microsoft.com/office/powerpoint/2010/main" val="1124065303"/>
+        <p14:creationId xmlns:p14="http://schemas.microsoft.com/office/powerpoint/2010/main" val="3388759464"/>
       </p:ext>
     </p:extLst>
   </p:cSld>
@@ -9828,7 +10008,7 @@
           <p:cNvPr id="2" name="Title 1">
             <a:extLst>
               <a:ext uri="{FF2B5EF4-FFF2-40B4-BE49-F238E27FC236}">
-                <a16:creationId xmlns:a16="http://schemas.microsoft.com/office/drawing/2014/main" id="{33948246-9242-430D-BF02-AFEFA6AA7060}"/>
+                <a16:creationId xmlns:a16="http://schemas.microsoft.com/office/drawing/2014/main" id="{DC639A60-E5A9-4810-8D1E-45F56C3F96EF}"/>
               </a:ext>
             </a:extLst>
           </p:cNvPr>
@@ -9857,7 +10037,7 @@
                 <a:ea typeface="+mj-ea"/>
                 <a:cs typeface="+mj-cs"/>
               </a:rPr>
-              <a:t>Create a Style Guide</a:t>
+              <a:t>Work High Level to Low Level</a:t>
             </a:r>
             <a:endParaRPr lang="en-US" dirty="0"/>
           </a:p>
@@ -9868,7 +10048,7 @@
           <p:cNvPr id="3" name="Content Placeholder 2">
             <a:extLst>
               <a:ext uri="{FF2B5EF4-FFF2-40B4-BE49-F238E27FC236}">
-                <a16:creationId xmlns:a16="http://schemas.microsoft.com/office/drawing/2014/main" id="{DC033FC2-8510-4ED9-BBB0-A58D06017D62}"/>
+                <a16:creationId xmlns:a16="http://schemas.microsoft.com/office/drawing/2014/main" id="{1B0268D1-74E0-42EC-86E4-76637B1B2E23}"/>
               </a:ext>
             </a:extLst>
           </p:cNvPr>
@@ -9884,51 +10064,14 @@
           <a:bodyPr/>
           <a:lstStyle/>
           <a:p>
-            <a:r>
-              <a:rPr lang="en-US" dirty="0"/>
-              <a:t>Create your own</a:t>
-            </a:r>
-          </a:p>
-          <a:p>
-            <a:r>
-              <a:rPr lang="en-US" dirty="0"/>
-              <a:t>Borrow one (e.g., </a:t>
-            </a:r>
-            <a:r>
-              <a:rPr lang="en-US" dirty="0">
-                <a:hlinkClick r:id="rId3"/>
-              </a:rPr>
-              <a:t>google.github.io/</a:t>
-            </a:r>
-            <a:r>
-              <a:rPr lang="en-US" dirty="0" err="1">
-                <a:hlinkClick r:id="rId3"/>
-              </a:rPr>
-              <a:t>styleguide</a:t>
-            </a:r>
-            <a:r>
-              <a:rPr lang="en-US" dirty="0"/>
-              <a:t>) </a:t>
-            </a:r>
-          </a:p>
-          <a:p>
-            <a:r>
-              <a:rPr lang="en-US" dirty="0"/>
-              <a:t>Allow guide to evolve over time</a:t>
-            </a:r>
-          </a:p>
-          <a:p>
-            <a:r>
-              <a:rPr lang="en-US" dirty="0"/>
-              <a:t>Don’t waste review time arguing over style</a:t>
-            </a:r>
+            <a:endParaRPr lang="en-US"/>
           </a:p>
         </p:txBody>
       </p:sp>
     </p:spTree>
     <p:extLst>
       <p:ext uri="{BB962C8B-B14F-4D97-AF65-F5344CB8AC3E}">
-        <p14:creationId xmlns:p14="http://schemas.microsoft.com/office/powerpoint/2010/main" val="4059051589"/>
+        <p14:creationId xmlns:p14="http://schemas.microsoft.com/office/powerpoint/2010/main" val="1401221868"/>
       </p:ext>
     </p:extLst>
   </p:cSld>
@@ -9960,7 +10103,7 @@
           <p:cNvPr id="2" name="Title 1">
             <a:extLst>
               <a:ext uri="{FF2B5EF4-FFF2-40B4-BE49-F238E27FC236}">
-                <a16:creationId xmlns:a16="http://schemas.microsoft.com/office/drawing/2014/main" id="{25E4B825-584A-40C2-AE87-D63CA582B86D}"/>
+                <a16:creationId xmlns:a16="http://schemas.microsoft.com/office/drawing/2014/main" id="{42581139-FDE8-47B2-AF45-D6DF888E2BBD}"/>
               </a:ext>
             </a:extLst>
           </p:cNvPr>
@@ -9989,7 +10132,7 @@
                 <a:ea typeface="+mj-ea"/>
                 <a:cs typeface="+mj-cs"/>
               </a:rPr>
-              <a:t>Include Code Examples</a:t>
+              <a:t>Use the Computer</a:t>
             </a:r>
             <a:endParaRPr lang="en-US" dirty="0"/>
           </a:p>
@@ -10000,7 +10143,7 @@
           <p:cNvPr id="3" name="Content Placeholder 2">
             <a:extLst>
               <a:ext uri="{FF2B5EF4-FFF2-40B4-BE49-F238E27FC236}">
-                <a16:creationId xmlns:a16="http://schemas.microsoft.com/office/drawing/2014/main" id="{AA02B509-6860-4B81-82E6-311CA50A834D}"/>
+                <a16:creationId xmlns:a16="http://schemas.microsoft.com/office/drawing/2014/main" id="{E21C6901-8D49-4DA7-B41E-54BD2C3371FE}"/>
               </a:ext>
             </a:extLst>
           </p:cNvPr>
@@ -10016,14 +10159,14 @@
           <a:bodyPr/>
           <a:lstStyle/>
           <a:p>
-            <a:endParaRPr lang="en-US" dirty="0"/>
+            <a:endParaRPr lang="en-US"/>
           </a:p>
         </p:txBody>
       </p:sp>
     </p:spTree>
     <p:extLst>
       <p:ext uri="{BB962C8B-B14F-4D97-AF65-F5344CB8AC3E}">
-        <p14:creationId xmlns:p14="http://schemas.microsoft.com/office/powerpoint/2010/main" val="1101141667"/>
+        <p14:creationId xmlns:p14="http://schemas.microsoft.com/office/powerpoint/2010/main" val="1124065303"/>
       </p:ext>
     </p:extLst>
   </p:cSld>
@@ -10055,7 +10198,7 @@
           <p:cNvPr id="2" name="Title 1">
             <a:extLst>
               <a:ext uri="{FF2B5EF4-FFF2-40B4-BE49-F238E27FC236}">
-                <a16:creationId xmlns:a16="http://schemas.microsoft.com/office/drawing/2014/main" id="{E52E02DD-634B-0D61-1198-3E878E965DB3}"/>
+                <a16:creationId xmlns:a16="http://schemas.microsoft.com/office/drawing/2014/main" id="{33948246-9242-430D-BF02-AFEFA6AA7060}"/>
               </a:ext>
             </a:extLst>
           </p:cNvPr>
@@ -10068,43 +10211,12 @@
         </p:nvSpPr>
         <p:spPr/>
         <p:txBody>
-          <a:bodyPr/>
-          <a:lstStyle/>
-          <a:p>
-            <a:r>
-              <a:rPr lang="en-US" dirty="0"/>
-              <a:t>Do Not</a:t>
-            </a:r>
-            <a:r>
-              <a:rPr lang="en-US" baseline="0" dirty="0"/>
-              <a:t> Make It Personal</a:t>
-            </a:r>
-            <a:endParaRPr lang="en-US" dirty="0"/>
-          </a:p>
-        </p:txBody>
-      </p:sp>
-      <p:sp>
-        <p:nvSpPr>
-          <p:cNvPr id="3" name="Content Placeholder 2">
-            <a:extLst>
-              <a:ext uri="{FF2B5EF4-FFF2-40B4-BE49-F238E27FC236}">
-                <a16:creationId xmlns:a16="http://schemas.microsoft.com/office/drawing/2014/main" id="{E25687BC-E243-6F5C-A91E-8893F9E7E688}"/>
-              </a:ext>
-            </a:extLst>
-          </p:cNvPr>
-          <p:cNvSpPr>
-            <a:spLocks noGrp="1"/>
-          </p:cNvSpPr>
-          <p:nvPr>
-            <p:ph idx="1"/>
-          </p:nvPr>
-        </p:nvSpPr>
-        <p:spPr/>
-        <p:txBody>
-          <a:bodyPr/>
-          <a:lstStyle/>
-          <a:p>
-            <a:pPr lvl="0" rtl="0" eaLnBrk="1" latinLnBrk="0" hangingPunct="1"/>
+          <a:bodyPr>
+            <a:normAutofit/>
+          </a:bodyPr>
+          <a:lstStyle/>
+          <a:p>
+            <a:pPr rtl="0" eaLnBrk="1" latinLnBrk="0" hangingPunct="1"/>
             <a:r>
               <a:rPr lang="en-US" sz="4400" kern="1200" dirty="0">
                 <a:solidFill>
@@ -10115,53 +10227,70 @@
                 <a:ea typeface="+mj-ea"/>
                 <a:cs typeface="+mj-cs"/>
               </a:rPr>
-              <a:t>Do Not Say “YOU”</a:t>
-            </a:r>
-          </a:p>
-          <a:p>
-            <a:pPr lvl="0" rtl="0" eaLnBrk="1" latinLnBrk="0" hangingPunct="1"/>
-            <a:r>
-              <a:rPr lang="en-US" sz="4400" kern="1200" dirty="0">
-                <a:solidFill>
-                  <a:schemeClr val="tx1"/>
-                </a:solidFill>
-                <a:effectLst/>
-                <a:latin typeface="+mj-lt"/>
-                <a:ea typeface="+mj-ea"/>
-                <a:cs typeface="+mj-cs"/>
+              <a:t>Create a Style Guide</a:t>
+            </a:r>
+            <a:endParaRPr lang="en-US" dirty="0"/>
+          </a:p>
+        </p:txBody>
+      </p:sp>
+      <p:sp>
+        <p:nvSpPr>
+          <p:cNvPr id="3" name="Content Placeholder 2">
+            <a:extLst>
+              <a:ext uri="{FF2B5EF4-FFF2-40B4-BE49-F238E27FC236}">
+                <a16:creationId xmlns:a16="http://schemas.microsoft.com/office/drawing/2014/main" id="{DC033FC2-8510-4ED9-BBB0-A58D06017D62}"/>
+              </a:ext>
+            </a:extLst>
+          </p:cNvPr>
+          <p:cNvSpPr>
+            <a:spLocks noGrp="1"/>
+          </p:cNvSpPr>
+          <p:nvPr>
+            <p:ph idx="1"/>
+          </p:nvPr>
+        </p:nvSpPr>
+        <p:spPr/>
+        <p:txBody>
+          <a:bodyPr/>
+          <a:lstStyle/>
+          <a:p>
+            <a:r>
+              <a:rPr lang="en-US" dirty="0"/>
+              <a:t>Create your own</a:t>
+            </a:r>
+          </a:p>
+          <a:p>
+            <a:r>
+              <a:rPr lang="en-US" dirty="0"/>
+              <a:t>Borrow one (e.g., </a:t>
+            </a:r>
+            <a:r>
+              <a:rPr lang="en-US" dirty="0">
+                <a:hlinkClick r:id="rId3"/>
               </a:rPr>
-              <a:t>Requests</a:t>
-            </a:r>
-            <a:r>
-              <a:rPr lang="en-US" dirty="0"/>
-              <a:t>;</a:t>
-            </a:r>
-            <a:r>
-              <a:rPr lang="en-US" sz="4400" kern="1200" dirty="0">
-                <a:solidFill>
-                  <a:schemeClr val="tx1"/>
-                </a:solidFill>
-                <a:effectLst/>
-                <a:latin typeface="+mj-lt"/>
-                <a:ea typeface="+mj-ea"/>
-                <a:cs typeface="+mj-cs"/>
+              <a:t>google.github.io/</a:t>
+            </a:r>
+            <a:r>
+              <a:rPr lang="en-US" dirty="0" err="1">
+                <a:hlinkClick r:id="rId3"/>
               </a:rPr>
-              <a:t> not Commands</a:t>
-            </a:r>
-          </a:p>
-          <a:p>
-            <a:pPr lvl="0" rtl="0" eaLnBrk="1" latinLnBrk="0" hangingPunct="1"/>
-            <a:r>
-              <a:rPr lang="en-US" sz="4400" kern="1200" dirty="0">
-                <a:solidFill>
-                  <a:schemeClr val="tx1"/>
-                </a:solidFill>
-                <a:effectLst/>
-                <a:latin typeface="+mj-lt"/>
-                <a:ea typeface="+mj-ea"/>
-                <a:cs typeface="+mj-cs"/>
-              </a:rPr>
-              <a:t>Principles; not Opinions</a:t>
+              <a:t>styleguide</a:t>
+            </a:r>
+            <a:r>
+              <a:rPr lang="en-US" dirty="0"/>
+              <a:t>) </a:t>
+            </a:r>
+          </a:p>
+          <a:p>
+            <a:r>
+              <a:rPr lang="en-US" dirty="0"/>
+              <a:t>Allow guide to evolve over time</a:t>
+            </a:r>
+          </a:p>
+          <a:p>
+            <a:r>
+              <a:rPr lang="en-US" dirty="0"/>
+              <a:t>Don’t waste review time arguing over style</a:t>
             </a:r>
           </a:p>
         </p:txBody>
@@ -10169,7 +10298,7 @@
     </p:spTree>
     <p:extLst>
       <p:ext uri="{BB962C8B-B14F-4D97-AF65-F5344CB8AC3E}">
-        <p14:creationId xmlns:p14="http://schemas.microsoft.com/office/powerpoint/2010/main" val="741424649"/>
+        <p14:creationId xmlns:p14="http://schemas.microsoft.com/office/powerpoint/2010/main" val="4059051589"/>
       </p:ext>
     </p:extLst>
   </p:cSld>
@@ -10201,7 +10330,7 @@
           <p:cNvPr id="2" name="Title 1">
             <a:extLst>
               <a:ext uri="{FF2B5EF4-FFF2-40B4-BE49-F238E27FC236}">
-                <a16:creationId xmlns:a16="http://schemas.microsoft.com/office/drawing/2014/main" id="{291BEF2D-0A52-BFE1-8F98-FDB0B873DF62}"/>
+                <a16:creationId xmlns:a16="http://schemas.microsoft.com/office/drawing/2014/main" id="{25E4B825-584A-40C2-AE87-D63CA582B86D}"/>
               </a:ext>
             </a:extLst>
           </p:cNvPr>
@@ -10214,13 +10343,25 @@
         </p:nvSpPr>
         <p:spPr/>
         <p:txBody>
-          <a:bodyPr/>
-          <a:lstStyle/>
-          <a:p>
-            <a:r>
-              <a:rPr lang="en-US" dirty="0"/>
-              <a:t>Prefix review comments with labels:</a:t>
-            </a:r>
+          <a:bodyPr>
+            <a:normAutofit/>
+          </a:bodyPr>
+          <a:lstStyle/>
+          <a:p>
+            <a:pPr rtl="0" eaLnBrk="1" latinLnBrk="0" hangingPunct="1"/>
+            <a:r>
+              <a:rPr lang="en-US" sz="4400" kern="1200" dirty="0">
+                <a:solidFill>
+                  <a:schemeClr val="tx1"/>
+                </a:solidFill>
+                <a:effectLst/>
+                <a:latin typeface="+mj-lt"/>
+                <a:ea typeface="+mj-ea"/>
+                <a:cs typeface="+mj-cs"/>
+              </a:rPr>
+              <a:t>Include Code Examples</a:t>
+            </a:r>
+            <a:endParaRPr lang="en-US" dirty="0"/>
           </a:p>
         </p:txBody>
       </p:sp>
@@ -10229,7 +10370,7 @@
           <p:cNvPr id="3" name="Content Placeholder 2">
             <a:extLst>
               <a:ext uri="{FF2B5EF4-FFF2-40B4-BE49-F238E27FC236}">
-                <a16:creationId xmlns:a16="http://schemas.microsoft.com/office/drawing/2014/main" id="{031337D1-73EC-A1AA-46AB-09ADBC36299D}"/>
+                <a16:creationId xmlns:a16="http://schemas.microsoft.com/office/drawing/2014/main" id="{AA02B509-6860-4B81-82E6-311CA50A834D}"/>
               </a:ext>
             </a:extLst>
           </p:cNvPr>
@@ -10244,48 +10385,6 @@
         <p:txBody>
           <a:bodyPr/>
           <a:lstStyle/>
-          <a:p>
-            <a:r>
-              <a:rPr lang="en-US" dirty="0"/>
-              <a:t>Issue: </a:t>
-            </a:r>
-          </a:p>
-          <a:p>
-            <a:r>
-              <a:rPr lang="en-US" dirty="0"/>
-              <a:t>Suggestion:</a:t>
-            </a:r>
-          </a:p>
-          <a:p>
-            <a:r>
-              <a:rPr lang="en-US" dirty="0"/>
-              <a:t>Question: </a:t>
-            </a:r>
-          </a:p>
-          <a:p>
-            <a:r>
-              <a:rPr lang="en-US" dirty="0"/>
-              <a:t>Nit: </a:t>
-            </a:r>
-          </a:p>
-          <a:p>
-            <a:r>
-              <a:rPr lang="en-US" dirty="0"/>
-              <a:t>Thought: </a:t>
-            </a:r>
-          </a:p>
-          <a:p>
-            <a:r>
-              <a:rPr lang="en-US" dirty="0"/>
-              <a:t>Chore: </a:t>
-            </a:r>
-          </a:p>
-          <a:p>
-            <a:r>
-              <a:rPr lang="en-US" dirty="0"/>
-              <a:t>Praise: </a:t>
-            </a:r>
-          </a:p>
           <a:p>
             <a:endParaRPr lang="en-US" dirty="0"/>
           </a:p>
@@ -10294,7 +10393,7 @@
     </p:spTree>
     <p:extLst>
       <p:ext uri="{BB962C8B-B14F-4D97-AF65-F5344CB8AC3E}">
-        <p14:creationId xmlns:p14="http://schemas.microsoft.com/office/powerpoint/2010/main" val="1374117594"/>
+        <p14:creationId xmlns:p14="http://schemas.microsoft.com/office/powerpoint/2010/main" val="1101141667"/>
       </p:ext>
     </p:extLst>
   </p:cSld>
@@ -10326,7 +10425,7 @@
           <p:cNvPr id="2" name="Title 1">
             <a:extLst>
               <a:ext uri="{FF2B5EF4-FFF2-40B4-BE49-F238E27FC236}">
-                <a16:creationId xmlns:a16="http://schemas.microsoft.com/office/drawing/2014/main" id="{291BEF2D-0A52-BFE1-8F98-FDB0B873DF62}"/>
+                <a16:creationId xmlns:a16="http://schemas.microsoft.com/office/drawing/2014/main" id="{E52E02DD-634B-0D61-1198-3E878E965DB3}"/>
               </a:ext>
             </a:extLst>
           </p:cNvPr>
@@ -10344,8 +10443,13 @@
           <a:p>
             <a:r>
               <a:rPr lang="en-US" dirty="0"/>
-              <a:t>Prefix review comments with labels:</a:t>
-            </a:r>
+              <a:t>Do Not</a:t>
+            </a:r>
+            <a:r>
+              <a:rPr lang="en-US" baseline="0" dirty="0"/>
+              <a:t> Make It Personal</a:t>
+            </a:r>
+            <a:endParaRPr lang="en-US" dirty="0"/>
           </a:p>
         </p:txBody>
       </p:sp>
@@ -10354,7 +10458,7 @@
           <p:cNvPr id="3" name="Content Placeholder 2">
             <a:extLst>
               <a:ext uri="{FF2B5EF4-FFF2-40B4-BE49-F238E27FC236}">
-                <a16:creationId xmlns:a16="http://schemas.microsoft.com/office/drawing/2014/main" id="{031337D1-73EC-A1AA-46AB-09ADBC36299D}"/>
+                <a16:creationId xmlns:a16="http://schemas.microsoft.com/office/drawing/2014/main" id="{E25687BC-E243-6F5C-A91E-8893F9E7E688}"/>
               </a:ext>
             </a:extLst>
           </p:cNvPr>
@@ -10365,82 +10469,77 @@
             <p:ph idx="1"/>
           </p:nvPr>
         </p:nvSpPr>
-        <p:spPr>
-          <a:xfrm>
-            <a:off x="838199" y="1825625"/>
-            <a:ext cx="11072149" cy="4351338"/>
-          </a:xfrm>
-        </p:spPr>
-        <p:txBody>
-          <a:bodyPr/>
-          <a:lstStyle/>
-          <a:p>
-            <a:r>
-              <a:rPr lang="en-US" dirty="0"/>
-              <a:t>Issue: This method does 2 things; violates the SRP</a:t>
-            </a:r>
-          </a:p>
-          <a:p>
-            <a:r>
-              <a:rPr lang="en-US" dirty="0"/>
-              <a:t>Suggestion: Consider splitting this into 2 methods</a:t>
-            </a:r>
-          </a:p>
-          <a:p>
-            <a:r>
-              <a:rPr lang="en-US" dirty="0"/>
-              <a:t>Question: Why did you choose the </a:t>
-            </a:r>
-            <a:r>
-              <a:rPr lang="en-US" dirty="0" err="1"/>
-              <a:t>ArrayList</a:t>
-            </a:r>
-            <a:r>
-              <a:rPr lang="en-US" dirty="0"/>
-              <a:t> instead of the List class?</a:t>
-            </a:r>
-          </a:p>
-          <a:p>
-            <a:r>
-              <a:rPr lang="en-US" dirty="0"/>
-              <a:t>Nit: A better name for this method might be “</a:t>
-            </a:r>
-            <a:r>
-              <a:rPr lang="en-US" dirty="0" err="1"/>
-              <a:t>GetAllProducts</a:t>
-            </a:r>
-            <a:r>
-              <a:rPr lang="en-US" dirty="0"/>
-              <a:t>”</a:t>
-            </a:r>
-          </a:p>
-          <a:p>
-            <a:r>
-              <a:rPr lang="en-US" dirty="0"/>
-              <a:t>Thought: Here is a library that does this for you</a:t>
-            </a:r>
-          </a:p>
-          <a:p>
-            <a:r>
-              <a:rPr lang="en-US" dirty="0"/>
-              <a:t>Chore: “Customer” is misspelled</a:t>
-            </a:r>
-          </a:p>
-          <a:p>
-            <a:r>
-              <a:rPr lang="en-US" dirty="0"/>
-              <a:t>Praise: Clever refactoring! Much more readable!</a:t>
-            </a:r>
-          </a:p>
-          <a:p>
-            <a:endParaRPr lang="en-US" dirty="0"/>
+        <p:spPr/>
+        <p:txBody>
+          <a:bodyPr/>
+          <a:lstStyle/>
+          <a:p>
+            <a:pPr lvl="0" rtl="0" eaLnBrk="1" latinLnBrk="0" hangingPunct="1"/>
+            <a:r>
+              <a:rPr lang="en-US" sz="4400" kern="1200" dirty="0">
+                <a:solidFill>
+                  <a:schemeClr val="tx1"/>
+                </a:solidFill>
+                <a:effectLst/>
+                <a:latin typeface="+mj-lt"/>
+                <a:ea typeface="+mj-ea"/>
+                <a:cs typeface="+mj-cs"/>
+              </a:rPr>
+              <a:t>Do Not Say “YOU”</a:t>
+            </a:r>
+          </a:p>
+          <a:p>
+            <a:pPr lvl="0" rtl="0" eaLnBrk="1" latinLnBrk="0" hangingPunct="1"/>
+            <a:r>
+              <a:rPr lang="en-US" sz="4400" kern="1200" dirty="0">
+                <a:solidFill>
+                  <a:schemeClr val="tx1"/>
+                </a:solidFill>
+                <a:effectLst/>
+                <a:latin typeface="+mj-lt"/>
+                <a:ea typeface="+mj-ea"/>
+                <a:cs typeface="+mj-cs"/>
+              </a:rPr>
+              <a:t>Requests</a:t>
+            </a:r>
+            <a:r>
+              <a:rPr lang="en-US" dirty="0"/>
+              <a:t>;</a:t>
+            </a:r>
+            <a:r>
+              <a:rPr lang="en-US" sz="4400" kern="1200" dirty="0">
+                <a:solidFill>
+                  <a:schemeClr val="tx1"/>
+                </a:solidFill>
+                <a:effectLst/>
+                <a:latin typeface="+mj-lt"/>
+                <a:ea typeface="+mj-ea"/>
+                <a:cs typeface="+mj-cs"/>
+              </a:rPr>
+              <a:t> not Commands</a:t>
+            </a:r>
+          </a:p>
+          <a:p>
+            <a:pPr lvl="0" rtl="0" eaLnBrk="1" latinLnBrk="0" hangingPunct="1"/>
+            <a:r>
+              <a:rPr lang="en-US" sz="4400" kern="1200" dirty="0">
+                <a:solidFill>
+                  <a:schemeClr val="tx1"/>
+                </a:solidFill>
+                <a:effectLst/>
+                <a:latin typeface="+mj-lt"/>
+                <a:ea typeface="+mj-ea"/>
+                <a:cs typeface="+mj-cs"/>
+              </a:rPr>
+              <a:t>Principles; not Opinions</a:t>
+            </a:r>
           </a:p>
         </p:txBody>
       </p:sp>
     </p:spTree>
     <p:extLst>
       <p:ext uri="{BB962C8B-B14F-4D97-AF65-F5344CB8AC3E}">
-        <p14:creationId xmlns:p14="http://schemas.microsoft.com/office/powerpoint/2010/main" val="2945040223"/>
+        <p14:creationId xmlns:p14="http://schemas.microsoft.com/office/powerpoint/2010/main" val="741424649"/>
       </p:ext>
     </p:extLst>
   </p:cSld>
@@ -10472,7 +10571,7 @@
           <p:cNvPr id="2" name="Title 1">
             <a:extLst>
               <a:ext uri="{FF2B5EF4-FFF2-40B4-BE49-F238E27FC236}">
-                <a16:creationId xmlns:a16="http://schemas.microsoft.com/office/drawing/2014/main" id="{E7292F2C-862D-48C0-8ABB-A2C971E526D7}"/>
+                <a16:creationId xmlns:a16="http://schemas.microsoft.com/office/drawing/2014/main" id="{291BEF2D-0A52-BFE1-8F98-FDB0B873DF62}"/>
               </a:ext>
             </a:extLst>
           </p:cNvPr>
@@ -10485,57 +10584,87 @@
         </p:nvSpPr>
         <p:spPr/>
         <p:txBody>
-          <a:bodyPr>
-            <a:normAutofit/>
-          </a:bodyPr>
-          <a:lstStyle/>
-          <a:p>
-            <a:pPr rtl="0" eaLnBrk="1" latinLnBrk="0" hangingPunct="1"/>
-            <a:r>
-              <a:rPr lang="en-US" sz="4400" kern="1200" dirty="0">
-                <a:solidFill>
-                  <a:schemeClr val="tx1"/>
-                </a:solidFill>
-                <a:effectLst/>
-                <a:latin typeface="+mj-lt"/>
-                <a:ea typeface="+mj-ea"/>
-                <a:cs typeface="+mj-cs"/>
-              </a:rPr>
-              <a:t>Praise Sincerely</a:t>
-            </a:r>
+          <a:bodyPr/>
+          <a:lstStyle/>
+          <a:p>
+            <a:r>
+              <a:rPr lang="en-US" dirty="0"/>
+              <a:t>Prefix review comments with labels:</a:t>
+            </a:r>
+          </a:p>
+        </p:txBody>
+      </p:sp>
+      <p:sp>
+        <p:nvSpPr>
+          <p:cNvPr id="3" name="Content Placeholder 2">
+            <a:extLst>
+              <a:ext uri="{FF2B5EF4-FFF2-40B4-BE49-F238E27FC236}">
+                <a16:creationId xmlns:a16="http://schemas.microsoft.com/office/drawing/2014/main" id="{031337D1-73EC-A1AA-46AB-09ADBC36299D}"/>
+              </a:ext>
+            </a:extLst>
+          </p:cNvPr>
+          <p:cNvSpPr>
+            <a:spLocks noGrp="1"/>
+          </p:cNvSpPr>
+          <p:nvPr>
+            <p:ph idx="1"/>
+          </p:nvPr>
+        </p:nvSpPr>
+        <p:spPr/>
+        <p:txBody>
+          <a:bodyPr/>
+          <a:lstStyle/>
+          <a:p>
+            <a:r>
+              <a:rPr lang="en-US" dirty="0"/>
+              <a:t>Issue: </a:t>
+            </a:r>
+          </a:p>
+          <a:p>
+            <a:r>
+              <a:rPr lang="en-US" dirty="0"/>
+              <a:t>Suggestion:</a:t>
+            </a:r>
+          </a:p>
+          <a:p>
+            <a:r>
+              <a:rPr lang="en-US" dirty="0"/>
+              <a:t>Question: </a:t>
+            </a:r>
+          </a:p>
+          <a:p>
+            <a:r>
+              <a:rPr lang="en-US" dirty="0"/>
+              <a:t>Nit: </a:t>
+            </a:r>
+          </a:p>
+          <a:p>
+            <a:r>
+              <a:rPr lang="en-US" dirty="0"/>
+              <a:t>Thought: </a:t>
+            </a:r>
+          </a:p>
+          <a:p>
+            <a:r>
+              <a:rPr lang="en-US" dirty="0"/>
+              <a:t>Chore: </a:t>
+            </a:r>
+          </a:p>
+          <a:p>
+            <a:r>
+              <a:rPr lang="en-US" dirty="0"/>
+              <a:t>Praise: </a:t>
+            </a:r>
+          </a:p>
+          <a:p>
             <a:endParaRPr lang="en-US" dirty="0"/>
-          </a:p>
-        </p:txBody>
-      </p:sp>
-      <p:sp>
-        <p:nvSpPr>
-          <p:cNvPr id="3" name="Content Placeholder 2">
-            <a:extLst>
-              <a:ext uri="{FF2B5EF4-FFF2-40B4-BE49-F238E27FC236}">
-                <a16:creationId xmlns:a16="http://schemas.microsoft.com/office/drawing/2014/main" id="{AE3130E8-14D6-462E-ADD0-E1FA331D78FF}"/>
-              </a:ext>
-            </a:extLst>
-          </p:cNvPr>
-          <p:cNvSpPr>
-            <a:spLocks noGrp="1"/>
-          </p:cNvSpPr>
-          <p:nvPr>
-            <p:ph idx="1"/>
-          </p:nvPr>
-        </p:nvSpPr>
-        <p:spPr/>
-        <p:txBody>
-          <a:bodyPr/>
-          <a:lstStyle/>
-          <a:p>
-            <a:endParaRPr lang="en-US"/>
           </a:p>
         </p:txBody>
       </p:sp>
     </p:spTree>
     <p:extLst>
       <p:ext uri="{BB962C8B-B14F-4D97-AF65-F5344CB8AC3E}">
-        <p14:creationId xmlns:p14="http://schemas.microsoft.com/office/powerpoint/2010/main" val="3965849638"/>
+        <p14:creationId xmlns:p14="http://schemas.microsoft.com/office/powerpoint/2010/main" val="1374117594"/>
       </p:ext>
     </p:extLst>
   </p:cSld>
@@ -10664,7 +10793,7 @@
           <p:cNvPr id="2" name="Title 1">
             <a:extLst>
               <a:ext uri="{FF2B5EF4-FFF2-40B4-BE49-F238E27FC236}">
-                <a16:creationId xmlns:a16="http://schemas.microsoft.com/office/drawing/2014/main" id="{2CC1ED39-E06C-4481-A123-CC7C697D1E5B}"/>
+                <a16:creationId xmlns:a16="http://schemas.microsoft.com/office/drawing/2014/main" id="{291BEF2D-0A52-BFE1-8F98-FDB0B873DF62}"/>
               </a:ext>
             </a:extLst>
           </p:cNvPr>
@@ -10677,25 +10806,13 @@
         </p:nvSpPr>
         <p:spPr/>
         <p:txBody>
-          <a:bodyPr>
-            <a:normAutofit/>
-          </a:bodyPr>
-          <a:lstStyle/>
-          <a:p>
-            <a:pPr rtl="0" eaLnBrk="1" latinLnBrk="0" hangingPunct="1"/>
-            <a:r>
-              <a:rPr lang="en-US" sz="4400" kern="1200" dirty="0">
-                <a:solidFill>
-                  <a:schemeClr val="tx1"/>
-                </a:solidFill>
-                <a:effectLst/>
-                <a:latin typeface="+mj-lt"/>
-                <a:ea typeface="+mj-ea"/>
-                <a:cs typeface="+mj-cs"/>
-              </a:rPr>
-              <a:t>Avoid Repeating Feedback</a:t>
-            </a:r>
-            <a:endParaRPr lang="en-US" dirty="0"/>
+          <a:bodyPr/>
+          <a:lstStyle/>
+          <a:p>
+            <a:r>
+              <a:rPr lang="en-US" dirty="0"/>
+              <a:t>Prefix review comments with labels:</a:t>
+            </a:r>
           </a:p>
         </p:txBody>
       </p:sp>
@@ -10704,7 +10821,7 @@
           <p:cNvPr id="3" name="Content Placeholder 2">
             <a:extLst>
               <a:ext uri="{FF2B5EF4-FFF2-40B4-BE49-F238E27FC236}">
-                <a16:creationId xmlns:a16="http://schemas.microsoft.com/office/drawing/2014/main" id="{BF1A8C6F-72A0-4A11-AB2B-0F965154AD0D}"/>
+                <a16:creationId xmlns:a16="http://schemas.microsoft.com/office/drawing/2014/main" id="{031337D1-73EC-A1AA-46AB-09ADBC36299D}"/>
               </a:ext>
             </a:extLst>
           </p:cNvPr>
@@ -10715,23 +10832,74 @@
             <p:ph idx="1"/>
           </p:nvPr>
         </p:nvSpPr>
-        <p:spPr/>
-        <p:txBody>
-          <a:bodyPr/>
-          <a:lstStyle/>
-          <a:p>
-            <a:r>
-              <a:rPr lang="en-US" sz="2800" kern="1200" dirty="0">
-                <a:solidFill>
-                  <a:schemeClr val="tx1"/>
-                </a:solidFill>
-                <a:effectLst/>
-                <a:latin typeface="+mj-lt"/>
-                <a:ea typeface="+mj-ea"/>
-                <a:cs typeface="+mj-cs"/>
-              </a:rPr>
-              <a:t>e.g., “See naming convention comment above”</a:t>
-            </a:r>
+        <p:spPr>
+          <a:xfrm>
+            <a:off x="838199" y="1825625"/>
+            <a:ext cx="11072149" cy="4351338"/>
+          </a:xfrm>
+        </p:spPr>
+        <p:txBody>
+          <a:bodyPr/>
+          <a:lstStyle/>
+          <a:p>
+            <a:r>
+              <a:rPr lang="en-US" dirty="0"/>
+              <a:t>Issue: This method does 2 things; violates the SRP</a:t>
+            </a:r>
+          </a:p>
+          <a:p>
+            <a:r>
+              <a:rPr lang="en-US" dirty="0"/>
+              <a:t>Suggestion: Consider splitting this into 2 methods</a:t>
+            </a:r>
+          </a:p>
+          <a:p>
+            <a:r>
+              <a:rPr lang="en-US" dirty="0"/>
+              <a:t>Question: Why did you choose the </a:t>
+            </a:r>
+            <a:r>
+              <a:rPr lang="en-US" dirty="0" err="1"/>
+              <a:t>ArrayList</a:t>
+            </a:r>
+            <a:r>
+              <a:rPr lang="en-US" dirty="0"/>
+              <a:t> instead of the List class?</a:t>
+            </a:r>
+          </a:p>
+          <a:p>
+            <a:r>
+              <a:rPr lang="en-US" dirty="0"/>
+              <a:t>Nit: A better name for this method might be “</a:t>
+            </a:r>
+            <a:r>
+              <a:rPr lang="en-US" dirty="0" err="1"/>
+              <a:t>GetAllProducts</a:t>
+            </a:r>
+            <a:r>
+              <a:rPr lang="en-US" dirty="0"/>
+              <a:t>”</a:t>
+            </a:r>
+          </a:p>
+          <a:p>
+            <a:r>
+              <a:rPr lang="en-US" dirty="0"/>
+              <a:t>Thought: Here is a library that does this for you</a:t>
+            </a:r>
+          </a:p>
+          <a:p>
+            <a:r>
+              <a:rPr lang="en-US" dirty="0"/>
+              <a:t>Chore: “Customer” is misspelled</a:t>
+            </a:r>
+          </a:p>
+          <a:p>
+            <a:r>
+              <a:rPr lang="en-US" dirty="0"/>
+              <a:t>Praise: Clever refactoring! Much more readable!</a:t>
+            </a:r>
+          </a:p>
+          <a:p>
             <a:endParaRPr lang="en-US" dirty="0"/>
           </a:p>
         </p:txBody>
@@ -10739,7 +10907,7 @@
     </p:spTree>
     <p:extLst>
       <p:ext uri="{BB962C8B-B14F-4D97-AF65-F5344CB8AC3E}">
-        <p14:creationId xmlns:p14="http://schemas.microsoft.com/office/powerpoint/2010/main" val="1070692530"/>
+        <p14:creationId xmlns:p14="http://schemas.microsoft.com/office/powerpoint/2010/main" val="2945040223"/>
       </p:ext>
     </p:extLst>
   </p:cSld>
@@ -10771,7 +10939,7 @@
           <p:cNvPr id="2" name="Title 1">
             <a:extLst>
               <a:ext uri="{FF2B5EF4-FFF2-40B4-BE49-F238E27FC236}">
-                <a16:creationId xmlns:a16="http://schemas.microsoft.com/office/drawing/2014/main" id="{040CCC4B-DF36-45D2-9F4A-CF91339C1B14}"/>
+                <a16:creationId xmlns:a16="http://schemas.microsoft.com/office/drawing/2014/main" id="{E7292F2C-862D-48C0-8ABB-A2C971E526D7}"/>
               </a:ext>
             </a:extLst>
           </p:cNvPr>
@@ -10800,7 +10968,7 @@
                 <a:ea typeface="+mj-ea"/>
                 <a:cs typeface="+mj-cs"/>
               </a:rPr>
-              <a:t>Consider the Scope of the Review</a:t>
+              <a:t>Praise Sincerely</a:t>
             </a:r>
             <a:endParaRPr lang="en-US" dirty="0"/>
           </a:p>
@@ -10811,7 +10979,7 @@
           <p:cNvPr id="3" name="Content Placeholder 2">
             <a:extLst>
               <a:ext uri="{FF2B5EF4-FFF2-40B4-BE49-F238E27FC236}">
-                <a16:creationId xmlns:a16="http://schemas.microsoft.com/office/drawing/2014/main" id="{4B44D634-86F7-4806-AD7E-EC760E369389}"/>
+                <a16:creationId xmlns:a16="http://schemas.microsoft.com/office/drawing/2014/main" id="{AE3130E8-14D6-462E-ADD0-E1FA331D78FF}"/>
               </a:ext>
             </a:extLst>
           </p:cNvPr>
@@ -10827,41 +10995,14 @@
           <a:bodyPr/>
           <a:lstStyle/>
           <a:p>
-            <a:r>
-              <a:rPr lang="en-US" dirty="0"/>
-              <a:t>Avoid feedback on lines that did not change</a:t>
-            </a:r>
-          </a:p>
-          <a:p>
-            <a:r>
-              <a:rPr lang="en-US" dirty="0"/>
-              <a:t>Exceptions</a:t>
-            </a:r>
-          </a:p>
-          <a:p>
-            <a:pPr lvl="1"/>
-            <a:r>
-              <a:rPr lang="en-US"/>
-              <a:t>Trivial change and few other feedback items</a:t>
-            </a:r>
-          </a:p>
-          <a:p>
-            <a:pPr lvl="1"/>
-            <a:r>
-              <a:rPr lang="en-US"/>
-              <a:t>Change </a:t>
-            </a:r>
-            <a:r>
-              <a:rPr lang="en-US" dirty="0"/>
-              <a:t>affected a line (e.g., the name of a function whose body changed)</a:t>
-            </a:r>
+            <a:endParaRPr lang="en-US"/>
           </a:p>
         </p:txBody>
       </p:sp>
     </p:spTree>
     <p:extLst>
       <p:ext uri="{BB962C8B-B14F-4D97-AF65-F5344CB8AC3E}">
-        <p14:creationId xmlns:p14="http://schemas.microsoft.com/office/powerpoint/2010/main" val="3374163760"/>
+        <p14:creationId xmlns:p14="http://schemas.microsoft.com/office/powerpoint/2010/main" val="3965849638"/>
       </p:ext>
     </p:extLst>
   </p:cSld>
@@ -10893,7 +11034,7 @@
           <p:cNvPr id="2" name="Title 1">
             <a:extLst>
               <a:ext uri="{FF2B5EF4-FFF2-40B4-BE49-F238E27FC236}">
-                <a16:creationId xmlns:a16="http://schemas.microsoft.com/office/drawing/2014/main" id="{756AE765-1AAB-4A76-986C-DD680717C9A0}"/>
+                <a16:creationId xmlns:a16="http://schemas.microsoft.com/office/drawing/2014/main" id="{2CC1ED39-E06C-4481-A123-CC7C697D1E5B}"/>
               </a:ext>
             </a:extLst>
           </p:cNvPr>
@@ -10906,7 +11047,9 @@
         </p:nvSpPr>
         <p:spPr/>
         <p:txBody>
-          <a:bodyPr/>
+          <a:bodyPr>
+            <a:normAutofit/>
+          </a:bodyPr>
           <a:lstStyle/>
           <a:p>
             <a:pPr rtl="0" eaLnBrk="1" latinLnBrk="0" hangingPunct="1"/>
@@ -10920,7 +11063,7 @@
                 <a:ea typeface="+mj-ea"/>
                 <a:cs typeface="+mj-cs"/>
               </a:rPr>
-              <a:t>Stalemates</a:t>
+              <a:t>Avoid Repeating Feedback</a:t>
             </a:r>
             <a:endParaRPr lang="en-US" dirty="0"/>
           </a:p>
@@ -10931,7 +11074,7 @@
           <p:cNvPr id="3" name="Content Placeholder 2">
             <a:extLst>
               <a:ext uri="{FF2B5EF4-FFF2-40B4-BE49-F238E27FC236}">
-                <a16:creationId xmlns:a16="http://schemas.microsoft.com/office/drawing/2014/main" id="{1EA7DAC6-CEC9-4255-872E-3E1D95674F03}"/>
+                <a16:creationId xmlns:a16="http://schemas.microsoft.com/office/drawing/2014/main" id="{BF1A8C6F-72A0-4A11-AB2B-0F965154AD0D}"/>
               </a:ext>
             </a:extLst>
           </p:cNvPr>
@@ -10948,64 +11091,25 @@
           <a:lstStyle/>
           <a:p>
             <a:r>
-              <a:rPr lang="en-US" dirty="0"/>
-              <a:t>Symptoms</a:t>
-            </a:r>
-          </a:p>
-          <a:p>
-            <a:pPr lvl="1"/>
-            <a:r>
-              <a:rPr lang="en-US" dirty="0"/>
-              <a:t>No progress</a:t>
-            </a:r>
-          </a:p>
-          <a:p>
-            <a:pPr lvl="1"/>
-            <a:r>
-              <a:rPr lang="en-US" dirty="0"/>
-              <a:t>Tension</a:t>
-            </a:r>
-          </a:p>
-          <a:p>
-            <a:r>
-              <a:rPr lang="en-US" dirty="0"/>
-              <a:t>Cures</a:t>
-            </a:r>
-          </a:p>
-          <a:p>
-            <a:pPr lvl="1"/>
-            <a:r>
-              <a:rPr lang="en-US" dirty="0"/>
-              <a:t>Discuss</a:t>
-            </a:r>
-          </a:p>
-          <a:p>
-            <a:pPr lvl="1"/>
-            <a:r>
-              <a:rPr lang="en-US" dirty="0"/>
-              <a:t>Design Review</a:t>
-            </a:r>
-          </a:p>
-          <a:p>
-            <a:pPr lvl="1"/>
-            <a:r>
-              <a:rPr lang="en-US" dirty="0"/>
-              <a:t>Concede</a:t>
-            </a:r>
-          </a:p>
-          <a:p>
-            <a:pPr lvl="1"/>
-            <a:r>
-              <a:rPr lang="en-US" dirty="0"/>
-              <a:t>Escalate</a:t>
-            </a:r>
+              <a:rPr lang="en-US" sz="2800" kern="1200" dirty="0">
+                <a:solidFill>
+                  <a:schemeClr val="tx1"/>
+                </a:solidFill>
+                <a:effectLst/>
+                <a:latin typeface="+mj-lt"/>
+                <a:ea typeface="+mj-ea"/>
+                <a:cs typeface="+mj-cs"/>
+              </a:rPr>
+              <a:t>e.g., “See naming convention comment above”</a:t>
+            </a:r>
+            <a:endParaRPr lang="en-US" dirty="0"/>
           </a:p>
         </p:txBody>
       </p:sp>
     </p:spTree>
     <p:extLst>
       <p:ext uri="{BB962C8B-B14F-4D97-AF65-F5344CB8AC3E}">
-        <p14:creationId xmlns:p14="http://schemas.microsoft.com/office/powerpoint/2010/main" val="3682861194"/>
+        <p14:creationId xmlns:p14="http://schemas.microsoft.com/office/powerpoint/2010/main" val="1070692530"/>
       </p:ext>
     </p:extLst>
   </p:cSld>
@@ -11037,7 +11141,7 @@
           <p:cNvPr id="2" name="Title 1">
             <a:extLst>
               <a:ext uri="{FF2B5EF4-FFF2-40B4-BE49-F238E27FC236}">
-                <a16:creationId xmlns:a16="http://schemas.microsoft.com/office/drawing/2014/main" id="{1A7D252D-6B4C-4749-BF4B-C4B91C7A2B9B}"/>
+                <a16:creationId xmlns:a16="http://schemas.microsoft.com/office/drawing/2014/main" id="{040CCC4B-DF36-45D2-9F4A-CF91339C1B14}"/>
               </a:ext>
             </a:extLst>
           </p:cNvPr>
@@ -11066,7 +11170,7 @@
                 <a:ea typeface="+mj-ea"/>
                 <a:cs typeface="+mj-cs"/>
               </a:rPr>
-              <a:t>Goal: Improve Code</a:t>
+              <a:t>Consider the Scope of the Review</a:t>
             </a:r>
             <a:endParaRPr lang="en-US" dirty="0"/>
           </a:p>
@@ -11077,7 +11181,7 @@
           <p:cNvPr id="3" name="Content Placeholder 2">
             <a:extLst>
               <a:ext uri="{FF2B5EF4-FFF2-40B4-BE49-F238E27FC236}">
-                <a16:creationId xmlns:a16="http://schemas.microsoft.com/office/drawing/2014/main" id="{C5B44566-2B5B-46DB-BC5A-C1E2DA1E7236}"/>
+                <a16:creationId xmlns:a16="http://schemas.microsoft.com/office/drawing/2014/main" id="{4B44D634-86F7-4806-AD7E-EC760E369389}"/>
               </a:ext>
             </a:extLst>
           </p:cNvPr>
@@ -11093,23 +11197,284 @@
           <a:bodyPr/>
           <a:lstStyle/>
           <a:p>
-            <a:pPr marL="0" indent="0">
-              <a:buNone/>
-            </a:pPr>
-            <a:endParaRPr lang="en-US" dirty="0"/>
+            <a:r>
+              <a:rPr lang="en-US" dirty="0"/>
+              <a:t>Avoid feedback on lines that did not change</a:t>
+            </a:r>
+          </a:p>
+          <a:p>
+            <a:r>
+              <a:rPr lang="en-US" dirty="0"/>
+              <a:t>Exceptions</a:t>
+            </a:r>
+          </a:p>
+          <a:p>
+            <a:pPr lvl="1"/>
+            <a:r>
+              <a:rPr lang="en-US" dirty="0"/>
+              <a:t>Trivial change and few other feedback items</a:t>
+            </a:r>
+          </a:p>
+          <a:p>
+            <a:pPr lvl="1"/>
+            <a:r>
+              <a:rPr lang="en-US" dirty="0"/>
+              <a:t>Change affected a line (e.g., the name of a function whose body changed)</a:t>
+            </a:r>
           </a:p>
         </p:txBody>
       </p:sp>
     </p:spTree>
     <p:extLst>
       <p:ext uri="{BB962C8B-B14F-4D97-AF65-F5344CB8AC3E}">
-        <p14:creationId xmlns:p14="http://schemas.microsoft.com/office/powerpoint/2010/main" val="3537904068"/>
+        <p14:creationId xmlns:p14="http://schemas.microsoft.com/office/powerpoint/2010/main" val="3374163760"/>
       </p:ext>
     </p:extLst>
   </p:cSld>
   <p:clrMapOvr>
     <a:masterClrMapping/>
   </p:clrMapOvr>
+  <p:timing>
+    <p:tnLst>
+      <p:par>
+        <p:cTn id="1" dur="indefinite" restart="never" nodeType="tmRoot">
+          <p:childTnLst>
+            <p:seq concurrent="1" nextAc="seek">
+              <p:cTn id="2" dur="indefinite" nodeType="mainSeq">
+                <p:childTnLst>
+                  <p:par>
+                    <p:cTn id="3" fill="hold">
+                      <p:stCondLst>
+                        <p:cond delay="indefinite"/>
+                      </p:stCondLst>
+                      <p:childTnLst>
+                        <p:par>
+                          <p:cTn id="4" fill="hold">
+                            <p:stCondLst>
+                              <p:cond delay="0"/>
+                            </p:stCondLst>
+                            <p:childTnLst>
+                              <p:par>
+                                <p:cTn id="5" presetID="10" presetClass="entr" presetSubtype="0" fill="hold" grpId="0" nodeType="clickEffect">
+                                  <p:stCondLst>
+                                    <p:cond delay="0"/>
+                                  </p:stCondLst>
+                                  <p:childTnLst>
+                                    <p:set>
+                                      <p:cBhvr>
+                                        <p:cTn id="6" dur="1" fill="hold">
+                                          <p:stCondLst>
+                                            <p:cond delay="0"/>
+                                          </p:stCondLst>
+                                        </p:cTn>
+                                        <p:tgtEl>
+                                          <p:spTgt spid="3">
+                                            <p:txEl>
+                                              <p:pRg st="0" end="0"/>
+                                            </p:txEl>
+                                          </p:spTgt>
+                                        </p:tgtEl>
+                                        <p:attrNameLst>
+                                          <p:attrName>style.visibility</p:attrName>
+                                        </p:attrNameLst>
+                                      </p:cBhvr>
+                                      <p:to>
+                                        <p:strVal val="visible"/>
+                                      </p:to>
+                                    </p:set>
+                                    <p:animEffect transition="in" filter="fade">
+                                      <p:cBhvr>
+                                        <p:cTn id="7" dur="500"/>
+                                        <p:tgtEl>
+                                          <p:spTgt spid="3">
+                                            <p:txEl>
+                                              <p:pRg st="0" end="0"/>
+                                            </p:txEl>
+                                          </p:spTgt>
+                                        </p:tgtEl>
+                                      </p:cBhvr>
+                                    </p:animEffect>
+                                  </p:childTnLst>
+                                </p:cTn>
+                              </p:par>
+                            </p:childTnLst>
+                          </p:cTn>
+                        </p:par>
+                      </p:childTnLst>
+                    </p:cTn>
+                  </p:par>
+                  <p:par>
+                    <p:cTn id="8" fill="hold">
+                      <p:stCondLst>
+                        <p:cond delay="indefinite"/>
+                      </p:stCondLst>
+                      <p:childTnLst>
+                        <p:par>
+                          <p:cTn id="9" fill="hold">
+                            <p:stCondLst>
+                              <p:cond delay="0"/>
+                            </p:stCondLst>
+                            <p:childTnLst>
+                              <p:par>
+                                <p:cTn id="10" presetID="10" presetClass="entr" presetSubtype="0" fill="hold" grpId="0" nodeType="clickEffect">
+                                  <p:stCondLst>
+                                    <p:cond delay="0"/>
+                                  </p:stCondLst>
+                                  <p:childTnLst>
+                                    <p:set>
+                                      <p:cBhvr>
+                                        <p:cTn id="11" dur="1" fill="hold">
+                                          <p:stCondLst>
+                                            <p:cond delay="0"/>
+                                          </p:stCondLst>
+                                        </p:cTn>
+                                        <p:tgtEl>
+                                          <p:spTgt spid="3">
+                                            <p:txEl>
+                                              <p:pRg st="1" end="1"/>
+                                            </p:txEl>
+                                          </p:spTgt>
+                                        </p:tgtEl>
+                                        <p:attrNameLst>
+                                          <p:attrName>style.visibility</p:attrName>
+                                        </p:attrNameLst>
+                                      </p:cBhvr>
+                                      <p:to>
+                                        <p:strVal val="visible"/>
+                                      </p:to>
+                                    </p:set>
+                                    <p:animEffect transition="in" filter="fade">
+                                      <p:cBhvr>
+                                        <p:cTn id="12" dur="500"/>
+                                        <p:tgtEl>
+                                          <p:spTgt spid="3">
+                                            <p:txEl>
+                                              <p:pRg st="1" end="1"/>
+                                            </p:txEl>
+                                          </p:spTgt>
+                                        </p:tgtEl>
+                                      </p:cBhvr>
+                                    </p:animEffect>
+                                  </p:childTnLst>
+                                </p:cTn>
+                              </p:par>
+                              <p:par>
+                                <p:cTn id="13" presetID="10" presetClass="entr" presetSubtype="0" fill="hold" grpId="0" nodeType="withEffect">
+                                  <p:stCondLst>
+                                    <p:cond delay="0"/>
+                                  </p:stCondLst>
+                                  <p:childTnLst>
+                                    <p:set>
+                                      <p:cBhvr>
+                                        <p:cTn id="14" dur="1" fill="hold">
+                                          <p:stCondLst>
+                                            <p:cond delay="0"/>
+                                          </p:stCondLst>
+                                        </p:cTn>
+                                        <p:tgtEl>
+                                          <p:spTgt spid="3">
+                                            <p:txEl>
+                                              <p:pRg st="2" end="2"/>
+                                            </p:txEl>
+                                          </p:spTgt>
+                                        </p:tgtEl>
+                                        <p:attrNameLst>
+                                          <p:attrName>style.visibility</p:attrName>
+                                        </p:attrNameLst>
+                                      </p:cBhvr>
+                                      <p:to>
+                                        <p:strVal val="visible"/>
+                                      </p:to>
+                                    </p:set>
+                                    <p:animEffect transition="in" filter="fade">
+                                      <p:cBhvr>
+                                        <p:cTn id="15" dur="500"/>
+                                        <p:tgtEl>
+                                          <p:spTgt spid="3">
+                                            <p:txEl>
+                                              <p:pRg st="2" end="2"/>
+                                            </p:txEl>
+                                          </p:spTgt>
+                                        </p:tgtEl>
+                                      </p:cBhvr>
+                                    </p:animEffect>
+                                  </p:childTnLst>
+                                </p:cTn>
+                              </p:par>
+                              <p:par>
+                                <p:cTn id="16" presetID="10" presetClass="entr" presetSubtype="0" fill="hold" grpId="0" nodeType="withEffect">
+                                  <p:stCondLst>
+                                    <p:cond delay="0"/>
+                                  </p:stCondLst>
+                                  <p:childTnLst>
+                                    <p:set>
+                                      <p:cBhvr>
+                                        <p:cTn id="17" dur="1" fill="hold">
+                                          <p:stCondLst>
+                                            <p:cond delay="0"/>
+                                          </p:stCondLst>
+                                        </p:cTn>
+                                        <p:tgtEl>
+                                          <p:spTgt spid="3">
+                                            <p:txEl>
+                                              <p:pRg st="3" end="3"/>
+                                            </p:txEl>
+                                          </p:spTgt>
+                                        </p:tgtEl>
+                                        <p:attrNameLst>
+                                          <p:attrName>style.visibility</p:attrName>
+                                        </p:attrNameLst>
+                                      </p:cBhvr>
+                                      <p:to>
+                                        <p:strVal val="visible"/>
+                                      </p:to>
+                                    </p:set>
+                                    <p:animEffect transition="in" filter="fade">
+                                      <p:cBhvr>
+                                        <p:cTn id="18" dur="500"/>
+                                        <p:tgtEl>
+                                          <p:spTgt spid="3">
+                                            <p:txEl>
+                                              <p:pRg st="3" end="3"/>
+                                            </p:txEl>
+                                          </p:spTgt>
+                                        </p:tgtEl>
+                                      </p:cBhvr>
+                                    </p:animEffect>
+                                  </p:childTnLst>
+                                </p:cTn>
+                              </p:par>
+                            </p:childTnLst>
+                          </p:cTn>
+                        </p:par>
+                      </p:childTnLst>
+                    </p:cTn>
+                  </p:par>
+                </p:childTnLst>
+              </p:cTn>
+              <p:prevCondLst>
+                <p:cond evt="onPrev" delay="0">
+                  <p:tgtEl>
+                    <p:sldTgt/>
+                  </p:tgtEl>
+                </p:cond>
+              </p:prevCondLst>
+              <p:nextCondLst>
+                <p:cond evt="onNext" delay="0">
+                  <p:tgtEl>
+                    <p:sldTgt/>
+                  </p:tgtEl>
+                </p:cond>
+              </p:nextCondLst>
+            </p:seq>
+          </p:childTnLst>
+        </p:cTn>
+      </p:par>
+    </p:tnLst>
+    <p:bldLst>
+      <p:bldP spid="3" grpId="0" build="p"/>
+    </p:bldLst>
+  </p:timing>
 </p:sld>
 </file>
 
@@ -11135,6 +11500,248 @@
           <p:cNvPr id="2" name="Title 1">
             <a:extLst>
               <a:ext uri="{FF2B5EF4-FFF2-40B4-BE49-F238E27FC236}">
+                <a16:creationId xmlns:a16="http://schemas.microsoft.com/office/drawing/2014/main" id="{756AE765-1AAB-4A76-986C-DD680717C9A0}"/>
+              </a:ext>
+            </a:extLst>
+          </p:cNvPr>
+          <p:cNvSpPr>
+            <a:spLocks noGrp="1"/>
+          </p:cNvSpPr>
+          <p:nvPr>
+            <p:ph type="title"/>
+          </p:nvPr>
+        </p:nvSpPr>
+        <p:spPr/>
+        <p:txBody>
+          <a:bodyPr/>
+          <a:lstStyle/>
+          <a:p>
+            <a:pPr rtl="0" eaLnBrk="1" latinLnBrk="0" hangingPunct="1"/>
+            <a:r>
+              <a:rPr lang="en-US" sz="4400" kern="1200" dirty="0">
+                <a:solidFill>
+                  <a:schemeClr val="tx1"/>
+                </a:solidFill>
+                <a:effectLst/>
+                <a:latin typeface="+mj-lt"/>
+                <a:ea typeface="+mj-ea"/>
+                <a:cs typeface="+mj-cs"/>
+              </a:rPr>
+              <a:t>Stalemates</a:t>
+            </a:r>
+            <a:endParaRPr lang="en-US" dirty="0"/>
+          </a:p>
+        </p:txBody>
+      </p:sp>
+      <p:sp>
+        <p:nvSpPr>
+          <p:cNvPr id="3" name="Content Placeholder 2">
+            <a:extLst>
+              <a:ext uri="{FF2B5EF4-FFF2-40B4-BE49-F238E27FC236}">
+                <a16:creationId xmlns:a16="http://schemas.microsoft.com/office/drawing/2014/main" id="{1EA7DAC6-CEC9-4255-872E-3E1D95674F03}"/>
+              </a:ext>
+            </a:extLst>
+          </p:cNvPr>
+          <p:cNvSpPr>
+            <a:spLocks noGrp="1"/>
+          </p:cNvSpPr>
+          <p:nvPr>
+            <p:ph idx="1"/>
+          </p:nvPr>
+        </p:nvSpPr>
+        <p:spPr/>
+        <p:txBody>
+          <a:bodyPr/>
+          <a:lstStyle/>
+          <a:p>
+            <a:r>
+              <a:rPr lang="en-US" dirty="0"/>
+              <a:t>Symptoms</a:t>
+            </a:r>
+          </a:p>
+          <a:p>
+            <a:pPr lvl="1"/>
+            <a:r>
+              <a:rPr lang="en-US" dirty="0"/>
+              <a:t>No progress</a:t>
+            </a:r>
+          </a:p>
+          <a:p>
+            <a:pPr lvl="1"/>
+            <a:r>
+              <a:rPr lang="en-US" dirty="0"/>
+              <a:t>Tension</a:t>
+            </a:r>
+          </a:p>
+          <a:p>
+            <a:r>
+              <a:rPr lang="en-US" dirty="0"/>
+              <a:t>Cures</a:t>
+            </a:r>
+          </a:p>
+          <a:p>
+            <a:pPr lvl="1"/>
+            <a:r>
+              <a:rPr lang="en-US" dirty="0"/>
+              <a:t>Discuss</a:t>
+            </a:r>
+          </a:p>
+          <a:p>
+            <a:pPr lvl="1"/>
+            <a:r>
+              <a:rPr lang="en-US" dirty="0"/>
+              <a:t>Design Review</a:t>
+            </a:r>
+          </a:p>
+          <a:p>
+            <a:pPr lvl="1"/>
+            <a:r>
+              <a:rPr lang="en-US" dirty="0"/>
+              <a:t>Concede</a:t>
+            </a:r>
+          </a:p>
+          <a:p>
+            <a:pPr lvl="1"/>
+            <a:r>
+              <a:rPr lang="en-US" dirty="0"/>
+              <a:t>Escalate</a:t>
+            </a:r>
+          </a:p>
+        </p:txBody>
+      </p:sp>
+    </p:spTree>
+    <p:extLst>
+      <p:ext uri="{BB962C8B-B14F-4D97-AF65-F5344CB8AC3E}">
+        <p14:creationId xmlns:p14="http://schemas.microsoft.com/office/powerpoint/2010/main" val="3682861194"/>
+      </p:ext>
+    </p:extLst>
+  </p:cSld>
+  <p:clrMapOvr>
+    <a:masterClrMapping/>
+  </p:clrMapOvr>
+</p:sld>
+</file>
+
+<file path=ppt/slides/slide35.xml><?xml version="1.0" encoding="utf-8"?>
+<p:sld xmlns:a="http://schemas.openxmlformats.org/drawingml/2006/main" xmlns:r="http://schemas.openxmlformats.org/officeDocument/2006/relationships" xmlns:p="http://schemas.openxmlformats.org/presentationml/2006/main">
+  <p:cSld>
+    <p:spTree>
+      <p:nvGrpSpPr>
+        <p:cNvPr id="1" name=""/>
+        <p:cNvGrpSpPr/>
+        <p:nvPr/>
+      </p:nvGrpSpPr>
+      <p:grpSpPr>
+        <a:xfrm>
+          <a:off x="0" y="0"/>
+          <a:ext cx="0" cy="0"/>
+          <a:chOff x="0" y="0"/>
+          <a:chExt cx="0" cy="0"/>
+        </a:xfrm>
+      </p:grpSpPr>
+      <p:sp>
+        <p:nvSpPr>
+          <p:cNvPr id="2" name="Title 1">
+            <a:extLst>
+              <a:ext uri="{FF2B5EF4-FFF2-40B4-BE49-F238E27FC236}">
+                <a16:creationId xmlns:a16="http://schemas.microsoft.com/office/drawing/2014/main" id="{1A7D252D-6B4C-4749-BF4B-C4B91C7A2B9B}"/>
+              </a:ext>
+            </a:extLst>
+          </p:cNvPr>
+          <p:cNvSpPr>
+            <a:spLocks noGrp="1"/>
+          </p:cNvSpPr>
+          <p:nvPr>
+            <p:ph type="title"/>
+          </p:nvPr>
+        </p:nvSpPr>
+        <p:spPr/>
+        <p:txBody>
+          <a:bodyPr>
+            <a:normAutofit/>
+          </a:bodyPr>
+          <a:lstStyle/>
+          <a:p>
+            <a:pPr rtl="0" eaLnBrk="1" latinLnBrk="0" hangingPunct="1"/>
+            <a:r>
+              <a:rPr lang="en-US" sz="4400" kern="1200" dirty="0">
+                <a:solidFill>
+                  <a:schemeClr val="tx1"/>
+                </a:solidFill>
+                <a:effectLst/>
+                <a:latin typeface="+mj-lt"/>
+                <a:ea typeface="+mj-ea"/>
+                <a:cs typeface="+mj-cs"/>
+              </a:rPr>
+              <a:t>Goal: Improve Code</a:t>
+            </a:r>
+            <a:endParaRPr lang="en-US" dirty="0"/>
+          </a:p>
+        </p:txBody>
+      </p:sp>
+      <p:sp>
+        <p:nvSpPr>
+          <p:cNvPr id="3" name="Content Placeholder 2">
+            <a:extLst>
+              <a:ext uri="{FF2B5EF4-FFF2-40B4-BE49-F238E27FC236}">
+                <a16:creationId xmlns:a16="http://schemas.microsoft.com/office/drawing/2014/main" id="{C5B44566-2B5B-46DB-BC5A-C1E2DA1E7236}"/>
+              </a:ext>
+            </a:extLst>
+          </p:cNvPr>
+          <p:cNvSpPr>
+            <a:spLocks noGrp="1"/>
+          </p:cNvSpPr>
+          <p:nvPr>
+            <p:ph idx="1"/>
+          </p:nvPr>
+        </p:nvSpPr>
+        <p:spPr/>
+        <p:txBody>
+          <a:bodyPr/>
+          <a:lstStyle/>
+          <a:p>
+            <a:pPr marL="0" indent="0">
+              <a:buNone/>
+            </a:pPr>
+            <a:endParaRPr lang="en-US" dirty="0"/>
+          </a:p>
+        </p:txBody>
+      </p:sp>
+    </p:spTree>
+    <p:extLst>
+      <p:ext uri="{BB962C8B-B14F-4D97-AF65-F5344CB8AC3E}">
+        <p14:creationId xmlns:p14="http://schemas.microsoft.com/office/powerpoint/2010/main" val="3537904068"/>
+      </p:ext>
+    </p:extLst>
+  </p:cSld>
+  <p:clrMapOvr>
+    <a:masterClrMapping/>
+  </p:clrMapOvr>
+</p:sld>
+</file>
+
+<file path=ppt/slides/slide36.xml><?xml version="1.0" encoding="utf-8"?>
+<p:sld xmlns:a="http://schemas.openxmlformats.org/drawingml/2006/main" xmlns:r="http://schemas.openxmlformats.org/officeDocument/2006/relationships" xmlns:p="http://schemas.openxmlformats.org/presentationml/2006/main">
+  <p:cSld>
+    <p:spTree>
+      <p:nvGrpSpPr>
+        <p:cNvPr id="1" name=""/>
+        <p:cNvGrpSpPr/>
+        <p:nvPr/>
+      </p:nvGrpSpPr>
+      <p:grpSpPr>
+        <a:xfrm>
+          <a:off x="0" y="0"/>
+          <a:ext cx="0" cy="0"/>
+          <a:chOff x="0" y="0"/>
+          <a:chExt cx="0" cy="0"/>
+        </a:xfrm>
+      </p:grpSpPr>
+      <p:sp>
+        <p:nvSpPr>
+          <p:cNvPr id="2" name="Title 1">
+            <a:extLst>
+              <a:ext uri="{FF2B5EF4-FFF2-40B4-BE49-F238E27FC236}">
                 <a16:creationId xmlns:a16="http://schemas.microsoft.com/office/drawing/2014/main" id="{BD8F8452-BA7A-96C4-9680-0CC582F0CE80}"/>
               </a:ext>
             </a:extLst>
@@ -11214,7 +11821,7 @@
 </p:sld>
 </file>
 
-<file path=ppt/slides/slide35.xml><?xml version="1.0" encoding="utf-8"?>
+<file path=ppt/slides/slide37.xml><?xml version="1.0" encoding="utf-8"?>
 <p:sld xmlns:a="http://schemas.openxmlformats.org/drawingml/2006/main" xmlns:r="http://schemas.openxmlformats.org/officeDocument/2006/relationships" xmlns:p="http://schemas.openxmlformats.org/presentationml/2006/main">
   <p:cSld>
     <p:spTree>
@@ -11438,173 +12045,6 @@
 </p:sld>
 </file>
 
-<file path=ppt/slides/slide36.xml><?xml version="1.0" encoding="utf-8"?>
-<p:sld xmlns:a="http://schemas.openxmlformats.org/drawingml/2006/main" xmlns:r="http://schemas.openxmlformats.org/officeDocument/2006/relationships" xmlns:p="http://schemas.openxmlformats.org/presentationml/2006/main">
-  <p:cSld>
-    <p:spTree>
-      <p:nvGrpSpPr>
-        <p:cNvPr id="1" name=""/>
-        <p:cNvGrpSpPr/>
-        <p:nvPr/>
-      </p:nvGrpSpPr>
-      <p:grpSpPr>
-        <a:xfrm>
-          <a:off x="0" y="0"/>
-          <a:ext cx="0" cy="0"/>
-          <a:chOff x="0" y="0"/>
-          <a:chExt cx="0" cy="0"/>
-        </a:xfrm>
-      </p:grpSpPr>
-      <p:sp>
-        <p:nvSpPr>
-          <p:cNvPr id="2" name="Title 1">
-            <a:extLst>
-              <a:ext uri="{FF2B5EF4-FFF2-40B4-BE49-F238E27FC236}">
-                <a16:creationId xmlns:a16="http://schemas.microsoft.com/office/drawing/2014/main" id="{3DC4F2E8-6C07-939C-3F38-CADCF7C47825}"/>
-              </a:ext>
-            </a:extLst>
-          </p:cNvPr>
-          <p:cNvSpPr>
-            <a:spLocks noGrp="1"/>
-          </p:cNvSpPr>
-          <p:nvPr>
-            <p:ph type="title"/>
-          </p:nvPr>
-        </p:nvSpPr>
-        <p:spPr/>
-        <p:txBody>
-          <a:bodyPr/>
-          <a:lstStyle/>
-          <a:p>
-            <a:r>
-              <a:rPr lang="en-US" dirty="0"/>
-              <a:t>Test, Test, Test!</a:t>
-            </a:r>
-          </a:p>
-        </p:txBody>
-      </p:sp>
-      <p:sp>
-        <p:nvSpPr>
-          <p:cNvPr id="3" name="Content Placeholder 2">
-            <a:extLst>
-              <a:ext uri="{FF2B5EF4-FFF2-40B4-BE49-F238E27FC236}">
-                <a16:creationId xmlns:a16="http://schemas.microsoft.com/office/drawing/2014/main" id="{38717A33-7130-FF93-A34C-4ABB6BFEE63C}"/>
-              </a:ext>
-            </a:extLst>
-          </p:cNvPr>
-          <p:cNvSpPr>
-            <a:spLocks noGrp="1"/>
-          </p:cNvSpPr>
-          <p:nvPr>
-            <p:ph idx="1"/>
-          </p:nvPr>
-        </p:nvSpPr>
-        <p:spPr/>
-        <p:txBody>
-          <a:bodyPr/>
-          <a:lstStyle/>
-          <a:p>
-            <a:endParaRPr lang="en-US"/>
-          </a:p>
-        </p:txBody>
-      </p:sp>
-    </p:spTree>
-    <p:extLst>
-      <p:ext uri="{BB962C8B-B14F-4D97-AF65-F5344CB8AC3E}">
-        <p14:creationId xmlns:p14="http://schemas.microsoft.com/office/powerpoint/2010/main" val="266870724"/>
-      </p:ext>
-    </p:extLst>
-  </p:cSld>
-  <p:clrMapOvr>
-    <a:masterClrMapping/>
-  </p:clrMapOvr>
-</p:sld>
-</file>
-
-<file path=ppt/slides/slide37.xml><?xml version="1.0" encoding="utf-8"?>
-<p:sld xmlns:a="http://schemas.openxmlformats.org/drawingml/2006/main" xmlns:r="http://schemas.openxmlformats.org/officeDocument/2006/relationships" xmlns:p="http://schemas.openxmlformats.org/presentationml/2006/main">
-  <p:cSld>
-    <p:spTree>
-      <p:nvGrpSpPr>
-        <p:cNvPr id="1" name=""/>
-        <p:cNvGrpSpPr/>
-        <p:nvPr/>
-      </p:nvGrpSpPr>
-      <p:grpSpPr>
-        <a:xfrm>
-          <a:off x="0" y="0"/>
-          <a:ext cx="0" cy="0"/>
-          <a:chOff x="0" y="0"/>
-          <a:chExt cx="0" cy="0"/>
-        </a:xfrm>
-      </p:grpSpPr>
-      <p:sp>
-        <p:nvSpPr>
-          <p:cNvPr id="2" name="Title 1">
-            <a:extLst>
-              <a:ext uri="{FF2B5EF4-FFF2-40B4-BE49-F238E27FC236}">
-                <a16:creationId xmlns:a16="http://schemas.microsoft.com/office/drawing/2014/main" id="{1400C7A5-EDF0-4A76-967E-C7B402FCAED5}"/>
-              </a:ext>
-            </a:extLst>
-          </p:cNvPr>
-          <p:cNvSpPr>
-            <a:spLocks noGrp="1"/>
-          </p:cNvSpPr>
-          <p:nvPr>
-            <p:ph type="title"/>
-          </p:nvPr>
-        </p:nvSpPr>
-        <p:spPr/>
-        <p:txBody>
-          <a:bodyPr/>
-          <a:lstStyle/>
-          <a:p>
-            <a:pPr lvl="0"/>
-            <a:r>
-              <a:rPr lang="en-US" dirty="0"/>
-              <a:t>Use the computer</a:t>
-            </a:r>
-          </a:p>
-        </p:txBody>
-      </p:sp>
-      <p:sp>
-        <p:nvSpPr>
-          <p:cNvPr id="3" name="Content Placeholder 2">
-            <a:extLst>
-              <a:ext uri="{FF2B5EF4-FFF2-40B4-BE49-F238E27FC236}">
-                <a16:creationId xmlns:a16="http://schemas.microsoft.com/office/drawing/2014/main" id="{410129CB-3B53-4D35-B842-E13D26067596}"/>
-              </a:ext>
-            </a:extLst>
-          </p:cNvPr>
-          <p:cNvSpPr>
-            <a:spLocks noGrp="1"/>
-          </p:cNvSpPr>
-          <p:nvPr>
-            <p:ph idx="1"/>
-          </p:nvPr>
-        </p:nvSpPr>
-        <p:spPr/>
-        <p:txBody>
-          <a:bodyPr/>
-          <a:lstStyle/>
-          <a:p>
-            <a:endParaRPr lang="en-US"/>
-          </a:p>
-        </p:txBody>
-      </p:sp>
-    </p:spTree>
-    <p:extLst>
-      <p:ext uri="{BB962C8B-B14F-4D97-AF65-F5344CB8AC3E}">
-        <p14:creationId xmlns:p14="http://schemas.microsoft.com/office/powerpoint/2010/main" val="849285240"/>
-      </p:ext>
-    </p:extLst>
-  </p:cSld>
-  <p:clrMapOvr>
-    <a:masterClrMapping/>
-  </p:clrMapOvr>
-</p:sld>
-</file>
-
 <file path=ppt/slides/slide38.xml><?xml version="1.0" encoding="utf-8"?>
 <p:sld xmlns:a="http://schemas.openxmlformats.org/drawingml/2006/main" xmlns:r="http://schemas.openxmlformats.org/officeDocument/2006/relationships" xmlns:p="http://schemas.openxmlformats.org/presentationml/2006/main">
   <p:cSld>
@@ -11627,7 +12067,7 @@
           <p:cNvPr id="2" name="Title 1">
             <a:extLst>
               <a:ext uri="{FF2B5EF4-FFF2-40B4-BE49-F238E27FC236}">
-                <a16:creationId xmlns:a16="http://schemas.microsoft.com/office/drawing/2014/main" id="{55FBC620-476D-4296-935F-9E71A1ECB00F}"/>
+                <a16:creationId xmlns:a16="http://schemas.microsoft.com/office/drawing/2014/main" id="{3DC4F2E8-6C07-939C-3F38-CADCF7C47825}"/>
               </a:ext>
             </a:extLst>
           </p:cNvPr>
@@ -11643,10 +12083,9 @@
           <a:bodyPr/>
           <a:lstStyle/>
           <a:p>
-            <a:pPr lvl="0"/>
-            <a:r>
-              <a:rPr lang="en-US" dirty="0"/>
-              <a:t>Review your own code first</a:t>
+            <a:r>
+              <a:rPr lang="en-US" dirty="0"/>
+              <a:t>Test, Test, Test!</a:t>
             </a:r>
           </a:p>
         </p:txBody>
@@ -11656,7 +12095,7 @@
           <p:cNvPr id="3" name="Content Placeholder 2">
             <a:extLst>
               <a:ext uri="{FF2B5EF4-FFF2-40B4-BE49-F238E27FC236}">
-                <a16:creationId xmlns:a16="http://schemas.microsoft.com/office/drawing/2014/main" id="{7D5A9C92-94F5-4740-84CA-D1FD2F46FD27}"/>
+                <a16:creationId xmlns:a16="http://schemas.microsoft.com/office/drawing/2014/main" id="{38717A33-7130-FF93-A34C-4ABB6BFEE63C}"/>
               </a:ext>
             </a:extLst>
           </p:cNvPr>
@@ -11672,14 +12111,14 @@
           <a:bodyPr/>
           <a:lstStyle/>
           <a:p>
-            <a:endParaRPr lang="en-US" dirty="0"/>
+            <a:endParaRPr lang="en-US"/>
           </a:p>
         </p:txBody>
       </p:sp>
     </p:spTree>
     <p:extLst>
       <p:ext uri="{BB962C8B-B14F-4D97-AF65-F5344CB8AC3E}">
-        <p14:creationId xmlns:p14="http://schemas.microsoft.com/office/powerpoint/2010/main" val="3324773624"/>
+        <p14:creationId xmlns:p14="http://schemas.microsoft.com/office/powerpoint/2010/main" val="266870724"/>
       </p:ext>
     </p:extLst>
   </p:cSld>
@@ -11711,7 +12150,7 @@
           <p:cNvPr id="2" name="Title 1">
             <a:extLst>
               <a:ext uri="{FF2B5EF4-FFF2-40B4-BE49-F238E27FC236}">
-                <a16:creationId xmlns:a16="http://schemas.microsoft.com/office/drawing/2014/main" id="{74F67C75-18B2-4C47-B562-A820CA04993D}"/>
+                <a16:creationId xmlns:a16="http://schemas.microsoft.com/office/drawing/2014/main" id="{1400C7A5-EDF0-4A76-967E-C7B402FCAED5}"/>
               </a:ext>
             </a:extLst>
           </p:cNvPr>
@@ -11730,7 +12169,7 @@
             <a:pPr lvl="0"/>
             <a:r>
               <a:rPr lang="en-US" dirty="0"/>
-              <a:t>Communicate Clearly</a:t>
+              <a:t>Use the computer</a:t>
             </a:r>
           </a:p>
         </p:txBody>
@@ -11740,7 +12179,7 @@
           <p:cNvPr id="3" name="Content Placeholder 2">
             <a:extLst>
               <a:ext uri="{FF2B5EF4-FFF2-40B4-BE49-F238E27FC236}">
-                <a16:creationId xmlns:a16="http://schemas.microsoft.com/office/drawing/2014/main" id="{D66E4CEB-A5F2-49D1-A171-E4F2F2F92B6D}"/>
+                <a16:creationId xmlns:a16="http://schemas.microsoft.com/office/drawing/2014/main" id="{410129CB-3B53-4D35-B842-E13D26067596}"/>
               </a:ext>
             </a:extLst>
           </p:cNvPr>
@@ -11763,7 +12202,7 @@
     </p:spTree>
     <p:extLst>
       <p:ext uri="{BB962C8B-B14F-4D97-AF65-F5344CB8AC3E}">
-        <p14:creationId xmlns:p14="http://schemas.microsoft.com/office/powerpoint/2010/main" val="97765795"/>
+        <p14:creationId xmlns:p14="http://schemas.microsoft.com/office/powerpoint/2010/main" val="849285240"/>
       </p:ext>
     </p:extLst>
   </p:cSld>
@@ -11892,7 +12331,7 @@
           <p:cNvPr id="2" name="Title 1">
             <a:extLst>
               <a:ext uri="{FF2B5EF4-FFF2-40B4-BE49-F238E27FC236}">
-                <a16:creationId xmlns:a16="http://schemas.microsoft.com/office/drawing/2014/main" id="{C4F9A022-7BBA-446B-B9AB-1AAD4B3C623C}"/>
+                <a16:creationId xmlns:a16="http://schemas.microsoft.com/office/drawing/2014/main" id="{55FBC620-476D-4296-935F-9E71A1ECB00F}"/>
               </a:ext>
             </a:extLst>
           </p:cNvPr>
@@ -11911,7 +12350,7 @@
             <a:pPr lvl="0"/>
             <a:r>
               <a:rPr lang="en-US" dirty="0"/>
-              <a:t>Answer questions with the code</a:t>
+              <a:t>Review your own code first</a:t>
             </a:r>
           </a:p>
         </p:txBody>
@@ -11921,7 +12360,7 @@
           <p:cNvPr id="3" name="Content Placeholder 2">
             <a:extLst>
               <a:ext uri="{FF2B5EF4-FFF2-40B4-BE49-F238E27FC236}">
-                <a16:creationId xmlns:a16="http://schemas.microsoft.com/office/drawing/2014/main" id="{AF189AA5-1C25-430C-8DB5-6C9D8A504F9B}"/>
+                <a16:creationId xmlns:a16="http://schemas.microsoft.com/office/drawing/2014/main" id="{7D5A9C92-94F5-4740-84CA-D1FD2F46FD27}"/>
               </a:ext>
             </a:extLst>
           </p:cNvPr>
@@ -11937,23 +12376,14 @@
           <a:bodyPr/>
           <a:lstStyle/>
           <a:p>
-            <a:r>
-              <a:rPr lang="en-US" dirty="0"/>
-              <a:t>Refactor to make it more readable</a:t>
-            </a:r>
-          </a:p>
-          <a:p>
-            <a:r>
-              <a:rPr lang="en-US" dirty="0"/>
-              <a:t>Eliminate confusion</a:t>
-            </a:r>
+            <a:endParaRPr lang="en-US" dirty="0"/>
           </a:p>
         </p:txBody>
       </p:sp>
     </p:spTree>
     <p:extLst>
       <p:ext uri="{BB962C8B-B14F-4D97-AF65-F5344CB8AC3E}">
-        <p14:creationId xmlns:p14="http://schemas.microsoft.com/office/powerpoint/2010/main" val="2685276257"/>
+        <p14:creationId xmlns:p14="http://schemas.microsoft.com/office/powerpoint/2010/main" val="3324773624"/>
       </p:ext>
     </p:extLst>
   </p:cSld>
@@ -11985,7 +12415,7 @@
           <p:cNvPr id="2" name="Title 1">
             <a:extLst>
               <a:ext uri="{FF2B5EF4-FFF2-40B4-BE49-F238E27FC236}">
-                <a16:creationId xmlns:a16="http://schemas.microsoft.com/office/drawing/2014/main" id="{27B045FA-639B-48FA-166A-1273198F3F4D}"/>
+                <a16:creationId xmlns:a16="http://schemas.microsoft.com/office/drawing/2014/main" id="{74F67C75-18B2-4C47-B562-A820CA04993D}"/>
               </a:ext>
             </a:extLst>
           </p:cNvPr>
@@ -12001,9 +12431,10 @@
           <a:bodyPr/>
           <a:lstStyle/>
           <a:p>
-            <a:r>
-              <a:rPr lang="en-US" dirty="0"/>
-              <a:t>Keep it Simple</a:t>
+            <a:pPr lvl="0"/>
+            <a:r>
+              <a:rPr lang="en-US" dirty="0"/>
+              <a:t>Communicate Clearly</a:t>
             </a:r>
           </a:p>
         </p:txBody>
@@ -12013,7 +12444,7 @@
           <p:cNvPr id="3" name="Content Placeholder 2">
             <a:extLst>
               <a:ext uri="{FF2B5EF4-FFF2-40B4-BE49-F238E27FC236}">
-                <a16:creationId xmlns:a16="http://schemas.microsoft.com/office/drawing/2014/main" id="{3182D7FA-4DEE-93DD-A7B3-F431B32DF42F}"/>
+                <a16:creationId xmlns:a16="http://schemas.microsoft.com/office/drawing/2014/main" id="{D66E4CEB-A5F2-49D1-A171-E4F2F2F92B6D}"/>
               </a:ext>
             </a:extLst>
           </p:cNvPr>
@@ -12029,32 +12460,14 @@
           <a:bodyPr/>
           <a:lstStyle/>
           <a:p>
-            <a:pPr lvl="0"/>
-            <a:r>
-              <a:rPr lang="en-US" dirty="0"/>
-              <a:t>Narrow scope changes</a:t>
-            </a:r>
-          </a:p>
-          <a:p>
-            <a:pPr lvl="0"/>
-            <a:r>
-              <a:rPr lang="en-US" dirty="0"/>
-              <a:t>Separate functional and non-functional changes</a:t>
-            </a:r>
-          </a:p>
-          <a:p>
-            <a:pPr lvl="0"/>
-            <a:r>
-              <a:rPr lang="en-US" dirty="0"/>
-              <a:t>Break up large change sets</a:t>
-            </a:r>
+            <a:endParaRPr lang="en-US"/>
           </a:p>
         </p:txBody>
       </p:sp>
     </p:spTree>
     <p:extLst>
       <p:ext uri="{BB962C8B-B14F-4D97-AF65-F5344CB8AC3E}">
-        <p14:creationId xmlns:p14="http://schemas.microsoft.com/office/powerpoint/2010/main" val="1020306639"/>
+        <p14:creationId xmlns:p14="http://schemas.microsoft.com/office/powerpoint/2010/main" val="97765795"/>
       </p:ext>
     </p:extLst>
   </p:cSld>
@@ -12086,7 +12499,7 @@
           <p:cNvPr id="2" name="Title 1">
             <a:extLst>
               <a:ext uri="{FF2B5EF4-FFF2-40B4-BE49-F238E27FC236}">
-                <a16:creationId xmlns:a16="http://schemas.microsoft.com/office/drawing/2014/main" id="{77133BF5-62E6-4381-AAD5-4D276411C0FE}"/>
+                <a16:creationId xmlns:a16="http://schemas.microsoft.com/office/drawing/2014/main" id="{C4F9A022-7BBA-446B-B9AB-1AAD4B3C623C}"/>
               </a:ext>
             </a:extLst>
           </p:cNvPr>
@@ -12105,7 +12518,7 @@
             <a:pPr lvl="0"/>
             <a:r>
               <a:rPr lang="en-US" dirty="0"/>
-              <a:t>Stay Cool</a:t>
+              <a:t>Answer questions with the code</a:t>
             </a:r>
           </a:p>
         </p:txBody>
@@ -12115,7 +12528,7 @@
           <p:cNvPr id="3" name="Content Placeholder 2">
             <a:extLst>
               <a:ext uri="{FF2B5EF4-FFF2-40B4-BE49-F238E27FC236}">
-                <a16:creationId xmlns:a16="http://schemas.microsoft.com/office/drawing/2014/main" id="{FFD8BA3E-42B8-47D9-92FF-5437AEE51C9E}"/>
+                <a16:creationId xmlns:a16="http://schemas.microsoft.com/office/drawing/2014/main" id="{AF189AA5-1C25-430C-8DB5-6C9D8A504F9B}"/>
               </a:ext>
             </a:extLst>
           </p:cNvPr>
@@ -12131,17 +12544,15 @@
           <a:bodyPr/>
           <a:lstStyle/>
           <a:p>
-            <a:pPr lvl="0"/>
-            <a:r>
-              <a:rPr lang="en-US" dirty="0"/>
-              <a:t>Respond graciously</a:t>
-            </a:r>
-          </a:p>
-          <a:p>
-            <a:pPr lvl="0"/>
-            <a:r>
-              <a:rPr lang="en-US" dirty="0"/>
-              <a:t>Be patient when reviewer is mistaken</a:t>
+            <a:r>
+              <a:rPr lang="en-US" dirty="0"/>
+              <a:t>Refactor to make it more readable</a:t>
+            </a:r>
+          </a:p>
+          <a:p>
+            <a:r>
+              <a:rPr lang="en-US" dirty="0"/>
+              <a:t>Eliminate confusion</a:t>
             </a:r>
           </a:p>
         </p:txBody>
@@ -12149,7 +12560,7 @@
     </p:spTree>
     <p:extLst>
       <p:ext uri="{BB962C8B-B14F-4D97-AF65-F5344CB8AC3E}">
-        <p14:creationId xmlns:p14="http://schemas.microsoft.com/office/powerpoint/2010/main" val="502853573"/>
+        <p14:creationId xmlns:p14="http://schemas.microsoft.com/office/powerpoint/2010/main" val="2685276257"/>
       </p:ext>
     </p:extLst>
   </p:cSld>
@@ -12181,7 +12592,7 @@
           <p:cNvPr id="2" name="Title 1">
             <a:extLst>
               <a:ext uri="{FF2B5EF4-FFF2-40B4-BE49-F238E27FC236}">
-                <a16:creationId xmlns:a16="http://schemas.microsoft.com/office/drawing/2014/main" id="{2DB38190-4088-2EAF-AB63-6A6308369618}"/>
+                <a16:creationId xmlns:a16="http://schemas.microsoft.com/office/drawing/2014/main" id="{27B045FA-639B-48FA-166A-1273198F3F4D}"/>
               </a:ext>
             </a:extLst>
           </p:cNvPr>
@@ -12199,7 +12610,7 @@
           <a:p>
             <a:r>
               <a:rPr lang="en-US" dirty="0"/>
-              <a:t>Respond Quickly</a:t>
+              <a:t>Keep it Simple</a:t>
             </a:r>
           </a:p>
         </p:txBody>
@@ -12209,7 +12620,7 @@
           <p:cNvPr id="3" name="Content Placeholder 2">
             <a:extLst>
               <a:ext uri="{FF2B5EF4-FFF2-40B4-BE49-F238E27FC236}">
-                <a16:creationId xmlns:a16="http://schemas.microsoft.com/office/drawing/2014/main" id="{1E6A3824-4E76-1B2D-AC84-9F005F5B1A66}"/>
+                <a16:creationId xmlns:a16="http://schemas.microsoft.com/office/drawing/2014/main" id="{3182D7FA-4DEE-93DD-A7B3-F431B32DF42F}"/>
               </a:ext>
             </a:extLst>
           </p:cNvPr>
@@ -12226,14 +12637,34 @@
           <a:lstStyle/>
           <a:p>
             <a:pPr lvl="0"/>
-            <a:endParaRPr lang="en-US" dirty="0"/>
+            <a:r>
+              <a:rPr lang="en-US" dirty="0"/>
+              <a:t>Narrow scope changes</a:t>
+            </a:r>
+          </a:p>
+          <a:p>
+            <a:r>
+              <a:rPr lang="en-US"/>
+              <a:t>Break up large change sets</a:t>
+            </a:r>
+          </a:p>
+          <a:p>
+            <a:pPr lvl="0"/>
+            <a:r>
+              <a:rPr lang="en-US"/>
+              <a:t>Separate </a:t>
+            </a:r>
+            <a:r>
+              <a:rPr lang="en-US" dirty="0"/>
+              <a:t>functional and non-functional changes</a:t>
+            </a:r>
           </a:p>
         </p:txBody>
       </p:sp>
     </p:spTree>
     <p:extLst>
       <p:ext uri="{BB962C8B-B14F-4D97-AF65-F5344CB8AC3E}">
-        <p14:creationId xmlns:p14="http://schemas.microsoft.com/office/powerpoint/2010/main" val="4063495638"/>
+        <p14:creationId xmlns:p14="http://schemas.microsoft.com/office/powerpoint/2010/main" val="1020306639"/>
       </p:ext>
     </p:extLst>
   </p:cSld>
@@ -12265,7 +12696,7 @@
           <p:cNvPr id="2" name="Title 1">
             <a:extLst>
               <a:ext uri="{FF2B5EF4-FFF2-40B4-BE49-F238E27FC236}">
-                <a16:creationId xmlns:a16="http://schemas.microsoft.com/office/drawing/2014/main" id="{AFECA953-EA38-47CF-B589-C24DB3218239}"/>
+                <a16:creationId xmlns:a16="http://schemas.microsoft.com/office/drawing/2014/main" id="{77133BF5-62E6-4381-AAD5-4D276411C0FE}"/>
               </a:ext>
             </a:extLst>
           </p:cNvPr>
@@ -12284,7 +12715,7 @@
             <a:pPr lvl="0"/>
             <a:r>
               <a:rPr lang="en-US" dirty="0"/>
-              <a:t>Award ties to your reviewer</a:t>
+              <a:t>Stay Cool</a:t>
             </a:r>
           </a:p>
         </p:txBody>
@@ -12294,7 +12725,7 @@
           <p:cNvPr id="3" name="Content Placeholder 2">
             <a:extLst>
               <a:ext uri="{FF2B5EF4-FFF2-40B4-BE49-F238E27FC236}">
-                <a16:creationId xmlns:a16="http://schemas.microsoft.com/office/drawing/2014/main" id="{9804FA7E-20D6-4595-9AFC-39ACA010A08F}"/>
+                <a16:creationId xmlns:a16="http://schemas.microsoft.com/office/drawing/2014/main" id="{FFD8BA3E-42B8-47D9-92FF-5437AEE51C9E}"/>
               </a:ext>
             </a:extLst>
           </p:cNvPr>
@@ -12310,14 +12741,25 @@
           <a:bodyPr/>
           <a:lstStyle/>
           <a:p>
-            <a:endParaRPr lang="en-US"/>
+            <a:pPr lvl="0"/>
+            <a:r>
+              <a:rPr lang="en-US" dirty="0"/>
+              <a:t>Respond graciously</a:t>
+            </a:r>
+          </a:p>
+          <a:p>
+            <a:pPr lvl="0"/>
+            <a:r>
+              <a:rPr lang="en-US" dirty="0"/>
+              <a:t>Be patient when reviewer is mistaken</a:t>
+            </a:r>
           </a:p>
         </p:txBody>
       </p:sp>
     </p:spTree>
     <p:extLst>
       <p:ext uri="{BB962C8B-B14F-4D97-AF65-F5344CB8AC3E}">
-        <p14:creationId xmlns:p14="http://schemas.microsoft.com/office/powerpoint/2010/main" val="660866794"/>
+        <p14:creationId xmlns:p14="http://schemas.microsoft.com/office/powerpoint/2010/main" val="502853573"/>
       </p:ext>
     </p:extLst>
   </p:cSld>
@@ -12349,7 +12791,7 @@
           <p:cNvPr id="2" name="Title 1">
             <a:extLst>
               <a:ext uri="{FF2B5EF4-FFF2-40B4-BE49-F238E27FC236}">
-                <a16:creationId xmlns:a16="http://schemas.microsoft.com/office/drawing/2014/main" id="{77E78699-ECC4-FB9B-2E4D-DCB0F2DC3353}"/>
+                <a16:creationId xmlns:a16="http://schemas.microsoft.com/office/drawing/2014/main" id="{2DB38190-4088-2EAF-AB63-6A6308369618}"/>
               </a:ext>
             </a:extLst>
           </p:cNvPr>
@@ -12367,7 +12809,7 @@
           <a:p>
             <a:r>
               <a:rPr lang="en-US" dirty="0"/>
-              <a:t>Best Practices for Code Author</a:t>
+              <a:t>Respond Quickly</a:t>
             </a:r>
           </a:p>
         </p:txBody>
@@ -12377,7 +12819,7 @@
           <p:cNvPr id="3" name="Content Placeholder 2">
             <a:extLst>
               <a:ext uri="{FF2B5EF4-FFF2-40B4-BE49-F238E27FC236}">
-                <a16:creationId xmlns:a16="http://schemas.microsoft.com/office/drawing/2014/main" id="{DD7EC6D3-8CBF-E3A3-EAEA-FAD9515DF7E6}"/>
+                <a16:creationId xmlns:a16="http://schemas.microsoft.com/office/drawing/2014/main" id="{1E6A3824-4E76-1B2D-AC84-9F005F5B1A66}"/>
               </a:ext>
             </a:extLst>
           </p:cNvPr>
@@ -12393,41 +12835,15 @@
           <a:bodyPr/>
           <a:lstStyle/>
           <a:p>
-            <a:r>
-              <a:rPr lang="en-US" dirty="0"/>
-              <a:t>Review First</a:t>
-            </a:r>
-          </a:p>
-          <a:p>
-            <a:r>
-              <a:rPr lang="en-US" dirty="0"/>
-              <a:t>Small change sets</a:t>
-            </a:r>
-          </a:p>
-          <a:p>
-            <a:r>
-              <a:rPr lang="en-US" dirty="0"/>
-              <a:t>Readable Code</a:t>
-            </a:r>
-          </a:p>
-          <a:p>
-            <a:r>
-              <a:rPr lang="en-US" dirty="0"/>
-              <a:t>Clear Communication</a:t>
-            </a:r>
-          </a:p>
-          <a:p>
-            <a:r>
-              <a:rPr lang="en-US" dirty="0"/>
-              <a:t>Do Not Take It Personally</a:t>
-            </a:r>
+            <a:pPr lvl="0"/>
+            <a:endParaRPr lang="en-US" dirty="0"/>
           </a:p>
         </p:txBody>
       </p:sp>
     </p:spTree>
     <p:extLst>
       <p:ext uri="{BB962C8B-B14F-4D97-AF65-F5344CB8AC3E}">
-        <p14:creationId xmlns:p14="http://schemas.microsoft.com/office/powerpoint/2010/main" val="1835386389"/>
+        <p14:creationId xmlns:p14="http://schemas.microsoft.com/office/powerpoint/2010/main" val="4063495638"/>
       </p:ext>
     </p:extLst>
   </p:cSld>
@@ -12459,7 +12875,7 @@
           <p:cNvPr id="2" name="Title 1">
             <a:extLst>
               <a:ext uri="{FF2B5EF4-FFF2-40B4-BE49-F238E27FC236}">
-                <a16:creationId xmlns:a16="http://schemas.microsoft.com/office/drawing/2014/main" id="{64C74969-14BF-E23B-0378-D3C115411FDD}"/>
+                <a16:creationId xmlns:a16="http://schemas.microsoft.com/office/drawing/2014/main" id="{AFECA953-EA38-47CF-B589-C24DB3218239}"/>
               </a:ext>
             </a:extLst>
           </p:cNvPr>
@@ -12475,9 +12891,10 @@
           <a:bodyPr/>
           <a:lstStyle/>
           <a:p>
-            <a:r>
-              <a:rPr lang="en-US" dirty="0"/>
-              <a:t>Best Practices Common to Author and Reviewer</a:t>
+            <a:pPr lvl="0"/>
+            <a:r>
+              <a:rPr lang="en-US" dirty="0"/>
+              <a:t>Award ties to your reviewer</a:t>
             </a:r>
           </a:p>
         </p:txBody>
@@ -12487,7 +12904,7 @@
           <p:cNvPr id="3" name="Content Placeholder 2">
             <a:extLst>
               <a:ext uri="{FF2B5EF4-FFF2-40B4-BE49-F238E27FC236}">
-                <a16:creationId xmlns:a16="http://schemas.microsoft.com/office/drawing/2014/main" id="{53CCF844-EC74-58A6-F908-14572160C533}"/>
+                <a16:creationId xmlns:a16="http://schemas.microsoft.com/office/drawing/2014/main" id="{9804FA7E-20D6-4595-9AFC-39ACA010A08F}"/>
               </a:ext>
             </a:extLst>
           </p:cNvPr>
@@ -12503,32 +12920,14 @@
           <a:bodyPr/>
           <a:lstStyle/>
           <a:p>
-            <a:r>
-              <a:rPr lang="en-US" dirty="0"/>
-              <a:t>Keep review time short</a:t>
-            </a:r>
-          </a:p>
-          <a:p>
-            <a:r>
-              <a:rPr lang="en-US" dirty="0"/>
-              <a:t>Maintain respectful communication</a:t>
-            </a:r>
-          </a:p>
-          <a:p>
-            <a:r>
-              <a:rPr lang="en-US" dirty="0"/>
-              <a:t>Never make it personal</a:t>
-            </a:r>
-          </a:p>
-          <a:p>
-            <a:endParaRPr lang="en-US" dirty="0"/>
+            <a:endParaRPr lang="en-US"/>
           </a:p>
         </p:txBody>
       </p:sp>
     </p:spTree>
     <p:extLst>
       <p:ext uri="{BB962C8B-B14F-4D97-AF65-F5344CB8AC3E}">
-        <p14:creationId xmlns:p14="http://schemas.microsoft.com/office/powerpoint/2010/main" val="2141707603"/>
+        <p14:creationId xmlns:p14="http://schemas.microsoft.com/office/powerpoint/2010/main" val="660866794"/>
       </p:ext>
     </p:extLst>
   </p:cSld>
@@ -12560,7 +12959,7 @@
           <p:cNvPr id="2" name="Title 1">
             <a:extLst>
               <a:ext uri="{FF2B5EF4-FFF2-40B4-BE49-F238E27FC236}">
-                <a16:creationId xmlns:a16="http://schemas.microsoft.com/office/drawing/2014/main" id="{73125B13-522D-C8C0-4132-26103B18FC5A}"/>
+                <a16:creationId xmlns:a16="http://schemas.microsoft.com/office/drawing/2014/main" id="{77E78699-ECC4-FB9B-2E4D-DCB0F2DC3353}"/>
               </a:ext>
             </a:extLst>
           </p:cNvPr>
@@ -12578,7 +12977,7 @@
           <a:p>
             <a:r>
               <a:rPr lang="en-US" dirty="0"/>
-              <a:t>For Managers</a:t>
+              <a:t>Best Practices for Code Author</a:t>
             </a:r>
           </a:p>
         </p:txBody>
@@ -12588,7 +12987,7 @@
           <p:cNvPr id="3" name="Content Placeholder 2">
             <a:extLst>
               <a:ext uri="{FF2B5EF4-FFF2-40B4-BE49-F238E27FC236}">
-                <a16:creationId xmlns:a16="http://schemas.microsoft.com/office/drawing/2014/main" id="{CBD7B767-AF2A-E842-237F-A1D946AF88B8}"/>
+                <a16:creationId xmlns:a16="http://schemas.microsoft.com/office/drawing/2014/main" id="{DD7EC6D3-8CBF-E3A3-EAEA-FAD9515DF7E6}"/>
               </a:ext>
             </a:extLst>
           </p:cNvPr>
@@ -12606,25 +13005,31 @@
           <a:p>
             <a:r>
               <a:rPr lang="en-US" dirty="0"/>
-              <a:t>Rotate who reviews whose code</a:t>
-            </a:r>
-          </a:p>
-          <a:p>
-            <a:r>
-              <a:rPr lang="en-US" dirty="0"/>
-              <a:t>Make sure each engineer is authoring and reviewing</a:t>
-            </a:r>
-          </a:p>
-          <a:p>
-            <a:r>
-              <a:rPr lang="en-US" dirty="0"/>
-              <a:t>Set policies to require code approval before a PR merge</a:t>
-            </a:r>
-          </a:p>
-          <a:p>
-            <a:r>
-              <a:rPr lang="en-US" dirty="0"/>
-              <a:t>Foster a culture of teamwork</a:t>
+              <a:t>Review First</a:t>
+            </a:r>
+          </a:p>
+          <a:p>
+            <a:r>
+              <a:rPr lang="en-US" dirty="0"/>
+              <a:t>Small change sets</a:t>
+            </a:r>
+          </a:p>
+          <a:p>
+            <a:r>
+              <a:rPr lang="en-US" dirty="0"/>
+              <a:t>Readable Code</a:t>
+            </a:r>
+          </a:p>
+          <a:p>
+            <a:r>
+              <a:rPr lang="en-US" dirty="0"/>
+              <a:t>Clear Communication</a:t>
+            </a:r>
+          </a:p>
+          <a:p>
+            <a:r>
+              <a:rPr lang="en-US" dirty="0"/>
+              <a:t>Do Not Take It Personally</a:t>
             </a:r>
           </a:p>
         </p:txBody>
@@ -12632,7 +13037,7 @@
     </p:spTree>
     <p:extLst>
       <p:ext uri="{BB962C8B-B14F-4D97-AF65-F5344CB8AC3E}">
-        <p14:creationId xmlns:p14="http://schemas.microsoft.com/office/powerpoint/2010/main" val="1686258816"/>
+        <p14:creationId xmlns:p14="http://schemas.microsoft.com/office/powerpoint/2010/main" val="1835386389"/>
       </p:ext>
     </p:extLst>
   </p:cSld>
@@ -12664,6 +13069,330 @@
           <p:cNvPr id="2" name="Title 1">
             <a:extLst>
               <a:ext uri="{FF2B5EF4-FFF2-40B4-BE49-F238E27FC236}">
+                <a16:creationId xmlns:a16="http://schemas.microsoft.com/office/drawing/2014/main" id="{64C74969-14BF-E23B-0378-D3C115411FDD}"/>
+              </a:ext>
+            </a:extLst>
+          </p:cNvPr>
+          <p:cNvSpPr>
+            <a:spLocks noGrp="1"/>
+          </p:cNvSpPr>
+          <p:nvPr>
+            <p:ph type="title"/>
+          </p:nvPr>
+        </p:nvSpPr>
+        <p:spPr/>
+        <p:txBody>
+          <a:bodyPr/>
+          <a:lstStyle/>
+          <a:p>
+            <a:r>
+              <a:rPr lang="en-US" dirty="0"/>
+              <a:t>Best Practices Common to Author and Reviewer</a:t>
+            </a:r>
+          </a:p>
+        </p:txBody>
+      </p:sp>
+      <p:sp>
+        <p:nvSpPr>
+          <p:cNvPr id="3" name="Content Placeholder 2">
+            <a:extLst>
+              <a:ext uri="{FF2B5EF4-FFF2-40B4-BE49-F238E27FC236}">
+                <a16:creationId xmlns:a16="http://schemas.microsoft.com/office/drawing/2014/main" id="{53CCF844-EC74-58A6-F908-14572160C533}"/>
+              </a:ext>
+            </a:extLst>
+          </p:cNvPr>
+          <p:cNvSpPr>
+            <a:spLocks noGrp="1"/>
+          </p:cNvSpPr>
+          <p:nvPr>
+            <p:ph idx="1"/>
+          </p:nvPr>
+        </p:nvSpPr>
+        <p:spPr/>
+        <p:txBody>
+          <a:bodyPr/>
+          <a:lstStyle/>
+          <a:p>
+            <a:r>
+              <a:rPr lang="en-US" dirty="0"/>
+              <a:t>Keep review time short</a:t>
+            </a:r>
+          </a:p>
+          <a:p>
+            <a:r>
+              <a:rPr lang="en-US" dirty="0"/>
+              <a:t>Maintain respectful communication</a:t>
+            </a:r>
+          </a:p>
+          <a:p>
+            <a:r>
+              <a:rPr lang="en-US" dirty="0"/>
+              <a:t>Never make it personal</a:t>
+            </a:r>
+          </a:p>
+          <a:p>
+            <a:endParaRPr lang="en-US" dirty="0"/>
+          </a:p>
+        </p:txBody>
+      </p:sp>
+    </p:spTree>
+    <p:extLst>
+      <p:ext uri="{BB962C8B-B14F-4D97-AF65-F5344CB8AC3E}">
+        <p14:creationId xmlns:p14="http://schemas.microsoft.com/office/powerpoint/2010/main" val="2141707603"/>
+      </p:ext>
+    </p:extLst>
+  </p:cSld>
+  <p:clrMapOvr>
+    <a:masterClrMapping/>
+  </p:clrMapOvr>
+</p:sld>
+</file>
+
+<file path=ppt/slides/slide49.xml><?xml version="1.0" encoding="utf-8"?>
+<p:sld xmlns:a="http://schemas.openxmlformats.org/drawingml/2006/main" xmlns:r="http://schemas.openxmlformats.org/officeDocument/2006/relationships" xmlns:p="http://schemas.openxmlformats.org/presentationml/2006/main">
+  <p:cSld>
+    <p:spTree>
+      <p:nvGrpSpPr>
+        <p:cNvPr id="1" name=""/>
+        <p:cNvGrpSpPr/>
+        <p:nvPr/>
+      </p:nvGrpSpPr>
+      <p:grpSpPr>
+        <a:xfrm>
+          <a:off x="0" y="0"/>
+          <a:ext cx="0" cy="0"/>
+          <a:chOff x="0" y="0"/>
+          <a:chExt cx="0" cy="0"/>
+        </a:xfrm>
+      </p:grpSpPr>
+      <p:sp>
+        <p:nvSpPr>
+          <p:cNvPr id="2" name="Title 1">
+            <a:extLst>
+              <a:ext uri="{FF2B5EF4-FFF2-40B4-BE49-F238E27FC236}">
+                <a16:creationId xmlns:a16="http://schemas.microsoft.com/office/drawing/2014/main" id="{73125B13-522D-C8C0-4132-26103B18FC5A}"/>
+              </a:ext>
+            </a:extLst>
+          </p:cNvPr>
+          <p:cNvSpPr>
+            <a:spLocks noGrp="1"/>
+          </p:cNvSpPr>
+          <p:nvPr>
+            <p:ph type="title"/>
+          </p:nvPr>
+        </p:nvSpPr>
+        <p:spPr/>
+        <p:txBody>
+          <a:bodyPr/>
+          <a:lstStyle/>
+          <a:p>
+            <a:r>
+              <a:rPr lang="en-US" dirty="0"/>
+              <a:t>For Managers</a:t>
+            </a:r>
+          </a:p>
+        </p:txBody>
+      </p:sp>
+      <p:sp>
+        <p:nvSpPr>
+          <p:cNvPr id="3" name="Content Placeholder 2">
+            <a:extLst>
+              <a:ext uri="{FF2B5EF4-FFF2-40B4-BE49-F238E27FC236}">
+                <a16:creationId xmlns:a16="http://schemas.microsoft.com/office/drawing/2014/main" id="{CBD7B767-AF2A-E842-237F-A1D946AF88B8}"/>
+              </a:ext>
+            </a:extLst>
+          </p:cNvPr>
+          <p:cNvSpPr>
+            <a:spLocks noGrp="1"/>
+          </p:cNvSpPr>
+          <p:nvPr>
+            <p:ph idx="1"/>
+          </p:nvPr>
+        </p:nvSpPr>
+        <p:spPr/>
+        <p:txBody>
+          <a:bodyPr/>
+          <a:lstStyle/>
+          <a:p>
+            <a:r>
+              <a:rPr lang="en-US" dirty="0"/>
+              <a:t>Rotate who reviews whose code</a:t>
+            </a:r>
+          </a:p>
+          <a:p>
+            <a:r>
+              <a:rPr lang="en-US" dirty="0"/>
+              <a:t>Make sure each engineer is authoring and reviewing</a:t>
+            </a:r>
+          </a:p>
+          <a:p>
+            <a:r>
+              <a:rPr lang="en-US" dirty="0"/>
+              <a:t>Set policies to require code approval before a PR merge</a:t>
+            </a:r>
+          </a:p>
+          <a:p>
+            <a:r>
+              <a:rPr lang="en-US" dirty="0"/>
+              <a:t>Foster a culture of teamwork</a:t>
+            </a:r>
+          </a:p>
+        </p:txBody>
+      </p:sp>
+    </p:spTree>
+    <p:extLst>
+      <p:ext uri="{BB962C8B-B14F-4D97-AF65-F5344CB8AC3E}">
+        <p14:creationId xmlns:p14="http://schemas.microsoft.com/office/powerpoint/2010/main" val="1686258816"/>
+      </p:ext>
+    </p:extLst>
+  </p:cSld>
+  <p:clrMapOvr>
+    <a:masterClrMapping/>
+  </p:clrMapOvr>
+</p:sld>
+</file>
+
+<file path=ppt/slides/slide5.xml><?xml version="1.0" encoding="utf-8"?>
+<p:sld xmlns:a="http://schemas.openxmlformats.org/drawingml/2006/main" xmlns:r="http://schemas.openxmlformats.org/officeDocument/2006/relationships" xmlns:p="http://schemas.openxmlformats.org/presentationml/2006/main">
+  <p:cSld>
+    <p:spTree>
+      <p:nvGrpSpPr>
+        <p:cNvPr id="1" name=""/>
+        <p:cNvGrpSpPr/>
+        <p:nvPr/>
+      </p:nvGrpSpPr>
+      <p:grpSpPr>
+        <a:xfrm>
+          <a:off x="0" y="0"/>
+          <a:ext cx="0" cy="0"/>
+          <a:chOff x="0" y="0"/>
+          <a:chExt cx="0" cy="0"/>
+        </a:xfrm>
+      </p:grpSpPr>
+      <p:sp>
+        <p:nvSpPr>
+          <p:cNvPr id="2" name="Title 1">
+            <a:extLst>
+              <a:ext uri="{FF2B5EF4-FFF2-40B4-BE49-F238E27FC236}">
+                <a16:creationId xmlns:a16="http://schemas.microsoft.com/office/drawing/2014/main" id="{D74BD1D6-4648-4A50-A39A-843BA94B45D2}"/>
+              </a:ext>
+            </a:extLst>
+          </p:cNvPr>
+          <p:cNvSpPr>
+            <a:spLocks noGrp="1"/>
+          </p:cNvSpPr>
+          <p:nvPr>
+            <p:ph type="title"/>
+          </p:nvPr>
+        </p:nvSpPr>
+        <p:spPr/>
+        <p:txBody>
+          <a:bodyPr/>
+          <a:lstStyle/>
+          <a:p>
+            <a:r>
+              <a:rPr lang="en-US" dirty="0"/>
+              <a:t>Agenda</a:t>
+            </a:r>
+          </a:p>
+        </p:txBody>
+      </p:sp>
+      <p:sp>
+        <p:nvSpPr>
+          <p:cNvPr id="3" name="Content Placeholder 2">
+            <a:extLst>
+              <a:ext uri="{FF2B5EF4-FFF2-40B4-BE49-F238E27FC236}">
+                <a16:creationId xmlns:a16="http://schemas.microsoft.com/office/drawing/2014/main" id="{8A84D209-C1EC-4AE4-8D4B-F5B2D4EADFFE}"/>
+              </a:ext>
+            </a:extLst>
+          </p:cNvPr>
+          <p:cNvSpPr>
+            <a:spLocks noGrp="1"/>
+          </p:cNvSpPr>
+          <p:nvPr>
+            <p:ph idx="1"/>
+          </p:nvPr>
+        </p:nvSpPr>
+        <p:spPr/>
+        <p:txBody>
+          <a:bodyPr/>
+          <a:lstStyle/>
+          <a:p>
+            <a:r>
+              <a:rPr lang="en-US" dirty="0"/>
+              <a:t>Definitions</a:t>
+            </a:r>
+          </a:p>
+          <a:p>
+            <a:r>
+              <a:rPr lang="en-US" dirty="0"/>
+              <a:t>Purpose of a Code Review</a:t>
+            </a:r>
+          </a:p>
+          <a:p>
+            <a:r>
+              <a:rPr lang="en-US" dirty="0"/>
+              <a:t>Challenges</a:t>
+            </a:r>
+          </a:p>
+          <a:p>
+            <a:r>
+              <a:rPr lang="en-US" dirty="0"/>
+              <a:t>Techniques for Code Reviewer</a:t>
+            </a:r>
+          </a:p>
+          <a:p>
+            <a:r>
+              <a:rPr lang="en-US" dirty="0"/>
+              <a:t>Techniques for Code Author</a:t>
+            </a:r>
+          </a:p>
+          <a:p>
+            <a:r>
+              <a:rPr lang="en-US" dirty="0"/>
+              <a:t>Further Reading</a:t>
+            </a:r>
+          </a:p>
+          <a:p>
+            <a:endParaRPr lang="en-US" dirty="0"/>
+          </a:p>
+        </p:txBody>
+      </p:sp>
+    </p:spTree>
+    <p:extLst>
+      <p:ext uri="{BB962C8B-B14F-4D97-AF65-F5344CB8AC3E}">
+        <p14:creationId xmlns:p14="http://schemas.microsoft.com/office/powerpoint/2010/main" val="3491964724"/>
+      </p:ext>
+    </p:extLst>
+  </p:cSld>
+  <p:clrMapOvr>
+    <a:masterClrMapping/>
+  </p:clrMapOvr>
+</p:sld>
+</file>
+
+<file path=ppt/slides/slide50.xml><?xml version="1.0" encoding="utf-8"?>
+<p:sld xmlns:a="http://schemas.openxmlformats.org/drawingml/2006/main" xmlns:r="http://schemas.openxmlformats.org/officeDocument/2006/relationships" xmlns:p="http://schemas.openxmlformats.org/presentationml/2006/main">
+  <p:cSld>
+    <p:spTree>
+      <p:nvGrpSpPr>
+        <p:cNvPr id="1" name=""/>
+        <p:cNvGrpSpPr/>
+        <p:nvPr/>
+      </p:nvGrpSpPr>
+      <p:grpSpPr>
+        <a:xfrm>
+          <a:off x="0" y="0"/>
+          <a:ext cx="0" cy="0"/>
+          <a:chOff x="0" y="0"/>
+          <a:chExt cx="0" cy="0"/>
+        </a:xfrm>
+      </p:grpSpPr>
+      <p:sp>
+        <p:nvSpPr>
+          <p:cNvPr id="2" name="Title 1">
+            <a:extLst>
+              <a:ext uri="{FF2B5EF4-FFF2-40B4-BE49-F238E27FC236}">
                 <a16:creationId xmlns:a16="http://schemas.microsoft.com/office/drawing/2014/main" id="{7A9BBECF-D27F-4A95-82D2-35584A0A31A4}"/>
               </a:ext>
             </a:extLst>
@@ -12705,7 +13434,9 @@
         </p:nvSpPr>
         <p:spPr/>
         <p:txBody>
-          <a:bodyPr/>
+          <a:bodyPr>
+            <a:normAutofit lnSpcReduction="10000"/>
+          </a:bodyPr>
           <a:lstStyle/>
           <a:p>
             <a:pPr marL="342900">
@@ -12983,6 +13714,42 @@
               <a:effectLst/>
               <a:latin typeface="Calibri" panose="020F0502020204030204" pitchFamily="34" charset="0"/>
             </a:endParaRPr>
+          </a:p>
+          <a:p>
+            <a:pPr marL="342900">
+              <a:spcBef>
+                <a:spcPts val="0"/>
+              </a:spcBef>
+            </a:pPr>
+            <a:r>
+              <a:rPr lang="en-US" sz="2400" dirty="0">
+                <a:effectLst/>
+                <a:latin typeface="Calibri" panose="020F0502020204030204" pitchFamily="34" charset="0"/>
+              </a:rPr>
+              <a:t>Why Agile Software Development Techniques Work: Improved Feedback</a:t>
+            </a:r>
+          </a:p>
+          <a:p>
+            <a:pPr marL="800100" lvl="1">
+              <a:spcBef>
+                <a:spcPts val="0"/>
+              </a:spcBef>
+            </a:pPr>
+            <a:r>
+              <a:rPr lang="en-US" sz="2000" dirty="0">
+                <a:effectLst/>
+                <a:latin typeface="Calibri" panose="020F0502020204030204" pitchFamily="34" charset="0"/>
+                <a:hlinkClick r:id="rId9"/>
+              </a:rPr>
+              <a:t>http://www.ambysoft.com/essays/whyAgileWorksFeedback.html</a:t>
+            </a:r>
+            <a:r>
+              <a:rPr lang="en-US" sz="2000" dirty="0">
+                <a:effectLst/>
+                <a:latin typeface="Calibri" panose="020F0502020204030204" pitchFamily="34" charset="0"/>
+              </a:rPr>
+              <a:t> </a:t>
+            </a:r>
           </a:p>
           <a:p>
             <a:pPr marL="342900">
@@ -13027,7 +13794,7 @@
 </p:sld>
 </file>
 
-<file path=ppt/slides/slide49.xml><?xml version="1.0" encoding="utf-8"?>
+<file path=ppt/slides/slide51.xml><?xml version="1.0" encoding="utf-8"?>
 <p:sld xmlns:a="http://schemas.openxmlformats.org/drawingml/2006/main" xmlns:r="http://schemas.openxmlformats.org/officeDocument/2006/relationships" xmlns:p="http://schemas.openxmlformats.org/presentationml/2006/main">
   <p:cSld>
     <p:spTree>
@@ -13624,126 +14391,7 @@
 </p:sld>
 </file>
 
-<file path=ppt/slides/slide5.xml><?xml version="1.0" encoding="utf-8"?>
-<p:sld xmlns:a="http://schemas.openxmlformats.org/drawingml/2006/main" xmlns:r="http://schemas.openxmlformats.org/officeDocument/2006/relationships" xmlns:p="http://schemas.openxmlformats.org/presentationml/2006/main">
-  <p:cSld>
-    <p:spTree>
-      <p:nvGrpSpPr>
-        <p:cNvPr id="1" name=""/>
-        <p:cNvGrpSpPr/>
-        <p:nvPr/>
-      </p:nvGrpSpPr>
-      <p:grpSpPr>
-        <a:xfrm>
-          <a:off x="0" y="0"/>
-          <a:ext cx="0" cy="0"/>
-          <a:chOff x="0" y="0"/>
-          <a:chExt cx="0" cy="0"/>
-        </a:xfrm>
-      </p:grpSpPr>
-      <p:sp>
-        <p:nvSpPr>
-          <p:cNvPr id="2" name="Title 1">
-            <a:extLst>
-              <a:ext uri="{FF2B5EF4-FFF2-40B4-BE49-F238E27FC236}">
-                <a16:creationId xmlns:a16="http://schemas.microsoft.com/office/drawing/2014/main" id="{D74BD1D6-4648-4A50-A39A-843BA94B45D2}"/>
-              </a:ext>
-            </a:extLst>
-          </p:cNvPr>
-          <p:cNvSpPr>
-            <a:spLocks noGrp="1"/>
-          </p:cNvSpPr>
-          <p:nvPr>
-            <p:ph type="title"/>
-          </p:nvPr>
-        </p:nvSpPr>
-        <p:spPr/>
-        <p:txBody>
-          <a:bodyPr/>
-          <a:lstStyle/>
-          <a:p>
-            <a:r>
-              <a:rPr lang="en-US" dirty="0"/>
-              <a:t>Agenda</a:t>
-            </a:r>
-          </a:p>
-        </p:txBody>
-      </p:sp>
-      <p:sp>
-        <p:nvSpPr>
-          <p:cNvPr id="3" name="Content Placeholder 2">
-            <a:extLst>
-              <a:ext uri="{FF2B5EF4-FFF2-40B4-BE49-F238E27FC236}">
-                <a16:creationId xmlns:a16="http://schemas.microsoft.com/office/drawing/2014/main" id="{8A84D209-C1EC-4AE4-8D4B-F5B2D4EADFFE}"/>
-              </a:ext>
-            </a:extLst>
-          </p:cNvPr>
-          <p:cNvSpPr>
-            <a:spLocks noGrp="1"/>
-          </p:cNvSpPr>
-          <p:nvPr>
-            <p:ph idx="1"/>
-          </p:nvPr>
-        </p:nvSpPr>
-        <p:spPr/>
-        <p:txBody>
-          <a:bodyPr/>
-          <a:lstStyle/>
-          <a:p>
-            <a:r>
-              <a:rPr lang="en-US" dirty="0"/>
-              <a:t>Definitions</a:t>
-            </a:r>
-          </a:p>
-          <a:p>
-            <a:r>
-              <a:rPr lang="en-US" dirty="0"/>
-              <a:t>Purpose of a Code Review</a:t>
-            </a:r>
-          </a:p>
-          <a:p>
-            <a:r>
-              <a:rPr lang="en-US" dirty="0"/>
-              <a:t>Challenges</a:t>
-            </a:r>
-          </a:p>
-          <a:p>
-            <a:r>
-              <a:rPr lang="en-US" dirty="0"/>
-              <a:t>Techniques for Code Reviewer</a:t>
-            </a:r>
-          </a:p>
-          <a:p>
-            <a:r>
-              <a:rPr lang="en-US" dirty="0"/>
-              <a:t>Techniques for Code Author</a:t>
-            </a:r>
-          </a:p>
-          <a:p>
-            <a:r>
-              <a:rPr lang="en-US" dirty="0"/>
-              <a:t>Further Reading</a:t>
-            </a:r>
-          </a:p>
-          <a:p>
-            <a:endParaRPr lang="en-US" dirty="0"/>
-          </a:p>
-        </p:txBody>
-      </p:sp>
-    </p:spTree>
-    <p:extLst>
-      <p:ext uri="{BB962C8B-B14F-4D97-AF65-F5344CB8AC3E}">
-        <p14:creationId xmlns:p14="http://schemas.microsoft.com/office/powerpoint/2010/main" val="3491964724"/>
-      </p:ext>
-    </p:extLst>
-  </p:cSld>
-  <p:clrMapOvr>
-    <a:masterClrMapping/>
-  </p:clrMapOvr>
-</p:sld>
-</file>
-
-<file path=ppt/slides/slide50.xml><?xml version="1.0" encoding="utf-8"?>
+<file path=ppt/slides/slide52.xml><?xml version="1.0" encoding="utf-8"?>
 <p:sld xmlns:a="http://schemas.openxmlformats.org/drawingml/2006/main" xmlns:r="http://schemas.openxmlformats.org/officeDocument/2006/relationships" xmlns:p="http://schemas.openxmlformats.org/presentationml/2006/main">
   <p:cSld>
     <p:spTree>
@@ -13839,7 +14487,7 @@
 </p:sld>
 </file>
 
-<file path=ppt/slides/slide51.xml><?xml version="1.0" encoding="utf-8"?>
+<file path=ppt/slides/slide53.xml><?xml version="1.0" encoding="utf-8"?>
 <p:sld xmlns:a="http://schemas.openxmlformats.org/drawingml/2006/main" xmlns:r="http://schemas.openxmlformats.org/officeDocument/2006/relationships" xmlns:p="http://schemas.openxmlformats.org/presentationml/2006/main" show="0">
   <p:cSld>
     <p:spTree>
@@ -13991,7 +14639,7 @@
 </p:sld>
 </file>
 
-<file path=ppt/slides/slide52.xml><?xml version="1.0" encoding="utf-8"?>
+<file path=ppt/slides/slide54.xml><?xml version="1.0" encoding="utf-8"?>
 <p:sld xmlns:a="http://schemas.openxmlformats.org/drawingml/2006/main" xmlns:r="http://schemas.openxmlformats.org/officeDocument/2006/relationships" xmlns:p="http://schemas.openxmlformats.org/presentationml/2006/main">
   <p:cSld>
     <p:spTree>

</xml_diff>